<commit_message>
Adding databricks notebook demo and other related stuff
</commit_message>
<xml_diff>
--- a/Data Engineering Using Free Tools/Learn Data Engineering For Free.pptx
+++ b/Data Engineering Using Free Tools/Learn Data Engineering For Free.pptx
@@ -5,7 +5,7 @@
     <p:sldMasterId id="2147483648" r:id="rId1"/>
   </p:sldMasterIdLst>
   <p:notesMasterIdLst>
-    <p:notesMasterId r:id="rId53"/>
+    <p:notesMasterId r:id="rId57"/>
   </p:notesMasterIdLst>
   <p:sldIdLst>
     <p:sldId id="256" r:id="rId2"/>
@@ -14,51 +14,55 @@
     <p:sldId id="264" r:id="rId5"/>
     <p:sldId id="308" r:id="rId6"/>
     <p:sldId id="306" r:id="rId7"/>
-    <p:sldId id="261" r:id="rId8"/>
-    <p:sldId id="307" r:id="rId9"/>
-    <p:sldId id="258" r:id="rId10"/>
-    <p:sldId id="292" r:id="rId11"/>
-    <p:sldId id="262" r:id="rId12"/>
-    <p:sldId id="309" r:id="rId13"/>
-    <p:sldId id="275" r:id="rId14"/>
-    <p:sldId id="276" r:id="rId15"/>
-    <p:sldId id="263" r:id="rId16"/>
-    <p:sldId id="259" r:id="rId17"/>
-    <p:sldId id="277" r:id="rId18"/>
-    <p:sldId id="278" r:id="rId19"/>
-    <p:sldId id="280" r:id="rId20"/>
-    <p:sldId id="281" r:id="rId21"/>
-    <p:sldId id="283" r:id="rId22"/>
-    <p:sldId id="284" r:id="rId23"/>
-    <p:sldId id="296" r:id="rId24"/>
-    <p:sldId id="285" r:id="rId25"/>
-    <p:sldId id="289" r:id="rId26"/>
-    <p:sldId id="290" r:id="rId27"/>
-    <p:sldId id="291" r:id="rId28"/>
-    <p:sldId id="294" r:id="rId29"/>
-    <p:sldId id="286" r:id="rId30"/>
-    <p:sldId id="287" r:id="rId31"/>
-    <p:sldId id="288" r:id="rId32"/>
-    <p:sldId id="295" r:id="rId33"/>
-    <p:sldId id="297" r:id="rId34"/>
-    <p:sldId id="298" r:id="rId35"/>
-    <p:sldId id="301" r:id="rId36"/>
-    <p:sldId id="302" r:id="rId37"/>
-    <p:sldId id="303" r:id="rId38"/>
-    <p:sldId id="304" r:id="rId39"/>
-    <p:sldId id="267" r:id="rId40"/>
-    <p:sldId id="270" r:id="rId41"/>
-    <p:sldId id="266" r:id="rId42"/>
-    <p:sldId id="293" r:id="rId43"/>
-    <p:sldId id="271" r:id="rId44"/>
-    <p:sldId id="272" r:id="rId45"/>
-    <p:sldId id="273" r:id="rId46"/>
-    <p:sldId id="282" r:id="rId47"/>
-    <p:sldId id="305" r:id="rId48"/>
-    <p:sldId id="299" r:id="rId49"/>
-    <p:sldId id="300" r:id="rId50"/>
-    <p:sldId id="257" r:id="rId51"/>
-    <p:sldId id="260" r:id="rId52"/>
+    <p:sldId id="310" r:id="rId8"/>
+    <p:sldId id="261" r:id="rId9"/>
+    <p:sldId id="307" r:id="rId10"/>
+    <p:sldId id="258" r:id="rId11"/>
+    <p:sldId id="292" r:id="rId12"/>
+    <p:sldId id="262" r:id="rId13"/>
+    <p:sldId id="309" r:id="rId14"/>
+    <p:sldId id="275" r:id="rId15"/>
+    <p:sldId id="276" r:id="rId16"/>
+    <p:sldId id="263" r:id="rId17"/>
+    <p:sldId id="259" r:id="rId18"/>
+    <p:sldId id="313" r:id="rId19"/>
+    <p:sldId id="277" r:id="rId20"/>
+    <p:sldId id="278" r:id="rId21"/>
+    <p:sldId id="284" r:id="rId22"/>
+    <p:sldId id="285" r:id="rId23"/>
+    <p:sldId id="290" r:id="rId24"/>
+    <p:sldId id="291" r:id="rId25"/>
+    <p:sldId id="312" r:id="rId26"/>
+    <p:sldId id="280" r:id="rId27"/>
+    <p:sldId id="281" r:id="rId28"/>
+    <p:sldId id="283" r:id="rId29"/>
+    <p:sldId id="296" r:id="rId30"/>
+    <p:sldId id="289" r:id="rId31"/>
+    <p:sldId id="294" r:id="rId32"/>
+    <p:sldId id="286" r:id="rId33"/>
+    <p:sldId id="287" r:id="rId34"/>
+    <p:sldId id="288" r:id="rId35"/>
+    <p:sldId id="295" r:id="rId36"/>
+    <p:sldId id="297" r:id="rId37"/>
+    <p:sldId id="298" r:id="rId38"/>
+    <p:sldId id="311" r:id="rId39"/>
+    <p:sldId id="301" r:id="rId40"/>
+    <p:sldId id="302" r:id="rId41"/>
+    <p:sldId id="303" r:id="rId42"/>
+    <p:sldId id="304" r:id="rId43"/>
+    <p:sldId id="267" r:id="rId44"/>
+    <p:sldId id="270" r:id="rId45"/>
+    <p:sldId id="266" r:id="rId46"/>
+    <p:sldId id="293" r:id="rId47"/>
+    <p:sldId id="271" r:id="rId48"/>
+    <p:sldId id="272" r:id="rId49"/>
+    <p:sldId id="273" r:id="rId50"/>
+    <p:sldId id="282" r:id="rId51"/>
+    <p:sldId id="305" r:id="rId52"/>
+    <p:sldId id="299" r:id="rId53"/>
+    <p:sldId id="300" r:id="rId54"/>
+    <p:sldId id="257" r:id="rId55"/>
+    <p:sldId id="260" r:id="rId56"/>
   </p:sldIdLst>
   <p:sldSz cx="12192000" cy="6858000"/>
   <p:notesSz cx="6858000" cy="9144000"/>
@@ -168,7 +172,7 @@
 <file path=ppt/revisionInfo.xml><?xml version="1.0" encoding="utf-8"?>
 <p1510:revInfo xmlns:a="http://schemas.openxmlformats.org/drawingml/2006/main" xmlns:r="http://schemas.openxmlformats.org/officeDocument/2006/relationships" xmlns:p1510="http://schemas.microsoft.com/office/powerpoint/2015/10/main">
   <p1510:revLst>
-    <p1510:client id="{8045750F-A766-48EF-9F9C-8A19365185C6}" v="11" dt="2024-09-15T14:54:32.126"/>
+    <p1510:client id="{8045750F-A766-48EF-9F9C-8A19365185C6}" v="12" dt="2024-09-17T17:41:57.628"/>
   </p1510:revLst>
 </p1510:revInfo>
 </file>
@@ -178,7 +182,7 @@
   <pc:docChgLst>
     <pc:chgData name="Phil Austin" userId="e8cb08a9-62eb-4c3a-858b-569f98079d08" providerId="ADAL" clId="{8045750F-A766-48EF-9F9C-8A19365185C6}"/>
     <pc:docChg chg="undo custSel addSld delSld modSld sldOrd">
-      <pc:chgData name="Phil Austin" userId="e8cb08a9-62eb-4c3a-858b-569f98079d08" providerId="ADAL" clId="{8045750F-A766-48EF-9F9C-8A19365185C6}" dt="2024-09-15T15:27:40.388" v="1045" actId="47"/>
+      <pc:chgData name="Phil Austin" userId="e8cb08a9-62eb-4c3a-858b-569f98079d08" providerId="ADAL" clId="{8045750F-A766-48EF-9F9C-8A19365185C6}" dt="2024-09-19T20:11:55.639" v="1094" actId="27636"/>
       <pc:docMkLst>
         <pc:docMk/>
       </pc:docMkLst>
@@ -942,7 +946,7 @@
         </pc:picChg>
       </pc:sldChg>
       <pc:sldChg chg="addSp delSp modSp new mod ord">
-        <pc:chgData name="Phil Austin" userId="e8cb08a9-62eb-4c3a-858b-569f98079d08" providerId="ADAL" clId="{8045750F-A766-48EF-9F9C-8A19365185C6}" dt="2024-09-15T15:25:22.725" v="1034"/>
+        <pc:chgData name="Phil Austin" userId="e8cb08a9-62eb-4c3a-858b-569f98079d08" providerId="ADAL" clId="{8045750F-A766-48EF-9F9C-8A19365185C6}" dt="2024-09-19T17:08:08.095" v="1058"/>
         <pc:sldMkLst>
           <pc:docMk/>
           <pc:sldMk cId="4274672877" sldId="283"/>
@@ -981,7 +985,7 @@
         </pc:picChg>
       </pc:sldChg>
       <pc:sldChg chg="addSp delSp modSp new mod ord">
-        <pc:chgData name="Phil Austin" userId="e8cb08a9-62eb-4c3a-858b-569f98079d08" providerId="ADAL" clId="{8045750F-A766-48EF-9F9C-8A19365185C6}" dt="2024-09-15T15:25:22.725" v="1034"/>
+        <pc:chgData name="Phil Austin" userId="e8cb08a9-62eb-4c3a-858b-569f98079d08" providerId="ADAL" clId="{8045750F-A766-48EF-9F9C-8A19365185C6}" dt="2024-09-19T17:09:11.971" v="1074"/>
         <pc:sldMkLst>
           <pc:docMk/>
           <pc:sldMk cId="497924248" sldId="284"/>
@@ -1012,7 +1016,7 @@
         </pc:picChg>
       </pc:sldChg>
       <pc:sldChg chg="addSp delSp modSp new mod ord">
-        <pc:chgData name="Phil Austin" userId="e8cb08a9-62eb-4c3a-858b-569f98079d08" providerId="ADAL" clId="{8045750F-A766-48EF-9F9C-8A19365185C6}" dt="2024-09-15T15:25:22.725" v="1034"/>
+        <pc:chgData name="Phil Austin" userId="e8cb08a9-62eb-4c3a-858b-569f98079d08" providerId="ADAL" clId="{8045750F-A766-48EF-9F9C-8A19365185C6}" dt="2024-09-19T17:09:05.081" v="1070"/>
         <pc:sldMkLst>
           <pc:docMk/>
           <pc:sldMk cId="711803047" sldId="285"/>
@@ -1175,11 +1179,19 @@
         </pc:picChg>
       </pc:sldChg>
       <pc:sldChg chg="addSp delSp modSp new mod ord">
-        <pc:chgData name="Phil Austin" userId="e8cb08a9-62eb-4c3a-858b-569f98079d08" providerId="ADAL" clId="{8045750F-A766-48EF-9F9C-8A19365185C6}" dt="2024-09-15T15:25:22.725" v="1034"/>
+        <pc:chgData name="Phil Austin" userId="e8cb08a9-62eb-4c3a-858b-569f98079d08" providerId="ADAL" clId="{8045750F-A766-48EF-9F9C-8A19365185C6}" dt="2024-09-19T20:10:29.490" v="1088" actId="14100"/>
         <pc:sldMkLst>
           <pc:docMk/>
           <pc:sldMk cId="2631230412" sldId="290"/>
         </pc:sldMkLst>
+        <pc:spChg chg="mod">
+          <ac:chgData name="Phil Austin" userId="e8cb08a9-62eb-4c3a-858b-569f98079d08" providerId="ADAL" clId="{8045750F-A766-48EF-9F9C-8A19365185C6}" dt="2024-09-19T20:10:29.490" v="1088" actId="14100"/>
+          <ac:spMkLst>
+            <pc:docMk/>
+            <pc:sldMk cId="2631230412" sldId="290"/>
+            <ac:spMk id="2" creationId="{A9BC8783-6E9D-F9AF-AB14-9E9E3094A2C0}"/>
+          </ac:spMkLst>
+        </pc:spChg>
         <pc:spChg chg="del">
           <ac:chgData name="Phil Austin" userId="e8cb08a9-62eb-4c3a-858b-569f98079d08" providerId="ADAL" clId="{8045750F-A766-48EF-9F9C-8A19365185C6}" dt="2024-09-08T11:39:48.916" v="621" actId="478"/>
           <ac:spMkLst>
@@ -1197,7 +1209,7 @@
           </ac:picMkLst>
         </pc:picChg>
         <pc:picChg chg="add mod">
-          <ac:chgData name="Phil Austin" userId="e8cb08a9-62eb-4c3a-858b-569f98079d08" providerId="ADAL" clId="{8045750F-A766-48EF-9F9C-8A19365185C6}" dt="2024-09-08T11:41:43.262" v="632" actId="1076"/>
+          <ac:chgData name="Phil Austin" userId="e8cb08a9-62eb-4c3a-858b-569f98079d08" providerId="ADAL" clId="{8045750F-A766-48EF-9F9C-8A19365185C6}" dt="2024-09-19T20:10:25.518" v="1087" actId="14100"/>
           <ac:picMkLst>
             <pc:docMk/>
             <pc:sldMk cId="2631230412" sldId="290"/>
@@ -1206,7 +1218,7 @@
         </pc:picChg>
       </pc:sldChg>
       <pc:sldChg chg="addSp delSp modSp new mod ord">
-        <pc:chgData name="Phil Austin" userId="e8cb08a9-62eb-4c3a-858b-569f98079d08" providerId="ADAL" clId="{8045750F-A766-48EF-9F9C-8A19365185C6}" dt="2024-09-15T15:25:22.725" v="1034"/>
+        <pc:chgData name="Phil Austin" userId="e8cb08a9-62eb-4c3a-858b-569f98079d08" providerId="ADAL" clId="{8045750F-A766-48EF-9F9C-8A19365185C6}" dt="2024-09-19T20:08:59.122" v="1086" actId="22"/>
         <pc:sldMkLst>
           <pc:docMk/>
           <pc:sldMk cId="1718911435" sldId="291"/>
@@ -1219,6 +1231,14 @@
             <ac:spMk id="3" creationId="{4C142AB6-0CF0-C1B6-F885-E91D39BD0623}"/>
           </ac:spMkLst>
         </pc:spChg>
+        <pc:picChg chg="add">
+          <ac:chgData name="Phil Austin" userId="e8cb08a9-62eb-4c3a-858b-569f98079d08" providerId="ADAL" clId="{8045750F-A766-48EF-9F9C-8A19365185C6}" dt="2024-09-19T20:08:59.122" v="1086" actId="22"/>
+          <ac:picMkLst>
+            <pc:docMk/>
+            <pc:sldMk cId="1718911435" sldId="291"/>
+            <ac:picMk id="4" creationId="{4F69654C-6DA8-2205-4B70-B0177BA26CE7}"/>
+          </ac:picMkLst>
+        </pc:picChg>
         <pc:picChg chg="add del mod">
           <ac:chgData name="Phil Austin" userId="e8cb08a9-62eb-4c3a-858b-569f98079d08" providerId="ADAL" clId="{8045750F-A766-48EF-9F9C-8A19365185C6}" dt="2024-09-08T11:44:39.186" v="637" actId="478"/>
           <ac:picMkLst>
@@ -1235,8 +1255,8 @@
             <ac:picMk id="7" creationId="{FE4CE226-F8C9-86F2-AF26-1670DE42F821}"/>
           </ac:picMkLst>
         </pc:picChg>
-        <pc:picChg chg="add mod">
-          <ac:chgData name="Phil Austin" userId="e8cb08a9-62eb-4c3a-858b-569f98079d08" providerId="ADAL" clId="{8045750F-A766-48EF-9F9C-8A19365185C6}" dt="2024-09-08T11:52:21.910" v="655" actId="1076"/>
+        <pc:picChg chg="add del mod">
+          <ac:chgData name="Phil Austin" userId="e8cb08a9-62eb-4c3a-858b-569f98079d08" providerId="ADAL" clId="{8045750F-A766-48EF-9F9C-8A19365185C6}" dt="2024-09-19T20:05:42.863" v="1085" actId="478"/>
           <ac:picMkLst>
             <pc:docMk/>
             <pc:sldMk cId="1718911435" sldId="291"/>
@@ -1769,6 +1789,75 @@
           <pc:docMk/>
           <pc:sldMk cId="4075518487" sldId="309"/>
         </pc:sldMkLst>
+      </pc:sldChg>
+      <pc:sldChg chg="addSp delSp modSp add mod">
+        <pc:chgData name="Phil Austin" userId="e8cb08a9-62eb-4c3a-858b-569f98079d08" providerId="ADAL" clId="{8045750F-A766-48EF-9F9C-8A19365185C6}" dt="2024-09-17T17:42:16.357" v="1053" actId="20577"/>
+        <pc:sldMkLst>
+          <pc:docMk/>
+          <pc:sldMk cId="439281930" sldId="310"/>
+        </pc:sldMkLst>
+        <pc:spChg chg="mod">
+          <ac:chgData name="Phil Austin" userId="e8cb08a9-62eb-4c3a-858b-569f98079d08" providerId="ADAL" clId="{8045750F-A766-48EF-9F9C-8A19365185C6}" dt="2024-09-17T17:42:16.357" v="1053" actId="20577"/>
+          <ac:spMkLst>
+            <pc:docMk/>
+            <pc:sldMk cId="439281930" sldId="310"/>
+            <ac:spMk id="2" creationId="{838AC0F5-5B6B-B939-FA3C-B663E317E445}"/>
+          </ac:spMkLst>
+        </pc:spChg>
+        <pc:spChg chg="del">
+          <ac:chgData name="Phil Austin" userId="e8cb08a9-62eb-4c3a-858b-569f98079d08" providerId="ADAL" clId="{8045750F-A766-48EF-9F9C-8A19365185C6}" dt="2024-09-17T17:42:08.182" v="1047" actId="478"/>
+          <ac:spMkLst>
+            <pc:docMk/>
+            <pc:sldMk cId="439281930" sldId="310"/>
+            <ac:spMk id="3" creationId="{F8A13E07-A759-E54C-79C1-64A09C31C106}"/>
+          </ac:spMkLst>
+        </pc:spChg>
+        <pc:spChg chg="add del mod">
+          <ac:chgData name="Phil Austin" userId="e8cb08a9-62eb-4c3a-858b-569f98079d08" providerId="ADAL" clId="{8045750F-A766-48EF-9F9C-8A19365185C6}" dt="2024-09-17T17:42:11.316" v="1048" actId="478"/>
+          <ac:spMkLst>
+            <pc:docMk/>
+            <pc:sldMk cId="439281930" sldId="310"/>
+            <ac:spMk id="5" creationId="{0D1C1B8B-1192-809F-CED6-DF41C521D2BB}"/>
+          </ac:spMkLst>
+        </pc:spChg>
+      </pc:sldChg>
+      <pc:sldChg chg="new">
+        <pc:chgData name="Phil Austin" userId="e8cb08a9-62eb-4c3a-858b-569f98079d08" providerId="ADAL" clId="{8045750F-A766-48EF-9F9C-8A19365185C6}" dt="2024-09-17T17:53:12.151" v="1054" actId="680"/>
+        <pc:sldMkLst>
+          <pc:docMk/>
+          <pc:sldMk cId="3703701476" sldId="311"/>
+        </pc:sldMkLst>
+      </pc:sldChg>
+      <pc:sldChg chg="addSp delSp modSp add mod">
+        <pc:chgData name="Phil Austin" userId="e8cb08a9-62eb-4c3a-858b-569f98079d08" providerId="ADAL" clId="{8045750F-A766-48EF-9F9C-8A19365185C6}" dt="2024-09-19T20:11:55.639" v="1094" actId="27636"/>
+        <pc:sldMkLst>
+          <pc:docMk/>
+          <pc:sldMk cId="3447463729" sldId="312"/>
+        </pc:sldMkLst>
+        <pc:spChg chg="mod">
+          <ac:chgData name="Phil Austin" userId="e8cb08a9-62eb-4c3a-858b-569f98079d08" providerId="ADAL" clId="{8045750F-A766-48EF-9F9C-8A19365185C6}" dt="2024-09-19T20:11:55.639" v="1094" actId="27636"/>
+          <ac:spMkLst>
+            <pc:docMk/>
+            <pc:sldMk cId="3447463729" sldId="312"/>
+            <ac:spMk id="2" creationId="{21017636-EA3E-8FEF-99A9-52E40CE4CEE3}"/>
+          </ac:spMkLst>
+        </pc:spChg>
+        <pc:picChg chg="del">
+          <ac:chgData name="Phil Austin" userId="e8cb08a9-62eb-4c3a-858b-569f98079d08" providerId="ADAL" clId="{8045750F-A766-48EF-9F9C-8A19365185C6}" dt="2024-09-19T20:11:16.148" v="1090" actId="478"/>
+          <ac:picMkLst>
+            <pc:docMk/>
+            <pc:sldMk cId="3447463729" sldId="312"/>
+            <ac:picMk id="4" creationId="{4F69654C-6DA8-2205-4B70-B0177BA26CE7}"/>
+          </ac:picMkLst>
+        </pc:picChg>
+        <pc:picChg chg="add mod">
+          <ac:chgData name="Phil Austin" userId="e8cb08a9-62eb-4c3a-858b-569f98079d08" providerId="ADAL" clId="{8045750F-A766-48EF-9F9C-8A19365185C6}" dt="2024-09-19T20:11:49.359" v="1092" actId="14100"/>
+          <ac:picMkLst>
+            <pc:docMk/>
+            <pc:sldMk cId="3447463729" sldId="312"/>
+            <ac:picMk id="5" creationId="{8F5E4456-8C4D-4A3F-7FEB-51C36B0663E7}"/>
+          </ac:picMkLst>
+        </pc:picChg>
       </pc:sldChg>
     </pc:docChg>
   </pc:docChgLst>
@@ -1857,7 +1946,7 @@
           <a:p>
             <a:fld id="{C49D3115-C41D-4930-8EF3-A657CFCC644E}" type="datetimeFigureOut">
               <a:rPr lang="en-GB" smtClean="0"/>
-              <a:t>15/09/2024</a:t>
+              <a:t>21/09/2024</a:t>
             </a:fld>
             <a:endParaRPr lang="en-GB"/>
           </a:p>
@@ -2190,7 +2279,7 @@
           <a:p>
             <a:fld id="{E7E8E24E-2DA5-414D-9B85-6ED9E2618CC6}" type="slidenum">
               <a:rPr lang="en-GB" smtClean="0"/>
-              <a:t>21</a:t>
+              <a:t>28</a:t>
             </a:fld>
             <a:endParaRPr lang="en-GB"/>
           </a:p>
@@ -2358,7 +2447,7 @@
           <a:p>
             <a:fld id="{35275B4F-5DE5-4D53-BD3B-F0C44FE589B2}" type="datetimeFigureOut">
               <a:rPr lang="en-GB" smtClean="0"/>
-              <a:t>15/09/2024</a:t>
+              <a:t>21/09/2024</a:t>
             </a:fld>
             <a:endParaRPr lang="en-GB"/>
           </a:p>
@@ -2558,7 +2647,7 @@
           <a:p>
             <a:fld id="{35275B4F-5DE5-4D53-BD3B-F0C44FE589B2}" type="datetimeFigureOut">
               <a:rPr lang="en-GB" smtClean="0"/>
-              <a:t>15/09/2024</a:t>
+              <a:t>21/09/2024</a:t>
             </a:fld>
             <a:endParaRPr lang="en-GB"/>
           </a:p>
@@ -2768,7 +2857,7 @@
           <a:p>
             <a:fld id="{35275B4F-5DE5-4D53-BD3B-F0C44FE589B2}" type="datetimeFigureOut">
               <a:rPr lang="en-GB" smtClean="0"/>
-              <a:t>15/09/2024</a:t>
+              <a:t>21/09/2024</a:t>
             </a:fld>
             <a:endParaRPr lang="en-GB"/>
           </a:p>
@@ -2968,7 +3057,7 @@
           <a:p>
             <a:fld id="{35275B4F-5DE5-4D53-BD3B-F0C44FE589B2}" type="datetimeFigureOut">
               <a:rPr lang="en-GB" smtClean="0"/>
-              <a:t>15/09/2024</a:t>
+              <a:t>21/09/2024</a:t>
             </a:fld>
             <a:endParaRPr lang="en-GB"/>
           </a:p>
@@ -3244,7 +3333,7 @@
           <a:p>
             <a:fld id="{35275B4F-5DE5-4D53-BD3B-F0C44FE589B2}" type="datetimeFigureOut">
               <a:rPr lang="en-GB" smtClean="0"/>
-              <a:t>15/09/2024</a:t>
+              <a:t>21/09/2024</a:t>
             </a:fld>
             <a:endParaRPr lang="en-GB"/>
           </a:p>
@@ -3512,7 +3601,7 @@
           <a:p>
             <a:fld id="{35275B4F-5DE5-4D53-BD3B-F0C44FE589B2}" type="datetimeFigureOut">
               <a:rPr lang="en-GB" smtClean="0"/>
-              <a:t>15/09/2024</a:t>
+              <a:t>21/09/2024</a:t>
             </a:fld>
             <a:endParaRPr lang="en-GB"/>
           </a:p>
@@ -3927,7 +4016,7 @@
           <a:p>
             <a:fld id="{35275B4F-5DE5-4D53-BD3B-F0C44FE589B2}" type="datetimeFigureOut">
               <a:rPr lang="en-GB" smtClean="0"/>
-              <a:t>15/09/2024</a:t>
+              <a:t>21/09/2024</a:t>
             </a:fld>
             <a:endParaRPr lang="en-GB"/>
           </a:p>
@@ -4069,7 +4158,7 @@
           <a:p>
             <a:fld id="{35275B4F-5DE5-4D53-BD3B-F0C44FE589B2}" type="datetimeFigureOut">
               <a:rPr lang="en-GB" smtClean="0"/>
-              <a:t>15/09/2024</a:t>
+              <a:t>21/09/2024</a:t>
             </a:fld>
             <a:endParaRPr lang="en-GB"/>
           </a:p>
@@ -4182,7 +4271,7 @@
           <a:p>
             <a:fld id="{35275B4F-5DE5-4D53-BD3B-F0C44FE589B2}" type="datetimeFigureOut">
               <a:rPr lang="en-GB" smtClean="0"/>
-              <a:t>15/09/2024</a:t>
+              <a:t>21/09/2024</a:t>
             </a:fld>
             <a:endParaRPr lang="en-GB"/>
           </a:p>
@@ -4495,7 +4584,7 @@
           <a:p>
             <a:fld id="{35275B4F-5DE5-4D53-BD3B-F0C44FE589B2}" type="datetimeFigureOut">
               <a:rPr lang="en-GB" smtClean="0"/>
-              <a:t>15/09/2024</a:t>
+              <a:t>21/09/2024</a:t>
             </a:fld>
             <a:endParaRPr lang="en-GB"/>
           </a:p>
@@ -4784,7 +4873,7 @@
           <a:p>
             <a:fld id="{35275B4F-5DE5-4D53-BD3B-F0C44FE589B2}" type="datetimeFigureOut">
               <a:rPr lang="en-GB" smtClean="0"/>
-              <a:t>15/09/2024</a:t>
+              <a:t>21/09/2024</a:t>
             </a:fld>
             <a:endParaRPr lang="en-GB"/>
           </a:p>
@@ -5027,7 +5116,7 @@
           <a:p>
             <a:fld id="{35275B4F-5DE5-4D53-BD3B-F0C44FE589B2}" type="datetimeFigureOut">
               <a:rPr lang="en-GB" smtClean="0"/>
-              <a:t>15/09/2024</a:t>
+              <a:t>21/09/2024</a:t>
             </a:fld>
             <a:endParaRPr lang="en-GB"/>
           </a:p>
@@ -5529,6 +5618,116 @@
           <p:cNvPr id="2" name="Title 1">
             <a:extLst>
               <a:ext uri="{FF2B5EF4-FFF2-40B4-BE49-F238E27FC236}">
+                <a16:creationId xmlns:a16="http://schemas.microsoft.com/office/drawing/2014/main" id="{17E4CBBF-6487-8E96-192F-A817DFB10918}"/>
+              </a:ext>
+            </a:extLst>
+          </p:cNvPr>
+          <p:cNvSpPr>
+            <a:spLocks noGrp="1"/>
+          </p:cNvSpPr>
+          <p:nvPr>
+            <p:ph type="title"/>
+          </p:nvPr>
+        </p:nvSpPr>
+        <p:spPr/>
+        <p:txBody>
+          <a:bodyPr/>
+          <a:lstStyle/>
+          <a:p>
+            <a:r>
+              <a:rPr lang="en-GB" dirty="0"/>
+              <a:t>Data &amp; Databases</a:t>
+            </a:r>
+          </a:p>
+        </p:txBody>
+      </p:sp>
+      <p:sp>
+        <p:nvSpPr>
+          <p:cNvPr id="3" name="Content Placeholder 2">
+            <a:extLst>
+              <a:ext uri="{FF2B5EF4-FFF2-40B4-BE49-F238E27FC236}">
+                <a16:creationId xmlns:a16="http://schemas.microsoft.com/office/drawing/2014/main" id="{4EA3B715-9AC1-E540-E1D0-85781B1B6F2D}"/>
+              </a:ext>
+            </a:extLst>
+          </p:cNvPr>
+          <p:cNvSpPr>
+            <a:spLocks noGrp="1"/>
+          </p:cNvSpPr>
+          <p:nvPr>
+            <p:ph idx="1"/>
+          </p:nvPr>
+        </p:nvSpPr>
+        <p:spPr/>
+        <p:txBody>
+          <a:bodyPr/>
+          <a:lstStyle/>
+          <a:p>
+            <a:r>
+              <a:rPr lang="en-GB" dirty="0"/>
+              <a:t>Concepts to Learn: Data types, databases (SQL and NoSQL), data structures.</a:t>
+            </a:r>
+          </a:p>
+          <a:p>
+            <a:endParaRPr lang="en-GB" dirty="0"/>
+          </a:p>
+          <a:p>
+            <a:r>
+              <a:rPr lang="en-GB" dirty="0"/>
+              <a:t>Tools/Resources:</a:t>
+            </a:r>
+          </a:p>
+          <a:p>
+            <a:r>
+              <a:rPr lang="en-GB" dirty="0"/>
+              <a:t>Azure SQL Database - free tier available</a:t>
+            </a:r>
+          </a:p>
+          <a:p>
+            <a:r>
+              <a:rPr lang="en-GB" dirty="0"/>
+              <a:t>Cosmos DB: Explore NoSQL databases with a limited free tier on Azure.</a:t>
+            </a:r>
+          </a:p>
+          <a:p>
+            <a:endParaRPr lang="en-GB" dirty="0"/>
+          </a:p>
+        </p:txBody>
+      </p:sp>
+    </p:spTree>
+    <p:extLst>
+      <p:ext uri="{BB962C8B-B14F-4D97-AF65-F5344CB8AC3E}">
+        <p14:creationId xmlns:p14="http://schemas.microsoft.com/office/powerpoint/2010/main" val="4098208133"/>
+      </p:ext>
+    </p:extLst>
+  </p:cSld>
+  <p:clrMapOvr>
+    <a:masterClrMapping/>
+  </p:clrMapOvr>
+</p:sld>
+</file>
+
+<file path=ppt/slides/slide11.xml><?xml version="1.0" encoding="utf-8"?>
+<p:sld xmlns:a="http://schemas.openxmlformats.org/drawingml/2006/main" xmlns:r="http://schemas.openxmlformats.org/officeDocument/2006/relationships" xmlns:p="http://schemas.openxmlformats.org/presentationml/2006/main">
+  <p:cSld>
+    <p:spTree>
+      <p:nvGrpSpPr>
+        <p:cNvPr id="1" name=""/>
+        <p:cNvGrpSpPr/>
+        <p:nvPr/>
+      </p:nvGrpSpPr>
+      <p:grpSpPr>
+        <a:xfrm>
+          <a:off x="0" y="0"/>
+          <a:ext cx="0" cy="0"/>
+          <a:chOff x="0" y="0"/>
+          <a:chExt cx="0" cy="0"/>
+        </a:xfrm>
+      </p:grpSpPr>
+      <p:sp>
+        <p:nvSpPr>
+          <p:cNvPr id="2" name="Title 1">
+            <a:extLst>
+              <a:ext uri="{FF2B5EF4-FFF2-40B4-BE49-F238E27FC236}">
                 <a16:creationId xmlns:a16="http://schemas.microsoft.com/office/drawing/2014/main" id="{3C83975B-EF01-7C43-08F4-D4643AE62A88}"/>
               </a:ext>
             </a:extLst>
@@ -5592,7 +5791,7 @@
 </p:sld>
 </file>
 
-<file path=ppt/slides/slide11.xml><?xml version="1.0" encoding="utf-8"?>
+<file path=ppt/slides/slide12.xml><?xml version="1.0" encoding="utf-8"?>
 <p:sld xmlns:a="http://schemas.openxmlformats.org/drawingml/2006/main" xmlns:r="http://schemas.openxmlformats.org/officeDocument/2006/relationships" xmlns:p="http://schemas.openxmlformats.org/presentationml/2006/main">
   <p:cSld>
     <p:spTree>
@@ -5708,7 +5907,7 @@
 </p:sld>
 </file>
 
-<file path=ppt/slides/slide12.xml><?xml version="1.0" encoding="utf-8"?>
+<file path=ppt/slides/slide13.xml><?xml version="1.0" encoding="utf-8"?>
 <p:sld xmlns:a="http://schemas.openxmlformats.org/drawingml/2006/main" xmlns:r="http://schemas.openxmlformats.org/officeDocument/2006/relationships" xmlns:p="http://schemas.openxmlformats.org/presentationml/2006/main">
   <p:cSld>
     <p:spTree>
@@ -5801,7 +6000,7 @@
 </p:sld>
 </file>
 
-<file path=ppt/slides/slide13.xml><?xml version="1.0" encoding="utf-8"?>
+<file path=ppt/slides/slide14.xml><?xml version="1.0" encoding="utf-8"?>
 <p:sld xmlns:a="http://schemas.openxmlformats.org/drawingml/2006/main" xmlns:r="http://schemas.openxmlformats.org/officeDocument/2006/relationships" xmlns:p="http://schemas.openxmlformats.org/presentationml/2006/main">
   <p:cSld>
     <p:spTree>
@@ -5894,7 +6093,7 @@
 </p:sld>
 </file>
 
-<file path=ppt/slides/slide14.xml><?xml version="1.0" encoding="utf-8"?>
+<file path=ppt/slides/slide15.xml><?xml version="1.0" encoding="utf-8"?>
 <p:sld xmlns:a="http://schemas.openxmlformats.org/drawingml/2006/main" xmlns:r="http://schemas.openxmlformats.org/officeDocument/2006/relationships" xmlns:p="http://schemas.openxmlformats.org/presentationml/2006/main">
   <p:cSld>
     <p:spTree>
@@ -5987,7 +6186,7 @@
 </p:sld>
 </file>
 
-<file path=ppt/slides/slide15.xml><?xml version="1.0" encoding="utf-8"?>
+<file path=ppt/slides/slide16.xml><?xml version="1.0" encoding="utf-8"?>
 <p:sld xmlns:a="http://schemas.openxmlformats.org/drawingml/2006/main" xmlns:r="http://schemas.openxmlformats.org/officeDocument/2006/relationships" xmlns:p="http://schemas.openxmlformats.org/presentationml/2006/main">
   <p:cSld>
     <p:spTree>
@@ -6108,7 +6307,7 @@
 </p:sld>
 </file>
 
-<file path=ppt/slides/slide16.xml><?xml version="1.0" encoding="utf-8"?>
+<file path=ppt/slides/slide17.xml><?xml version="1.0" encoding="utf-8"?>
 <p:sld xmlns:a="http://schemas.openxmlformats.org/drawingml/2006/main" xmlns:r="http://schemas.openxmlformats.org/officeDocument/2006/relationships" xmlns:p="http://schemas.openxmlformats.org/presentationml/2006/main">
   <p:cSld>
     <p:spTree>
@@ -6245,126 +6444,6 @@
 </p:sld>
 </file>
 
-<file path=ppt/slides/slide17.xml><?xml version="1.0" encoding="utf-8"?>
-<p:sld xmlns:a="http://schemas.openxmlformats.org/drawingml/2006/main" xmlns:r="http://schemas.openxmlformats.org/officeDocument/2006/relationships" xmlns:p="http://schemas.openxmlformats.org/presentationml/2006/main">
-  <p:cSld>
-    <p:spTree>
-      <p:nvGrpSpPr>
-        <p:cNvPr id="1" name=""/>
-        <p:cNvGrpSpPr/>
-        <p:nvPr/>
-      </p:nvGrpSpPr>
-      <p:grpSpPr>
-        <a:xfrm>
-          <a:off x="0" y="0"/>
-          <a:ext cx="0" cy="0"/>
-          <a:chOff x="0" y="0"/>
-          <a:chExt cx="0" cy="0"/>
-        </a:xfrm>
-      </p:grpSpPr>
-      <p:sp>
-        <p:nvSpPr>
-          <p:cNvPr id="2" name="Title 1">
-            <a:extLst>
-              <a:ext uri="{FF2B5EF4-FFF2-40B4-BE49-F238E27FC236}">
-                <a16:creationId xmlns:a16="http://schemas.microsoft.com/office/drawing/2014/main" id="{BFAC80B4-447D-E463-8661-F82BB0566396}"/>
-              </a:ext>
-            </a:extLst>
-          </p:cNvPr>
-          <p:cNvSpPr>
-            <a:spLocks noGrp="1"/>
-          </p:cNvSpPr>
-          <p:nvPr>
-            <p:ph type="title"/>
-          </p:nvPr>
-        </p:nvSpPr>
-        <p:spPr>
-          <a:xfrm>
-            <a:off x="838200" y="365125"/>
-            <a:ext cx="10515600" cy="911225"/>
-          </a:xfrm>
-        </p:spPr>
-        <p:txBody>
-          <a:bodyPr/>
-          <a:lstStyle/>
-          <a:p>
-            <a:endParaRPr lang="en-GB" dirty="0"/>
-          </a:p>
-        </p:txBody>
-      </p:sp>
-      <p:pic>
-        <p:nvPicPr>
-          <p:cNvPr id="5" name="Picture 4">
-            <a:extLst>
-              <a:ext uri="{FF2B5EF4-FFF2-40B4-BE49-F238E27FC236}">
-                <a16:creationId xmlns:a16="http://schemas.microsoft.com/office/drawing/2014/main" id="{201CED20-40B3-81D8-3E22-C3ED7D00E0AA}"/>
-              </a:ext>
-            </a:extLst>
-          </p:cNvPr>
-          <p:cNvPicPr>
-            <a:picLocks noChangeAspect="1"/>
-          </p:cNvPicPr>
-          <p:nvPr/>
-        </p:nvPicPr>
-        <p:blipFill>
-          <a:blip r:embed="rId2"/>
-          <a:stretch>
-            <a:fillRect/>
-          </a:stretch>
-        </p:blipFill>
-        <p:spPr>
-          <a:xfrm>
-            <a:off x="838200" y="1461845"/>
-            <a:ext cx="6232082" cy="2316405"/>
-          </a:xfrm>
-          <a:prstGeom prst="rect">
-            <a:avLst/>
-          </a:prstGeom>
-        </p:spPr>
-      </p:pic>
-      <p:pic>
-        <p:nvPicPr>
-          <p:cNvPr id="7" name="Picture 6">
-            <a:extLst>
-              <a:ext uri="{FF2B5EF4-FFF2-40B4-BE49-F238E27FC236}">
-                <a16:creationId xmlns:a16="http://schemas.microsoft.com/office/drawing/2014/main" id="{F4C98D34-33BF-17A3-51E1-241C734185DA}"/>
-              </a:ext>
-            </a:extLst>
-          </p:cNvPr>
-          <p:cNvPicPr>
-            <a:picLocks noChangeAspect="1"/>
-          </p:cNvPicPr>
-          <p:nvPr/>
-        </p:nvPicPr>
-        <p:blipFill>
-          <a:blip r:embed="rId3"/>
-          <a:stretch>
-            <a:fillRect/>
-          </a:stretch>
-        </p:blipFill>
-        <p:spPr>
-          <a:xfrm>
-            <a:off x="838200" y="4136867"/>
-            <a:ext cx="6232082" cy="1868055"/>
-          </a:xfrm>
-          <a:prstGeom prst="rect">
-            <a:avLst/>
-          </a:prstGeom>
-        </p:spPr>
-      </p:pic>
-    </p:spTree>
-    <p:extLst>
-      <p:ext uri="{BB962C8B-B14F-4D97-AF65-F5344CB8AC3E}">
-        <p14:creationId xmlns:p14="http://schemas.microsoft.com/office/powerpoint/2010/main" val="2078073998"/>
-      </p:ext>
-    </p:extLst>
-  </p:cSld>
-  <p:clrMapOvr>
-    <a:masterClrMapping/>
-  </p:clrMapOvr>
-</p:sld>
-</file>
-
 <file path=ppt/slides/slide18.xml><?xml version="1.0" encoding="utf-8"?>
 <p:sld xmlns:a="http://schemas.openxmlformats.org/drawingml/2006/main" xmlns:r="http://schemas.openxmlformats.org/officeDocument/2006/relationships" xmlns:p="http://schemas.openxmlformats.org/presentationml/2006/main">
   <p:cSld>
@@ -6387,7 +6466,7 @@
           <p:cNvPr id="2" name="Title 1">
             <a:extLst>
               <a:ext uri="{FF2B5EF4-FFF2-40B4-BE49-F238E27FC236}">
-                <a16:creationId xmlns:a16="http://schemas.microsoft.com/office/drawing/2014/main" id="{18E77E9E-521E-D666-1172-EA04863A7EE5}"/>
+                <a16:creationId xmlns:a16="http://schemas.microsoft.com/office/drawing/2014/main" id="{12485F72-3D84-4EED-32F6-699CF9A5F075}"/>
               </a:ext>
             </a:extLst>
           </p:cNvPr>
@@ -6398,7 +6477,12 @@
             <p:ph type="title"/>
           </p:nvPr>
         </p:nvSpPr>
-        <p:spPr/>
+        <p:spPr>
+          <a:xfrm>
+            <a:off x="838200" y="365125"/>
+            <a:ext cx="9616200" cy="894875"/>
+          </a:xfrm>
+        </p:spPr>
         <p:txBody>
           <a:bodyPr/>
           <a:lstStyle/>
@@ -6409,10 +6493,10 @@
       </p:sp>
       <p:pic>
         <p:nvPicPr>
-          <p:cNvPr id="5" name="Picture 4">
-            <a:extLst>
-              <a:ext uri="{FF2B5EF4-FFF2-40B4-BE49-F238E27FC236}">
-                <a16:creationId xmlns:a16="http://schemas.microsoft.com/office/drawing/2014/main" id="{7F29A0FD-412A-4FF6-269A-9279CA60F87E}"/>
+          <p:cNvPr id="4" name="Picture 3">
+            <a:extLst>
+              <a:ext uri="{FF2B5EF4-FFF2-40B4-BE49-F238E27FC236}">
+                <a16:creationId xmlns:a16="http://schemas.microsoft.com/office/drawing/2014/main" id="{40139D6D-6F1B-BA21-B499-E6B83E65CACB}"/>
               </a:ext>
             </a:extLst>
           </p:cNvPr>
@@ -6429,8 +6513,8 @@
         </p:blipFill>
         <p:spPr>
           <a:xfrm>
-            <a:off x="838200" y="1861257"/>
-            <a:ext cx="7687645" cy="3135485"/>
+            <a:off x="838200" y="1690688"/>
+            <a:ext cx="8844000" cy="4906476"/>
           </a:xfrm>
           <a:prstGeom prst="rect">
             <a:avLst/>
@@ -6440,7 +6524,7 @@
     </p:spTree>
     <p:extLst>
       <p:ext uri="{BB962C8B-B14F-4D97-AF65-F5344CB8AC3E}">
-        <p14:creationId xmlns:p14="http://schemas.microsoft.com/office/powerpoint/2010/main" val="1708826250"/>
+        <p14:creationId xmlns:p14="http://schemas.microsoft.com/office/powerpoint/2010/main" val="3973721547"/>
       </p:ext>
     </p:extLst>
   </p:cSld>
@@ -6472,7 +6556,7 @@
           <p:cNvPr id="2" name="Title 1">
             <a:extLst>
               <a:ext uri="{FF2B5EF4-FFF2-40B4-BE49-F238E27FC236}">
-                <a16:creationId xmlns:a16="http://schemas.microsoft.com/office/drawing/2014/main" id="{F34501D7-A5A1-B14C-9DF8-33D23D87D92F}"/>
+                <a16:creationId xmlns:a16="http://schemas.microsoft.com/office/drawing/2014/main" id="{BFAC80B4-447D-E463-8661-F82BB0566396}"/>
               </a:ext>
             </a:extLst>
           </p:cNvPr>
@@ -6483,21 +6567,26 @@
             <p:ph type="title"/>
           </p:nvPr>
         </p:nvSpPr>
-        <p:spPr/>
+        <p:spPr>
+          <a:xfrm>
+            <a:off x="838200" y="365125"/>
+            <a:ext cx="10515600" cy="911225"/>
+          </a:xfrm>
+        </p:spPr>
         <p:txBody>
           <a:bodyPr/>
           <a:lstStyle/>
           <a:p>
-            <a:endParaRPr lang="en-GB"/>
+            <a:endParaRPr lang="en-GB" dirty="0"/>
           </a:p>
         </p:txBody>
       </p:sp>
       <p:pic>
         <p:nvPicPr>
-          <p:cNvPr id="7" name="Picture 6">
-            <a:extLst>
-              <a:ext uri="{FF2B5EF4-FFF2-40B4-BE49-F238E27FC236}">
-                <a16:creationId xmlns:a16="http://schemas.microsoft.com/office/drawing/2014/main" id="{EA47DFE6-D2F8-294E-C3D2-1D0F0F663C9E}"/>
+          <p:cNvPr id="5" name="Picture 4">
+            <a:extLst>
+              <a:ext uri="{FF2B5EF4-FFF2-40B4-BE49-F238E27FC236}">
+                <a16:creationId xmlns:a16="http://schemas.microsoft.com/office/drawing/2014/main" id="{201CED20-40B3-81D8-3E22-C3ED7D00E0AA}"/>
               </a:ext>
             </a:extLst>
           </p:cNvPr>
@@ -6514,8 +6603,38 @@
         </p:blipFill>
         <p:spPr>
           <a:xfrm>
-            <a:off x="838200" y="1901595"/>
-            <a:ext cx="4620270" cy="3296110"/>
+            <a:off x="838200" y="1461845"/>
+            <a:ext cx="6232082" cy="2316405"/>
+          </a:xfrm>
+          <a:prstGeom prst="rect">
+            <a:avLst/>
+          </a:prstGeom>
+        </p:spPr>
+      </p:pic>
+      <p:pic>
+        <p:nvPicPr>
+          <p:cNvPr id="7" name="Picture 6">
+            <a:extLst>
+              <a:ext uri="{FF2B5EF4-FFF2-40B4-BE49-F238E27FC236}">
+                <a16:creationId xmlns:a16="http://schemas.microsoft.com/office/drawing/2014/main" id="{F4C98D34-33BF-17A3-51E1-241C734185DA}"/>
+              </a:ext>
+            </a:extLst>
+          </p:cNvPr>
+          <p:cNvPicPr>
+            <a:picLocks noChangeAspect="1"/>
+          </p:cNvPicPr>
+          <p:nvPr/>
+        </p:nvPicPr>
+        <p:blipFill>
+          <a:blip r:embed="rId3"/>
+          <a:stretch>
+            <a:fillRect/>
+          </a:stretch>
+        </p:blipFill>
+        <p:spPr>
+          <a:xfrm>
+            <a:off x="838200" y="4136867"/>
+            <a:ext cx="6232082" cy="1868055"/>
           </a:xfrm>
           <a:prstGeom prst="rect">
             <a:avLst/>
@@ -6525,7 +6644,7 @@
     </p:spTree>
     <p:extLst>
       <p:ext uri="{BB962C8B-B14F-4D97-AF65-F5344CB8AC3E}">
-        <p14:creationId xmlns:p14="http://schemas.microsoft.com/office/powerpoint/2010/main" val="421378720"/>
+        <p14:creationId xmlns:p14="http://schemas.microsoft.com/office/powerpoint/2010/main" val="2078073998"/>
       </p:ext>
     </p:extLst>
   </p:cSld>
@@ -6645,6 +6764,673 @@
           <p:cNvPr id="2" name="Title 1">
             <a:extLst>
               <a:ext uri="{FF2B5EF4-FFF2-40B4-BE49-F238E27FC236}">
+                <a16:creationId xmlns:a16="http://schemas.microsoft.com/office/drawing/2014/main" id="{18E77E9E-521E-D666-1172-EA04863A7EE5}"/>
+              </a:ext>
+            </a:extLst>
+          </p:cNvPr>
+          <p:cNvSpPr>
+            <a:spLocks noGrp="1"/>
+          </p:cNvSpPr>
+          <p:nvPr>
+            <p:ph type="title"/>
+          </p:nvPr>
+        </p:nvSpPr>
+        <p:spPr/>
+        <p:txBody>
+          <a:bodyPr/>
+          <a:lstStyle/>
+          <a:p>
+            <a:endParaRPr lang="en-GB"/>
+          </a:p>
+        </p:txBody>
+      </p:sp>
+      <p:pic>
+        <p:nvPicPr>
+          <p:cNvPr id="5" name="Picture 4">
+            <a:extLst>
+              <a:ext uri="{FF2B5EF4-FFF2-40B4-BE49-F238E27FC236}">
+                <a16:creationId xmlns:a16="http://schemas.microsoft.com/office/drawing/2014/main" id="{7F29A0FD-412A-4FF6-269A-9279CA60F87E}"/>
+              </a:ext>
+            </a:extLst>
+          </p:cNvPr>
+          <p:cNvPicPr>
+            <a:picLocks noChangeAspect="1"/>
+          </p:cNvPicPr>
+          <p:nvPr/>
+        </p:nvPicPr>
+        <p:blipFill>
+          <a:blip r:embed="rId2"/>
+          <a:stretch>
+            <a:fillRect/>
+          </a:stretch>
+        </p:blipFill>
+        <p:spPr>
+          <a:xfrm>
+            <a:off x="838200" y="1861257"/>
+            <a:ext cx="7687645" cy="3135485"/>
+          </a:xfrm>
+          <a:prstGeom prst="rect">
+            <a:avLst/>
+          </a:prstGeom>
+        </p:spPr>
+      </p:pic>
+    </p:spTree>
+    <p:extLst>
+      <p:ext uri="{BB962C8B-B14F-4D97-AF65-F5344CB8AC3E}">
+        <p14:creationId xmlns:p14="http://schemas.microsoft.com/office/powerpoint/2010/main" val="1708826250"/>
+      </p:ext>
+    </p:extLst>
+  </p:cSld>
+  <p:clrMapOvr>
+    <a:masterClrMapping/>
+  </p:clrMapOvr>
+</p:sld>
+</file>
+
+<file path=ppt/slides/slide21.xml><?xml version="1.0" encoding="utf-8"?>
+<p:sld xmlns:a="http://schemas.openxmlformats.org/drawingml/2006/main" xmlns:r="http://schemas.openxmlformats.org/officeDocument/2006/relationships" xmlns:p="http://schemas.openxmlformats.org/presentationml/2006/main">
+  <p:cSld>
+    <p:spTree>
+      <p:nvGrpSpPr>
+        <p:cNvPr id="1" name=""/>
+        <p:cNvGrpSpPr/>
+        <p:nvPr/>
+      </p:nvGrpSpPr>
+      <p:grpSpPr>
+        <a:xfrm>
+          <a:off x="0" y="0"/>
+          <a:ext cx="0" cy="0"/>
+          <a:chOff x="0" y="0"/>
+          <a:chExt cx="0" cy="0"/>
+        </a:xfrm>
+      </p:grpSpPr>
+      <p:sp>
+        <p:nvSpPr>
+          <p:cNvPr id="2" name="Title 1">
+            <a:extLst>
+              <a:ext uri="{FF2B5EF4-FFF2-40B4-BE49-F238E27FC236}">
+                <a16:creationId xmlns:a16="http://schemas.microsoft.com/office/drawing/2014/main" id="{7B0F8EF9-2F8A-D280-EAA2-35BAC51A2A4E}"/>
+              </a:ext>
+            </a:extLst>
+          </p:cNvPr>
+          <p:cNvSpPr>
+            <a:spLocks noGrp="1"/>
+          </p:cNvSpPr>
+          <p:nvPr>
+            <p:ph type="title"/>
+          </p:nvPr>
+        </p:nvSpPr>
+        <p:spPr/>
+        <p:txBody>
+          <a:bodyPr/>
+          <a:lstStyle/>
+          <a:p>
+            <a:endParaRPr lang="en-GB"/>
+          </a:p>
+        </p:txBody>
+      </p:sp>
+      <p:pic>
+        <p:nvPicPr>
+          <p:cNvPr id="5" name="Picture 4">
+            <a:extLst>
+              <a:ext uri="{FF2B5EF4-FFF2-40B4-BE49-F238E27FC236}">
+                <a16:creationId xmlns:a16="http://schemas.microsoft.com/office/drawing/2014/main" id="{E42CB9A0-0A1D-2247-2FB8-AB5F4B227001}"/>
+              </a:ext>
+            </a:extLst>
+          </p:cNvPr>
+          <p:cNvPicPr>
+            <a:picLocks noChangeAspect="1"/>
+          </p:cNvPicPr>
+          <p:nvPr/>
+        </p:nvPicPr>
+        <p:blipFill>
+          <a:blip r:embed="rId2"/>
+          <a:stretch>
+            <a:fillRect/>
+          </a:stretch>
+        </p:blipFill>
+        <p:spPr>
+          <a:xfrm>
+            <a:off x="838200" y="1833324"/>
+            <a:ext cx="3448531" cy="3419952"/>
+          </a:xfrm>
+          <a:prstGeom prst="rect">
+            <a:avLst/>
+          </a:prstGeom>
+        </p:spPr>
+      </p:pic>
+      <p:pic>
+        <p:nvPicPr>
+          <p:cNvPr id="7" name="Picture 6">
+            <a:extLst>
+              <a:ext uri="{FF2B5EF4-FFF2-40B4-BE49-F238E27FC236}">
+                <a16:creationId xmlns:a16="http://schemas.microsoft.com/office/drawing/2014/main" id="{22FBDBA8-7F16-79C5-84FF-B4B16E5DB3DB}"/>
+              </a:ext>
+            </a:extLst>
+          </p:cNvPr>
+          <p:cNvPicPr>
+            <a:picLocks noChangeAspect="1"/>
+          </p:cNvPicPr>
+          <p:nvPr/>
+        </p:nvPicPr>
+        <p:blipFill>
+          <a:blip r:embed="rId3"/>
+          <a:stretch>
+            <a:fillRect/>
+          </a:stretch>
+        </p:blipFill>
+        <p:spPr>
+          <a:xfrm>
+            <a:off x="5063397" y="1833324"/>
+            <a:ext cx="3790680" cy="4951789"/>
+          </a:xfrm>
+          <a:prstGeom prst="rect">
+            <a:avLst/>
+          </a:prstGeom>
+        </p:spPr>
+      </p:pic>
+    </p:spTree>
+    <p:extLst>
+      <p:ext uri="{BB962C8B-B14F-4D97-AF65-F5344CB8AC3E}">
+        <p14:creationId xmlns:p14="http://schemas.microsoft.com/office/powerpoint/2010/main" val="497924248"/>
+      </p:ext>
+    </p:extLst>
+  </p:cSld>
+  <p:clrMapOvr>
+    <a:masterClrMapping/>
+  </p:clrMapOvr>
+</p:sld>
+</file>
+
+<file path=ppt/slides/slide22.xml><?xml version="1.0" encoding="utf-8"?>
+<p:sld xmlns:a="http://schemas.openxmlformats.org/drawingml/2006/main" xmlns:r="http://schemas.openxmlformats.org/officeDocument/2006/relationships" xmlns:p="http://schemas.openxmlformats.org/presentationml/2006/main">
+  <p:cSld>
+    <p:spTree>
+      <p:nvGrpSpPr>
+        <p:cNvPr id="1" name=""/>
+        <p:cNvGrpSpPr/>
+        <p:nvPr/>
+      </p:nvGrpSpPr>
+      <p:grpSpPr>
+        <a:xfrm>
+          <a:off x="0" y="0"/>
+          <a:ext cx="0" cy="0"/>
+          <a:chOff x="0" y="0"/>
+          <a:chExt cx="0" cy="0"/>
+        </a:xfrm>
+      </p:grpSpPr>
+      <p:sp>
+        <p:nvSpPr>
+          <p:cNvPr id="2" name="Title 1">
+            <a:extLst>
+              <a:ext uri="{FF2B5EF4-FFF2-40B4-BE49-F238E27FC236}">
+                <a16:creationId xmlns:a16="http://schemas.microsoft.com/office/drawing/2014/main" id="{BADBA536-C8EA-CDEE-0412-CCBD65C8D699}"/>
+              </a:ext>
+            </a:extLst>
+          </p:cNvPr>
+          <p:cNvSpPr>
+            <a:spLocks noGrp="1"/>
+          </p:cNvSpPr>
+          <p:nvPr>
+            <p:ph type="title"/>
+          </p:nvPr>
+        </p:nvSpPr>
+        <p:spPr/>
+        <p:txBody>
+          <a:bodyPr/>
+          <a:lstStyle/>
+          <a:p>
+            <a:endParaRPr lang="en-GB"/>
+          </a:p>
+        </p:txBody>
+      </p:sp>
+      <p:pic>
+        <p:nvPicPr>
+          <p:cNvPr id="5" name="Picture 4">
+            <a:extLst>
+              <a:ext uri="{FF2B5EF4-FFF2-40B4-BE49-F238E27FC236}">
+                <a16:creationId xmlns:a16="http://schemas.microsoft.com/office/drawing/2014/main" id="{E3EE5837-9DE7-1C2A-DF3F-960FA55EC81F}"/>
+              </a:ext>
+            </a:extLst>
+          </p:cNvPr>
+          <p:cNvPicPr>
+            <a:picLocks noChangeAspect="1"/>
+          </p:cNvPicPr>
+          <p:nvPr/>
+        </p:nvPicPr>
+        <p:blipFill>
+          <a:blip r:embed="rId2"/>
+          <a:stretch>
+            <a:fillRect/>
+          </a:stretch>
+        </p:blipFill>
+        <p:spPr>
+          <a:xfrm>
+            <a:off x="838200" y="1957174"/>
+            <a:ext cx="5534797" cy="3057952"/>
+          </a:xfrm>
+          <a:prstGeom prst="rect">
+            <a:avLst/>
+          </a:prstGeom>
+        </p:spPr>
+      </p:pic>
+    </p:spTree>
+    <p:extLst>
+      <p:ext uri="{BB962C8B-B14F-4D97-AF65-F5344CB8AC3E}">
+        <p14:creationId xmlns:p14="http://schemas.microsoft.com/office/powerpoint/2010/main" val="711803047"/>
+      </p:ext>
+    </p:extLst>
+  </p:cSld>
+  <p:clrMapOvr>
+    <a:masterClrMapping/>
+  </p:clrMapOvr>
+</p:sld>
+</file>
+
+<file path=ppt/slides/slide23.xml><?xml version="1.0" encoding="utf-8"?>
+<p:sld xmlns:a="http://schemas.openxmlformats.org/drawingml/2006/main" xmlns:r="http://schemas.openxmlformats.org/officeDocument/2006/relationships" xmlns:p="http://schemas.openxmlformats.org/presentationml/2006/main">
+  <p:cSld>
+    <p:spTree>
+      <p:nvGrpSpPr>
+        <p:cNvPr id="1" name=""/>
+        <p:cNvGrpSpPr/>
+        <p:nvPr/>
+      </p:nvGrpSpPr>
+      <p:grpSpPr>
+        <a:xfrm>
+          <a:off x="0" y="0"/>
+          <a:ext cx="0" cy="0"/>
+          <a:chOff x="0" y="0"/>
+          <a:chExt cx="0" cy="0"/>
+        </a:xfrm>
+      </p:grpSpPr>
+      <p:sp>
+        <p:nvSpPr>
+          <p:cNvPr id="2" name="Title 1">
+            <a:extLst>
+              <a:ext uri="{FF2B5EF4-FFF2-40B4-BE49-F238E27FC236}">
+                <a16:creationId xmlns:a16="http://schemas.microsoft.com/office/drawing/2014/main" id="{A9BC8783-6E9D-F9AF-AB14-9E9E3094A2C0}"/>
+              </a:ext>
+            </a:extLst>
+          </p:cNvPr>
+          <p:cNvSpPr>
+            <a:spLocks noGrp="1"/>
+          </p:cNvSpPr>
+          <p:nvPr>
+            <p:ph type="title"/>
+          </p:nvPr>
+        </p:nvSpPr>
+        <p:spPr>
+          <a:xfrm>
+            <a:off x="838200" y="365126"/>
+            <a:ext cx="9913883" cy="742436"/>
+          </a:xfrm>
+        </p:spPr>
+        <p:txBody>
+          <a:bodyPr/>
+          <a:lstStyle/>
+          <a:p>
+            <a:endParaRPr lang="en-GB" dirty="0"/>
+          </a:p>
+        </p:txBody>
+      </p:sp>
+      <p:pic>
+        <p:nvPicPr>
+          <p:cNvPr id="5" name="Picture 4">
+            <a:extLst>
+              <a:ext uri="{FF2B5EF4-FFF2-40B4-BE49-F238E27FC236}">
+                <a16:creationId xmlns:a16="http://schemas.microsoft.com/office/drawing/2014/main" id="{B325228D-734D-34AB-D4A0-E0F5BD95DCAD}"/>
+              </a:ext>
+            </a:extLst>
+          </p:cNvPr>
+          <p:cNvPicPr>
+            <a:picLocks noChangeAspect="1"/>
+          </p:cNvPicPr>
+          <p:nvPr/>
+        </p:nvPicPr>
+        <p:blipFill>
+          <a:blip r:embed="rId2"/>
+          <a:stretch>
+            <a:fillRect/>
+          </a:stretch>
+        </p:blipFill>
+        <p:spPr>
+          <a:xfrm>
+            <a:off x="838200" y="2150805"/>
+            <a:ext cx="3991532" cy="3686689"/>
+          </a:xfrm>
+          <a:prstGeom prst="rect">
+            <a:avLst/>
+          </a:prstGeom>
+        </p:spPr>
+      </p:pic>
+      <p:pic>
+        <p:nvPicPr>
+          <p:cNvPr id="7" name="Picture 6">
+            <a:extLst>
+              <a:ext uri="{FF2B5EF4-FFF2-40B4-BE49-F238E27FC236}">
+                <a16:creationId xmlns:a16="http://schemas.microsoft.com/office/drawing/2014/main" id="{287A7ABC-D1AE-E170-A2A6-6470EE734A0D}"/>
+              </a:ext>
+            </a:extLst>
+          </p:cNvPr>
+          <p:cNvPicPr>
+            <a:picLocks noChangeAspect="1"/>
+          </p:cNvPicPr>
+          <p:nvPr/>
+        </p:nvPicPr>
+        <p:blipFill>
+          <a:blip r:embed="rId3"/>
+          <a:stretch>
+            <a:fillRect/>
+          </a:stretch>
+        </p:blipFill>
+        <p:spPr>
+          <a:xfrm>
+            <a:off x="5879816" y="1107561"/>
+            <a:ext cx="1695515" cy="5586608"/>
+          </a:xfrm>
+          <a:prstGeom prst="rect">
+            <a:avLst/>
+          </a:prstGeom>
+        </p:spPr>
+      </p:pic>
+    </p:spTree>
+    <p:extLst>
+      <p:ext uri="{BB962C8B-B14F-4D97-AF65-F5344CB8AC3E}">
+        <p14:creationId xmlns:p14="http://schemas.microsoft.com/office/powerpoint/2010/main" val="2631230412"/>
+      </p:ext>
+    </p:extLst>
+  </p:cSld>
+  <p:clrMapOvr>
+    <a:masterClrMapping/>
+  </p:clrMapOvr>
+</p:sld>
+</file>
+
+<file path=ppt/slides/slide24.xml><?xml version="1.0" encoding="utf-8"?>
+<p:sld xmlns:a="http://schemas.openxmlformats.org/drawingml/2006/main" xmlns:r="http://schemas.openxmlformats.org/officeDocument/2006/relationships" xmlns:p="http://schemas.openxmlformats.org/presentationml/2006/main">
+  <p:cSld>
+    <p:spTree>
+      <p:nvGrpSpPr>
+        <p:cNvPr id="1" name=""/>
+        <p:cNvGrpSpPr/>
+        <p:nvPr/>
+      </p:nvGrpSpPr>
+      <p:grpSpPr>
+        <a:xfrm>
+          <a:off x="0" y="0"/>
+          <a:ext cx="0" cy="0"/>
+          <a:chOff x="0" y="0"/>
+          <a:chExt cx="0" cy="0"/>
+        </a:xfrm>
+      </p:grpSpPr>
+      <p:sp>
+        <p:nvSpPr>
+          <p:cNvPr id="2" name="Title 1">
+            <a:extLst>
+              <a:ext uri="{FF2B5EF4-FFF2-40B4-BE49-F238E27FC236}">
+                <a16:creationId xmlns:a16="http://schemas.microsoft.com/office/drawing/2014/main" id="{21017636-EA3E-8FEF-99A9-52E40CE4CEE3}"/>
+              </a:ext>
+            </a:extLst>
+          </p:cNvPr>
+          <p:cNvSpPr>
+            <a:spLocks noGrp="1"/>
+          </p:cNvSpPr>
+          <p:nvPr>
+            <p:ph type="title"/>
+          </p:nvPr>
+        </p:nvSpPr>
+        <p:spPr/>
+        <p:txBody>
+          <a:bodyPr/>
+          <a:lstStyle/>
+          <a:p>
+            <a:endParaRPr lang="en-GB"/>
+          </a:p>
+        </p:txBody>
+      </p:sp>
+      <p:pic>
+        <p:nvPicPr>
+          <p:cNvPr id="4" name="Picture 3">
+            <a:extLst>
+              <a:ext uri="{FF2B5EF4-FFF2-40B4-BE49-F238E27FC236}">
+                <a16:creationId xmlns:a16="http://schemas.microsoft.com/office/drawing/2014/main" id="{4F69654C-6DA8-2205-4B70-B0177BA26CE7}"/>
+              </a:ext>
+            </a:extLst>
+          </p:cNvPr>
+          <p:cNvPicPr>
+            <a:picLocks noChangeAspect="1"/>
+          </p:cNvPicPr>
+          <p:nvPr/>
+        </p:nvPicPr>
+        <p:blipFill>
+          <a:blip r:embed="rId2"/>
+          <a:stretch>
+            <a:fillRect/>
+          </a:stretch>
+        </p:blipFill>
+        <p:spPr>
+          <a:xfrm>
+            <a:off x="3139923" y="2035103"/>
+            <a:ext cx="5912154" cy="2787793"/>
+          </a:xfrm>
+          <a:prstGeom prst="rect">
+            <a:avLst/>
+          </a:prstGeom>
+        </p:spPr>
+      </p:pic>
+    </p:spTree>
+    <p:extLst>
+      <p:ext uri="{BB962C8B-B14F-4D97-AF65-F5344CB8AC3E}">
+        <p14:creationId xmlns:p14="http://schemas.microsoft.com/office/powerpoint/2010/main" val="1718911435"/>
+      </p:ext>
+    </p:extLst>
+  </p:cSld>
+  <p:clrMapOvr>
+    <a:masterClrMapping/>
+  </p:clrMapOvr>
+</p:sld>
+</file>
+
+<file path=ppt/slides/slide25.xml><?xml version="1.0" encoding="utf-8"?>
+<p:sld xmlns:a="http://schemas.openxmlformats.org/drawingml/2006/main" xmlns:r="http://schemas.openxmlformats.org/officeDocument/2006/relationships" xmlns:p="http://schemas.openxmlformats.org/presentationml/2006/main">
+  <p:cSld>
+    <p:spTree>
+      <p:nvGrpSpPr>
+        <p:cNvPr id="1" name=""/>
+        <p:cNvGrpSpPr/>
+        <p:nvPr/>
+      </p:nvGrpSpPr>
+      <p:grpSpPr>
+        <a:xfrm>
+          <a:off x="0" y="0"/>
+          <a:ext cx="0" cy="0"/>
+          <a:chOff x="0" y="0"/>
+          <a:chExt cx="0" cy="0"/>
+        </a:xfrm>
+      </p:grpSpPr>
+      <p:sp>
+        <p:nvSpPr>
+          <p:cNvPr id="2" name="Title 1">
+            <a:extLst>
+              <a:ext uri="{FF2B5EF4-FFF2-40B4-BE49-F238E27FC236}">
+                <a16:creationId xmlns:a16="http://schemas.microsoft.com/office/drawing/2014/main" id="{21017636-EA3E-8FEF-99A9-52E40CE4CEE3}"/>
+              </a:ext>
+            </a:extLst>
+          </p:cNvPr>
+          <p:cNvSpPr>
+            <a:spLocks noGrp="1"/>
+          </p:cNvSpPr>
+          <p:nvPr>
+            <p:ph type="title"/>
+          </p:nvPr>
+        </p:nvSpPr>
+        <p:spPr>
+          <a:xfrm>
+            <a:off x="838200" y="365125"/>
+            <a:ext cx="9310991" cy="566593"/>
+          </a:xfrm>
+        </p:spPr>
+        <p:txBody>
+          <a:bodyPr>
+            <a:normAutofit fontScale="90000"/>
+          </a:bodyPr>
+          <a:lstStyle/>
+          <a:p>
+            <a:endParaRPr lang="en-GB" dirty="0"/>
+          </a:p>
+        </p:txBody>
+      </p:sp>
+      <p:pic>
+        <p:nvPicPr>
+          <p:cNvPr id="5" name="Picture 4">
+            <a:extLst>
+              <a:ext uri="{FF2B5EF4-FFF2-40B4-BE49-F238E27FC236}">
+                <a16:creationId xmlns:a16="http://schemas.microsoft.com/office/drawing/2014/main" id="{8F5E4456-8C4D-4A3F-7FEB-51C36B0663E7}"/>
+              </a:ext>
+            </a:extLst>
+          </p:cNvPr>
+          <p:cNvPicPr>
+            <a:picLocks noChangeAspect="1"/>
+          </p:cNvPicPr>
+          <p:nvPr/>
+        </p:nvPicPr>
+        <p:blipFill>
+          <a:blip r:embed="rId2"/>
+          <a:stretch>
+            <a:fillRect/>
+          </a:stretch>
+        </p:blipFill>
+        <p:spPr>
+          <a:xfrm>
+            <a:off x="1906620" y="931718"/>
+            <a:ext cx="8583805" cy="5116791"/>
+          </a:xfrm>
+          <a:prstGeom prst="rect">
+            <a:avLst/>
+          </a:prstGeom>
+        </p:spPr>
+      </p:pic>
+    </p:spTree>
+    <p:extLst>
+      <p:ext uri="{BB962C8B-B14F-4D97-AF65-F5344CB8AC3E}">
+        <p14:creationId xmlns:p14="http://schemas.microsoft.com/office/powerpoint/2010/main" val="3447463729"/>
+      </p:ext>
+    </p:extLst>
+  </p:cSld>
+  <p:clrMapOvr>
+    <a:masterClrMapping/>
+  </p:clrMapOvr>
+</p:sld>
+</file>
+
+<file path=ppt/slides/slide26.xml><?xml version="1.0" encoding="utf-8"?>
+<p:sld xmlns:a="http://schemas.openxmlformats.org/drawingml/2006/main" xmlns:r="http://schemas.openxmlformats.org/officeDocument/2006/relationships" xmlns:p="http://schemas.openxmlformats.org/presentationml/2006/main">
+  <p:cSld>
+    <p:spTree>
+      <p:nvGrpSpPr>
+        <p:cNvPr id="1" name=""/>
+        <p:cNvGrpSpPr/>
+        <p:nvPr/>
+      </p:nvGrpSpPr>
+      <p:grpSpPr>
+        <a:xfrm>
+          <a:off x="0" y="0"/>
+          <a:ext cx="0" cy="0"/>
+          <a:chOff x="0" y="0"/>
+          <a:chExt cx="0" cy="0"/>
+        </a:xfrm>
+      </p:grpSpPr>
+      <p:sp>
+        <p:nvSpPr>
+          <p:cNvPr id="2" name="Title 1">
+            <a:extLst>
+              <a:ext uri="{FF2B5EF4-FFF2-40B4-BE49-F238E27FC236}">
+                <a16:creationId xmlns:a16="http://schemas.microsoft.com/office/drawing/2014/main" id="{F34501D7-A5A1-B14C-9DF8-33D23D87D92F}"/>
+              </a:ext>
+            </a:extLst>
+          </p:cNvPr>
+          <p:cNvSpPr>
+            <a:spLocks noGrp="1"/>
+          </p:cNvSpPr>
+          <p:nvPr>
+            <p:ph type="title"/>
+          </p:nvPr>
+        </p:nvSpPr>
+        <p:spPr/>
+        <p:txBody>
+          <a:bodyPr/>
+          <a:lstStyle/>
+          <a:p>
+            <a:endParaRPr lang="en-GB"/>
+          </a:p>
+        </p:txBody>
+      </p:sp>
+      <p:pic>
+        <p:nvPicPr>
+          <p:cNvPr id="7" name="Picture 6">
+            <a:extLst>
+              <a:ext uri="{FF2B5EF4-FFF2-40B4-BE49-F238E27FC236}">
+                <a16:creationId xmlns:a16="http://schemas.microsoft.com/office/drawing/2014/main" id="{EA47DFE6-D2F8-294E-C3D2-1D0F0F663C9E}"/>
+              </a:ext>
+            </a:extLst>
+          </p:cNvPr>
+          <p:cNvPicPr>
+            <a:picLocks noChangeAspect="1"/>
+          </p:cNvPicPr>
+          <p:nvPr/>
+        </p:nvPicPr>
+        <p:blipFill>
+          <a:blip r:embed="rId2"/>
+          <a:stretch>
+            <a:fillRect/>
+          </a:stretch>
+        </p:blipFill>
+        <p:spPr>
+          <a:xfrm>
+            <a:off x="838200" y="1901595"/>
+            <a:ext cx="4620270" cy="3296110"/>
+          </a:xfrm>
+          <a:prstGeom prst="rect">
+            <a:avLst/>
+          </a:prstGeom>
+        </p:spPr>
+      </p:pic>
+    </p:spTree>
+    <p:extLst>
+      <p:ext uri="{BB962C8B-B14F-4D97-AF65-F5344CB8AC3E}">
+        <p14:creationId xmlns:p14="http://schemas.microsoft.com/office/powerpoint/2010/main" val="421378720"/>
+      </p:ext>
+    </p:extLst>
+  </p:cSld>
+  <p:clrMapOvr>
+    <a:masterClrMapping/>
+  </p:clrMapOvr>
+</p:sld>
+</file>
+
+<file path=ppt/slides/slide27.xml><?xml version="1.0" encoding="utf-8"?>
+<p:sld xmlns:a="http://schemas.openxmlformats.org/drawingml/2006/main" xmlns:r="http://schemas.openxmlformats.org/officeDocument/2006/relationships" xmlns:p="http://schemas.openxmlformats.org/presentationml/2006/main">
+  <p:cSld>
+    <p:spTree>
+      <p:nvGrpSpPr>
+        <p:cNvPr id="1" name=""/>
+        <p:cNvGrpSpPr/>
+        <p:nvPr/>
+      </p:nvGrpSpPr>
+      <p:grpSpPr>
+        <a:xfrm>
+          <a:off x="0" y="0"/>
+          <a:ext cx="0" cy="0"/>
+          <a:chOff x="0" y="0"/>
+          <a:chExt cx="0" cy="0"/>
+        </a:xfrm>
+      </p:grpSpPr>
+      <p:sp>
+        <p:nvSpPr>
+          <p:cNvPr id="2" name="Title 1">
+            <a:extLst>
+              <a:ext uri="{FF2B5EF4-FFF2-40B4-BE49-F238E27FC236}">
                 <a16:creationId xmlns:a16="http://schemas.microsoft.com/office/drawing/2014/main" id="{17BD5C91-DAB1-7FBB-913D-94307751905E}"/>
               </a:ext>
             </a:extLst>
@@ -6708,7 +7494,7 @@
 </p:sld>
 </file>
 
-<file path=ppt/slides/slide21.xml><?xml version="1.0" encoding="utf-8"?>
+<file path=ppt/slides/slide28.xml><?xml version="1.0" encoding="utf-8"?>
 <p:sld xmlns:a="http://schemas.openxmlformats.org/drawingml/2006/main" xmlns:r="http://schemas.openxmlformats.org/officeDocument/2006/relationships" xmlns:p="http://schemas.openxmlformats.org/presentationml/2006/main">
   <p:cSld>
     <p:spTree>
@@ -6798,122 +7584,7 @@
 </p:sld>
 </file>
 
-<file path=ppt/slides/slide22.xml><?xml version="1.0" encoding="utf-8"?>
-<p:sld xmlns:a="http://schemas.openxmlformats.org/drawingml/2006/main" xmlns:r="http://schemas.openxmlformats.org/officeDocument/2006/relationships" xmlns:p="http://schemas.openxmlformats.org/presentationml/2006/main">
-  <p:cSld>
-    <p:spTree>
-      <p:nvGrpSpPr>
-        <p:cNvPr id="1" name=""/>
-        <p:cNvGrpSpPr/>
-        <p:nvPr/>
-      </p:nvGrpSpPr>
-      <p:grpSpPr>
-        <a:xfrm>
-          <a:off x="0" y="0"/>
-          <a:ext cx="0" cy="0"/>
-          <a:chOff x="0" y="0"/>
-          <a:chExt cx="0" cy="0"/>
-        </a:xfrm>
-      </p:grpSpPr>
-      <p:sp>
-        <p:nvSpPr>
-          <p:cNvPr id="2" name="Title 1">
-            <a:extLst>
-              <a:ext uri="{FF2B5EF4-FFF2-40B4-BE49-F238E27FC236}">
-                <a16:creationId xmlns:a16="http://schemas.microsoft.com/office/drawing/2014/main" id="{7B0F8EF9-2F8A-D280-EAA2-35BAC51A2A4E}"/>
-              </a:ext>
-            </a:extLst>
-          </p:cNvPr>
-          <p:cNvSpPr>
-            <a:spLocks noGrp="1"/>
-          </p:cNvSpPr>
-          <p:nvPr>
-            <p:ph type="title"/>
-          </p:nvPr>
-        </p:nvSpPr>
-        <p:spPr/>
-        <p:txBody>
-          <a:bodyPr/>
-          <a:lstStyle/>
-          <a:p>
-            <a:endParaRPr lang="en-GB"/>
-          </a:p>
-        </p:txBody>
-      </p:sp>
-      <p:pic>
-        <p:nvPicPr>
-          <p:cNvPr id="5" name="Picture 4">
-            <a:extLst>
-              <a:ext uri="{FF2B5EF4-FFF2-40B4-BE49-F238E27FC236}">
-                <a16:creationId xmlns:a16="http://schemas.microsoft.com/office/drawing/2014/main" id="{E42CB9A0-0A1D-2247-2FB8-AB5F4B227001}"/>
-              </a:ext>
-            </a:extLst>
-          </p:cNvPr>
-          <p:cNvPicPr>
-            <a:picLocks noChangeAspect="1"/>
-          </p:cNvPicPr>
-          <p:nvPr/>
-        </p:nvPicPr>
-        <p:blipFill>
-          <a:blip r:embed="rId2"/>
-          <a:stretch>
-            <a:fillRect/>
-          </a:stretch>
-        </p:blipFill>
-        <p:spPr>
-          <a:xfrm>
-            <a:off x="838200" y="1833324"/>
-            <a:ext cx="3448531" cy="3419952"/>
-          </a:xfrm>
-          <a:prstGeom prst="rect">
-            <a:avLst/>
-          </a:prstGeom>
-        </p:spPr>
-      </p:pic>
-      <p:pic>
-        <p:nvPicPr>
-          <p:cNvPr id="7" name="Picture 6">
-            <a:extLst>
-              <a:ext uri="{FF2B5EF4-FFF2-40B4-BE49-F238E27FC236}">
-                <a16:creationId xmlns:a16="http://schemas.microsoft.com/office/drawing/2014/main" id="{22FBDBA8-7F16-79C5-84FF-B4B16E5DB3DB}"/>
-              </a:ext>
-            </a:extLst>
-          </p:cNvPr>
-          <p:cNvPicPr>
-            <a:picLocks noChangeAspect="1"/>
-          </p:cNvPicPr>
-          <p:nvPr/>
-        </p:nvPicPr>
-        <p:blipFill>
-          <a:blip r:embed="rId3"/>
-          <a:stretch>
-            <a:fillRect/>
-          </a:stretch>
-        </p:blipFill>
-        <p:spPr>
-          <a:xfrm>
-            <a:off x="5063397" y="1833324"/>
-            <a:ext cx="3790680" cy="4951789"/>
-          </a:xfrm>
-          <a:prstGeom prst="rect">
-            <a:avLst/>
-          </a:prstGeom>
-        </p:spPr>
-      </p:pic>
-    </p:spTree>
-    <p:extLst>
-      <p:ext uri="{BB962C8B-B14F-4D97-AF65-F5344CB8AC3E}">
-        <p14:creationId xmlns:p14="http://schemas.microsoft.com/office/powerpoint/2010/main" val="497924248"/>
-      </p:ext>
-    </p:extLst>
-  </p:cSld>
-  <p:clrMapOvr>
-    <a:masterClrMapping/>
-  </p:clrMapOvr>
-</p:sld>
-</file>
-
-<file path=ppt/slides/slide23.xml><?xml version="1.0" encoding="utf-8"?>
+<file path=ppt/slides/slide29.xml><?xml version="1.0" encoding="utf-8"?>
 <p:sld xmlns:a="http://schemas.openxmlformats.org/drawingml/2006/main" xmlns:r="http://schemas.openxmlformats.org/officeDocument/2006/relationships" xmlns:p="http://schemas.openxmlformats.org/presentationml/2006/main">
   <p:cSld>
     <p:spTree>
@@ -6989,641 +7660,6 @@
     <p:extLst>
       <p:ext uri="{BB962C8B-B14F-4D97-AF65-F5344CB8AC3E}">
         <p14:creationId xmlns:p14="http://schemas.microsoft.com/office/powerpoint/2010/main" val="1872683396"/>
-      </p:ext>
-    </p:extLst>
-  </p:cSld>
-  <p:clrMapOvr>
-    <a:masterClrMapping/>
-  </p:clrMapOvr>
-</p:sld>
-</file>
-
-<file path=ppt/slides/slide24.xml><?xml version="1.0" encoding="utf-8"?>
-<p:sld xmlns:a="http://schemas.openxmlformats.org/drawingml/2006/main" xmlns:r="http://schemas.openxmlformats.org/officeDocument/2006/relationships" xmlns:p="http://schemas.openxmlformats.org/presentationml/2006/main">
-  <p:cSld>
-    <p:spTree>
-      <p:nvGrpSpPr>
-        <p:cNvPr id="1" name=""/>
-        <p:cNvGrpSpPr/>
-        <p:nvPr/>
-      </p:nvGrpSpPr>
-      <p:grpSpPr>
-        <a:xfrm>
-          <a:off x="0" y="0"/>
-          <a:ext cx="0" cy="0"/>
-          <a:chOff x="0" y="0"/>
-          <a:chExt cx="0" cy="0"/>
-        </a:xfrm>
-      </p:grpSpPr>
-      <p:sp>
-        <p:nvSpPr>
-          <p:cNvPr id="2" name="Title 1">
-            <a:extLst>
-              <a:ext uri="{FF2B5EF4-FFF2-40B4-BE49-F238E27FC236}">
-                <a16:creationId xmlns:a16="http://schemas.microsoft.com/office/drawing/2014/main" id="{BADBA536-C8EA-CDEE-0412-CCBD65C8D699}"/>
-              </a:ext>
-            </a:extLst>
-          </p:cNvPr>
-          <p:cNvSpPr>
-            <a:spLocks noGrp="1"/>
-          </p:cNvSpPr>
-          <p:nvPr>
-            <p:ph type="title"/>
-          </p:nvPr>
-        </p:nvSpPr>
-        <p:spPr/>
-        <p:txBody>
-          <a:bodyPr/>
-          <a:lstStyle/>
-          <a:p>
-            <a:endParaRPr lang="en-GB"/>
-          </a:p>
-        </p:txBody>
-      </p:sp>
-      <p:pic>
-        <p:nvPicPr>
-          <p:cNvPr id="5" name="Picture 4">
-            <a:extLst>
-              <a:ext uri="{FF2B5EF4-FFF2-40B4-BE49-F238E27FC236}">
-                <a16:creationId xmlns:a16="http://schemas.microsoft.com/office/drawing/2014/main" id="{E3EE5837-9DE7-1C2A-DF3F-960FA55EC81F}"/>
-              </a:ext>
-            </a:extLst>
-          </p:cNvPr>
-          <p:cNvPicPr>
-            <a:picLocks noChangeAspect="1"/>
-          </p:cNvPicPr>
-          <p:nvPr/>
-        </p:nvPicPr>
-        <p:blipFill>
-          <a:blip r:embed="rId2"/>
-          <a:stretch>
-            <a:fillRect/>
-          </a:stretch>
-        </p:blipFill>
-        <p:spPr>
-          <a:xfrm>
-            <a:off x="838200" y="1957174"/>
-            <a:ext cx="5534797" cy="3057952"/>
-          </a:xfrm>
-          <a:prstGeom prst="rect">
-            <a:avLst/>
-          </a:prstGeom>
-        </p:spPr>
-      </p:pic>
-    </p:spTree>
-    <p:extLst>
-      <p:ext uri="{BB962C8B-B14F-4D97-AF65-F5344CB8AC3E}">
-        <p14:creationId xmlns:p14="http://schemas.microsoft.com/office/powerpoint/2010/main" val="711803047"/>
-      </p:ext>
-    </p:extLst>
-  </p:cSld>
-  <p:clrMapOvr>
-    <a:masterClrMapping/>
-  </p:clrMapOvr>
-</p:sld>
-</file>
-
-<file path=ppt/slides/slide25.xml><?xml version="1.0" encoding="utf-8"?>
-<p:sld xmlns:a="http://schemas.openxmlformats.org/drawingml/2006/main" xmlns:r="http://schemas.openxmlformats.org/officeDocument/2006/relationships" xmlns:p="http://schemas.openxmlformats.org/presentationml/2006/main">
-  <p:cSld>
-    <p:spTree>
-      <p:nvGrpSpPr>
-        <p:cNvPr id="1" name=""/>
-        <p:cNvGrpSpPr/>
-        <p:nvPr/>
-      </p:nvGrpSpPr>
-      <p:grpSpPr>
-        <a:xfrm>
-          <a:off x="0" y="0"/>
-          <a:ext cx="0" cy="0"/>
-          <a:chOff x="0" y="0"/>
-          <a:chExt cx="0" cy="0"/>
-        </a:xfrm>
-      </p:grpSpPr>
-      <p:sp>
-        <p:nvSpPr>
-          <p:cNvPr id="2" name="Title 1">
-            <a:extLst>
-              <a:ext uri="{FF2B5EF4-FFF2-40B4-BE49-F238E27FC236}">
-                <a16:creationId xmlns:a16="http://schemas.microsoft.com/office/drawing/2014/main" id="{CC9BC353-C438-5E40-C3FF-618D49D8A61E}"/>
-              </a:ext>
-            </a:extLst>
-          </p:cNvPr>
-          <p:cNvSpPr>
-            <a:spLocks noGrp="1"/>
-          </p:cNvSpPr>
-          <p:nvPr>
-            <p:ph type="title"/>
-          </p:nvPr>
-        </p:nvSpPr>
-        <p:spPr>
-          <a:xfrm>
-            <a:off x="838200" y="365125"/>
-            <a:ext cx="10515600" cy="720725"/>
-          </a:xfrm>
-        </p:spPr>
-        <p:txBody>
-          <a:bodyPr/>
-          <a:lstStyle/>
-          <a:p>
-            <a:endParaRPr lang="en-GB" dirty="0"/>
-          </a:p>
-        </p:txBody>
-      </p:sp>
-      <p:pic>
-        <p:nvPicPr>
-          <p:cNvPr id="5" name="Picture 4">
-            <a:extLst>
-              <a:ext uri="{FF2B5EF4-FFF2-40B4-BE49-F238E27FC236}">
-                <a16:creationId xmlns:a16="http://schemas.microsoft.com/office/drawing/2014/main" id="{98CF9533-BABB-55BB-1DB2-79C1ABB8F663}"/>
-              </a:ext>
-            </a:extLst>
-          </p:cNvPr>
-          <p:cNvPicPr>
-            <a:picLocks noChangeAspect="1"/>
-          </p:cNvPicPr>
-          <p:nvPr/>
-        </p:nvPicPr>
-        <p:blipFill>
-          <a:blip r:embed="rId2"/>
-          <a:stretch>
-            <a:fillRect/>
-          </a:stretch>
-        </p:blipFill>
-        <p:spPr>
-          <a:xfrm>
-            <a:off x="793750" y="1290395"/>
-            <a:ext cx="3886742" cy="3477110"/>
-          </a:xfrm>
-          <a:prstGeom prst="rect">
-            <a:avLst/>
-          </a:prstGeom>
-        </p:spPr>
-      </p:pic>
-      <p:pic>
-        <p:nvPicPr>
-          <p:cNvPr id="7" name="Picture 6">
-            <a:extLst>
-              <a:ext uri="{FF2B5EF4-FFF2-40B4-BE49-F238E27FC236}">
-                <a16:creationId xmlns:a16="http://schemas.microsoft.com/office/drawing/2014/main" id="{1B13D5C5-E8D9-73FE-CFFB-A0B0D2A8EF6A}"/>
-              </a:ext>
-            </a:extLst>
-          </p:cNvPr>
-          <p:cNvPicPr>
-            <a:picLocks noChangeAspect="1"/>
-          </p:cNvPicPr>
-          <p:nvPr/>
-        </p:nvPicPr>
-        <p:blipFill>
-          <a:blip r:embed="rId3"/>
-          <a:stretch>
-            <a:fillRect/>
-          </a:stretch>
-        </p:blipFill>
-        <p:spPr>
-          <a:xfrm>
-            <a:off x="5095613" y="1193157"/>
-            <a:ext cx="4082057" cy="5029200"/>
-          </a:xfrm>
-          <a:prstGeom prst="rect">
-            <a:avLst/>
-          </a:prstGeom>
-        </p:spPr>
-      </p:pic>
-      <p:pic>
-        <p:nvPicPr>
-          <p:cNvPr id="9" name="Picture 8">
-            <a:extLst>
-              <a:ext uri="{FF2B5EF4-FFF2-40B4-BE49-F238E27FC236}">
-                <a16:creationId xmlns:a16="http://schemas.microsoft.com/office/drawing/2014/main" id="{E2E29D80-8472-864F-1A14-6618E05E385A}"/>
-              </a:ext>
-            </a:extLst>
-          </p:cNvPr>
-          <p:cNvPicPr>
-            <a:picLocks noChangeAspect="1"/>
-          </p:cNvPicPr>
-          <p:nvPr/>
-        </p:nvPicPr>
-        <p:blipFill>
-          <a:blip r:embed="rId4"/>
-          <a:stretch>
-            <a:fillRect/>
-          </a:stretch>
-        </p:blipFill>
-        <p:spPr>
-          <a:xfrm>
-            <a:off x="5095613" y="6222357"/>
-            <a:ext cx="3985272" cy="635643"/>
-          </a:xfrm>
-          <a:prstGeom prst="rect">
-            <a:avLst/>
-          </a:prstGeom>
-        </p:spPr>
-      </p:pic>
-    </p:spTree>
-    <p:extLst>
-      <p:ext uri="{BB962C8B-B14F-4D97-AF65-F5344CB8AC3E}">
-        <p14:creationId xmlns:p14="http://schemas.microsoft.com/office/powerpoint/2010/main" val="3875996855"/>
-      </p:ext>
-    </p:extLst>
-  </p:cSld>
-  <p:clrMapOvr>
-    <a:masterClrMapping/>
-  </p:clrMapOvr>
-</p:sld>
-</file>
-
-<file path=ppt/slides/slide26.xml><?xml version="1.0" encoding="utf-8"?>
-<p:sld xmlns:a="http://schemas.openxmlformats.org/drawingml/2006/main" xmlns:r="http://schemas.openxmlformats.org/officeDocument/2006/relationships" xmlns:p="http://schemas.openxmlformats.org/presentationml/2006/main">
-  <p:cSld>
-    <p:spTree>
-      <p:nvGrpSpPr>
-        <p:cNvPr id="1" name=""/>
-        <p:cNvGrpSpPr/>
-        <p:nvPr/>
-      </p:nvGrpSpPr>
-      <p:grpSpPr>
-        <a:xfrm>
-          <a:off x="0" y="0"/>
-          <a:ext cx="0" cy="0"/>
-          <a:chOff x="0" y="0"/>
-          <a:chExt cx="0" cy="0"/>
-        </a:xfrm>
-      </p:grpSpPr>
-      <p:sp>
-        <p:nvSpPr>
-          <p:cNvPr id="2" name="Title 1">
-            <a:extLst>
-              <a:ext uri="{FF2B5EF4-FFF2-40B4-BE49-F238E27FC236}">
-                <a16:creationId xmlns:a16="http://schemas.microsoft.com/office/drawing/2014/main" id="{A9BC8783-6E9D-F9AF-AB14-9E9E3094A2C0}"/>
-              </a:ext>
-            </a:extLst>
-          </p:cNvPr>
-          <p:cNvSpPr>
-            <a:spLocks noGrp="1"/>
-          </p:cNvSpPr>
-          <p:nvPr>
-            <p:ph type="title"/>
-          </p:nvPr>
-        </p:nvSpPr>
-        <p:spPr/>
-        <p:txBody>
-          <a:bodyPr/>
-          <a:lstStyle/>
-          <a:p>
-            <a:endParaRPr lang="en-GB"/>
-          </a:p>
-        </p:txBody>
-      </p:sp>
-      <p:pic>
-        <p:nvPicPr>
-          <p:cNvPr id="5" name="Picture 4">
-            <a:extLst>
-              <a:ext uri="{FF2B5EF4-FFF2-40B4-BE49-F238E27FC236}">
-                <a16:creationId xmlns:a16="http://schemas.microsoft.com/office/drawing/2014/main" id="{B325228D-734D-34AB-D4A0-E0F5BD95DCAD}"/>
-              </a:ext>
-            </a:extLst>
-          </p:cNvPr>
-          <p:cNvPicPr>
-            <a:picLocks noChangeAspect="1"/>
-          </p:cNvPicPr>
-          <p:nvPr/>
-        </p:nvPicPr>
-        <p:blipFill>
-          <a:blip r:embed="rId2"/>
-          <a:stretch>
-            <a:fillRect/>
-          </a:stretch>
-        </p:blipFill>
-        <p:spPr>
-          <a:xfrm>
-            <a:off x="838200" y="2150805"/>
-            <a:ext cx="3991532" cy="3686689"/>
-          </a:xfrm>
-          <a:prstGeom prst="rect">
-            <a:avLst/>
-          </a:prstGeom>
-        </p:spPr>
-      </p:pic>
-      <p:pic>
-        <p:nvPicPr>
-          <p:cNvPr id="7" name="Picture 6">
-            <a:extLst>
-              <a:ext uri="{FF2B5EF4-FFF2-40B4-BE49-F238E27FC236}">
-                <a16:creationId xmlns:a16="http://schemas.microsoft.com/office/drawing/2014/main" id="{287A7ABC-D1AE-E170-A2A6-6470EE734A0D}"/>
-              </a:ext>
-            </a:extLst>
-          </p:cNvPr>
-          <p:cNvPicPr>
-            <a:picLocks noChangeAspect="1"/>
-          </p:cNvPicPr>
-          <p:nvPr/>
-        </p:nvPicPr>
-        <p:blipFill>
-          <a:blip r:embed="rId3"/>
-          <a:stretch>
-            <a:fillRect/>
-          </a:stretch>
-        </p:blipFill>
-        <p:spPr>
-          <a:xfrm>
-            <a:off x="5879816" y="1027906"/>
-            <a:ext cx="1719690" cy="5666263"/>
-          </a:xfrm>
-          <a:prstGeom prst="rect">
-            <a:avLst/>
-          </a:prstGeom>
-        </p:spPr>
-      </p:pic>
-    </p:spTree>
-    <p:extLst>
-      <p:ext uri="{BB962C8B-B14F-4D97-AF65-F5344CB8AC3E}">
-        <p14:creationId xmlns:p14="http://schemas.microsoft.com/office/powerpoint/2010/main" val="2631230412"/>
-      </p:ext>
-    </p:extLst>
-  </p:cSld>
-  <p:clrMapOvr>
-    <a:masterClrMapping/>
-  </p:clrMapOvr>
-</p:sld>
-</file>
-
-<file path=ppt/slides/slide27.xml><?xml version="1.0" encoding="utf-8"?>
-<p:sld xmlns:a="http://schemas.openxmlformats.org/drawingml/2006/main" xmlns:r="http://schemas.openxmlformats.org/officeDocument/2006/relationships" xmlns:p="http://schemas.openxmlformats.org/presentationml/2006/main">
-  <p:cSld>
-    <p:spTree>
-      <p:nvGrpSpPr>
-        <p:cNvPr id="1" name=""/>
-        <p:cNvGrpSpPr/>
-        <p:nvPr/>
-      </p:nvGrpSpPr>
-      <p:grpSpPr>
-        <a:xfrm>
-          <a:off x="0" y="0"/>
-          <a:ext cx="0" cy="0"/>
-          <a:chOff x="0" y="0"/>
-          <a:chExt cx="0" cy="0"/>
-        </a:xfrm>
-      </p:grpSpPr>
-      <p:sp>
-        <p:nvSpPr>
-          <p:cNvPr id="2" name="Title 1">
-            <a:extLst>
-              <a:ext uri="{FF2B5EF4-FFF2-40B4-BE49-F238E27FC236}">
-                <a16:creationId xmlns:a16="http://schemas.microsoft.com/office/drawing/2014/main" id="{21017636-EA3E-8FEF-99A9-52E40CE4CEE3}"/>
-              </a:ext>
-            </a:extLst>
-          </p:cNvPr>
-          <p:cNvSpPr>
-            <a:spLocks noGrp="1"/>
-          </p:cNvSpPr>
-          <p:nvPr>
-            <p:ph type="title"/>
-          </p:nvPr>
-        </p:nvSpPr>
-        <p:spPr/>
-        <p:txBody>
-          <a:bodyPr/>
-          <a:lstStyle/>
-          <a:p>
-            <a:endParaRPr lang="en-GB"/>
-          </a:p>
-        </p:txBody>
-      </p:sp>
-      <p:pic>
-        <p:nvPicPr>
-          <p:cNvPr id="9" name="Picture 8">
-            <a:extLst>
-              <a:ext uri="{FF2B5EF4-FFF2-40B4-BE49-F238E27FC236}">
-                <a16:creationId xmlns:a16="http://schemas.microsoft.com/office/drawing/2014/main" id="{B3204D20-B887-386C-3F7D-C12C24AFC23A}"/>
-              </a:ext>
-            </a:extLst>
-          </p:cNvPr>
-          <p:cNvPicPr>
-            <a:picLocks noChangeAspect="1"/>
-          </p:cNvPicPr>
-          <p:nvPr/>
-        </p:nvPicPr>
-        <p:blipFill>
-          <a:blip r:embed="rId2"/>
-          <a:stretch>
-            <a:fillRect/>
-          </a:stretch>
-        </p:blipFill>
-        <p:spPr>
-          <a:xfrm>
-            <a:off x="781050" y="1877670"/>
-            <a:ext cx="7493773" cy="4269130"/>
-          </a:xfrm>
-          <a:prstGeom prst="rect">
-            <a:avLst/>
-          </a:prstGeom>
-        </p:spPr>
-      </p:pic>
-    </p:spTree>
-    <p:extLst>
-      <p:ext uri="{BB962C8B-B14F-4D97-AF65-F5344CB8AC3E}">
-        <p14:creationId xmlns:p14="http://schemas.microsoft.com/office/powerpoint/2010/main" val="1718911435"/>
-      </p:ext>
-    </p:extLst>
-  </p:cSld>
-  <p:clrMapOvr>
-    <a:masterClrMapping/>
-  </p:clrMapOvr>
-</p:sld>
-</file>
-
-<file path=ppt/slides/slide28.xml><?xml version="1.0" encoding="utf-8"?>
-<p:sld xmlns:a="http://schemas.openxmlformats.org/drawingml/2006/main" xmlns:r="http://schemas.openxmlformats.org/officeDocument/2006/relationships" xmlns:p="http://schemas.openxmlformats.org/presentationml/2006/main">
-  <p:cSld>
-    <p:spTree>
-      <p:nvGrpSpPr>
-        <p:cNvPr id="1" name=""/>
-        <p:cNvGrpSpPr/>
-        <p:nvPr/>
-      </p:nvGrpSpPr>
-      <p:grpSpPr>
-        <a:xfrm>
-          <a:off x="0" y="0"/>
-          <a:ext cx="0" cy="0"/>
-          <a:chOff x="0" y="0"/>
-          <a:chExt cx="0" cy="0"/>
-        </a:xfrm>
-      </p:grpSpPr>
-      <p:sp>
-        <p:nvSpPr>
-          <p:cNvPr id="2" name="Title 1">
-            <a:extLst>
-              <a:ext uri="{FF2B5EF4-FFF2-40B4-BE49-F238E27FC236}">
-                <a16:creationId xmlns:a16="http://schemas.microsoft.com/office/drawing/2014/main" id="{5AD2B775-94F1-2712-63F2-C63C14F05B7E}"/>
-              </a:ext>
-            </a:extLst>
-          </p:cNvPr>
-          <p:cNvSpPr>
-            <a:spLocks noGrp="1"/>
-          </p:cNvSpPr>
-          <p:nvPr>
-            <p:ph type="title"/>
-          </p:nvPr>
-        </p:nvSpPr>
-        <p:spPr/>
-        <p:txBody>
-          <a:bodyPr/>
-          <a:lstStyle/>
-          <a:p>
-            <a:endParaRPr lang="en-GB"/>
-          </a:p>
-        </p:txBody>
-      </p:sp>
-      <p:pic>
-        <p:nvPicPr>
-          <p:cNvPr id="7" name="Picture 6">
-            <a:extLst>
-              <a:ext uri="{FF2B5EF4-FFF2-40B4-BE49-F238E27FC236}">
-                <a16:creationId xmlns:a16="http://schemas.microsoft.com/office/drawing/2014/main" id="{3B83AA5B-5185-2773-ECE3-5309334D99EA}"/>
-              </a:ext>
-            </a:extLst>
-          </p:cNvPr>
-          <p:cNvPicPr>
-            <a:picLocks noChangeAspect="1"/>
-          </p:cNvPicPr>
-          <p:nvPr/>
-        </p:nvPicPr>
-        <p:blipFill>
-          <a:blip r:embed="rId2"/>
-          <a:stretch>
-            <a:fillRect/>
-          </a:stretch>
-        </p:blipFill>
-        <p:spPr>
-          <a:xfrm>
-            <a:off x="946150" y="1690688"/>
-            <a:ext cx="7684755" cy="4737847"/>
-          </a:xfrm>
-          <a:prstGeom prst="rect">
-            <a:avLst/>
-          </a:prstGeom>
-        </p:spPr>
-      </p:pic>
-    </p:spTree>
-    <p:extLst>
-      <p:ext uri="{BB962C8B-B14F-4D97-AF65-F5344CB8AC3E}">
-        <p14:creationId xmlns:p14="http://schemas.microsoft.com/office/powerpoint/2010/main" val="1093725443"/>
-      </p:ext>
-    </p:extLst>
-  </p:cSld>
-  <p:clrMapOvr>
-    <a:masterClrMapping/>
-  </p:clrMapOvr>
-</p:sld>
-</file>
-
-<file path=ppt/slides/slide29.xml><?xml version="1.0" encoding="utf-8"?>
-<p:sld xmlns:a="http://schemas.openxmlformats.org/drawingml/2006/main" xmlns:r="http://schemas.openxmlformats.org/officeDocument/2006/relationships" xmlns:p="http://schemas.openxmlformats.org/presentationml/2006/main">
-  <p:cSld>
-    <p:spTree>
-      <p:nvGrpSpPr>
-        <p:cNvPr id="1" name=""/>
-        <p:cNvGrpSpPr/>
-        <p:nvPr/>
-      </p:nvGrpSpPr>
-      <p:grpSpPr>
-        <a:xfrm>
-          <a:off x="0" y="0"/>
-          <a:ext cx="0" cy="0"/>
-          <a:chOff x="0" y="0"/>
-          <a:chExt cx="0" cy="0"/>
-        </a:xfrm>
-      </p:grpSpPr>
-      <p:sp>
-        <p:nvSpPr>
-          <p:cNvPr id="2" name="Title 1">
-            <a:extLst>
-              <a:ext uri="{FF2B5EF4-FFF2-40B4-BE49-F238E27FC236}">
-                <a16:creationId xmlns:a16="http://schemas.microsoft.com/office/drawing/2014/main" id="{6DE57C0E-E6ED-0C5C-8A08-3A79DC12E791}"/>
-              </a:ext>
-            </a:extLst>
-          </p:cNvPr>
-          <p:cNvSpPr>
-            <a:spLocks noGrp="1"/>
-          </p:cNvSpPr>
-          <p:nvPr>
-            <p:ph type="title"/>
-          </p:nvPr>
-        </p:nvSpPr>
-        <p:spPr/>
-        <p:txBody>
-          <a:bodyPr/>
-          <a:lstStyle/>
-          <a:p>
-            <a:endParaRPr lang="en-GB"/>
-          </a:p>
-        </p:txBody>
-      </p:sp>
-      <p:pic>
-        <p:nvPicPr>
-          <p:cNvPr id="5" name="Picture 4">
-            <a:extLst>
-              <a:ext uri="{FF2B5EF4-FFF2-40B4-BE49-F238E27FC236}">
-                <a16:creationId xmlns:a16="http://schemas.microsoft.com/office/drawing/2014/main" id="{4E9E29CB-43C5-F6D1-3EB0-E21010287988}"/>
-              </a:ext>
-            </a:extLst>
-          </p:cNvPr>
-          <p:cNvPicPr>
-            <a:picLocks noChangeAspect="1"/>
-          </p:cNvPicPr>
-          <p:nvPr/>
-        </p:nvPicPr>
-        <p:blipFill>
-          <a:blip r:embed="rId2"/>
-          <a:stretch>
-            <a:fillRect/>
-          </a:stretch>
-        </p:blipFill>
-        <p:spPr>
-          <a:xfrm>
-            <a:off x="838200" y="1927008"/>
-            <a:ext cx="4534533" cy="3105583"/>
-          </a:xfrm>
-          <a:prstGeom prst="rect">
-            <a:avLst/>
-          </a:prstGeom>
-        </p:spPr>
-      </p:pic>
-      <p:pic>
-        <p:nvPicPr>
-          <p:cNvPr id="9" name="Picture 8">
-            <a:extLst>
-              <a:ext uri="{FF2B5EF4-FFF2-40B4-BE49-F238E27FC236}">
-                <a16:creationId xmlns:a16="http://schemas.microsoft.com/office/drawing/2014/main" id="{E05F283C-C78D-A7F1-4AA5-5C3C0BD0ABB2}"/>
-              </a:ext>
-            </a:extLst>
-          </p:cNvPr>
-          <p:cNvPicPr>
-            <a:picLocks noChangeAspect="1"/>
-          </p:cNvPicPr>
-          <p:nvPr/>
-        </p:nvPicPr>
-        <p:blipFill>
-          <a:blip r:embed="rId3"/>
-          <a:stretch>
-            <a:fillRect/>
-          </a:stretch>
-        </p:blipFill>
-        <p:spPr>
-          <a:xfrm>
-            <a:off x="5773505" y="1927008"/>
-            <a:ext cx="3324689" cy="2991267"/>
-          </a:xfrm>
-          <a:prstGeom prst="rect">
-            <a:avLst/>
-          </a:prstGeom>
-        </p:spPr>
-      </p:pic>
-    </p:spTree>
-    <p:extLst>
-      <p:ext uri="{BB962C8B-B14F-4D97-AF65-F5344CB8AC3E}">
-        <p14:creationId xmlns:p14="http://schemas.microsoft.com/office/powerpoint/2010/main" val="1176878744"/>
       </p:ext>
     </p:extLst>
   </p:cSld>
@@ -7743,6 +7779,356 @@
           <p:cNvPr id="2" name="Title 1">
             <a:extLst>
               <a:ext uri="{FF2B5EF4-FFF2-40B4-BE49-F238E27FC236}">
+                <a16:creationId xmlns:a16="http://schemas.microsoft.com/office/drawing/2014/main" id="{CC9BC353-C438-5E40-C3FF-618D49D8A61E}"/>
+              </a:ext>
+            </a:extLst>
+          </p:cNvPr>
+          <p:cNvSpPr>
+            <a:spLocks noGrp="1"/>
+          </p:cNvSpPr>
+          <p:nvPr>
+            <p:ph type="title"/>
+          </p:nvPr>
+        </p:nvSpPr>
+        <p:spPr>
+          <a:xfrm>
+            <a:off x="838200" y="365125"/>
+            <a:ext cx="10515600" cy="720725"/>
+          </a:xfrm>
+        </p:spPr>
+        <p:txBody>
+          <a:bodyPr/>
+          <a:lstStyle/>
+          <a:p>
+            <a:endParaRPr lang="en-GB" dirty="0"/>
+          </a:p>
+        </p:txBody>
+      </p:sp>
+      <p:pic>
+        <p:nvPicPr>
+          <p:cNvPr id="5" name="Picture 4">
+            <a:extLst>
+              <a:ext uri="{FF2B5EF4-FFF2-40B4-BE49-F238E27FC236}">
+                <a16:creationId xmlns:a16="http://schemas.microsoft.com/office/drawing/2014/main" id="{98CF9533-BABB-55BB-1DB2-79C1ABB8F663}"/>
+              </a:ext>
+            </a:extLst>
+          </p:cNvPr>
+          <p:cNvPicPr>
+            <a:picLocks noChangeAspect="1"/>
+          </p:cNvPicPr>
+          <p:nvPr/>
+        </p:nvPicPr>
+        <p:blipFill>
+          <a:blip r:embed="rId2"/>
+          <a:stretch>
+            <a:fillRect/>
+          </a:stretch>
+        </p:blipFill>
+        <p:spPr>
+          <a:xfrm>
+            <a:off x="793750" y="1290395"/>
+            <a:ext cx="3886742" cy="3477110"/>
+          </a:xfrm>
+          <a:prstGeom prst="rect">
+            <a:avLst/>
+          </a:prstGeom>
+        </p:spPr>
+      </p:pic>
+      <p:pic>
+        <p:nvPicPr>
+          <p:cNvPr id="7" name="Picture 6">
+            <a:extLst>
+              <a:ext uri="{FF2B5EF4-FFF2-40B4-BE49-F238E27FC236}">
+                <a16:creationId xmlns:a16="http://schemas.microsoft.com/office/drawing/2014/main" id="{1B13D5C5-E8D9-73FE-CFFB-A0B0D2A8EF6A}"/>
+              </a:ext>
+            </a:extLst>
+          </p:cNvPr>
+          <p:cNvPicPr>
+            <a:picLocks noChangeAspect="1"/>
+          </p:cNvPicPr>
+          <p:nvPr/>
+        </p:nvPicPr>
+        <p:blipFill>
+          <a:blip r:embed="rId3"/>
+          <a:stretch>
+            <a:fillRect/>
+          </a:stretch>
+        </p:blipFill>
+        <p:spPr>
+          <a:xfrm>
+            <a:off x="5095613" y="1193157"/>
+            <a:ext cx="4082057" cy="5029200"/>
+          </a:xfrm>
+          <a:prstGeom prst="rect">
+            <a:avLst/>
+          </a:prstGeom>
+        </p:spPr>
+      </p:pic>
+      <p:pic>
+        <p:nvPicPr>
+          <p:cNvPr id="9" name="Picture 8">
+            <a:extLst>
+              <a:ext uri="{FF2B5EF4-FFF2-40B4-BE49-F238E27FC236}">
+                <a16:creationId xmlns:a16="http://schemas.microsoft.com/office/drawing/2014/main" id="{E2E29D80-8472-864F-1A14-6618E05E385A}"/>
+              </a:ext>
+            </a:extLst>
+          </p:cNvPr>
+          <p:cNvPicPr>
+            <a:picLocks noChangeAspect="1"/>
+          </p:cNvPicPr>
+          <p:nvPr/>
+        </p:nvPicPr>
+        <p:blipFill>
+          <a:blip r:embed="rId4"/>
+          <a:stretch>
+            <a:fillRect/>
+          </a:stretch>
+        </p:blipFill>
+        <p:spPr>
+          <a:xfrm>
+            <a:off x="5095613" y="6222357"/>
+            <a:ext cx="3985272" cy="635643"/>
+          </a:xfrm>
+          <a:prstGeom prst="rect">
+            <a:avLst/>
+          </a:prstGeom>
+        </p:spPr>
+      </p:pic>
+    </p:spTree>
+    <p:extLst>
+      <p:ext uri="{BB962C8B-B14F-4D97-AF65-F5344CB8AC3E}">
+        <p14:creationId xmlns:p14="http://schemas.microsoft.com/office/powerpoint/2010/main" val="3875996855"/>
+      </p:ext>
+    </p:extLst>
+  </p:cSld>
+  <p:clrMapOvr>
+    <a:masterClrMapping/>
+  </p:clrMapOvr>
+</p:sld>
+</file>
+
+<file path=ppt/slides/slide31.xml><?xml version="1.0" encoding="utf-8"?>
+<p:sld xmlns:a="http://schemas.openxmlformats.org/drawingml/2006/main" xmlns:r="http://schemas.openxmlformats.org/officeDocument/2006/relationships" xmlns:p="http://schemas.openxmlformats.org/presentationml/2006/main">
+  <p:cSld>
+    <p:spTree>
+      <p:nvGrpSpPr>
+        <p:cNvPr id="1" name=""/>
+        <p:cNvGrpSpPr/>
+        <p:nvPr/>
+      </p:nvGrpSpPr>
+      <p:grpSpPr>
+        <a:xfrm>
+          <a:off x="0" y="0"/>
+          <a:ext cx="0" cy="0"/>
+          <a:chOff x="0" y="0"/>
+          <a:chExt cx="0" cy="0"/>
+        </a:xfrm>
+      </p:grpSpPr>
+      <p:sp>
+        <p:nvSpPr>
+          <p:cNvPr id="2" name="Title 1">
+            <a:extLst>
+              <a:ext uri="{FF2B5EF4-FFF2-40B4-BE49-F238E27FC236}">
+                <a16:creationId xmlns:a16="http://schemas.microsoft.com/office/drawing/2014/main" id="{5AD2B775-94F1-2712-63F2-C63C14F05B7E}"/>
+              </a:ext>
+            </a:extLst>
+          </p:cNvPr>
+          <p:cNvSpPr>
+            <a:spLocks noGrp="1"/>
+          </p:cNvSpPr>
+          <p:nvPr>
+            <p:ph type="title"/>
+          </p:nvPr>
+        </p:nvSpPr>
+        <p:spPr/>
+        <p:txBody>
+          <a:bodyPr/>
+          <a:lstStyle/>
+          <a:p>
+            <a:endParaRPr lang="en-GB"/>
+          </a:p>
+        </p:txBody>
+      </p:sp>
+      <p:pic>
+        <p:nvPicPr>
+          <p:cNvPr id="7" name="Picture 6">
+            <a:extLst>
+              <a:ext uri="{FF2B5EF4-FFF2-40B4-BE49-F238E27FC236}">
+                <a16:creationId xmlns:a16="http://schemas.microsoft.com/office/drawing/2014/main" id="{3B83AA5B-5185-2773-ECE3-5309334D99EA}"/>
+              </a:ext>
+            </a:extLst>
+          </p:cNvPr>
+          <p:cNvPicPr>
+            <a:picLocks noChangeAspect="1"/>
+          </p:cNvPicPr>
+          <p:nvPr/>
+        </p:nvPicPr>
+        <p:blipFill>
+          <a:blip r:embed="rId2"/>
+          <a:stretch>
+            <a:fillRect/>
+          </a:stretch>
+        </p:blipFill>
+        <p:spPr>
+          <a:xfrm>
+            <a:off x="946150" y="1690688"/>
+            <a:ext cx="7684755" cy="4737847"/>
+          </a:xfrm>
+          <a:prstGeom prst="rect">
+            <a:avLst/>
+          </a:prstGeom>
+        </p:spPr>
+      </p:pic>
+    </p:spTree>
+    <p:extLst>
+      <p:ext uri="{BB962C8B-B14F-4D97-AF65-F5344CB8AC3E}">
+        <p14:creationId xmlns:p14="http://schemas.microsoft.com/office/powerpoint/2010/main" val="1093725443"/>
+      </p:ext>
+    </p:extLst>
+  </p:cSld>
+  <p:clrMapOvr>
+    <a:masterClrMapping/>
+  </p:clrMapOvr>
+</p:sld>
+</file>
+
+<file path=ppt/slides/slide32.xml><?xml version="1.0" encoding="utf-8"?>
+<p:sld xmlns:a="http://schemas.openxmlformats.org/drawingml/2006/main" xmlns:r="http://schemas.openxmlformats.org/officeDocument/2006/relationships" xmlns:p="http://schemas.openxmlformats.org/presentationml/2006/main">
+  <p:cSld>
+    <p:spTree>
+      <p:nvGrpSpPr>
+        <p:cNvPr id="1" name=""/>
+        <p:cNvGrpSpPr/>
+        <p:nvPr/>
+      </p:nvGrpSpPr>
+      <p:grpSpPr>
+        <a:xfrm>
+          <a:off x="0" y="0"/>
+          <a:ext cx="0" cy="0"/>
+          <a:chOff x="0" y="0"/>
+          <a:chExt cx="0" cy="0"/>
+        </a:xfrm>
+      </p:grpSpPr>
+      <p:sp>
+        <p:nvSpPr>
+          <p:cNvPr id="2" name="Title 1">
+            <a:extLst>
+              <a:ext uri="{FF2B5EF4-FFF2-40B4-BE49-F238E27FC236}">
+                <a16:creationId xmlns:a16="http://schemas.microsoft.com/office/drawing/2014/main" id="{6DE57C0E-E6ED-0C5C-8A08-3A79DC12E791}"/>
+              </a:ext>
+            </a:extLst>
+          </p:cNvPr>
+          <p:cNvSpPr>
+            <a:spLocks noGrp="1"/>
+          </p:cNvSpPr>
+          <p:nvPr>
+            <p:ph type="title"/>
+          </p:nvPr>
+        </p:nvSpPr>
+        <p:spPr/>
+        <p:txBody>
+          <a:bodyPr/>
+          <a:lstStyle/>
+          <a:p>
+            <a:endParaRPr lang="en-GB"/>
+          </a:p>
+        </p:txBody>
+      </p:sp>
+      <p:pic>
+        <p:nvPicPr>
+          <p:cNvPr id="5" name="Picture 4">
+            <a:extLst>
+              <a:ext uri="{FF2B5EF4-FFF2-40B4-BE49-F238E27FC236}">
+                <a16:creationId xmlns:a16="http://schemas.microsoft.com/office/drawing/2014/main" id="{4E9E29CB-43C5-F6D1-3EB0-E21010287988}"/>
+              </a:ext>
+            </a:extLst>
+          </p:cNvPr>
+          <p:cNvPicPr>
+            <a:picLocks noChangeAspect="1"/>
+          </p:cNvPicPr>
+          <p:nvPr/>
+        </p:nvPicPr>
+        <p:blipFill>
+          <a:blip r:embed="rId2"/>
+          <a:stretch>
+            <a:fillRect/>
+          </a:stretch>
+        </p:blipFill>
+        <p:spPr>
+          <a:xfrm>
+            <a:off x="838200" y="1927008"/>
+            <a:ext cx="4534533" cy="3105583"/>
+          </a:xfrm>
+          <a:prstGeom prst="rect">
+            <a:avLst/>
+          </a:prstGeom>
+        </p:spPr>
+      </p:pic>
+      <p:pic>
+        <p:nvPicPr>
+          <p:cNvPr id="9" name="Picture 8">
+            <a:extLst>
+              <a:ext uri="{FF2B5EF4-FFF2-40B4-BE49-F238E27FC236}">
+                <a16:creationId xmlns:a16="http://schemas.microsoft.com/office/drawing/2014/main" id="{E05F283C-C78D-A7F1-4AA5-5C3C0BD0ABB2}"/>
+              </a:ext>
+            </a:extLst>
+          </p:cNvPr>
+          <p:cNvPicPr>
+            <a:picLocks noChangeAspect="1"/>
+          </p:cNvPicPr>
+          <p:nvPr/>
+        </p:nvPicPr>
+        <p:blipFill>
+          <a:blip r:embed="rId3"/>
+          <a:stretch>
+            <a:fillRect/>
+          </a:stretch>
+        </p:blipFill>
+        <p:spPr>
+          <a:xfrm>
+            <a:off x="5773505" y="1927008"/>
+            <a:ext cx="3324689" cy="2991267"/>
+          </a:xfrm>
+          <a:prstGeom prst="rect">
+            <a:avLst/>
+          </a:prstGeom>
+        </p:spPr>
+      </p:pic>
+    </p:spTree>
+    <p:extLst>
+      <p:ext uri="{BB962C8B-B14F-4D97-AF65-F5344CB8AC3E}">
+        <p14:creationId xmlns:p14="http://schemas.microsoft.com/office/powerpoint/2010/main" val="1176878744"/>
+      </p:ext>
+    </p:extLst>
+  </p:cSld>
+  <p:clrMapOvr>
+    <a:masterClrMapping/>
+  </p:clrMapOvr>
+</p:sld>
+</file>
+
+<file path=ppt/slides/slide33.xml><?xml version="1.0" encoding="utf-8"?>
+<p:sld xmlns:a="http://schemas.openxmlformats.org/drawingml/2006/main" xmlns:r="http://schemas.openxmlformats.org/officeDocument/2006/relationships" xmlns:p="http://schemas.openxmlformats.org/presentationml/2006/main">
+  <p:cSld>
+    <p:spTree>
+      <p:nvGrpSpPr>
+        <p:cNvPr id="1" name=""/>
+        <p:cNvGrpSpPr/>
+        <p:nvPr/>
+      </p:nvGrpSpPr>
+      <p:grpSpPr>
+        <a:xfrm>
+          <a:off x="0" y="0"/>
+          <a:ext cx="0" cy="0"/>
+          <a:chOff x="0" y="0"/>
+          <a:chExt cx="0" cy="0"/>
+        </a:xfrm>
+      </p:grpSpPr>
+      <p:sp>
+        <p:nvSpPr>
+          <p:cNvPr id="2" name="Title 1">
+            <a:extLst>
+              <a:ext uri="{FF2B5EF4-FFF2-40B4-BE49-F238E27FC236}">
                 <a16:creationId xmlns:a16="http://schemas.microsoft.com/office/drawing/2014/main" id="{01098F21-15EF-C2B8-A81B-F04DD58828E6}"/>
               </a:ext>
             </a:extLst>
@@ -7806,7 +8192,7 @@
 </p:sld>
 </file>
 
-<file path=ppt/slides/slide31.xml><?xml version="1.0" encoding="utf-8"?>
+<file path=ppt/slides/slide34.xml><?xml version="1.0" encoding="utf-8"?>
 <p:sld xmlns:a="http://schemas.openxmlformats.org/drawingml/2006/main" xmlns:r="http://schemas.openxmlformats.org/officeDocument/2006/relationships" xmlns:p="http://schemas.openxmlformats.org/presentationml/2006/main">
   <p:cSld>
     <p:spTree>
@@ -7891,7 +8277,7 @@
 </p:sld>
 </file>
 
-<file path=ppt/slides/slide32.xml><?xml version="1.0" encoding="utf-8"?>
+<file path=ppt/slides/slide35.xml><?xml version="1.0" encoding="utf-8"?>
 <p:sld xmlns:a="http://schemas.openxmlformats.org/drawingml/2006/main" xmlns:r="http://schemas.openxmlformats.org/officeDocument/2006/relationships" xmlns:p="http://schemas.openxmlformats.org/presentationml/2006/main">
   <p:cSld>
     <p:spTree>
@@ -7976,7 +8362,7 @@
 </p:sld>
 </file>
 
-<file path=ppt/slides/slide33.xml><?xml version="1.0" encoding="utf-8"?>
+<file path=ppt/slides/slide36.xml><?xml version="1.0" encoding="utf-8"?>
 <p:sld xmlns:a="http://schemas.openxmlformats.org/drawingml/2006/main" xmlns:r="http://schemas.openxmlformats.org/officeDocument/2006/relationships" xmlns:p="http://schemas.openxmlformats.org/presentationml/2006/main">
   <p:cSld>
     <p:spTree>
@@ -8066,7 +8452,7 @@
 </p:sld>
 </file>
 
-<file path=ppt/slides/slide34.xml><?xml version="1.0" encoding="utf-8"?>
+<file path=ppt/slides/slide37.xml><?xml version="1.0" encoding="utf-8"?>
 <p:sld xmlns:a="http://schemas.openxmlformats.org/drawingml/2006/main" xmlns:r="http://schemas.openxmlformats.org/officeDocument/2006/relationships" xmlns:p="http://schemas.openxmlformats.org/presentationml/2006/main">
   <p:cSld>
     <p:spTree>
@@ -8151,301 +8537,6 @@
 </p:sld>
 </file>
 
-<file path=ppt/slides/slide35.xml><?xml version="1.0" encoding="utf-8"?>
-<p:sld xmlns:a="http://schemas.openxmlformats.org/drawingml/2006/main" xmlns:r="http://schemas.openxmlformats.org/officeDocument/2006/relationships" xmlns:p="http://schemas.openxmlformats.org/presentationml/2006/main">
-  <p:cSld>
-    <p:spTree>
-      <p:nvGrpSpPr>
-        <p:cNvPr id="1" name=""/>
-        <p:cNvGrpSpPr/>
-        <p:nvPr/>
-      </p:nvGrpSpPr>
-      <p:grpSpPr>
-        <a:xfrm>
-          <a:off x="0" y="0"/>
-          <a:ext cx="0" cy="0"/>
-          <a:chOff x="0" y="0"/>
-          <a:chExt cx="0" cy="0"/>
-        </a:xfrm>
-      </p:grpSpPr>
-      <p:sp>
-        <p:nvSpPr>
-          <p:cNvPr id="2" name="Title 1">
-            <a:extLst>
-              <a:ext uri="{FF2B5EF4-FFF2-40B4-BE49-F238E27FC236}">
-                <a16:creationId xmlns:a16="http://schemas.microsoft.com/office/drawing/2014/main" id="{DCD86764-00F4-6C9A-2130-D553A9C0F19A}"/>
-              </a:ext>
-            </a:extLst>
-          </p:cNvPr>
-          <p:cNvSpPr>
-            <a:spLocks noGrp="1"/>
-          </p:cNvSpPr>
-          <p:nvPr>
-            <p:ph type="title"/>
-          </p:nvPr>
-        </p:nvSpPr>
-        <p:spPr/>
-        <p:txBody>
-          <a:bodyPr/>
-          <a:lstStyle/>
-          <a:p>
-            <a:endParaRPr lang="en-GB"/>
-          </a:p>
-        </p:txBody>
-      </p:sp>
-      <p:pic>
-        <p:nvPicPr>
-          <p:cNvPr id="4" name="Picture 3">
-            <a:extLst>
-              <a:ext uri="{FF2B5EF4-FFF2-40B4-BE49-F238E27FC236}">
-                <a16:creationId xmlns:a16="http://schemas.microsoft.com/office/drawing/2014/main" id="{20F3E66B-E246-EFCB-FFBE-25044944C469}"/>
-              </a:ext>
-            </a:extLst>
-          </p:cNvPr>
-          <p:cNvPicPr>
-            <a:picLocks noChangeAspect="1"/>
-          </p:cNvPicPr>
-          <p:nvPr/>
-        </p:nvPicPr>
-        <p:blipFill>
-          <a:blip r:embed="rId2"/>
-          <a:stretch>
-            <a:fillRect/>
-          </a:stretch>
-        </p:blipFill>
-        <p:spPr>
-          <a:xfrm>
-            <a:off x="838200" y="1242558"/>
-            <a:ext cx="4959605" cy="1517728"/>
-          </a:xfrm>
-          <a:prstGeom prst="rect">
-            <a:avLst/>
-          </a:prstGeom>
-        </p:spPr>
-      </p:pic>
-      <p:pic>
-        <p:nvPicPr>
-          <p:cNvPr id="7" name="Picture 6">
-            <a:extLst>
-              <a:ext uri="{FF2B5EF4-FFF2-40B4-BE49-F238E27FC236}">
-                <a16:creationId xmlns:a16="http://schemas.microsoft.com/office/drawing/2014/main" id="{A96C8C96-A6EA-2AE6-661D-FA50CC4E8CDA}"/>
-              </a:ext>
-            </a:extLst>
-          </p:cNvPr>
-          <p:cNvPicPr>
-            <a:picLocks noChangeAspect="1"/>
-          </p:cNvPicPr>
-          <p:nvPr/>
-        </p:nvPicPr>
-        <p:blipFill>
-          <a:blip r:embed="rId3"/>
-          <a:stretch>
-            <a:fillRect/>
-          </a:stretch>
-        </p:blipFill>
-        <p:spPr>
-          <a:xfrm>
-            <a:off x="6394197" y="1242558"/>
-            <a:ext cx="4511991" cy="5250317"/>
-          </a:xfrm>
-          <a:prstGeom prst="rect">
-            <a:avLst/>
-          </a:prstGeom>
-        </p:spPr>
-      </p:pic>
-    </p:spTree>
-    <p:extLst>
-      <p:ext uri="{BB962C8B-B14F-4D97-AF65-F5344CB8AC3E}">
-        <p14:creationId xmlns:p14="http://schemas.microsoft.com/office/powerpoint/2010/main" val="17736079"/>
-      </p:ext>
-    </p:extLst>
-  </p:cSld>
-  <p:clrMapOvr>
-    <a:masterClrMapping/>
-  </p:clrMapOvr>
-</p:sld>
-</file>
-
-<file path=ppt/slides/slide36.xml><?xml version="1.0" encoding="utf-8"?>
-<p:sld xmlns:a="http://schemas.openxmlformats.org/drawingml/2006/main" xmlns:r="http://schemas.openxmlformats.org/officeDocument/2006/relationships" xmlns:p="http://schemas.openxmlformats.org/presentationml/2006/main">
-  <p:cSld>
-    <p:spTree>
-      <p:nvGrpSpPr>
-        <p:cNvPr id="1" name=""/>
-        <p:cNvGrpSpPr/>
-        <p:nvPr/>
-      </p:nvGrpSpPr>
-      <p:grpSpPr>
-        <a:xfrm>
-          <a:off x="0" y="0"/>
-          <a:ext cx="0" cy="0"/>
-          <a:chOff x="0" y="0"/>
-          <a:chExt cx="0" cy="0"/>
-        </a:xfrm>
-      </p:grpSpPr>
-      <p:pic>
-        <p:nvPicPr>
-          <p:cNvPr id="8" name="Picture 7">
-            <a:extLst>
-              <a:ext uri="{FF2B5EF4-FFF2-40B4-BE49-F238E27FC236}">
-                <a16:creationId xmlns:a16="http://schemas.microsoft.com/office/drawing/2014/main" id="{267E26B0-ADE5-2D5A-201D-E7974C1FE8C8}"/>
-              </a:ext>
-            </a:extLst>
-          </p:cNvPr>
-          <p:cNvPicPr>
-            <a:picLocks noChangeAspect="1"/>
-          </p:cNvPicPr>
-          <p:nvPr/>
-        </p:nvPicPr>
-        <p:blipFill>
-          <a:blip r:embed="rId2"/>
-          <a:stretch>
-            <a:fillRect/>
-          </a:stretch>
-        </p:blipFill>
-        <p:spPr>
-          <a:xfrm>
-            <a:off x="497406" y="502516"/>
-            <a:ext cx="6401129" cy="5550185"/>
-          </a:xfrm>
-          <a:prstGeom prst="rect">
-            <a:avLst/>
-          </a:prstGeom>
-        </p:spPr>
-      </p:pic>
-      <p:pic>
-        <p:nvPicPr>
-          <p:cNvPr id="9" name="Picture 8">
-            <a:extLst>
-              <a:ext uri="{FF2B5EF4-FFF2-40B4-BE49-F238E27FC236}">
-                <a16:creationId xmlns:a16="http://schemas.microsoft.com/office/drawing/2014/main" id="{159E5FD2-985E-7690-3E2A-435134F3B0FE}"/>
-              </a:ext>
-            </a:extLst>
-          </p:cNvPr>
-          <p:cNvPicPr>
-            <a:picLocks noChangeAspect="1"/>
-          </p:cNvPicPr>
-          <p:nvPr/>
-        </p:nvPicPr>
-        <p:blipFill>
-          <a:blip r:embed="rId3"/>
-          <a:stretch>
-            <a:fillRect/>
-          </a:stretch>
-        </p:blipFill>
-        <p:spPr>
-          <a:xfrm>
-            <a:off x="7205188" y="923852"/>
-            <a:ext cx="4915153" cy="2006703"/>
-          </a:xfrm>
-          <a:prstGeom prst="rect">
-            <a:avLst/>
-          </a:prstGeom>
-        </p:spPr>
-      </p:pic>
-    </p:spTree>
-    <p:extLst>
-      <p:ext uri="{BB962C8B-B14F-4D97-AF65-F5344CB8AC3E}">
-        <p14:creationId xmlns:p14="http://schemas.microsoft.com/office/powerpoint/2010/main" val="3790276932"/>
-      </p:ext>
-    </p:extLst>
-  </p:cSld>
-  <p:clrMapOvr>
-    <a:masterClrMapping/>
-  </p:clrMapOvr>
-</p:sld>
-</file>
-
-<file path=ppt/slides/slide37.xml><?xml version="1.0" encoding="utf-8"?>
-<p:sld xmlns:a="http://schemas.openxmlformats.org/drawingml/2006/main" xmlns:r="http://schemas.openxmlformats.org/officeDocument/2006/relationships" xmlns:p="http://schemas.openxmlformats.org/presentationml/2006/main">
-  <p:cSld>
-    <p:spTree>
-      <p:nvGrpSpPr>
-        <p:cNvPr id="1" name=""/>
-        <p:cNvGrpSpPr/>
-        <p:nvPr/>
-      </p:nvGrpSpPr>
-      <p:grpSpPr>
-        <a:xfrm>
-          <a:off x="0" y="0"/>
-          <a:ext cx="0" cy="0"/>
-          <a:chOff x="0" y="0"/>
-          <a:chExt cx="0" cy="0"/>
-        </a:xfrm>
-      </p:grpSpPr>
-      <p:pic>
-        <p:nvPicPr>
-          <p:cNvPr id="5" name="Picture 4">
-            <a:extLst>
-              <a:ext uri="{FF2B5EF4-FFF2-40B4-BE49-F238E27FC236}">
-                <a16:creationId xmlns:a16="http://schemas.microsoft.com/office/drawing/2014/main" id="{D89C5F76-DE95-EF62-4BC4-CD0A02BDAAB6}"/>
-              </a:ext>
-            </a:extLst>
-          </p:cNvPr>
-          <p:cNvPicPr>
-            <a:picLocks noChangeAspect="1"/>
-          </p:cNvPicPr>
-          <p:nvPr/>
-        </p:nvPicPr>
-        <p:blipFill>
-          <a:blip r:embed="rId2"/>
-          <a:stretch>
-            <a:fillRect/>
-          </a:stretch>
-        </p:blipFill>
-        <p:spPr>
-          <a:xfrm>
-            <a:off x="564587" y="761453"/>
-            <a:ext cx="4680191" cy="3264068"/>
-          </a:xfrm>
-          <a:prstGeom prst="rect">
-            <a:avLst/>
-          </a:prstGeom>
-        </p:spPr>
-      </p:pic>
-      <p:pic>
-        <p:nvPicPr>
-          <p:cNvPr id="7" name="Picture 6">
-            <a:extLst>
-              <a:ext uri="{FF2B5EF4-FFF2-40B4-BE49-F238E27FC236}">
-                <a16:creationId xmlns:a16="http://schemas.microsoft.com/office/drawing/2014/main" id="{FE67BB66-D68E-91FC-1442-E45607E8A920}"/>
-              </a:ext>
-            </a:extLst>
-          </p:cNvPr>
-          <p:cNvPicPr>
-            <a:picLocks noChangeAspect="1"/>
-          </p:cNvPicPr>
-          <p:nvPr/>
-        </p:nvPicPr>
-        <p:blipFill>
-          <a:blip r:embed="rId3"/>
-          <a:stretch>
-            <a:fillRect/>
-          </a:stretch>
-        </p:blipFill>
-        <p:spPr>
-          <a:xfrm>
-            <a:off x="6858335" y="889174"/>
-            <a:ext cx="2508379" cy="3892750"/>
-          </a:xfrm>
-          <a:prstGeom prst="rect">
-            <a:avLst/>
-          </a:prstGeom>
-        </p:spPr>
-      </p:pic>
-    </p:spTree>
-    <p:extLst>
-      <p:ext uri="{BB962C8B-B14F-4D97-AF65-F5344CB8AC3E}">
-        <p14:creationId xmlns:p14="http://schemas.microsoft.com/office/powerpoint/2010/main" val="1708038266"/>
-      </p:ext>
-    </p:extLst>
-  </p:cSld>
-  <p:clrMapOvr>
-    <a:masterClrMapping/>
-  </p:clrMapOvr>
-</p:sld>
-</file>
-
 <file path=ppt/slides/slide38.xml><?xml version="1.0" encoding="utf-8"?>
 <p:sld xmlns:a="http://schemas.openxmlformats.org/drawingml/2006/main" xmlns:r="http://schemas.openxmlformats.org/officeDocument/2006/relationships" xmlns:p="http://schemas.openxmlformats.org/presentationml/2006/main">
   <p:cSld>
@@ -8463,40 +8554,60 @@
           <a:chExt cx="0" cy="0"/>
         </a:xfrm>
       </p:grpSpPr>
-      <p:pic>
-        <p:nvPicPr>
-          <p:cNvPr id="5" name="Picture 4">
-            <a:extLst>
-              <a:ext uri="{FF2B5EF4-FFF2-40B4-BE49-F238E27FC236}">
-                <a16:creationId xmlns:a16="http://schemas.microsoft.com/office/drawing/2014/main" id="{BC909FB5-6F06-559F-6D56-11877CAEF8ED}"/>
-              </a:ext>
-            </a:extLst>
-          </p:cNvPr>
-          <p:cNvPicPr>
-            <a:picLocks noChangeAspect="1"/>
-          </p:cNvPicPr>
-          <p:nvPr/>
-        </p:nvPicPr>
-        <p:blipFill>
-          <a:blip r:embed="rId2"/>
-          <a:stretch>
-            <a:fillRect/>
-          </a:stretch>
-        </p:blipFill>
-        <p:spPr>
-          <a:xfrm>
-            <a:off x="645176" y="794450"/>
-            <a:ext cx="9036514" cy="3016405"/>
-          </a:xfrm>
-          <a:prstGeom prst="rect">
-            <a:avLst/>
-          </a:prstGeom>
-        </p:spPr>
-      </p:pic>
+      <p:sp>
+        <p:nvSpPr>
+          <p:cNvPr id="2" name="Title 1">
+            <a:extLst>
+              <a:ext uri="{FF2B5EF4-FFF2-40B4-BE49-F238E27FC236}">
+                <a16:creationId xmlns:a16="http://schemas.microsoft.com/office/drawing/2014/main" id="{6461F12C-8296-BADA-FD56-149E96554D1E}"/>
+              </a:ext>
+            </a:extLst>
+          </p:cNvPr>
+          <p:cNvSpPr>
+            <a:spLocks noGrp="1"/>
+          </p:cNvSpPr>
+          <p:nvPr>
+            <p:ph type="title"/>
+          </p:nvPr>
+        </p:nvSpPr>
+        <p:spPr/>
+        <p:txBody>
+          <a:bodyPr/>
+          <a:lstStyle/>
+          <a:p>
+            <a:endParaRPr lang="en-GB"/>
+          </a:p>
+        </p:txBody>
+      </p:sp>
+      <p:sp>
+        <p:nvSpPr>
+          <p:cNvPr id="3" name="Content Placeholder 2">
+            <a:extLst>
+              <a:ext uri="{FF2B5EF4-FFF2-40B4-BE49-F238E27FC236}">
+                <a16:creationId xmlns:a16="http://schemas.microsoft.com/office/drawing/2014/main" id="{F53F936F-859F-7DDE-4B0E-4510115802B5}"/>
+              </a:ext>
+            </a:extLst>
+          </p:cNvPr>
+          <p:cNvSpPr>
+            <a:spLocks noGrp="1"/>
+          </p:cNvSpPr>
+          <p:nvPr>
+            <p:ph idx="1"/>
+          </p:nvPr>
+        </p:nvSpPr>
+        <p:spPr/>
+        <p:txBody>
+          <a:bodyPr/>
+          <a:lstStyle/>
+          <a:p>
+            <a:endParaRPr lang="en-GB"/>
+          </a:p>
+        </p:txBody>
+      </p:sp>
     </p:spTree>
     <p:extLst>
       <p:ext uri="{BB962C8B-B14F-4D97-AF65-F5344CB8AC3E}">
-        <p14:creationId xmlns:p14="http://schemas.microsoft.com/office/powerpoint/2010/main" val="3243554057"/>
+        <p14:creationId xmlns:p14="http://schemas.microsoft.com/office/powerpoint/2010/main" val="3703701476"/>
       </p:ext>
     </p:extLst>
   </p:cSld>
@@ -8528,7 +8639,7 @@
           <p:cNvPr id="2" name="Title 1">
             <a:extLst>
               <a:ext uri="{FF2B5EF4-FFF2-40B4-BE49-F238E27FC236}">
-                <a16:creationId xmlns:a16="http://schemas.microsoft.com/office/drawing/2014/main" id="{71DE5ED6-49D5-43EE-E52E-844BFD80D4AE}"/>
+                <a16:creationId xmlns:a16="http://schemas.microsoft.com/office/drawing/2014/main" id="{DCD86764-00F4-6C9A-2130-D553A9C0F19A}"/>
               </a:ext>
             </a:extLst>
           </p:cNvPr>
@@ -8544,19 +8655,16 @@
           <a:bodyPr/>
           <a:lstStyle/>
           <a:p>
-            <a:r>
-              <a:rPr lang="en-GB" dirty="0"/>
-              <a:t>Create storage account</a:t>
-            </a:r>
+            <a:endParaRPr lang="en-GB"/>
           </a:p>
         </p:txBody>
       </p:sp>
       <p:pic>
         <p:nvPicPr>
-          <p:cNvPr id="11" name="Picture 10">
-            <a:extLst>
-              <a:ext uri="{FF2B5EF4-FFF2-40B4-BE49-F238E27FC236}">
-                <a16:creationId xmlns:a16="http://schemas.microsoft.com/office/drawing/2014/main" id="{3268972B-32A1-31B9-A481-6C95F1501AAC}"/>
+          <p:cNvPr id="4" name="Picture 3">
+            <a:extLst>
+              <a:ext uri="{FF2B5EF4-FFF2-40B4-BE49-F238E27FC236}">
+                <a16:creationId xmlns:a16="http://schemas.microsoft.com/office/drawing/2014/main" id="{20F3E66B-E246-EFCB-FFBE-25044944C469}"/>
               </a:ext>
             </a:extLst>
           </p:cNvPr>
@@ -8573,8 +8681,38 @@
         </p:blipFill>
         <p:spPr>
           <a:xfrm>
-            <a:off x="2676047" y="2109603"/>
-            <a:ext cx="6839905" cy="2638793"/>
+            <a:off x="838200" y="1242558"/>
+            <a:ext cx="4959605" cy="1517728"/>
+          </a:xfrm>
+          <a:prstGeom prst="rect">
+            <a:avLst/>
+          </a:prstGeom>
+        </p:spPr>
+      </p:pic>
+      <p:pic>
+        <p:nvPicPr>
+          <p:cNvPr id="7" name="Picture 6">
+            <a:extLst>
+              <a:ext uri="{FF2B5EF4-FFF2-40B4-BE49-F238E27FC236}">
+                <a16:creationId xmlns:a16="http://schemas.microsoft.com/office/drawing/2014/main" id="{A96C8C96-A6EA-2AE6-661D-FA50CC4E8CDA}"/>
+              </a:ext>
+            </a:extLst>
+          </p:cNvPr>
+          <p:cNvPicPr>
+            <a:picLocks noChangeAspect="1"/>
+          </p:cNvPicPr>
+          <p:nvPr/>
+        </p:nvPicPr>
+        <p:blipFill>
+          <a:blip r:embed="rId3"/>
+          <a:stretch>
+            <a:fillRect/>
+          </a:stretch>
+        </p:blipFill>
+        <p:spPr>
+          <a:xfrm>
+            <a:off x="6394197" y="1242558"/>
+            <a:ext cx="4511991" cy="5250317"/>
           </a:xfrm>
           <a:prstGeom prst="rect">
             <a:avLst/>
@@ -8584,7 +8722,7 @@
     </p:spTree>
     <p:extLst>
       <p:ext uri="{BB962C8B-B14F-4D97-AF65-F5344CB8AC3E}">
-        <p14:creationId xmlns:p14="http://schemas.microsoft.com/office/powerpoint/2010/main" val="164542091"/>
+        <p14:creationId xmlns:p14="http://schemas.microsoft.com/office/powerpoint/2010/main" val="17736079"/>
       </p:ext>
     </p:extLst>
   </p:cSld>
@@ -8699,6 +8837,334 @@
           <a:chExt cx="0" cy="0"/>
         </a:xfrm>
       </p:grpSpPr>
+      <p:pic>
+        <p:nvPicPr>
+          <p:cNvPr id="8" name="Picture 7">
+            <a:extLst>
+              <a:ext uri="{FF2B5EF4-FFF2-40B4-BE49-F238E27FC236}">
+                <a16:creationId xmlns:a16="http://schemas.microsoft.com/office/drawing/2014/main" id="{267E26B0-ADE5-2D5A-201D-E7974C1FE8C8}"/>
+              </a:ext>
+            </a:extLst>
+          </p:cNvPr>
+          <p:cNvPicPr>
+            <a:picLocks noChangeAspect="1"/>
+          </p:cNvPicPr>
+          <p:nvPr/>
+        </p:nvPicPr>
+        <p:blipFill>
+          <a:blip r:embed="rId2"/>
+          <a:stretch>
+            <a:fillRect/>
+          </a:stretch>
+        </p:blipFill>
+        <p:spPr>
+          <a:xfrm>
+            <a:off x="497406" y="502516"/>
+            <a:ext cx="6401129" cy="5550185"/>
+          </a:xfrm>
+          <a:prstGeom prst="rect">
+            <a:avLst/>
+          </a:prstGeom>
+        </p:spPr>
+      </p:pic>
+      <p:pic>
+        <p:nvPicPr>
+          <p:cNvPr id="9" name="Picture 8">
+            <a:extLst>
+              <a:ext uri="{FF2B5EF4-FFF2-40B4-BE49-F238E27FC236}">
+                <a16:creationId xmlns:a16="http://schemas.microsoft.com/office/drawing/2014/main" id="{159E5FD2-985E-7690-3E2A-435134F3B0FE}"/>
+              </a:ext>
+            </a:extLst>
+          </p:cNvPr>
+          <p:cNvPicPr>
+            <a:picLocks noChangeAspect="1"/>
+          </p:cNvPicPr>
+          <p:nvPr/>
+        </p:nvPicPr>
+        <p:blipFill>
+          <a:blip r:embed="rId3"/>
+          <a:stretch>
+            <a:fillRect/>
+          </a:stretch>
+        </p:blipFill>
+        <p:spPr>
+          <a:xfrm>
+            <a:off x="7205188" y="923852"/>
+            <a:ext cx="4915153" cy="2006703"/>
+          </a:xfrm>
+          <a:prstGeom prst="rect">
+            <a:avLst/>
+          </a:prstGeom>
+        </p:spPr>
+      </p:pic>
+    </p:spTree>
+    <p:extLst>
+      <p:ext uri="{BB962C8B-B14F-4D97-AF65-F5344CB8AC3E}">
+        <p14:creationId xmlns:p14="http://schemas.microsoft.com/office/powerpoint/2010/main" val="3790276932"/>
+      </p:ext>
+    </p:extLst>
+  </p:cSld>
+  <p:clrMapOvr>
+    <a:masterClrMapping/>
+  </p:clrMapOvr>
+</p:sld>
+</file>
+
+<file path=ppt/slides/slide41.xml><?xml version="1.0" encoding="utf-8"?>
+<p:sld xmlns:a="http://schemas.openxmlformats.org/drawingml/2006/main" xmlns:r="http://schemas.openxmlformats.org/officeDocument/2006/relationships" xmlns:p="http://schemas.openxmlformats.org/presentationml/2006/main">
+  <p:cSld>
+    <p:spTree>
+      <p:nvGrpSpPr>
+        <p:cNvPr id="1" name=""/>
+        <p:cNvGrpSpPr/>
+        <p:nvPr/>
+      </p:nvGrpSpPr>
+      <p:grpSpPr>
+        <a:xfrm>
+          <a:off x="0" y="0"/>
+          <a:ext cx="0" cy="0"/>
+          <a:chOff x="0" y="0"/>
+          <a:chExt cx="0" cy="0"/>
+        </a:xfrm>
+      </p:grpSpPr>
+      <p:pic>
+        <p:nvPicPr>
+          <p:cNvPr id="5" name="Picture 4">
+            <a:extLst>
+              <a:ext uri="{FF2B5EF4-FFF2-40B4-BE49-F238E27FC236}">
+                <a16:creationId xmlns:a16="http://schemas.microsoft.com/office/drawing/2014/main" id="{D89C5F76-DE95-EF62-4BC4-CD0A02BDAAB6}"/>
+              </a:ext>
+            </a:extLst>
+          </p:cNvPr>
+          <p:cNvPicPr>
+            <a:picLocks noChangeAspect="1"/>
+          </p:cNvPicPr>
+          <p:nvPr/>
+        </p:nvPicPr>
+        <p:blipFill>
+          <a:blip r:embed="rId2"/>
+          <a:stretch>
+            <a:fillRect/>
+          </a:stretch>
+        </p:blipFill>
+        <p:spPr>
+          <a:xfrm>
+            <a:off x="564587" y="761453"/>
+            <a:ext cx="4680191" cy="3264068"/>
+          </a:xfrm>
+          <a:prstGeom prst="rect">
+            <a:avLst/>
+          </a:prstGeom>
+        </p:spPr>
+      </p:pic>
+      <p:pic>
+        <p:nvPicPr>
+          <p:cNvPr id="7" name="Picture 6">
+            <a:extLst>
+              <a:ext uri="{FF2B5EF4-FFF2-40B4-BE49-F238E27FC236}">
+                <a16:creationId xmlns:a16="http://schemas.microsoft.com/office/drawing/2014/main" id="{FE67BB66-D68E-91FC-1442-E45607E8A920}"/>
+              </a:ext>
+            </a:extLst>
+          </p:cNvPr>
+          <p:cNvPicPr>
+            <a:picLocks noChangeAspect="1"/>
+          </p:cNvPicPr>
+          <p:nvPr/>
+        </p:nvPicPr>
+        <p:blipFill>
+          <a:blip r:embed="rId3"/>
+          <a:stretch>
+            <a:fillRect/>
+          </a:stretch>
+        </p:blipFill>
+        <p:spPr>
+          <a:xfrm>
+            <a:off x="6858335" y="889174"/>
+            <a:ext cx="2508379" cy="3892750"/>
+          </a:xfrm>
+          <a:prstGeom prst="rect">
+            <a:avLst/>
+          </a:prstGeom>
+        </p:spPr>
+      </p:pic>
+    </p:spTree>
+    <p:extLst>
+      <p:ext uri="{BB962C8B-B14F-4D97-AF65-F5344CB8AC3E}">
+        <p14:creationId xmlns:p14="http://schemas.microsoft.com/office/powerpoint/2010/main" val="1708038266"/>
+      </p:ext>
+    </p:extLst>
+  </p:cSld>
+  <p:clrMapOvr>
+    <a:masterClrMapping/>
+  </p:clrMapOvr>
+</p:sld>
+</file>
+
+<file path=ppt/slides/slide42.xml><?xml version="1.0" encoding="utf-8"?>
+<p:sld xmlns:a="http://schemas.openxmlformats.org/drawingml/2006/main" xmlns:r="http://schemas.openxmlformats.org/officeDocument/2006/relationships" xmlns:p="http://schemas.openxmlformats.org/presentationml/2006/main">
+  <p:cSld>
+    <p:spTree>
+      <p:nvGrpSpPr>
+        <p:cNvPr id="1" name=""/>
+        <p:cNvGrpSpPr/>
+        <p:nvPr/>
+      </p:nvGrpSpPr>
+      <p:grpSpPr>
+        <a:xfrm>
+          <a:off x="0" y="0"/>
+          <a:ext cx="0" cy="0"/>
+          <a:chOff x="0" y="0"/>
+          <a:chExt cx="0" cy="0"/>
+        </a:xfrm>
+      </p:grpSpPr>
+      <p:pic>
+        <p:nvPicPr>
+          <p:cNvPr id="5" name="Picture 4">
+            <a:extLst>
+              <a:ext uri="{FF2B5EF4-FFF2-40B4-BE49-F238E27FC236}">
+                <a16:creationId xmlns:a16="http://schemas.microsoft.com/office/drawing/2014/main" id="{BC909FB5-6F06-559F-6D56-11877CAEF8ED}"/>
+              </a:ext>
+            </a:extLst>
+          </p:cNvPr>
+          <p:cNvPicPr>
+            <a:picLocks noChangeAspect="1"/>
+          </p:cNvPicPr>
+          <p:nvPr/>
+        </p:nvPicPr>
+        <p:blipFill>
+          <a:blip r:embed="rId2"/>
+          <a:stretch>
+            <a:fillRect/>
+          </a:stretch>
+        </p:blipFill>
+        <p:spPr>
+          <a:xfrm>
+            <a:off x="645176" y="794450"/>
+            <a:ext cx="9036514" cy="3016405"/>
+          </a:xfrm>
+          <a:prstGeom prst="rect">
+            <a:avLst/>
+          </a:prstGeom>
+        </p:spPr>
+      </p:pic>
+    </p:spTree>
+    <p:extLst>
+      <p:ext uri="{BB962C8B-B14F-4D97-AF65-F5344CB8AC3E}">
+        <p14:creationId xmlns:p14="http://schemas.microsoft.com/office/powerpoint/2010/main" val="3243554057"/>
+      </p:ext>
+    </p:extLst>
+  </p:cSld>
+  <p:clrMapOvr>
+    <a:masterClrMapping/>
+  </p:clrMapOvr>
+</p:sld>
+</file>
+
+<file path=ppt/slides/slide43.xml><?xml version="1.0" encoding="utf-8"?>
+<p:sld xmlns:a="http://schemas.openxmlformats.org/drawingml/2006/main" xmlns:r="http://schemas.openxmlformats.org/officeDocument/2006/relationships" xmlns:p="http://schemas.openxmlformats.org/presentationml/2006/main">
+  <p:cSld>
+    <p:spTree>
+      <p:nvGrpSpPr>
+        <p:cNvPr id="1" name=""/>
+        <p:cNvGrpSpPr/>
+        <p:nvPr/>
+      </p:nvGrpSpPr>
+      <p:grpSpPr>
+        <a:xfrm>
+          <a:off x="0" y="0"/>
+          <a:ext cx="0" cy="0"/>
+          <a:chOff x="0" y="0"/>
+          <a:chExt cx="0" cy="0"/>
+        </a:xfrm>
+      </p:grpSpPr>
+      <p:sp>
+        <p:nvSpPr>
+          <p:cNvPr id="2" name="Title 1">
+            <a:extLst>
+              <a:ext uri="{FF2B5EF4-FFF2-40B4-BE49-F238E27FC236}">
+                <a16:creationId xmlns:a16="http://schemas.microsoft.com/office/drawing/2014/main" id="{71DE5ED6-49D5-43EE-E52E-844BFD80D4AE}"/>
+              </a:ext>
+            </a:extLst>
+          </p:cNvPr>
+          <p:cNvSpPr>
+            <a:spLocks noGrp="1"/>
+          </p:cNvSpPr>
+          <p:nvPr>
+            <p:ph type="title"/>
+          </p:nvPr>
+        </p:nvSpPr>
+        <p:spPr/>
+        <p:txBody>
+          <a:bodyPr/>
+          <a:lstStyle/>
+          <a:p>
+            <a:r>
+              <a:rPr lang="en-GB" dirty="0"/>
+              <a:t>Create storage account</a:t>
+            </a:r>
+          </a:p>
+        </p:txBody>
+      </p:sp>
+      <p:pic>
+        <p:nvPicPr>
+          <p:cNvPr id="11" name="Picture 10">
+            <a:extLst>
+              <a:ext uri="{FF2B5EF4-FFF2-40B4-BE49-F238E27FC236}">
+                <a16:creationId xmlns:a16="http://schemas.microsoft.com/office/drawing/2014/main" id="{3268972B-32A1-31B9-A481-6C95F1501AAC}"/>
+              </a:ext>
+            </a:extLst>
+          </p:cNvPr>
+          <p:cNvPicPr>
+            <a:picLocks noChangeAspect="1"/>
+          </p:cNvPicPr>
+          <p:nvPr/>
+        </p:nvPicPr>
+        <p:blipFill>
+          <a:blip r:embed="rId2"/>
+          <a:stretch>
+            <a:fillRect/>
+          </a:stretch>
+        </p:blipFill>
+        <p:spPr>
+          <a:xfrm>
+            <a:off x="2676047" y="2109603"/>
+            <a:ext cx="6839905" cy="2638793"/>
+          </a:xfrm>
+          <a:prstGeom prst="rect">
+            <a:avLst/>
+          </a:prstGeom>
+        </p:spPr>
+      </p:pic>
+    </p:spTree>
+    <p:extLst>
+      <p:ext uri="{BB962C8B-B14F-4D97-AF65-F5344CB8AC3E}">
+        <p14:creationId xmlns:p14="http://schemas.microsoft.com/office/powerpoint/2010/main" val="164542091"/>
+      </p:ext>
+    </p:extLst>
+  </p:cSld>
+  <p:clrMapOvr>
+    <a:masterClrMapping/>
+  </p:clrMapOvr>
+</p:sld>
+</file>
+
+<file path=ppt/slides/slide44.xml><?xml version="1.0" encoding="utf-8"?>
+<p:sld xmlns:a="http://schemas.openxmlformats.org/drawingml/2006/main" xmlns:r="http://schemas.openxmlformats.org/officeDocument/2006/relationships" xmlns:p="http://schemas.openxmlformats.org/presentationml/2006/main">
+  <p:cSld>
+    <p:spTree>
+      <p:nvGrpSpPr>
+        <p:cNvPr id="1" name=""/>
+        <p:cNvGrpSpPr/>
+        <p:nvPr/>
+      </p:nvGrpSpPr>
+      <p:grpSpPr>
+        <a:xfrm>
+          <a:off x="0" y="0"/>
+          <a:ext cx="0" cy="0"/>
+          <a:chOff x="0" y="0"/>
+          <a:chExt cx="0" cy="0"/>
+        </a:xfrm>
+      </p:grpSpPr>
       <p:sp>
         <p:nvSpPr>
           <p:cNvPr id="2" name="Title 1">
@@ -8775,7 +9241,7 @@
 </p:sld>
 </file>
 
-<file path=ppt/slides/slide41.xml><?xml version="1.0" encoding="utf-8"?>
+<file path=ppt/slides/slide45.xml><?xml version="1.0" encoding="utf-8"?>
 <p:sld xmlns:a="http://schemas.openxmlformats.org/drawingml/2006/main" xmlns:r="http://schemas.openxmlformats.org/officeDocument/2006/relationships" xmlns:p="http://schemas.openxmlformats.org/presentationml/2006/main">
   <p:cSld>
     <p:spTree>
@@ -8862,7 +9328,7 @@
 </p:sld>
 </file>
 
-<file path=ppt/slides/slide42.xml><?xml version="1.0" encoding="utf-8"?>
+<file path=ppt/slides/slide46.xml><?xml version="1.0" encoding="utf-8"?>
 <p:sld xmlns:a="http://schemas.openxmlformats.org/drawingml/2006/main" xmlns:r="http://schemas.openxmlformats.org/officeDocument/2006/relationships" xmlns:p="http://schemas.openxmlformats.org/presentationml/2006/main">
   <p:cSld>
     <p:spTree>
@@ -8977,7 +9443,7 @@
 </p:sld>
 </file>
 
-<file path=ppt/slides/slide43.xml><?xml version="1.0" encoding="utf-8"?>
+<file path=ppt/slides/slide47.xml><?xml version="1.0" encoding="utf-8"?>
 <p:sld xmlns:a="http://schemas.openxmlformats.org/drawingml/2006/main" xmlns:r="http://schemas.openxmlformats.org/officeDocument/2006/relationships" xmlns:p="http://schemas.openxmlformats.org/presentationml/2006/main">
   <p:cSld>
     <p:spTree>
@@ -9095,7 +9561,7 @@
 </p:sld>
 </file>
 
-<file path=ppt/slides/slide44.xml><?xml version="1.0" encoding="utf-8"?>
+<file path=ppt/slides/slide48.xml><?xml version="1.0" encoding="utf-8"?>
 <p:sld xmlns:a="http://schemas.openxmlformats.org/drawingml/2006/main" xmlns:r="http://schemas.openxmlformats.org/officeDocument/2006/relationships" xmlns:p="http://schemas.openxmlformats.org/presentationml/2006/main">
   <p:cSld>
     <p:spTree>
@@ -9183,7 +9649,7 @@
 </p:sld>
 </file>
 
-<file path=ppt/slides/slide45.xml><?xml version="1.0" encoding="utf-8"?>
+<file path=ppt/slides/slide49.xml><?xml version="1.0" encoding="utf-8"?>
 <p:sld xmlns:a="http://schemas.openxmlformats.org/drawingml/2006/main" xmlns:r="http://schemas.openxmlformats.org/officeDocument/2006/relationships" xmlns:p="http://schemas.openxmlformats.org/presentationml/2006/main">
   <p:cSld>
     <p:spTree>
@@ -9271,7 +9737,90 @@
 </p:sld>
 </file>
 
-<file path=ppt/slides/slide46.xml><?xml version="1.0" encoding="utf-8"?>
+<file path=ppt/slides/slide5.xml><?xml version="1.0" encoding="utf-8"?>
+<p:sld xmlns:a="http://schemas.openxmlformats.org/drawingml/2006/main" xmlns:r="http://schemas.openxmlformats.org/officeDocument/2006/relationships" xmlns:p="http://schemas.openxmlformats.org/presentationml/2006/main">
+  <p:cSld>
+    <p:spTree>
+      <p:nvGrpSpPr>
+        <p:cNvPr id="1" name=""/>
+        <p:cNvGrpSpPr/>
+        <p:nvPr/>
+      </p:nvGrpSpPr>
+      <p:grpSpPr>
+        <a:xfrm>
+          <a:off x="0" y="0"/>
+          <a:ext cx="0" cy="0"/>
+          <a:chOff x="0" y="0"/>
+          <a:chExt cx="0" cy="0"/>
+        </a:xfrm>
+      </p:grpSpPr>
+      <p:sp>
+        <p:nvSpPr>
+          <p:cNvPr id="2" name="Title 1">
+            <a:extLst>
+              <a:ext uri="{FF2B5EF4-FFF2-40B4-BE49-F238E27FC236}">
+                <a16:creationId xmlns:a16="http://schemas.microsoft.com/office/drawing/2014/main" id="{9831B8CC-CE63-2632-A79B-DF312B723DB2}"/>
+              </a:ext>
+            </a:extLst>
+          </p:cNvPr>
+          <p:cNvSpPr>
+            <a:spLocks noGrp="1"/>
+          </p:cNvSpPr>
+          <p:nvPr>
+            <p:ph type="title"/>
+          </p:nvPr>
+        </p:nvSpPr>
+        <p:spPr/>
+        <p:txBody>
+          <a:bodyPr/>
+          <a:lstStyle/>
+          <a:p>
+            <a:r>
+              <a:rPr lang="en-GB" dirty="0"/>
+              <a:t>VS Code</a:t>
+            </a:r>
+          </a:p>
+        </p:txBody>
+      </p:sp>
+      <p:sp>
+        <p:nvSpPr>
+          <p:cNvPr id="3" name="Content Placeholder 2">
+            <a:extLst>
+              <a:ext uri="{FF2B5EF4-FFF2-40B4-BE49-F238E27FC236}">
+                <a16:creationId xmlns:a16="http://schemas.microsoft.com/office/drawing/2014/main" id="{B5E4477C-CAAB-ABF9-981B-11DA484523CD}"/>
+              </a:ext>
+            </a:extLst>
+          </p:cNvPr>
+          <p:cNvSpPr>
+            <a:spLocks noGrp="1"/>
+          </p:cNvSpPr>
+          <p:nvPr>
+            <p:ph idx="1"/>
+          </p:nvPr>
+        </p:nvSpPr>
+        <p:spPr/>
+        <p:txBody>
+          <a:bodyPr/>
+          <a:lstStyle/>
+          <a:p>
+            <a:endParaRPr lang="en-GB"/>
+          </a:p>
+        </p:txBody>
+      </p:sp>
+    </p:spTree>
+    <p:extLst>
+      <p:ext uri="{BB962C8B-B14F-4D97-AF65-F5344CB8AC3E}">
+        <p14:creationId xmlns:p14="http://schemas.microsoft.com/office/powerpoint/2010/main" val="3080502177"/>
+      </p:ext>
+    </p:extLst>
+  </p:cSld>
+  <p:clrMapOvr>
+    <a:masterClrMapping/>
+  </p:clrMapOvr>
+</p:sld>
+</file>
+
+<file path=ppt/slides/slide50.xml><?xml version="1.0" encoding="utf-8"?>
 <p:sld xmlns:a="http://schemas.openxmlformats.org/drawingml/2006/main" xmlns:r="http://schemas.openxmlformats.org/officeDocument/2006/relationships" xmlns:p="http://schemas.openxmlformats.org/presentationml/2006/main">
   <p:cSld>
     <p:spTree>
@@ -9361,7 +9910,7 @@
 </p:sld>
 </file>
 
-<file path=ppt/slides/slide47.xml><?xml version="1.0" encoding="utf-8"?>
+<file path=ppt/slides/slide51.xml><?xml version="1.0" encoding="utf-8"?>
 <p:sld xmlns:a="http://schemas.openxmlformats.org/drawingml/2006/main" xmlns:r="http://schemas.openxmlformats.org/officeDocument/2006/relationships" xmlns:p="http://schemas.openxmlformats.org/presentationml/2006/main">
   <p:cSld>
     <p:spTree>
@@ -9391,7 +9940,7 @@
 </p:sld>
 </file>
 
-<file path=ppt/slides/slide48.xml><?xml version="1.0" encoding="utf-8"?>
+<file path=ppt/slides/slide52.xml><?xml version="1.0" encoding="utf-8"?>
 <p:sld xmlns:a="http://schemas.openxmlformats.org/drawingml/2006/main" xmlns:r="http://schemas.openxmlformats.org/officeDocument/2006/relationships" xmlns:p="http://schemas.openxmlformats.org/presentationml/2006/main">
   <p:cSld>
     <p:spTree>
@@ -9476,7 +10025,7 @@
 </p:sld>
 </file>
 
-<file path=ppt/slides/slide49.xml><?xml version="1.0" encoding="utf-8"?>
+<file path=ppt/slides/slide53.xml><?xml version="1.0" encoding="utf-8"?>
 <p:sld xmlns:a="http://schemas.openxmlformats.org/drawingml/2006/main" xmlns:r="http://schemas.openxmlformats.org/officeDocument/2006/relationships" xmlns:p="http://schemas.openxmlformats.org/presentationml/2006/main">
   <p:cSld>
     <p:spTree>
@@ -9561,7 +10110,7 @@
 </p:sld>
 </file>
 
-<file path=ppt/slides/slide5.xml><?xml version="1.0" encoding="utf-8"?>
+<file path=ppt/slides/slide54.xml><?xml version="1.0" encoding="utf-8"?>
 <p:sld xmlns:a="http://schemas.openxmlformats.org/drawingml/2006/main" xmlns:r="http://schemas.openxmlformats.org/officeDocument/2006/relationships" xmlns:p="http://schemas.openxmlformats.org/presentationml/2006/main">
   <p:cSld>
     <p:spTree>
@@ -9583,89 +10132,6 @@
           <p:cNvPr id="2" name="Title 1">
             <a:extLst>
               <a:ext uri="{FF2B5EF4-FFF2-40B4-BE49-F238E27FC236}">
-                <a16:creationId xmlns:a16="http://schemas.microsoft.com/office/drawing/2014/main" id="{9831B8CC-CE63-2632-A79B-DF312B723DB2}"/>
-              </a:ext>
-            </a:extLst>
-          </p:cNvPr>
-          <p:cNvSpPr>
-            <a:spLocks noGrp="1"/>
-          </p:cNvSpPr>
-          <p:nvPr>
-            <p:ph type="title"/>
-          </p:nvPr>
-        </p:nvSpPr>
-        <p:spPr/>
-        <p:txBody>
-          <a:bodyPr/>
-          <a:lstStyle/>
-          <a:p>
-            <a:r>
-              <a:rPr lang="en-GB" dirty="0"/>
-              <a:t>VS Code</a:t>
-            </a:r>
-          </a:p>
-        </p:txBody>
-      </p:sp>
-      <p:sp>
-        <p:nvSpPr>
-          <p:cNvPr id="3" name="Content Placeholder 2">
-            <a:extLst>
-              <a:ext uri="{FF2B5EF4-FFF2-40B4-BE49-F238E27FC236}">
-                <a16:creationId xmlns:a16="http://schemas.microsoft.com/office/drawing/2014/main" id="{B5E4477C-CAAB-ABF9-981B-11DA484523CD}"/>
-              </a:ext>
-            </a:extLst>
-          </p:cNvPr>
-          <p:cNvSpPr>
-            <a:spLocks noGrp="1"/>
-          </p:cNvSpPr>
-          <p:nvPr>
-            <p:ph idx="1"/>
-          </p:nvPr>
-        </p:nvSpPr>
-        <p:spPr/>
-        <p:txBody>
-          <a:bodyPr/>
-          <a:lstStyle/>
-          <a:p>
-            <a:endParaRPr lang="en-GB"/>
-          </a:p>
-        </p:txBody>
-      </p:sp>
-    </p:spTree>
-    <p:extLst>
-      <p:ext uri="{BB962C8B-B14F-4D97-AF65-F5344CB8AC3E}">
-        <p14:creationId xmlns:p14="http://schemas.microsoft.com/office/powerpoint/2010/main" val="3080502177"/>
-      </p:ext>
-    </p:extLst>
-  </p:cSld>
-  <p:clrMapOvr>
-    <a:masterClrMapping/>
-  </p:clrMapOvr>
-</p:sld>
-</file>
-
-<file path=ppt/slides/slide50.xml><?xml version="1.0" encoding="utf-8"?>
-<p:sld xmlns:a="http://schemas.openxmlformats.org/drawingml/2006/main" xmlns:r="http://schemas.openxmlformats.org/officeDocument/2006/relationships" xmlns:p="http://schemas.openxmlformats.org/presentationml/2006/main">
-  <p:cSld>
-    <p:spTree>
-      <p:nvGrpSpPr>
-        <p:cNvPr id="1" name=""/>
-        <p:cNvGrpSpPr/>
-        <p:nvPr/>
-      </p:nvGrpSpPr>
-      <p:grpSpPr>
-        <a:xfrm>
-          <a:off x="0" y="0"/>
-          <a:ext cx="0" cy="0"/>
-          <a:chOff x="0" y="0"/>
-          <a:chExt cx="0" cy="0"/>
-        </a:xfrm>
-      </p:grpSpPr>
-      <p:sp>
-        <p:nvSpPr>
-          <p:cNvPr id="2" name="Title 1">
-            <a:extLst>
-              <a:ext uri="{FF2B5EF4-FFF2-40B4-BE49-F238E27FC236}">
                 <a16:creationId xmlns:a16="http://schemas.microsoft.com/office/drawing/2014/main" id="{A5469F7B-5F47-517F-D218-DF1E89BBB790}"/>
               </a:ext>
             </a:extLst>
@@ -9819,7 +10285,7 @@
 </p:sld>
 </file>
 
-<file path=ppt/slides/slide51.xml><?xml version="1.0" encoding="utf-8"?>
+<file path=ppt/slides/slide55.xml><?xml version="1.0" encoding="utf-8"?>
 <p:sld xmlns:a="http://schemas.openxmlformats.org/drawingml/2006/main" xmlns:r="http://schemas.openxmlformats.org/officeDocument/2006/relationships" xmlns:p="http://schemas.openxmlformats.org/presentationml/2006/main">
   <p:cSld>
     <p:spTree>
@@ -10065,7 +10531,7 @@
           <p:cNvPr id="2" name="Title 1">
             <a:extLst>
               <a:ext uri="{FF2B5EF4-FFF2-40B4-BE49-F238E27FC236}">
-                <a16:creationId xmlns:a16="http://schemas.microsoft.com/office/drawing/2014/main" id="{71DE5ED6-49D5-43EE-E52E-844BFD80D4AE}"/>
+                <a16:creationId xmlns:a16="http://schemas.microsoft.com/office/drawing/2014/main" id="{838AC0F5-5B6B-B939-FA3C-B663E317E445}"/>
               </a:ext>
             </a:extLst>
           </p:cNvPr>
@@ -10081,67 +10547,12 @@
           <a:bodyPr/>
           <a:lstStyle/>
           <a:p>
-            <a:r>
+            <a:br>
               <a:rPr lang="en-GB" dirty="0"/>
-              <a:t>Create storage account</a:t>
-            </a:r>
-          </a:p>
-        </p:txBody>
-      </p:sp>
-      <p:sp>
-        <p:nvSpPr>
-          <p:cNvPr id="3" name="Content Placeholder 2">
-            <a:extLst>
-              <a:ext uri="{FF2B5EF4-FFF2-40B4-BE49-F238E27FC236}">
-                <a16:creationId xmlns:a16="http://schemas.microsoft.com/office/drawing/2014/main" id="{0813FB62-FE46-CC92-2C0B-3D25E2B93615}"/>
-              </a:ext>
-            </a:extLst>
-          </p:cNvPr>
-          <p:cNvSpPr>
-            <a:spLocks noGrp="1"/>
-          </p:cNvSpPr>
-          <p:nvPr>
-            <p:ph idx="1"/>
-          </p:nvPr>
-        </p:nvSpPr>
-        <p:spPr/>
-        <p:txBody>
-          <a:bodyPr/>
-          <a:lstStyle/>
-          <a:p>
+            </a:br>
             <a:r>
               <a:rPr lang="en-GB" dirty="0"/>
-              <a:t>Create in same region as RG</a:t>
-            </a:r>
-          </a:p>
-          <a:p>
-            <a:r>
-              <a:rPr lang="en-GB" dirty="0"/>
-              <a:t>Primary service is ADLS Gen 2</a:t>
-            </a:r>
-          </a:p>
-          <a:p>
-            <a:r>
-              <a:rPr lang="en-GB" dirty="0"/>
-              <a:t>Primary workload Big Data Analytics</a:t>
-            </a:r>
-          </a:p>
-          <a:p>
-            <a:r>
-              <a:rPr lang="en-GB" dirty="0"/>
-              <a:t>Performance: Standard</a:t>
-            </a:r>
-          </a:p>
-          <a:p>
-            <a:r>
-              <a:rPr lang="en-GB" dirty="0"/>
-              <a:t>Redundancy: LRS</a:t>
-            </a:r>
-          </a:p>
-          <a:p>
-            <a:r>
-              <a:rPr lang="en-GB" dirty="0"/>
-              <a:t>Add container &gt; RAW directory</a:t>
+              <a:t>Azure CLI Demo</a:t>
             </a:r>
           </a:p>
         </p:txBody>
@@ -10149,7 +10560,7 @@
     </p:spTree>
     <p:extLst>
       <p:ext uri="{BB962C8B-B14F-4D97-AF65-F5344CB8AC3E}">
-        <p14:creationId xmlns:p14="http://schemas.microsoft.com/office/powerpoint/2010/main" val="3539444653"/>
+        <p14:creationId xmlns:p14="http://schemas.microsoft.com/office/powerpoint/2010/main" val="439281930"/>
       </p:ext>
     </p:extLst>
   </p:cSld>
@@ -10176,82 +10587,26 @@
           <a:chExt cx="0" cy="0"/>
         </a:xfrm>
       </p:grpSpPr>
-      <p:pic>
-        <p:nvPicPr>
-          <p:cNvPr id="7" name="Picture 6">
-            <a:extLst>
-              <a:ext uri="{FF2B5EF4-FFF2-40B4-BE49-F238E27FC236}">
-                <a16:creationId xmlns:a16="http://schemas.microsoft.com/office/drawing/2014/main" id="{F76B43E2-150F-DC80-8BA0-E8EF77942310}"/>
-              </a:ext>
-            </a:extLst>
-          </p:cNvPr>
-          <p:cNvPicPr>
-            <a:picLocks noChangeAspect="1"/>
-          </p:cNvPicPr>
-          <p:nvPr/>
-        </p:nvPicPr>
-        <p:blipFill>
-          <a:blip r:embed="rId2"/>
-          <a:stretch>
-            <a:fillRect/>
-          </a:stretch>
-        </p:blipFill>
-        <p:spPr>
-          <a:xfrm>
-            <a:off x="804124" y="2390630"/>
-            <a:ext cx="10583752" cy="2076740"/>
-          </a:xfrm>
-          <a:prstGeom prst="rect">
-            <a:avLst/>
-          </a:prstGeom>
-        </p:spPr>
-      </p:pic>
-      <p:sp>
-        <p:nvSpPr>
-          <p:cNvPr id="10" name="Title 1">
-            <a:extLst>
-              <a:ext uri="{FF2B5EF4-FFF2-40B4-BE49-F238E27FC236}">
-                <a16:creationId xmlns:a16="http://schemas.microsoft.com/office/drawing/2014/main" id="{F76196A7-FDB1-76F9-0DAF-649BCDEE61A3}"/>
-              </a:ext>
-            </a:extLst>
-          </p:cNvPr>
-          <p:cNvSpPr txBox="1">
-            <a:spLocks/>
-          </p:cNvSpPr>
-          <p:nvPr/>
-        </p:nvSpPr>
-        <p:spPr>
-          <a:xfrm>
-            <a:off x="804124" y="822325"/>
-            <a:ext cx="10515600" cy="1325563"/>
-          </a:xfrm>
-          <a:prstGeom prst="rect">
-            <a:avLst/>
-          </a:prstGeom>
-        </p:spPr>
-        <p:txBody>
-          <a:bodyPr vert="horz" lIns="91440" tIns="45720" rIns="91440" bIns="45720" rtlCol="0" anchor="ctr">
-            <a:normAutofit/>
-          </a:bodyPr>
-          <a:lstStyle>
-            <a:lvl1pPr algn="l" defTabSz="914400" rtl="0" eaLnBrk="1" latinLnBrk="0" hangingPunct="1">
-              <a:lnSpc>
-                <a:spcPct val="90000"/>
-              </a:lnSpc>
-              <a:spcBef>
-                <a:spcPct val="0"/>
-              </a:spcBef>
-              <a:buNone/>
-              <a:defRPr sz="4400" kern="1200">
-                <a:solidFill>
-                  <a:schemeClr val="tx1"/>
-                </a:solidFill>
-                <a:latin typeface="+mj-lt"/>
-                <a:ea typeface="+mj-ea"/>
-                <a:cs typeface="+mj-cs"/>
-              </a:defRPr>
-            </a:lvl1pPr>
-          </a:lstStyle>
+      <p:sp>
+        <p:nvSpPr>
+          <p:cNvPr id="2" name="Title 1">
+            <a:extLst>
+              <a:ext uri="{FF2B5EF4-FFF2-40B4-BE49-F238E27FC236}">
+                <a16:creationId xmlns:a16="http://schemas.microsoft.com/office/drawing/2014/main" id="{71DE5ED6-49D5-43EE-E52E-844BFD80D4AE}"/>
+              </a:ext>
+            </a:extLst>
+          </p:cNvPr>
+          <p:cNvSpPr>
+            <a:spLocks noGrp="1"/>
+          </p:cNvSpPr>
+          <p:nvPr>
+            <p:ph type="title"/>
+          </p:nvPr>
+        </p:nvSpPr>
+        <p:spPr/>
+        <p:txBody>
+          <a:bodyPr/>
+          <a:lstStyle/>
           <a:p>
             <a:r>
               <a:rPr lang="en-GB" dirty="0"/>
@@ -10260,40 +10615,68 @@
           </a:p>
         </p:txBody>
       </p:sp>
-      <p:pic>
-        <p:nvPicPr>
-          <p:cNvPr id="12" name="Picture 11">
-            <a:extLst>
-              <a:ext uri="{FF2B5EF4-FFF2-40B4-BE49-F238E27FC236}">
-                <a16:creationId xmlns:a16="http://schemas.microsoft.com/office/drawing/2014/main" id="{89545FC7-CFBB-FEB8-B2C2-A775C4B20B91}"/>
-              </a:ext>
-            </a:extLst>
-          </p:cNvPr>
-          <p:cNvPicPr>
-            <a:picLocks noChangeAspect="1"/>
-          </p:cNvPicPr>
-          <p:nvPr/>
-        </p:nvPicPr>
-        <p:blipFill>
-          <a:blip r:embed="rId3"/>
-          <a:stretch>
-            <a:fillRect/>
-          </a:stretch>
-        </p:blipFill>
-        <p:spPr>
-          <a:xfrm>
-            <a:off x="804124" y="4171874"/>
-            <a:ext cx="8202170" cy="1076475"/>
-          </a:xfrm>
-          <a:prstGeom prst="rect">
-            <a:avLst/>
-          </a:prstGeom>
-        </p:spPr>
-      </p:pic>
+      <p:sp>
+        <p:nvSpPr>
+          <p:cNvPr id="3" name="Content Placeholder 2">
+            <a:extLst>
+              <a:ext uri="{FF2B5EF4-FFF2-40B4-BE49-F238E27FC236}">
+                <a16:creationId xmlns:a16="http://schemas.microsoft.com/office/drawing/2014/main" id="{0813FB62-FE46-CC92-2C0B-3D25E2B93615}"/>
+              </a:ext>
+            </a:extLst>
+          </p:cNvPr>
+          <p:cNvSpPr>
+            <a:spLocks noGrp="1"/>
+          </p:cNvSpPr>
+          <p:nvPr>
+            <p:ph idx="1"/>
+          </p:nvPr>
+        </p:nvSpPr>
+        <p:spPr/>
+        <p:txBody>
+          <a:bodyPr/>
+          <a:lstStyle/>
+          <a:p>
+            <a:r>
+              <a:rPr lang="en-GB" dirty="0"/>
+              <a:t>Create in same region as RG</a:t>
+            </a:r>
+          </a:p>
+          <a:p>
+            <a:r>
+              <a:rPr lang="en-GB" dirty="0"/>
+              <a:t>Primary service is ADLS Gen 2</a:t>
+            </a:r>
+          </a:p>
+          <a:p>
+            <a:r>
+              <a:rPr lang="en-GB" dirty="0"/>
+              <a:t>Primary workload Big Data Analytics</a:t>
+            </a:r>
+          </a:p>
+          <a:p>
+            <a:r>
+              <a:rPr lang="en-GB" dirty="0"/>
+              <a:t>Performance: Standard</a:t>
+            </a:r>
+          </a:p>
+          <a:p>
+            <a:r>
+              <a:rPr lang="en-GB" dirty="0"/>
+              <a:t>Redundancy: LRS</a:t>
+            </a:r>
+          </a:p>
+          <a:p>
+            <a:r>
+              <a:rPr lang="en-GB" dirty="0"/>
+              <a:t>Add container &gt; RAW directory</a:t>
+            </a:r>
+          </a:p>
+        </p:txBody>
+      </p:sp>
     </p:spTree>
     <p:extLst>
       <p:ext uri="{BB962C8B-B14F-4D97-AF65-F5344CB8AC3E}">
-        <p14:creationId xmlns:p14="http://schemas.microsoft.com/office/powerpoint/2010/main" val="1439316186"/>
+        <p14:creationId xmlns:p14="http://schemas.microsoft.com/office/powerpoint/2010/main" val="3539444653"/>
       </p:ext>
     </p:extLst>
   </p:cSld>
@@ -10320,90 +10703,124 @@
           <a:chExt cx="0" cy="0"/>
         </a:xfrm>
       </p:grpSpPr>
-      <p:sp>
-        <p:nvSpPr>
-          <p:cNvPr id="2" name="Title 1">
-            <a:extLst>
-              <a:ext uri="{FF2B5EF4-FFF2-40B4-BE49-F238E27FC236}">
-                <a16:creationId xmlns:a16="http://schemas.microsoft.com/office/drawing/2014/main" id="{17E4CBBF-6487-8E96-192F-A817DFB10918}"/>
-              </a:ext>
-            </a:extLst>
-          </p:cNvPr>
-          <p:cNvSpPr>
-            <a:spLocks noGrp="1"/>
-          </p:cNvSpPr>
-          <p:nvPr>
-            <p:ph type="title"/>
-          </p:nvPr>
-        </p:nvSpPr>
-        <p:spPr/>
-        <p:txBody>
-          <a:bodyPr/>
-          <a:lstStyle/>
+      <p:pic>
+        <p:nvPicPr>
+          <p:cNvPr id="7" name="Picture 6">
+            <a:extLst>
+              <a:ext uri="{FF2B5EF4-FFF2-40B4-BE49-F238E27FC236}">
+                <a16:creationId xmlns:a16="http://schemas.microsoft.com/office/drawing/2014/main" id="{F76B43E2-150F-DC80-8BA0-E8EF77942310}"/>
+              </a:ext>
+            </a:extLst>
+          </p:cNvPr>
+          <p:cNvPicPr>
+            <a:picLocks noChangeAspect="1"/>
+          </p:cNvPicPr>
+          <p:nvPr/>
+        </p:nvPicPr>
+        <p:blipFill>
+          <a:blip r:embed="rId2"/>
+          <a:stretch>
+            <a:fillRect/>
+          </a:stretch>
+        </p:blipFill>
+        <p:spPr>
+          <a:xfrm>
+            <a:off x="804124" y="2390630"/>
+            <a:ext cx="10583752" cy="2076740"/>
+          </a:xfrm>
+          <a:prstGeom prst="rect">
+            <a:avLst/>
+          </a:prstGeom>
+        </p:spPr>
+      </p:pic>
+      <p:sp>
+        <p:nvSpPr>
+          <p:cNvPr id="10" name="Title 1">
+            <a:extLst>
+              <a:ext uri="{FF2B5EF4-FFF2-40B4-BE49-F238E27FC236}">
+                <a16:creationId xmlns:a16="http://schemas.microsoft.com/office/drawing/2014/main" id="{F76196A7-FDB1-76F9-0DAF-649BCDEE61A3}"/>
+              </a:ext>
+            </a:extLst>
+          </p:cNvPr>
+          <p:cNvSpPr txBox="1">
+            <a:spLocks/>
+          </p:cNvSpPr>
+          <p:nvPr/>
+        </p:nvSpPr>
+        <p:spPr>
+          <a:xfrm>
+            <a:off x="804124" y="822325"/>
+            <a:ext cx="10515600" cy="1325563"/>
+          </a:xfrm>
+          <a:prstGeom prst="rect">
+            <a:avLst/>
+          </a:prstGeom>
+        </p:spPr>
+        <p:txBody>
+          <a:bodyPr vert="horz" lIns="91440" tIns="45720" rIns="91440" bIns="45720" rtlCol="0" anchor="ctr">
+            <a:normAutofit/>
+          </a:bodyPr>
+          <a:lstStyle>
+            <a:lvl1pPr algn="l" defTabSz="914400" rtl="0" eaLnBrk="1" latinLnBrk="0" hangingPunct="1">
+              <a:lnSpc>
+                <a:spcPct val="90000"/>
+              </a:lnSpc>
+              <a:spcBef>
+                <a:spcPct val="0"/>
+              </a:spcBef>
+              <a:buNone/>
+              <a:defRPr sz="4400" kern="1200">
+                <a:solidFill>
+                  <a:schemeClr val="tx1"/>
+                </a:solidFill>
+                <a:latin typeface="+mj-lt"/>
+                <a:ea typeface="+mj-ea"/>
+                <a:cs typeface="+mj-cs"/>
+              </a:defRPr>
+            </a:lvl1pPr>
+          </a:lstStyle>
           <a:p>
             <a:r>
               <a:rPr lang="en-GB" dirty="0"/>
-              <a:t>Data &amp; Databases</a:t>
-            </a:r>
-          </a:p>
-        </p:txBody>
-      </p:sp>
-      <p:sp>
-        <p:nvSpPr>
-          <p:cNvPr id="3" name="Content Placeholder 2">
-            <a:extLst>
-              <a:ext uri="{FF2B5EF4-FFF2-40B4-BE49-F238E27FC236}">
-                <a16:creationId xmlns:a16="http://schemas.microsoft.com/office/drawing/2014/main" id="{4EA3B715-9AC1-E540-E1D0-85781B1B6F2D}"/>
-              </a:ext>
-            </a:extLst>
-          </p:cNvPr>
-          <p:cNvSpPr>
-            <a:spLocks noGrp="1"/>
-          </p:cNvSpPr>
-          <p:nvPr>
-            <p:ph idx="1"/>
-          </p:nvPr>
-        </p:nvSpPr>
-        <p:spPr/>
-        <p:txBody>
-          <a:bodyPr/>
-          <a:lstStyle/>
-          <a:p>
-            <a:r>
-              <a:rPr lang="en-GB" dirty="0"/>
-              <a:t>Concepts to Learn: Data types, databases (SQL and NoSQL), data structures.</a:t>
-            </a:r>
-          </a:p>
-          <a:p>
-            <a:endParaRPr lang="en-GB" dirty="0"/>
-          </a:p>
-          <a:p>
-            <a:r>
-              <a:rPr lang="en-GB" dirty="0"/>
-              <a:t>Tools/Resources:</a:t>
-            </a:r>
-          </a:p>
-          <a:p>
-            <a:r>
-              <a:rPr lang="en-GB" dirty="0"/>
-              <a:t>Azure SQL Database - free tier available</a:t>
-            </a:r>
-          </a:p>
-          <a:p>
-            <a:r>
-              <a:rPr lang="en-GB" dirty="0"/>
-              <a:t>Cosmos DB: Explore NoSQL databases with a limited free tier on Azure.</a:t>
-            </a:r>
-          </a:p>
-          <a:p>
-            <a:endParaRPr lang="en-GB" dirty="0"/>
-          </a:p>
-        </p:txBody>
-      </p:sp>
+              <a:t>Create storage account</a:t>
+            </a:r>
+          </a:p>
+        </p:txBody>
+      </p:sp>
+      <p:pic>
+        <p:nvPicPr>
+          <p:cNvPr id="12" name="Picture 11">
+            <a:extLst>
+              <a:ext uri="{FF2B5EF4-FFF2-40B4-BE49-F238E27FC236}">
+                <a16:creationId xmlns:a16="http://schemas.microsoft.com/office/drawing/2014/main" id="{89545FC7-CFBB-FEB8-B2C2-A775C4B20B91}"/>
+              </a:ext>
+            </a:extLst>
+          </p:cNvPr>
+          <p:cNvPicPr>
+            <a:picLocks noChangeAspect="1"/>
+          </p:cNvPicPr>
+          <p:nvPr/>
+        </p:nvPicPr>
+        <p:blipFill>
+          <a:blip r:embed="rId3"/>
+          <a:stretch>
+            <a:fillRect/>
+          </a:stretch>
+        </p:blipFill>
+        <p:spPr>
+          <a:xfrm>
+            <a:off x="804124" y="4171874"/>
+            <a:ext cx="8202170" cy="1076475"/>
+          </a:xfrm>
+          <a:prstGeom prst="rect">
+            <a:avLst/>
+          </a:prstGeom>
+        </p:spPr>
+      </p:pic>
     </p:spTree>
     <p:extLst>
       <p:ext uri="{BB962C8B-B14F-4D97-AF65-F5344CB8AC3E}">
-        <p14:creationId xmlns:p14="http://schemas.microsoft.com/office/powerpoint/2010/main" val="4098208133"/>
+        <p14:creationId xmlns:p14="http://schemas.microsoft.com/office/powerpoint/2010/main" val="1439316186"/>
       </p:ext>
     </p:extLst>
   </p:cSld>

</xml_diff>

<commit_message>
Update slides - beginning local stuff
</commit_message>
<xml_diff>
--- a/Data Engineering Using Free Tools/Learn Data Engineering For Free.pptx
+++ b/Data Engineering Using Free Tools/Learn Data Engineering For Free.pptx
@@ -5,7 +5,7 @@
     <p:sldMasterId id="2147483648" r:id="rId1"/>
   </p:sldMasterIdLst>
   <p:notesMasterIdLst>
-    <p:notesMasterId r:id="rId57"/>
+    <p:notesMasterId r:id="rId60"/>
   </p:notesMasterIdLst>
   <p:sldIdLst>
     <p:sldId id="256" r:id="rId2"/>
@@ -36,33 +36,36 @@
     <p:sldId id="280" r:id="rId27"/>
     <p:sldId id="281" r:id="rId28"/>
     <p:sldId id="283" r:id="rId29"/>
-    <p:sldId id="296" r:id="rId30"/>
-    <p:sldId id="289" r:id="rId31"/>
-    <p:sldId id="294" r:id="rId32"/>
-    <p:sldId id="286" r:id="rId33"/>
-    <p:sldId id="287" r:id="rId34"/>
+    <p:sldId id="289" r:id="rId30"/>
+    <p:sldId id="294" r:id="rId31"/>
+    <p:sldId id="286" r:id="rId32"/>
+    <p:sldId id="287" r:id="rId33"/>
+    <p:sldId id="296" r:id="rId34"/>
     <p:sldId id="288" r:id="rId35"/>
     <p:sldId id="295" r:id="rId36"/>
     <p:sldId id="297" r:id="rId37"/>
     <p:sldId id="298" r:id="rId38"/>
-    <p:sldId id="311" r:id="rId39"/>
-    <p:sldId id="301" r:id="rId40"/>
-    <p:sldId id="302" r:id="rId41"/>
-    <p:sldId id="303" r:id="rId42"/>
-    <p:sldId id="304" r:id="rId43"/>
-    <p:sldId id="267" r:id="rId44"/>
-    <p:sldId id="270" r:id="rId45"/>
-    <p:sldId id="266" r:id="rId46"/>
-    <p:sldId id="293" r:id="rId47"/>
-    <p:sldId id="271" r:id="rId48"/>
-    <p:sldId id="272" r:id="rId49"/>
-    <p:sldId id="273" r:id="rId50"/>
-    <p:sldId id="282" r:id="rId51"/>
-    <p:sldId id="305" r:id="rId52"/>
-    <p:sldId id="299" r:id="rId53"/>
-    <p:sldId id="300" r:id="rId54"/>
-    <p:sldId id="257" r:id="rId55"/>
-    <p:sldId id="260" r:id="rId56"/>
+    <p:sldId id="299" r:id="rId39"/>
+    <p:sldId id="300" r:id="rId40"/>
+    <p:sldId id="316" r:id="rId41"/>
+    <p:sldId id="257" r:id="rId42"/>
+    <p:sldId id="314" r:id="rId43"/>
+    <p:sldId id="315" r:id="rId44"/>
+    <p:sldId id="311" r:id="rId45"/>
+    <p:sldId id="301" r:id="rId46"/>
+    <p:sldId id="302" r:id="rId47"/>
+    <p:sldId id="303" r:id="rId48"/>
+    <p:sldId id="304" r:id="rId49"/>
+    <p:sldId id="267" r:id="rId50"/>
+    <p:sldId id="270" r:id="rId51"/>
+    <p:sldId id="266" r:id="rId52"/>
+    <p:sldId id="293" r:id="rId53"/>
+    <p:sldId id="271" r:id="rId54"/>
+    <p:sldId id="272" r:id="rId55"/>
+    <p:sldId id="273" r:id="rId56"/>
+    <p:sldId id="282" r:id="rId57"/>
+    <p:sldId id="305" r:id="rId58"/>
+    <p:sldId id="260" r:id="rId59"/>
   </p:sldIdLst>
   <p:sldSz cx="12192000" cy="6858000"/>
   <p:notesSz cx="6858000" cy="9144000"/>
@@ -1946,7 +1949,7 @@
           <a:p>
             <a:fld id="{C49D3115-C41D-4930-8EF3-A657CFCC644E}" type="datetimeFigureOut">
               <a:rPr lang="en-GB" smtClean="0"/>
-              <a:t>21/09/2024</a:t>
+              <a:t>22/09/2024</a:t>
             </a:fld>
             <a:endParaRPr lang="en-GB"/>
           </a:p>
@@ -2447,7 +2450,7 @@
           <a:p>
             <a:fld id="{35275B4F-5DE5-4D53-BD3B-F0C44FE589B2}" type="datetimeFigureOut">
               <a:rPr lang="en-GB" smtClean="0"/>
-              <a:t>21/09/2024</a:t>
+              <a:t>22/09/2024</a:t>
             </a:fld>
             <a:endParaRPr lang="en-GB"/>
           </a:p>
@@ -2647,7 +2650,7 @@
           <a:p>
             <a:fld id="{35275B4F-5DE5-4D53-BD3B-F0C44FE589B2}" type="datetimeFigureOut">
               <a:rPr lang="en-GB" smtClean="0"/>
-              <a:t>21/09/2024</a:t>
+              <a:t>22/09/2024</a:t>
             </a:fld>
             <a:endParaRPr lang="en-GB"/>
           </a:p>
@@ -2857,7 +2860,7 @@
           <a:p>
             <a:fld id="{35275B4F-5DE5-4D53-BD3B-F0C44FE589B2}" type="datetimeFigureOut">
               <a:rPr lang="en-GB" smtClean="0"/>
-              <a:t>21/09/2024</a:t>
+              <a:t>22/09/2024</a:t>
             </a:fld>
             <a:endParaRPr lang="en-GB"/>
           </a:p>
@@ -3057,7 +3060,7 @@
           <a:p>
             <a:fld id="{35275B4F-5DE5-4D53-BD3B-F0C44FE589B2}" type="datetimeFigureOut">
               <a:rPr lang="en-GB" smtClean="0"/>
-              <a:t>21/09/2024</a:t>
+              <a:t>22/09/2024</a:t>
             </a:fld>
             <a:endParaRPr lang="en-GB"/>
           </a:p>
@@ -3333,7 +3336,7 @@
           <a:p>
             <a:fld id="{35275B4F-5DE5-4D53-BD3B-F0C44FE589B2}" type="datetimeFigureOut">
               <a:rPr lang="en-GB" smtClean="0"/>
-              <a:t>21/09/2024</a:t>
+              <a:t>22/09/2024</a:t>
             </a:fld>
             <a:endParaRPr lang="en-GB"/>
           </a:p>
@@ -3601,7 +3604,7 @@
           <a:p>
             <a:fld id="{35275B4F-5DE5-4D53-BD3B-F0C44FE589B2}" type="datetimeFigureOut">
               <a:rPr lang="en-GB" smtClean="0"/>
-              <a:t>21/09/2024</a:t>
+              <a:t>22/09/2024</a:t>
             </a:fld>
             <a:endParaRPr lang="en-GB"/>
           </a:p>
@@ -4016,7 +4019,7 @@
           <a:p>
             <a:fld id="{35275B4F-5DE5-4D53-BD3B-F0C44FE589B2}" type="datetimeFigureOut">
               <a:rPr lang="en-GB" smtClean="0"/>
-              <a:t>21/09/2024</a:t>
+              <a:t>22/09/2024</a:t>
             </a:fld>
             <a:endParaRPr lang="en-GB"/>
           </a:p>
@@ -4158,7 +4161,7 @@
           <a:p>
             <a:fld id="{35275B4F-5DE5-4D53-BD3B-F0C44FE589B2}" type="datetimeFigureOut">
               <a:rPr lang="en-GB" smtClean="0"/>
-              <a:t>21/09/2024</a:t>
+              <a:t>22/09/2024</a:t>
             </a:fld>
             <a:endParaRPr lang="en-GB"/>
           </a:p>
@@ -4271,7 +4274,7 @@
           <a:p>
             <a:fld id="{35275B4F-5DE5-4D53-BD3B-F0C44FE589B2}" type="datetimeFigureOut">
               <a:rPr lang="en-GB" smtClean="0"/>
-              <a:t>21/09/2024</a:t>
+              <a:t>22/09/2024</a:t>
             </a:fld>
             <a:endParaRPr lang="en-GB"/>
           </a:p>
@@ -4584,7 +4587,7 @@
           <a:p>
             <a:fld id="{35275B4F-5DE5-4D53-BD3B-F0C44FE589B2}" type="datetimeFigureOut">
               <a:rPr lang="en-GB" smtClean="0"/>
-              <a:t>21/09/2024</a:t>
+              <a:t>22/09/2024</a:t>
             </a:fld>
             <a:endParaRPr lang="en-GB"/>
           </a:p>
@@ -4873,7 +4876,7 @@
           <a:p>
             <a:fld id="{35275B4F-5DE5-4D53-BD3B-F0C44FE589B2}" type="datetimeFigureOut">
               <a:rPr lang="en-GB" smtClean="0"/>
-              <a:t>21/09/2024</a:t>
+              <a:t>22/09/2024</a:t>
             </a:fld>
             <a:endParaRPr lang="en-GB"/>
           </a:p>
@@ -5116,7 +5119,7 @@
           <a:p>
             <a:fld id="{35275B4F-5DE5-4D53-BD3B-F0C44FE589B2}" type="datetimeFigureOut">
               <a:rPr lang="en-GB" smtClean="0"/>
-              <a:t>21/09/2024</a:t>
+              <a:t>22/09/2024</a:t>
             </a:fld>
             <a:endParaRPr lang="en-GB"/>
           </a:p>
@@ -7606,7 +7609,7 @@
           <p:cNvPr id="2" name="Title 1">
             <a:extLst>
               <a:ext uri="{FF2B5EF4-FFF2-40B4-BE49-F238E27FC236}">
-                <a16:creationId xmlns:a16="http://schemas.microsoft.com/office/drawing/2014/main" id="{B6BC1C70-057F-734E-9C24-C01B4041B371}"/>
+                <a16:creationId xmlns:a16="http://schemas.microsoft.com/office/drawing/2014/main" id="{CC9BC353-C438-5E40-C3FF-618D49D8A61E}"/>
               </a:ext>
             </a:extLst>
           </p:cNvPr>
@@ -7617,12 +7620,17 @@
             <p:ph type="title"/>
           </p:nvPr>
         </p:nvSpPr>
-        <p:spPr/>
+        <p:spPr>
+          <a:xfrm>
+            <a:off x="838200" y="365125"/>
+            <a:ext cx="10515600" cy="720725"/>
+          </a:xfrm>
+        </p:spPr>
         <p:txBody>
           <a:bodyPr/>
           <a:lstStyle/>
           <a:p>
-            <a:endParaRPr lang="en-GB"/>
+            <a:endParaRPr lang="en-GB" dirty="0"/>
           </a:p>
         </p:txBody>
       </p:sp>
@@ -7631,7 +7639,7 @@
           <p:cNvPr id="5" name="Picture 4">
             <a:extLst>
               <a:ext uri="{FF2B5EF4-FFF2-40B4-BE49-F238E27FC236}">
-                <a16:creationId xmlns:a16="http://schemas.microsoft.com/office/drawing/2014/main" id="{2DA5FC5E-D499-8485-A95C-FDE0C63A4EAA}"/>
+                <a16:creationId xmlns:a16="http://schemas.microsoft.com/office/drawing/2014/main" id="{98CF9533-BABB-55BB-1DB2-79C1ABB8F663}"/>
               </a:ext>
             </a:extLst>
           </p:cNvPr>
@@ -7648,8 +7656,68 @@
         </p:blipFill>
         <p:spPr>
           <a:xfrm>
-            <a:off x="838200" y="2003216"/>
-            <a:ext cx="7925906" cy="2991267"/>
+            <a:off x="793750" y="1290395"/>
+            <a:ext cx="3886742" cy="3477110"/>
+          </a:xfrm>
+          <a:prstGeom prst="rect">
+            <a:avLst/>
+          </a:prstGeom>
+        </p:spPr>
+      </p:pic>
+      <p:pic>
+        <p:nvPicPr>
+          <p:cNvPr id="7" name="Picture 6">
+            <a:extLst>
+              <a:ext uri="{FF2B5EF4-FFF2-40B4-BE49-F238E27FC236}">
+                <a16:creationId xmlns:a16="http://schemas.microsoft.com/office/drawing/2014/main" id="{1B13D5C5-E8D9-73FE-CFFB-A0B0D2A8EF6A}"/>
+              </a:ext>
+            </a:extLst>
+          </p:cNvPr>
+          <p:cNvPicPr>
+            <a:picLocks noChangeAspect="1"/>
+          </p:cNvPicPr>
+          <p:nvPr/>
+        </p:nvPicPr>
+        <p:blipFill>
+          <a:blip r:embed="rId3"/>
+          <a:stretch>
+            <a:fillRect/>
+          </a:stretch>
+        </p:blipFill>
+        <p:spPr>
+          <a:xfrm>
+            <a:off x="5095613" y="1193157"/>
+            <a:ext cx="4082057" cy="5029200"/>
+          </a:xfrm>
+          <a:prstGeom prst="rect">
+            <a:avLst/>
+          </a:prstGeom>
+        </p:spPr>
+      </p:pic>
+      <p:pic>
+        <p:nvPicPr>
+          <p:cNvPr id="9" name="Picture 8">
+            <a:extLst>
+              <a:ext uri="{FF2B5EF4-FFF2-40B4-BE49-F238E27FC236}">
+                <a16:creationId xmlns:a16="http://schemas.microsoft.com/office/drawing/2014/main" id="{E2E29D80-8472-864F-1A14-6618E05E385A}"/>
+              </a:ext>
+            </a:extLst>
+          </p:cNvPr>
+          <p:cNvPicPr>
+            <a:picLocks noChangeAspect="1"/>
+          </p:cNvPicPr>
+          <p:nvPr/>
+        </p:nvPicPr>
+        <p:blipFill>
+          <a:blip r:embed="rId4"/>
+          <a:stretch>
+            <a:fillRect/>
+          </a:stretch>
+        </p:blipFill>
+        <p:spPr>
+          <a:xfrm>
+            <a:off x="5095613" y="6222357"/>
+            <a:ext cx="3985272" cy="635643"/>
           </a:xfrm>
           <a:prstGeom prst="rect">
             <a:avLst/>
@@ -7659,7 +7727,7 @@
     </p:spTree>
     <p:extLst>
       <p:ext uri="{BB962C8B-B14F-4D97-AF65-F5344CB8AC3E}">
-        <p14:creationId xmlns:p14="http://schemas.microsoft.com/office/powerpoint/2010/main" val="1872683396"/>
+        <p14:creationId xmlns:p14="http://schemas.microsoft.com/office/powerpoint/2010/main" val="3875996855"/>
       </p:ext>
     </p:extLst>
   </p:cSld>
@@ -7779,156 +7847,6 @@
           <p:cNvPr id="2" name="Title 1">
             <a:extLst>
               <a:ext uri="{FF2B5EF4-FFF2-40B4-BE49-F238E27FC236}">
-                <a16:creationId xmlns:a16="http://schemas.microsoft.com/office/drawing/2014/main" id="{CC9BC353-C438-5E40-C3FF-618D49D8A61E}"/>
-              </a:ext>
-            </a:extLst>
-          </p:cNvPr>
-          <p:cNvSpPr>
-            <a:spLocks noGrp="1"/>
-          </p:cNvSpPr>
-          <p:nvPr>
-            <p:ph type="title"/>
-          </p:nvPr>
-        </p:nvSpPr>
-        <p:spPr>
-          <a:xfrm>
-            <a:off x="838200" y="365125"/>
-            <a:ext cx="10515600" cy="720725"/>
-          </a:xfrm>
-        </p:spPr>
-        <p:txBody>
-          <a:bodyPr/>
-          <a:lstStyle/>
-          <a:p>
-            <a:endParaRPr lang="en-GB" dirty="0"/>
-          </a:p>
-        </p:txBody>
-      </p:sp>
-      <p:pic>
-        <p:nvPicPr>
-          <p:cNvPr id="5" name="Picture 4">
-            <a:extLst>
-              <a:ext uri="{FF2B5EF4-FFF2-40B4-BE49-F238E27FC236}">
-                <a16:creationId xmlns:a16="http://schemas.microsoft.com/office/drawing/2014/main" id="{98CF9533-BABB-55BB-1DB2-79C1ABB8F663}"/>
-              </a:ext>
-            </a:extLst>
-          </p:cNvPr>
-          <p:cNvPicPr>
-            <a:picLocks noChangeAspect="1"/>
-          </p:cNvPicPr>
-          <p:nvPr/>
-        </p:nvPicPr>
-        <p:blipFill>
-          <a:blip r:embed="rId2"/>
-          <a:stretch>
-            <a:fillRect/>
-          </a:stretch>
-        </p:blipFill>
-        <p:spPr>
-          <a:xfrm>
-            <a:off x="793750" y="1290395"/>
-            <a:ext cx="3886742" cy="3477110"/>
-          </a:xfrm>
-          <a:prstGeom prst="rect">
-            <a:avLst/>
-          </a:prstGeom>
-        </p:spPr>
-      </p:pic>
-      <p:pic>
-        <p:nvPicPr>
-          <p:cNvPr id="7" name="Picture 6">
-            <a:extLst>
-              <a:ext uri="{FF2B5EF4-FFF2-40B4-BE49-F238E27FC236}">
-                <a16:creationId xmlns:a16="http://schemas.microsoft.com/office/drawing/2014/main" id="{1B13D5C5-E8D9-73FE-CFFB-A0B0D2A8EF6A}"/>
-              </a:ext>
-            </a:extLst>
-          </p:cNvPr>
-          <p:cNvPicPr>
-            <a:picLocks noChangeAspect="1"/>
-          </p:cNvPicPr>
-          <p:nvPr/>
-        </p:nvPicPr>
-        <p:blipFill>
-          <a:blip r:embed="rId3"/>
-          <a:stretch>
-            <a:fillRect/>
-          </a:stretch>
-        </p:blipFill>
-        <p:spPr>
-          <a:xfrm>
-            <a:off x="5095613" y="1193157"/>
-            <a:ext cx="4082057" cy="5029200"/>
-          </a:xfrm>
-          <a:prstGeom prst="rect">
-            <a:avLst/>
-          </a:prstGeom>
-        </p:spPr>
-      </p:pic>
-      <p:pic>
-        <p:nvPicPr>
-          <p:cNvPr id="9" name="Picture 8">
-            <a:extLst>
-              <a:ext uri="{FF2B5EF4-FFF2-40B4-BE49-F238E27FC236}">
-                <a16:creationId xmlns:a16="http://schemas.microsoft.com/office/drawing/2014/main" id="{E2E29D80-8472-864F-1A14-6618E05E385A}"/>
-              </a:ext>
-            </a:extLst>
-          </p:cNvPr>
-          <p:cNvPicPr>
-            <a:picLocks noChangeAspect="1"/>
-          </p:cNvPicPr>
-          <p:nvPr/>
-        </p:nvPicPr>
-        <p:blipFill>
-          <a:blip r:embed="rId4"/>
-          <a:stretch>
-            <a:fillRect/>
-          </a:stretch>
-        </p:blipFill>
-        <p:spPr>
-          <a:xfrm>
-            <a:off x="5095613" y="6222357"/>
-            <a:ext cx="3985272" cy="635643"/>
-          </a:xfrm>
-          <a:prstGeom prst="rect">
-            <a:avLst/>
-          </a:prstGeom>
-        </p:spPr>
-      </p:pic>
-    </p:spTree>
-    <p:extLst>
-      <p:ext uri="{BB962C8B-B14F-4D97-AF65-F5344CB8AC3E}">
-        <p14:creationId xmlns:p14="http://schemas.microsoft.com/office/powerpoint/2010/main" val="3875996855"/>
-      </p:ext>
-    </p:extLst>
-  </p:cSld>
-  <p:clrMapOvr>
-    <a:masterClrMapping/>
-  </p:clrMapOvr>
-</p:sld>
-</file>
-
-<file path=ppt/slides/slide31.xml><?xml version="1.0" encoding="utf-8"?>
-<p:sld xmlns:a="http://schemas.openxmlformats.org/drawingml/2006/main" xmlns:r="http://schemas.openxmlformats.org/officeDocument/2006/relationships" xmlns:p="http://schemas.openxmlformats.org/presentationml/2006/main">
-  <p:cSld>
-    <p:spTree>
-      <p:nvGrpSpPr>
-        <p:cNvPr id="1" name=""/>
-        <p:cNvGrpSpPr/>
-        <p:nvPr/>
-      </p:nvGrpSpPr>
-      <p:grpSpPr>
-        <a:xfrm>
-          <a:off x="0" y="0"/>
-          <a:ext cx="0" cy="0"/>
-          <a:chOff x="0" y="0"/>
-          <a:chExt cx="0" cy="0"/>
-        </a:xfrm>
-      </p:grpSpPr>
-      <p:sp>
-        <p:nvSpPr>
-          <p:cNvPr id="2" name="Title 1">
-            <a:extLst>
-              <a:ext uri="{FF2B5EF4-FFF2-40B4-BE49-F238E27FC236}">
                 <a16:creationId xmlns:a16="http://schemas.microsoft.com/office/drawing/2014/main" id="{5AD2B775-94F1-2712-63F2-C63C14F05B7E}"/>
               </a:ext>
             </a:extLst>
@@ -7992,7 +7910,7 @@
 </p:sld>
 </file>
 
-<file path=ppt/slides/slide32.xml><?xml version="1.0" encoding="utf-8"?>
+<file path=ppt/slides/slide31.xml><?xml version="1.0" encoding="utf-8"?>
 <p:sld xmlns:a="http://schemas.openxmlformats.org/drawingml/2006/main" xmlns:r="http://schemas.openxmlformats.org/officeDocument/2006/relationships" xmlns:p="http://schemas.openxmlformats.org/presentationml/2006/main">
   <p:cSld>
     <p:spTree>
@@ -8107,7 +8025,7 @@
 </p:sld>
 </file>
 
-<file path=ppt/slides/slide33.xml><?xml version="1.0" encoding="utf-8"?>
+<file path=ppt/slides/slide32.xml><?xml version="1.0" encoding="utf-8"?>
 <p:sld xmlns:a="http://schemas.openxmlformats.org/drawingml/2006/main" xmlns:r="http://schemas.openxmlformats.org/officeDocument/2006/relationships" xmlns:p="http://schemas.openxmlformats.org/presentationml/2006/main">
   <p:cSld>
     <p:spTree>
@@ -8183,6 +8101,91 @@
     <p:extLst>
       <p:ext uri="{BB962C8B-B14F-4D97-AF65-F5344CB8AC3E}">
         <p14:creationId xmlns:p14="http://schemas.microsoft.com/office/powerpoint/2010/main" val="790943487"/>
+      </p:ext>
+    </p:extLst>
+  </p:cSld>
+  <p:clrMapOvr>
+    <a:masterClrMapping/>
+  </p:clrMapOvr>
+</p:sld>
+</file>
+
+<file path=ppt/slides/slide33.xml><?xml version="1.0" encoding="utf-8"?>
+<p:sld xmlns:a="http://schemas.openxmlformats.org/drawingml/2006/main" xmlns:r="http://schemas.openxmlformats.org/officeDocument/2006/relationships" xmlns:p="http://schemas.openxmlformats.org/presentationml/2006/main">
+  <p:cSld>
+    <p:spTree>
+      <p:nvGrpSpPr>
+        <p:cNvPr id="1" name=""/>
+        <p:cNvGrpSpPr/>
+        <p:nvPr/>
+      </p:nvGrpSpPr>
+      <p:grpSpPr>
+        <a:xfrm>
+          <a:off x="0" y="0"/>
+          <a:ext cx="0" cy="0"/>
+          <a:chOff x="0" y="0"/>
+          <a:chExt cx="0" cy="0"/>
+        </a:xfrm>
+      </p:grpSpPr>
+      <p:sp>
+        <p:nvSpPr>
+          <p:cNvPr id="2" name="Title 1">
+            <a:extLst>
+              <a:ext uri="{FF2B5EF4-FFF2-40B4-BE49-F238E27FC236}">
+                <a16:creationId xmlns:a16="http://schemas.microsoft.com/office/drawing/2014/main" id="{B6BC1C70-057F-734E-9C24-C01B4041B371}"/>
+              </a:ext>
+            </a:extLst>
+          </p:cNvPr>
+          <p:cNvSpPr>
+            <a:spLocks noGrp="1"/>
+          </p:cNvSpPr>
+          <p:nvPr>
+            <p:ph type="title"/>
+          </p:nvPr>
+        </p:nvSpPr>
+        <p:spPr/>
+        <p:txBody>
+          <a:bodyPr/>
+          <a:lstStyle/>
+          <a:p>
+            <a:endParaRPr lang="en-GB"/>
+          </a:p>
+        </p:txBody>
+      </p:sp>
+      <p:pic>
+        <p:nvPicPr>
+          <p:cNvPr id="5" name="Picture 4">
+            <a:extLst>
+              <a:ext uri="{FF2B5EF4-FFF2-40B4-BE49-F238E27FC236}">
+                <a16:creationId xmlns:a16="http://schemas.microsoft.com/office/drawing/2014/main" id="{2DA5FC5E-D499-8485-A95C-FDE0C63A4EAA}"/>
+              </a:ext>
+            </a:extLst>
+          </p:cNvPr>
+          <p:cNvPicPr>
+            <a:picLocks noChangeAspect="1"/>
+          </p:cNvPicPr>
+          <p:nvPr/>
+        </p:nvPicPr>
+        <p:blipFill>
+          <a:blip r:embed="rId2"/>
+          <a:stretch>
+            <a:fillRect/>
+          </a:stretch>
+        </p:blipFill>
+        <p:spPr>
+          <a:xfrm>
+            <a:off x="838200" y="2003216"/>
+            <a:ext cx="7925906" cy="2991267"/>
+          </a:xfrm>
+          <a:prstGeom prst="rect">
+            <a:avLst/>
+          </a:prstGeom>
+        </p:spPr>
+      </p:pic>
+    </p:spTree>
+    <p:extLst>
+      <p:ext uri="{BB962C8B-B14F-4D97-AF65-F5344CB8AC3E}">
+        <p14:creationId xmlns:p14="http://schemas.microsoft.com/office/powerpoint/2010/main" val="1872683396"/>
       </p:ext>
     </p:extLst>
   </p:cSld>
@@ -8559,7 +8562,7 @@
           <p:cNvPr id="2" name="Title 1">
             <a:extLst>
               <a:ext uri="{FF2B5EF4-FFF2-40B4-BE49-F238E27FC236}">
-                <a16:creationId xmlns:a16="http://schemas.microsoft.com/office/drawing/2014/main" id="{6461F12C-8296-BADA-FD56-149E96554D1E}"/>
+                <a16:creationId xmlns:a16="http://schemas.microsoft.com/office/drawing/2014/main" id="{DCD86764-00F4-6C9A-2130-D553A9C0F19A}"/>
               </a:ext>
             </a:extLst>
           </p:cNvPr>
@@ -8579,35 +8582,40 @@
           </a:p>
         </p:txBody>
       </p:sp>
-      <p:sp>
-        <p:nvSpPr>
-          <p:cNvPr id="3" name="Content Placeholder 2">
-            <a:extLst>
-              <a:ext uri="{FF2B5EF4-FFF2-40B4-BE49-F238E27FC236}">
-                <a16:creationId xmlns:a16="http://schemas.microsoft.com/office/drawing/2014/main" id="{F53F936F-859F-7DDE-4B0E-4510115802B5}"/>
-              </a:ext>
-            </a:extLst>
-          </p:cNvPr>
-          <p:cNvSpPr>
-            <a:spLocks noGrp="1"/>
-          </p:cNvSpPr>
-          <p:nvPr>
-            <p:ph idx="1"/>
-          </p:nvPr>
-        </p:nvSpPr>
-        <p:spPr/>
-        <p:txBody>
-          <a:bodyPr/>
-          <a:lstStyle/>
-          <a:p>
-            <a:endParaRPr lang="en-GB"/>
-          </a:p>
-        </p:txBody>
-      </p:sp>
+      <p:pic>
+        <p:nvPicPr>
+          <p:cNvPr id="6" name="Picture 5">
+            <a:extLst>
+              <a:ext uri="{FF2B5EF4-FFF2-40B4-BE49-F238E27FC236}">
+                <a16:creationId xmlns:a16="http://schemas.microsoft.com/office/drawing/2014/main" id="{47C005FD-6EF0-7A3C-6393-F6C7EBDD05A8}"/>
+              </a:ext>
+            </a:extLst>
+          </p:cNvPr>
+          <p:cNvPicPr>
+            <a:picLocks noChangeAspect="1"/>
+          </p:cNvPicPr>
+          <p:nvPr/>
+        </p:nvPicPr>
+        <p:blipFill>
+          <a:blip r:embed="rId2"/>
+          <a:stretch>
+            <a:fillRect/>
+          </a:stretch>
+        </p:blipFill>
+        <p:spPr>
+          <a:xfrm>
+            <a:off x="371181" y="958723"/>
+            <a:ext cx="11449638" cy="4940554"/>
+          </a:xfrm>
+          <a:prstGeom prst="rect">
+            <a:avLst/>
+          </a:prstGeom>
+        </p:spPr>
+      </p:pic>
     </p:spTree>
     <p:extLst>
       <p:ext uri="{BB962C8B-B14F-4D97-AF65-F5344CB8AC3E}">
-        <p14:creationId xmlns:p14="http://schemas.microsoft.com/office/powerpoint/2010/main" val="3703701476"/>
+        <p14:creationId xmlns:p14="http://schemas.microsoft.com/office/powerpoint/2010/main" val="224514564"/>
       </p:ext>
     </p:extLst>
   </p:cSld>
@@ -8664,7 +8672,7 @@
           <p:cNvPr id="4" name="Picture 3">
             <a:extLst>
               <a:ext uri="{FF2B5EF4-FFF2-40B4-BE49-F238E27FC236}">
-                <a16:creationId xmlns:a16="http://schemas.microsoft.com/office/drawing/2014/main" id="{20F3E66B-E246-EFCB-FFBE-25044944C469}"/>
+                <a16:creationId xmlns:a16="http://schemas.microsoft.com/office/drawing/2014/main" id="{1228FCC1-0C76-DB22-35FF-1D59981CB3E8}"/>
               </a:ext>
             </a:extLst>
           </p:cNvPr>
@@ -8681,38 +8689,8 @@
         </p:blipFill>
         <p:spPr>
           <a:xfrm>
-            <a:off x="838200" y="1242558"/>
-            <a:ext cx="4959605" cy="1517728"/>
-          </a:xfrm>
-          <a:prstGeom prst="rect">
-            <a:avLst/>
-          </a:prstGeom>
-        </p:spPr>
-      </p:pic>
-      <p:pic>
-        <p:nvPicPr>
-          <p:cNvPr id="7" name="Picture 6">
-            <a:extLst>
-              <a:ext uri="{FF2B5EF4-FFF2-40B4-BE49-F238E27FC236}">
-                <a16:creationId xmlns:a16="http://schemas.microsoft.com/office/drawing/2014/main" id="{A96C8C96-A6EA-2AE6-661D-FA50CC4E8CDA}"/>
-              </a:ext>
-            </a:extLst>
-          </p:cNvPr>
-          <p:cNvPicPr>
-            <a:picLocks noChangeAspect="1"/>
-          </p:cNvPicPr>
-          <p:nvPr/>
-        </p:nvPicPr>
-        <p:blipFill>
-          <a:blip r:embed="rId3"/>
-          <a:stretch>
-            <a:fillRect/>
-          </a:stretch>
-        </p:blipFill>
-        <p:spPr>
-          <a:xfrm>
-            <a:off x="6394197" y="1242558"/>
-            <a:ext cx="4511991" cy="5250317"/>
+            <a:off x="838200" y="2026892"/>
+            <a:ext cx="3968954" cy="2101958"/>
           </a:xfrm>
           <a:prstGeom prst="rect">
             <a:avLst/>
@@ -8722,7 +8700,7 @@
     </p:spTree>
     <p:extLst>
       <p:ext uri="{BB962C8B-B14F-4D97-AF65-F5344CB8AC3E}">
-        <p14:creationId xmlns:p14="http://schemas.microsoft.com/office/powerpoint/2010/main" val="17736079"/>
+        <p14:creationId xmlns:p14="http://schemas.microsoft.com/office/powerpoint/2010/main" val="460359469"/>
       </p:ext>
     </p:extLst>
   </p:cSld>
@@ -8837,6 +8815,730 @@
           <a:chExt cx="0" cy="0"/>
         </a:xfrm>
       </p:grpSpPr>
+      <p:sp>
+        <p:nvSpPr>
+          <p:cNvPr id="2" name="Title 1">
+            <a:extLst>
+              <a:ext uri="{FF2B5EF4-FFF2-40B4-BE49-F238E27FC236}">
+                <a16:creationId xmlns:a16="http://schemas.microsoft.com/office/drawing/2014/main" id="{DCD86764-00F4-6C9A-2130-D553A9C0F19A}"/>
+              </a:ext>
+            </a:extLst>
+          </p:cNvPr>
+          <p:cNvSpPr>
+            <a:spLocks noGrp="1"/>
+          </p:cNvSpPr>
+          <p:nvPr>
+            <p:ph type="title"/>
+          </p:nvPr>
+        </p:nvSpPr>
+        <p:spPr/>
+        <p:txBody>
+          <a:bodyPr/>
+          <a:lstStyle/>
+          <a:p>
+            <a:r>
+              <a:rPr lang="en-GB" dirty="0"/>
+              <a:t>Python pre-</a:t>
+            </a:r>
+            <a:r>
+              <a:rPr lang="en-GB" dirty="0" err="1"/>
+              <a:t>reqs</a:t>
+            </a:r>
+            <a:endParaRPr lang="en-GB" dirty="0"/>
+          </a:p>
+        </p:txBody>
+      </p:sp>
+      <p:pic>
+        <p:nvPicPr>
+          <p:cNvPr id="5" name="Picture 4">
+            <a:extLst>
+              <a:ext uri="{FF2B5EF4-FFF2-40B4-BE49-F238E27FC236}">
+                <a16:creationId xmlns:a16="http://schemas.microsoft.com/office/drawing/2014/main" id="{C663F566-F2F6-4996-C066-E71C1013515E}"/>
+              </a:ext>
+            </a:extLst>
+          </p:cNvPr>
+          <p:cNvPicPr>
+            <a:picLocks noChangeAspect="1"/>
+          </p:cNvPicPr>
+          <p:nvPr/>
+        </p:nvPicPr>
+        <p:blipFill>
+          <a:blip r:embed="rId2"/>
+          <a:stretch>
+            <a:fillRect/>
+          </a:stretch>
+        </p:blipFill>
+        <p:spPr>
+          <a:xfrm>
+            <a:off x="838200" y="1431753"/>
+            <a:ext cx="9392961" cy="2457793"/>
+          </a:xfrm>
+          <a:prstGeom prst="rect">
+            <a:avLst/>
+          </a:prstGeom>
+        </p:spPr>
+      </p:pic>
+      <p:pic>
+        <p:nvPicPr>
+          <p:cNvPr id="8" name="Picture 7">
+            <a:extLst>
+              <a:ext uri="{FF2B5EF4-FFF2-40B4-BE49-F238E27FC236}">
+                <a16:creationId xmlns:a16="http://schemas.microsoft.com/office/drawing/2014/main" id="{0DA08BAC-BAA2-E123-3A0B-E202C41AC238}"/>
+              </a:ext>
+            </a:extLst>
+          </p:cNvPr>
+          <p:cNvPicPr>
+            <a:picLocks noChangeAspect="1"/>
+          </p:cNvPicPr>
+          <p:nvPr/>
+        </p:nvPicPr>
+        <p:blipFill>
+          <a:blip r:embed="rId3"/>
+          <a:stretch>
+            <a:fillRect/>
+          </a:stretch>
+        </p:blipFill>
+        <p:spPr>
+          <a:xfrm>
+            <a:off x="838200" y="4217883"/>
+            <a:ext cx="4934639" cy="1476581"/>
+          </a:xfrm>
+          <a:prstGeom prst="rect">
+            <a:avLst/>
+          </a:prstGeom>
+        </p:spPr>
+      </p:pic>
+    </p:spTree>
+    <p:extLst>
+      <p:ext uri="{BB962C8B-B14F-4D97-AF65-F5344CB8AC3E}">
+        <p14:creationId xmlns:p14="http://schemas.microsoft.com/office/powerpoint/2010/main" val="2091675727"/>
+      </p:ext>
+    </p:extLst>
+  </p:cSld>
+  <p:clrMapOvr>
+    <a:masterClrMapping/>
+  </p:clrMapOvr>
+</p:sld>
+</file>
+
+<file path=ppt/slides/slide41.xml><?xml version="1.0" encoding="utf-8"?>
+<p:sld xmlns:a="http://schemas.openxmlformats.org/drawingml/2006/main" xmlns:r="http://schemas.openxmlformats.org/officeDocument/2006/relationships" xmlns:p="http://schemas.openxmlformats.org/presentationml/2006/main">
+  <p:cSld>
+    <p:spTree>
+      <p:nvGrpSpPr>
+        <p:cNvPr id="1" name=""/>
+        <p:cNvGrpSpPr/>
+        <p:nvPr/>
+      </p:nvGrpSpPr>
+      <p:grpSpPr>
+        <a:xfrm>
+          <a:off x="0" y="0"/>
+          <a:ext cx="0" cy="0"/>
+          <a:chOff x="0" y="0"/>
+          <a:chExt cx="0" cy="0"/>
+        </a:xfrm>
+      </p:grpSpPr>
+      <p:sp>
+        <p:nvSpPr>
+          <p:cNvPr id="2" name="Title 1">
+            <a:extLst>
+              <a:ext uri="{FF2B5EF4-FFF2-40B4-BE49-F238E27FC236}">
+                <a16:creationId xmlns:a16="http://schemas.microsoft.com/office/drawing/2014/main" id="{A5469F7B-5F47-517F-D218-DF1E89BBB790}"/>
+              </a:ext>
+            </a:extLst>
+          </p:cNvPr>
+          <p:cNvSpPr>
+            <a:spLocks noGrp="1"/>
+          </p:cNvSpPr>
+          <p:nvPr>
+            <p:ph type="title"/>
+          </p:nvPr>
+        </p:nvSpPr>
+        <p:spPr/>
+        <p:txBody>
+          <a:bodyPr/>
+          <a:lstStyle/>
+          <a:p>
+            <a:r>
+              <a:rPr lang="en-GB" dirty="0"/>
+              <a:t>Python Demo</a:t>
+            </a:r>
+          </a:p>
+        </p:txBody>
+      </p:sp>
+      <p:sp>
+        <p:nvSpPr>
+          <p:cNvPr id="3" name="Content Placeholder 2">
+            <a:extLst>
+              <a:ext uri="{FF2B5EF4-FFF2-40B4-BE49-F238E27FC236}">
+                <a16:creationId xmlns:a16="http://schemas.microsoft.com/office/drawing/2014/main" id="{D887FE72-3475-5DF9-893F-927B7A1BBC5F}"/>
+              </a:ext>
+            </a:extLst>
+          </p:cNvPr>
+          <p:cNvSpPr>
+            <a:spLocks noGrp="1"/>
+          </p:cNvSpPr>
+          <p:nvPr>
+            <p:ph idx="1"/>
+          </p:nvPr>
+        </p:nvSpPr>
+        <p:spPr/>
+        <p:txBody>
+          <a:bodyPr>
+            <a:normAutofit fontScale="32500" lnSpcReduction="20000"/>
+          </a:bodyPr>
+          <a:lstStyle/>
+          <a:p>
+            <a:r>
+              <a:rPr lang="en-GB" dirty="0"/>
+              <a:t>Install Python</a:t>
+            </a:r>
+          </a:p>
+          <a:p>
+            <a:endParaRPr lang="en-GB" dirty="0"/>
+          </a:p>
+          <a:p>
+            <a:r>
+              <a:rPr lang="en-GB" dirty="0"/>
+              <a:t>Set path</a:t>
+            </a:r>
+          </a:p>
+          <a:p>
+            <a:endParaRPr lang="en-GB" dirty="0"/>
+          </a:p>
+          <a:p>
+            <a:r>
+              <a:rPr lang="en-GB" dirty="0"/>
+              <a:t>open Windows Terminal</a:t>
+            </a:r>
+          </a:p>
+          <a:p>
+            <a:r>
+              <a:rPr lang="en-GB" dirty="0"/>
+              <a:t>	- cd to user folder</a:t>
+            </a:r>
+          </a:p>
+          <a:p>
+            <a:r>
+              <a:rPr lang="en-GB" dirty="0"/>
+              <a:t>	- create folder &amp; python file - hello-world.py</a:t>
+            </a:r>
+          </a:p>
+          <a:p>
+            <a:r>
+              <a:rPr lang="en-GB" dirty="0"/>
+              <a:t>	- open python file in notepad</a:t>
+            </a:r>
+          </a:p>
+          <a:p>
+            <a:r>
+              <a:rPr lang="en-GB" dirty="0"/>
+              <a:t>	- print('hello world')</a:t>
+            </a:r>
+          </a:p>
+          <a:p>
+            <a:r>
+              <a:rPr lang="en-GB" dirty="0"/>
+              <a:t>	- from terminal python hello-world.py</a:t>
+            </a:r>
+          </a:p>
+          <a:p>
+            <a:endParaRPr lang="en-GB" dirty="0"/>
+          </a:p>
+          <a:p>
+            <a:r>
+              <a:rPr lang="en-GB" dirty="0"/>
+              <a:t>Run hello-world.py from VS Code in debug</a:t>
+            </a:r>
+          </a:p>
+          <a:p>
+            <a:r>
+              <a:rPr lang="en-GB" dirty="0"/>
+              <a:t>Demo editing file and running in debug</a:t>
+            </a:r>
+          </a:p>
+          <a:p>
+            <a:endParaRPr lang="en-GB" dirty="0"/>
+          </a:p>
+          <a:p>
+            <a:r>
+              <a:rPr lang="en-GB" dirty="0"/>
+              <a:t>Demo python from shell</a:t>
+            </a:r>
+          </a:p>
+          <a:p>
+            <a:endParaRPr lang="en-GB" dirty="0"/>
+          </a:p>
+          <a:p>
+            <a:r>
+              <a:rPr lang="en-GB" dirty="0"/>
+              <a:t>Install Pip</a:t>
+            </a:r>
+          </a:p>
+          <a:p>
+            <a:r>
+              <a:rPr lang="en-GB" dirty="0"/>
+              <a:t>Install Spark from Pip</a:t>
+            </a:r>
+          </a:p>
+        </p:txBody>
+      </p:sp>
+    </p:spTree>
+    <p:extLst>
+      <p:ext uri="{BB962C8B-B14F-4D97-AF65-F5344CB8AC3E}">
+        <p14:creationId xmlns:p14="http://schemas.microsoft.com/office/powerpoint/2010/main" val="3256889448"/>
+      </p:ext>
+    </p:extLst>
+  </p:cSld>
+  <p:clrMapOvr>
+    <a:masterClrMapping/>
+  </p:clrMapOvr>
+</p:sld>
+</file>
+
+<file path=ppt/slides/slide42.xml><?xml version="1.0" encoding="utf-8"?>
+<p:sld xmlns:a="http://schemas.openxmlformats.org/drawingml/2006/main" xmlns:r="http://schemas.openxmlformats.org/officeDocument/2006/relationships" xmlns:p="http://schemas.openxmlformats.org/presentationml/2006/main">
+  <p:cSld>
+    <p:spTree>
+      <p:nvGrpSpPr>
+        <p:cNvPr id="1" name=""/>
+        <p:cNvGrpSpPr/>
+        <p:nvPr/>
+      </p:nvGrpSpPr>
+      <p:grpSpPr>
+        <a:xfrm>
+          <a:off x="0" y="0"/>
+          <a:ext cx="0" cy="0"/>
+          <a:chOff x="0" y="0"/>
+          <a:chExt cx="0" cy="0"/>
+        </a:xfrm>
+      </p:grpSpPr>
+      <p:sp>
+        <p:nvSpPr>
+          <p:cNvPr id="2" name="Title 1">
+            <a:extLst>
+              <a:ext uri="{FF2B5EF4-FFF2-40B4-BE49-F238E27FC236}">
+                <a16:creationId xmlns:a16="http://schemas.microsoft.com/office/drawing/2014/main" id="{A5469F7B-5F47-517F-D218-DF1E89BBB790}"/>
+              </a:ext>
+            </a:extLst>
+          </p:cNvPr>
+          <p:cNvSpPr>
+            <a:spLocks noGrp="1"/>
+          </p:cNvSpPr>
+          <p:nvPr>
+            <p:ph type="title"/>
+          </p:nvPr>
+        </p:nvSpPr>
+        <p:spPr/>
+        <p:txBody>
+          <a:bodyPr/>
+          <a:lstStyle/>
+          <a:p>
+            <a:r>
+              <a:rPr lang="en-GB" dirty="0" err="1"/>
+              <a:t>PySpark</a:t>
+            </a:r>
+            <a:r>
+              <a:rPr lang="en-GB" dirty="0"/>
+              <a:t> Pre-requisites</a:t>
+            </a:r>
+          </a:p>
+        </p:txBody>
+      </p:sp>
+      <p:sp>
+        <p:nvSpPr>
+          <p:cNvPr id="3" name="Content Placeholder 2">
+            <a:extLst>
+              <a:ext uri="{FF2B5EF4-FFF2-40B4-BE49-F238E27FC236}">
+                <a16:creationId xmlns:a16="http://schemas.microsoft.com/office/drawing/2014/main" id="{D887FE72-3475-5DF9-893F-927B7A1BBC5F}"/>
+              </a:ext>
+            </a:extLst>
+          </p:cNvPr>
+          <p:cNvSpPr>
+            <a:spLocks noGrp="1"/>
+          </p:cNvSpPr>
+          <p:nvPr>
+            <p:ph idx="1"/>
+          </p:nvPr>
+        </p:nvSpPr>
+        <p:spPr/>
+        <p:txBody>
+          <a:bodyPr>
+            <a:normAutofit/>
+          </a:bodyPr>
+          <a:lstStyle/>
+          <a:p>
+            <a:r>
+              <a:rPr lang="en-GB" dirty="0"/>
+              <a:t>Install Java</a:t>
+            </a:r>
+          </a:p>
+          <a:p>
+            <a:r>
+              <a:rPr lang="en-GB" dirty="0"/>
+              <a:t>Set paths</a:t>
+            </a:r>
+          </a:p>
+          <a:p>
+            <a:pPr lvl="1"/>
+            <a:r>
+              <a:rPr lang="en-GB" dirty="0"/>
+              <a:t>JAVA_HOME</a:t>
+            </a:r>
+          </a:p>
+          <a:p>
+            <a:pPr lvl="1"/>
+            <a:r>
+              <a:rPr lang="en-GB" dirty="0"/>
+              <a:t>PATH</a:t>
+            </a:r>
+          </a:p>
+          <a:p>
+            <a:pPr lvl="1"/>
+            <a:endParaRPr lang="en-GB" dirty="0"/>
+          </a:p>
+          <a:p>
+            <a:r>
+              <a:rPr lang="en-GB" dirty="0"/>
+              <a:t>Install Apache Spark</a:t>
+            </a:r>
+          </a:p>
+          <a:p>
+            <a:r>
+              <a:rPr lang="en-GB" dirty="0"/>
+              <a:t>Install winutils.exe</a:t>
+            </a:r>
+          </a:p>
+          <a:p>
+            <a:endParaRPr lang="en-GB" dirty="0"/>
+          </a:p>
+        </p:txBody>
+      </p:sp>
+    </p:spTree>
+    <p:extLst>
+      <p:ext uri="{BB962C8B-B14F-4D97-AF65-F5344CB8AC3E}">
+        <p14:creationId xmlns:p14="http://schemas.microsoft.com/office/powerpoint/2010/main" val="662787998"/>
+      </p:ext>
+    </p:extLst>
+  </p:cSld>
+  <p:clrMapOvr>
+    <a:masterClrMapping/>
+  </p:clrMapOvr>
+</p:sld>
+</file>
+
+<file path=ppt/slides/slide43.xml><?xml version="1.0" encoding="utf-8"?>
+<p:sld xmlns:a="http://schemas.openxmlformats.org/drawingml/2006/main" xmlns:r="http://schemas.openxmlformats.org/officeDocument/2006/relationships" xmlns:p="http://schemas.openxmlformats.org/presentationml/2006/main">
+  <p:cSld>
+    <p:spTree>
+      <p:nvGrpSpPr>
+        <p:cNvPr id="1" name=""/>
+        <p:cNvGrpSpPr/>
+        <p:nvPr/>
+      </p:nvGrpSpPr>
+      <p:grpSpPr>
+        <a:xfrm>
+          <a:off x="0" y="0"/>
+          <a:ext cx="0" cy="0"/>
+          <a:chOff x="0" y="0"/>
+          <a:chExt cx="0" cy="0"/>
+        </a:xfrm>
+      </p:grpSpPr>
+      <p:sp>
+        <p:nvSpPr>
+          <p:cNvPr id="2" name="Title 1">
+            <a:extLst>
+              <a:ext uri="{FF2B5EF4-FFF2-40B4-BE49-F238E27FC236}">
+                <a16:creationId xmlns:a16="http://schemas.microsoft.com/office/drawing/2014/main" id="{A5469F7B-5F47-517F-D218-DF1E89BBB790}"/>
+              </a:ext>
+            </a:extLst>
+          </p:cNvPr>
+          <p:cNvSpPr>
+            <a:spLocks noGrp="1"/>
+          </p:cNvSpPr>
+          <p:nvPr>
+            <p:ph type="title"/>
+          </p:nvPr>
+        </p:nvSpPr>
+        <p:spPr/>
+        <p:txBody>
+          <a:bodyPr/>
+          <a:lstStyle/>
+          <a:p>
+            <a:r>
+              <a:rPr lang="en-GB" dirty="0" err="1"/>
+              <a:t>PySpark</a:t>
+            </a:r>
+            <a:r>
+              <a:rPr lang="en-GB" dirty="0"/>
+              <a:t> Demo</a:t>
+            </a:r>
+          </a:p>
+        </p:txBody>
+      </p:sp>
+      <p:sp>
+        <p:nvSpPr>
+          <p:cNvPr id="3" name="Content Placeholder 2">
+            <a:extLst>
+              <a:ext uri="{FF2B5EF4-FFF2-40B4-BE49-F238E27FC236}">
+                <a16:creationId xmlns:a16="http://schemas.microsoft.com/office/drawing/2014/main" id="{D887FE72-3475-5DF9-893F-927B7A1BBC5F}"/>
+              </a:ext>
+            </a:extLst>
+          </p:cNvPr>
+          <p:cNvSpPr>
+            <a:spLocks noGrp="1"/>
+          </p:cNvSpPr>
+          <p:nvPr>
+            <p:ph idx="1"/>
+          </p:nvPr>
+        </p:nvSpPr>
+        <p:spPr/>
+        <p:txBody>
+          <a:bodyPr>
+            <a:normAutofit/>
+          </a:bodyPr>
+          <a:lstStyle/>
+          <a:p>
+            <a:r>
+              <a:rPr lang="en-GB" dirty="0" err="1"/>
+              <a:t>PySpark</a:t>
+            </a:r>
+            <a:r>
+              <a:rPr lang="en-GB" dirty="0"/>
+              <a:t> validation</a:t>
+            </a:r>
+          </a:p>
+          <a:p>
+            <a:r>
+              <a:rPr lang="en-GB" dirty="0"/>
+              <a:t>Web UI</a:t>
+            </a:r>
+          </a:p>
+          <a:p>
+            <a:r>
+              <a:rPr lang="en-GB" dirty="0"/>
+              <a:t>VS Code</a:t>
+            </a:r>
+          </a:p>
+          <a:p>
+            <a:r>
+              <a:rPr lang="en-GB" dirty="0"/>
+              <a:t>Visualisation?</a:t>
+            </a:r>
+          </a:p>
+        </p:txBody>
+      </p:sp>
+    </p:spTree>
+    <p:extLst>
+      <p:ext uri="{BB962C8B-B14F-4D97-AF65-F5344CB8AC3E}">
+        <p14:creationId xmlns:p14="http://schemas.microsoft.com/office/powerpoint/2010/main" val="3082836330"/>
+      </p:ext>
+    </p:extLst>
+  </p:cSld>
+  <p:clrMapOvr>
+    <a:masterClrMapping/>
+  </p:clrMapOvr>
+</p:sld>
+</file>
+
+<file path=ppt/slides/slide44.xml><?xml version="1.0" encoding="utf-8"?>
+<p:sld xmlns:a="http://schemas.openxmlformats.org/drawingml/2006/main" xmlns:r="http://schemas.openxmlformats.org/officeDocument/2006/relationships" xmlns:p="http://schemas.openxmlformats.org/presentationml/2006/main">
+  <p:cSld>
+    <p:spTree>
+      <p:nvGrpSpPr>
+        <p:cNvPr id="1" name=""/>
+        <p:cNvGrpSpPr/>
+        <p:nvPr/>
+      </p:nvGrpSpPr>
+      <p:grpSpPr>
+        <a:xfrm>
+          <a:off x="0" y="0"/>
+          <a:ext cx="0" cy="0"/>
+          <a:chOff x="0" y="0"/>
+          <a:chExt cx="0" cy="0"/>
+        </a:xfrm>
+      </p:grpSpPr>
+      <p:sp>
+        <p:nvSpPr>
+          <p:cNvPr id="2" name="Title 1">
+            <a:extLst>
+              <a:ext uri="{FF2B5EF4-FFF2-40B4-BE49-F238E27FC236}">
+                <a16:creationId xmlns:a16="http://schemas.microsoft.com/office/drawing/2014/main" id="{6461F12C-8296-BADA-FD56-149E96554D1E}"/>
+              </a:ext>
+            </a:extLst>
+          </p:cNvPr>
+          <p:cNvSpPr>
+            <a:spLocks noGrp="1"/>
+          </p:cNvSpPr>
+          <p:nvPr>
+            <p:ph type="title"/>
+          </p:nvPr>
+        </p:nvSpPr>
+        <p:spPr>
+          <a:xfrm>
+            <a:off x="838200" y="365125"/>
+            <a:ext cx="10439400" cy="5940425"/>
+          </a:xfrm>
+        </p:spPr>
+        <p:txBody>
+          <a:bodyPr>
+            <a:normAutofit/>
+          </a:bodyPr>
+          <a:lstStyle/>
+          <a:p>
+            <a:pPr algn="ctr"/>
+            <a:r>
+              <a:rPr lang="en-GB" sz="8800" dirty="0"/>
+              <a:t>END</a:t>
+            </a:r>
+          </a:p>
+        </p:txBody>
+      </p:sp>
+    </p:spTree>
+    <p:extLst>
+      <p:ext uri="{BB962C8B-B14F-4D97-AF65-F5344CB8AC3E}">
+        <p14:creationId xmlns:p14="http://schemas.microsoft.com/office/powerpoint/2010/main" val="3703701476"/>
+      </p:ext>
+    </p:extLst>
+  </p:cSld>
+  <p:clrMapOvr>
+    <a:masterClrMapping/>
+  </p:clrMapOvr>
+</p:sld>
+</file>
+
+<file path=ppt/slides/slide45.xml><?xml version="1.0" encoding="utf-8"?>
+<p:sld xmlns:a="http://schemas.openxmlformats.org/drawingml/2006/main" xmlns:r="http://schemas.openxmlformats.org/officeDocument/2006/relationships" xmlns:p="http://schemas.openxmlformats.org/presentationml/2006/main">
+  <p:cSld>
+    <p:spTree>
+      <p:nvGrpSpPr>
+        <p:cNvPr id="1" name=""/>
+        <p:cNvGrpSpPr/>
+        <p:nvPr/>
+      </p:nvGrpSpPr>
+      <p:grpSpPr>
+        <a:xfrm>
+          <a:off x="0" y="0"/>
+          <a:ext cx="0" cy="0"/>
+          <a:chOff x="0" y="0"/>
+          <a:chExt cx="0" cy="0"/>
+        </a:xfrm>
+      </p:grpSpPr>
+      <p:sp>
+        <p:nvSpPr>
+          <p:cNvPr id="2" name="Title 1">
+            <a:extLst>
+              <a:ext uri="{FF2B5EF4-FFF2-40B4-BE49-F238E27FC236}">
+                <a16:creationId xmlns:a16="http://schemas.microsoft.com/office/drawing/2014/main" id="{DCD86764-00F4-6C9A-2130-D553A9C0F19A}"/>
+              </a:ext>
+            </a:extLst>
+          </p:cNvPr>
+          <p:cNvSpPr>
+            <a:spLocks noGrp="1"/>
+          </p:cNvSpPr>
+          <p:nvPr>
+            <p:ph type="title"/>
+          </p:nvPr>
+        </p:nvSpPr>
+        <p:spPr/>
+        <p:txBody>
+          <a:bodyPr/>
+          <a:lstStyle/>
+          <a:p>
+            <a:endParaRPr lang="en-GB"/>
+          </a:p>
+        </p:txBody>
+      </p:sp>
+      <p:pic>
+        <p:nvPicPr>
+          <p:cNvPr id="4" name="Picture 3">
+            <a:extLst>
+              <a:ext uri="{FF2B5EF4-FFF2-40B4-BE49-F238E27FC236}">
+                <a16:creationId xmlns:a16="http://schemas.microsoft.com/office/drawing/2014/main" id="{20F3E66B-E246-EFCB-FFBE-25044944C469}"/>
+              </a:ext>
+            </a:extLst>
+          </p:cNvPr>
+          <p:cNvPicPr>
+            <a:picLocks noChangeAspect="1"/>
+          </p:cNvPicPr>
+          <p:nvPr/>
+        </p:nvPicPr>
+        <p:blipFill>
+          <a:blip r:embed="rId2"/>
+          <a:stretch>
+            <a:fillRect/>
+          </a:stretch>
+        </p:blipFill>
+        <p:spPr>
+          <a:xfrm>
+            <a:off x="838200" y="1242558"/>
+            <a:ext cx="4959605" cy="1517728"/>
+          </a:xfrm>
+          <a:prstGeom prst="rect">
+            <a:avLst/>
+          </a:prstGeom>
+        </p:spPr>
+      </p:pic>
+      <p:pic>
+        <p:nvPicPr>
+          <p:cNvPr id="7" name="Picture 6">
+            <a:extLst>
+              <a:ext uri="{FF2B5EF4-FFF2-40B4-BE49-F238E27FC236}">
+                <a16:creationId xmlns:a16="http://schemas.microsoft.com/office/drawing/2014/main" id="{A96C8C96-A6EA-2AE6-661D-FA50CC4E8CDA}"/>
+              </a:ext>
+            </a:extLst>
+          </p:cNvPr>
+          <p:cNvPicPr>
+            <a:picLocks noChangeAspect="1"/>
+          </p:cNvPicPr>
+          <p:nvPr/>
+        </p:nvPicPr>
+        <p:blipFill>
+          <a:blip r:embed="rId3"/>
+          <a:stretch>
+            <a:fillRect/>
+          </a:stretch>
+        </p:blipFill>
+        <p:spPr>
+          <a:xfrm>
+            <a:off x="6394197" y="1242558"/>
+            <a:ext cx="4511991" cy="5250317"/>
+          </a:xfrm>
+          <a:prstGeom prst="rect">
+            <a:avLst/>
+          </a:prstGeom>
+        </p:spPr>
+      </p:pic>
+    </p:spTree>
+    <p:extLst>
+      <p:ext uri="{BB962C8B-B14F-4D97-AF65-F5344CB8AC3E}">
+        <p14:creationId xmlns:p14="http://schemas.microsoft.com/office/powerpoint/2010/main" val="17736079"/>
+      </p:ext>
+    </p:extLst>
+  </p:cSld>
+  <p:clrMapOvr>
+    <a:masterClrMapping/>
+  </p:clrMapOvr>
+</p:sld>
+</file>
+
+<file path=ppt/slides/slide46.xml><?xml version="1.0" encoding="utf-8"?>
+<p:sld xmlns:a="http://schemas.openxmlformats.org/drawingml/2006/main" xmlns:r="http://schemas.openxmlformats.org/officeDocument/2006/relationships" xmlns:p="http://schemas.openxmlformats.org/presentationml/2006/main">
+  <p:cSld>
+    <p:spTree>
+      <p:nvGrpSpPr>
+        <p:cNvPr id="1" name=""/>
+        <p:cNvGrpSpPr/>
+        <p:nvPr/>
+      </p:nvGrpSpPr>
+      <p:grpSpPr>
+        <a:xfrm>
+          <a:off x="0" y="0"/>
+          <a:ext cx="0" cy="0"/>
+          <a:chOff x="0" y="0"/>
+          <a:chExt cx="0" cy="0"/>
+        </a:xfrm>
+      </p:grpSpPr>
       <p:pic>
         <p:nvPicPr>
           <p:cNvPr id="8" name="Picture 7">
@@ -8910,7 +9612,7 @@
 </p:sld>
 </file>
 
-<file path=ppt/slides/slide41.xml><?xml version="1.0" encoding="utf-8"?>
+<file path=ppt/slides/slide47.xml><?xml version="1.0" encoding="utf-8"?>
 <p:sld xmlns:a="http://schemas.openxmlformats.org/drawingml/2006/main" xmlns:r="http://schemas.openxmlformats.org/officeDocument/2006/relationships" xmlns:p="http://schemas.openxmlformats.org/presentationml/2006/main">
   <p:cSld>
     <p:spTree>
@@ -9000,7 +9702,7 @@
 </p:sld>
 </file>
 
-<file path=ppt/slides/slide42.xml><?xml version="1.0" encoding="utf-8"?>
+<file path=ppt/slides/slide48.xml><?xml version="1.0" encoding="utf-8"?>
 <p:sld xmlns:a="http://schemas.openxmlformats.org/drawingml/2006/main" xmlns:r="http://schemas.openxmlformats.org/officeDocument/2006/relationships" xmlns:p="http://schemas.openxmlformats.org/presentationml/2006/main">
   <p:cSld>
     <p:spTree>
@@ -9060,7 +9762,7 @@
 </p:sld>
 </file>
 
-<file path=ppt/slides/slide43.xml><?xml version="1.0" encoding="utf-8"?>
+<file path=ppt/slides/slide49.xml><?xml version="1.0" encoding="utf-8"?>
 <p:sld xmlns:a="http://schemas.openxmlformats.org/drawingml/2006/main" xmlns:r="http://schemas.openxmlformats.org/officeDocument/2006/relationships" xmlns:p="http://schemas.openxmlformats.org/presentationml/2006/main">
   <p:cSld>
     <p:spTree>
@@ -9148,7 +9850,90 @@
 </p:sld>
 </file>
 
-<file path=ppt/slides/slide44.xml><?xml version="1.0" encoding="utf-8"?>
+<file path=ppt/slides/slide5.xml><?xml version="1.0" encoding="utf-8"?>
+<p:sld xmlns:a="http://schemas.openxmlformats.org/drawingml/2006/main" xmlns:r="http://schemas.openxmlformats.org/officeDocument/2006/relationships" xmlns:p="http://schemas.openxmlformats.org/presentationml/2006/main">
+  <p:cSld>
+    <p:spTree>
+      <p:nvGrpSpPr>
+        <p:cNvPr id="1" name=""/>
+        <p:cNvGrpSpPr/>
+        <p:nvPr/>
+      </p:nvGrpSpPr>
+      <p:grpSpPr>
+        <a:xfrm>
+          <a:off x="0" y="0"/>
+          <a:ext cx="0" cy="0"/>
+          <a:chOff x="0" y="0"/>
+          <a:chExt cx="0" cy="0"/>
+        </a:xfrm>
+      </p:grpSpPr>
+      <p:sp>
+        <p:nvSpPr>
+          <p:cNvPr id="2" name="Title 1">
+            <a:extLst>
+              <a:ext uri="{FF2B5EF4-FFF2-40B4-BE49-F238E27FC236}">
+                <a16:creationId xmlns:a16="http://schemas.microsoft.com/office/drawing/2014/main" id="{9831B8CC-CE63-2632-A79B-DF312B723DB2}"/>
+              </a:ext>
+            </a:extLst>
+          </p:cNvPr>
+          <p:cNvSpPr>
+            <a:spLocks noGrp="1"/>
+          </p:cNvSpPr>
+          <p:nvPr>
+            <p:ph type="title"/>
+          </p:nvPr>
+        </p:nvSpPr>
+        <p:spPr/>
+        <p:txBody>
+          <a:bodyPr/>
+          <a:lstStyle/>
+          <a:p>
+            <a:r>
+              <a:rPr lang="en-GB" dirty="0"/>
+              <a:t>VS Code</a:t>
+            </a:r>
+          </a:p>
+        </p:txBody>
+      </p:sp>
+      <p:sp>
+        <p:nvSpPr>
+          <p:cNvPr id="3" name="Content Placeholder 2">
+            <a:extLst>
+              <a:ext uri="{FF2B5EF4-FFF2-40B4-BE49-F238E27FC236}">
+                <a16:creationId xmlns:a16="http://schemas.microsoft.com/office/drawing/2014/main" id="{B5E4477C-CAAB-ABF9-981B-11DA484523CD}"/>
+              </a:ext>
+            </a:extLst>
+          </p:cNvPr>
+          <p:cNvSpPr>
+            <a:spLocks noGrp="1"/>
+          </p:cNvSpPr>
+          <p:nvPr>
+            <p:ph idx="1"/>
+          </p:nvPr>
+        </p:nvSpPr>
+        <p:spPr/>
+        <p:txBody>
+          <a:bodyPr/>
+          <a:lstStyle/>
+          <a:p>
+            <a:endParaRPr lang="en-GB"/>
+          </a:p>
+        </p:txBody>
+      </p:sp>
+    </p:spTree>
+    <p:extLst>
+      <p:ext uri="{BB962C8B-B14F-4D97-AF65-F5344CB8AC3E}">
+        <p14:creationId xmlns:p14="http://schemas.microsoft.com/office/powerpoint/2010/main" val="3080502177"/>
+      </p:ext>
+    </p:extLst>
+  </p:cSld>
+  <p:clrMapOvr>
+    <a:masterClrMapping/>
+  </p:clrMapOvr>
+</p:sld>
+</file>
+
+<file path=ppt/slides/slide50.xml><?xml version="1.0" encoding="utf-8"?>
 <p:sld xmlns:a="http://schemas.openxmlformats.org/drawingml/2006/main" xmlns:r="http://schemas.openxmlformats.org/officeDocument/2006/relationships" xmlns:p="http://schemas.openxmlformats.org/presentationml/2006/main">
   <p:cSld>
     <p:spTree>
@@ -9241,7 +10026,7 @@
 </p:sld>
 </file>
 
-<file path=ppt/slides/slide45.xml><?xml version="1.0" encoding="utf-8"?>
+<file path=ppt/slides/slide51.xml><?xml version="1.0" encoding="utf-8"?>
 <p:sld xmlns:a="http://schemas.openxmlformats.org/drawingml/2006/main" xmlns:r="http://schemas.openxmlformats.org/officeDocument/2006/relationships" xmlns:p="http://schemas.openxmlformats.org/presentationml/2006/main">
   <p:cSld>
     <p:spTree>
@@ -9328,7 +10113,7 @@
 </p:sld>
 </file>
 
-<file path=ppt/slides/slide46.xml><?xml version="1.0" encoding="utf-8"?>
+<file path=ppt/slides/slide52.xml><?xml version="1.0" encoding="utf-8"?>
 <p:sld xmlns:a="http://schemas.openxmlformats.org/drawingml/2006/main" xmlns:r="http://schemas.openxmlformats.org/officeDocument/2006/relationships" xmlns:p="http://schemas.openxmlformats.org/presentationml/2006/main">
   <p:cSld>
     <p:spTree>
@@ -9443,7 +10228,7 @@
 </p:sld>
 </file>
 
-<file path=ppt/slides/slide47.xml><?xml version="1.0" encoding="utf-8"?>
+<file path=ppt/slides/slide53.xml><?xml version="1.0" encoding="utf-8"?>
 <p:sld xmlns:a="http://schemas.openxmlformats.org/drawingml/2006/main" xmlns:r="http://schemas.openxmlformats.org/officeDocument/2006/relationships" xmlns:p="http://schemas.openxmlformats.org/presentationml/2006/main">
   <p:cSld>
     <p:spTree>
@@ -9561,7 +10346,7 @@
 </p:sld>
 </file>
 
-<file path=ppt/slides/slide48.xml><?xml version="1.0" encoding="utf-8"?>
+<file path=ppt/slides/slide54.xml><?xml version="1.0" encoding="utf-8"?>
 <p:sld xmlns:a="http://schemas.openxmlformats.org/drawingml/2006/main" xmlns:r="http://schemas.openxmlformats.org/officeDocument/2006/relationships" xmlns:p="http://schemas.openxmlformats.org/presentationml/2006/main">
   <p:cSld>
     <p:spTree>
@@ -9649,7 +10434,7 @@
 </p:sld>
 </file>
 
-<file path=ppt/slides/slide49.xml><?xml version="1.0" encoding="utf-8"?>
+<file path=ppt/slides/slide55.xml><?xml version="1.0" encoding="utf-8"?>
 <p:sld xmlns:a="http://schemas.openxmlformats.org/drawingml/2006/main" xmlns:r="http://schemas.openxmlformats.org/officeDocument/2006/relationships" xmlns:p="http://schemas.openxmlformats.org/presentationml/2006/main">
   <p:cSld>
     <p:spTree>
@@ -9737,90 +10522,7 @@
 </p:sld>
 </file>
 
-<file path=ppt/slides/slide5.xml><?xml version="1.0" encoding="utf-8"?>
-<p:sld xmlns:a="http://schemas.openxmlformats.org/drawingml/2006/main" xmlns:r="http://schemas.openxmlformats.org/officeDocument/2006/relationships" xmlns:p="http://schemas.openxmlformats.org/presentationml/2006/main">
-  <p:cSld>
-    <p:spTree>
-      <p:nvGrpSpPr>
-        <p:cNvPr id="1" name=""/>
-        <p:cNvGrpSpPr/>
-        <p:nvPr/>
-      </p:nvGrpSpPr>
-      <p:grpSpPr>
-        <a:xfrm>
-          <a:off x="0" y="0"/>
-          <a:ext cx="0" cy="0"/>
-          <a:chOff x="0" y="0"/>
-          <a:chExt cx="0" cy="0"/>
-        </a:xfrm>
-      </p:grpSpPr>
-      <p:sp>
-        <p:nvSpPr>
-          <p:cNvPr id="2" name="Title 1">
-            <a:extLst>
-              <a:ext uri="{FF2B5EF4-FFF2-40B4-BE49-F238E27FC236}">
-                <a16:creationId xmlns:a16="http://schemas.microsoft.com/office/drawing/2014/main" id="{9831B8CC-CE63-2632-A79B-DF312B723DB2}"/>
-              </a:ext>
-            </a:extLst>
-          </p:cNvPr>
-          <p:cNvSpPr>
-            <a:spLocks noGrp="1"/>
-          </p:cNvSpPr>
-          <p:nvPr>
-            <p:ph type="title"/>
-          </p:nvPr>
-        </p:nvSpPr>
-        <p:spPr/>
-        <p:txBody>
-          <a:bodyPr/>
-          <a:lstStyle/>
-          <a:p>
-            <a:r>
-              <a:rPr lang="en-GB" dirty="0"/>
-              <a:t>VS Code</a:t>
-            </a:r>
-          </a:p>
-        </p:txBody>
-      </p:sp>
-      <p:sp>
-        <p:nvSpPr>
-          <p:cNvPr id="3" name="Content Placeholder 2">
-            <a:extLst>
-              <a:ext uri="{FF2B5EF4-FFF2-40B4-BE49-F238E27FC236}">
-                <a16:creationId xmlns:a16="http://schemas.microsoft.com/office/drawing/2014/main" id="{B5E4477C-CAAB-ABF9-981B-11DA484523CD}"/>
-              </a:ext>
-            </a:extLst>
-          </p:cNvPr>
-          <p:cNvSpPr>
-            <a:spLocks noGrp="1"/>
-          </p:cNvSpPr>
-          <p:nvPr>
-            <p:ph idx="1"/>
-          </p:nvPr>
-        </p:nvSpPr>
-        <p:spPr/>
-        <p:txBody>
-          <a:bodyPr/>
-          <a:lstStyle/>
-          <a:p>
-            <a:endParaRPr lang="en-GB"/>
-          </a:p>
-        </p:txBody>
-      </p:sp>
-    </p:spTree>
-    <p:extLst>
-      <p:ext uri="{BB962C8B-B14F-4D97-AF65-F5344CB8AC3E}">
-        <p14:creationId xmlns:p14="http://schemas.microsoft.com/office/powerpoint/2010/main" val="3080502177"/>
-      </p:ext>
-    </p:extLst>
-  </p:cSld>
-  <p:clrMapOvr>
-    <a:masterClrMapping/>
-  </p:clrMapOvr>
-</p:sld>
-</file>
-
-<file path=ppt/slides/slide50.xml><?xml version="1.0" encoding="utf-8"?>
+<file path=ppt/slides/slide56.xml><?xml version="1.0" encoding="utf-8"?>
 <p:sld xmlns:a="http://schemas.openxmlformats.org/drawingml/2006/main" xmlns:r="http://schemas.openxmlformats.org/officeDocument/2006/relationships" xmlns:p="http://schemas.openxmlformats.org/presentationml/2006/main">
   <p:cSld>
     <p:spTree>
@@ -9910,7 +10612,7 @@
 </p:sld>
 </file>
 
-<file path=ppt/slides/slide51.xml><?xml version="1.0" encoding="utf-8"?>
+<file path=ppt/slides/slide57.xml><?xml version="1.0" encoding="utf-8"?>
 <p:sld xmlns:a="http://schemas.openxmlformats.org/drawingml/2006/main" xmlns:r="http://schemas.openxmlformats.org/officeDocument/2006/relationships" xmlns:p="http://schemas.openxmlformats.org/presentationml/2006/main">
   <p:cSld>
     <p:spTree>
@@ -9940,352 +10642,7 @@
 </p:sld>
 </file>
 
-<file path=ppt/slides/slide52.xml><?xml version="1.0" encoding="utf-8"?>
-<p:sld xmlns:a="http://schemas.openxmlformats.org/drawingml/2006/main" xmlns:r="http://schemas.openxmlformats.org/officeDocument/2006/relationships" xmlns:p="http://schemas.openxmlformats.org/presentationml/2006/main">
-  <p:cSld>
-    <p:spTree>
-      <p:nvGrpSpPr>
-        <p:cNvPr id="1" name=""/>
-        <p:cNvGrpSpPr/>
-        <p:nvPr/>
-      </p:nvGrpSpPr>
-      <p:grpSpPr>
-        <a:xfrm>
-          <a:off x="0" y="0"/>
-          <a:ext cx="0" cy="0"/>
-          <a:chOff x="0" y="0"/>
-          <a:chExt cx="0" cy="0"/>
-        </a:xfrm>
-      </p:grpSpPr>
-      <p:sp>
-        <p:nvSpPr>
-          <p:cNvPr id="2" name="Title 1">
-            <a:extLst>
-              <a:ext uri="{FF2B5EF4-FFF2-40B4-BE49-F238E27FC236}">
-                <a16:creationId xmlns:a16="http://schemas.microsoft.com/office/drawing/2014/main" id="{DCD86764-00F4-6C9A-2130-D553A9C0F19A}"/>
-              </a:ext>
-            </a:extLst>
-          </p:cNvPr>
-          <p:cNvSpPr>
-            <a:spLocks noGrp="1"/>
-          </p:cNvSpPr>
-          <p:nvPr>
-            <p:ph type="title"/>
-          </p:nvPr>
-        </p:nvSpPr>
-        <p:spPr/>
-        <p:txBody>
-          <a:bodyPr/>
-          <a:lstStyle/>
-          <a:p>
-            <a:endParaRPr lang="en-GB"/>
-          </a:p>
-        </p:txBody>
-      </p:sp>
-      <p:pic>
-        <p:nvPicPr>
-          <p:cNvPr id="6" name="Picture 5">
-            <a:extLst>
-              <a:ext uri="{FF2B5EF4-FFF2-40B4-BE49-F238E27FC236}">
-                <a16:creationId xmlns:a16="http://schemas.microsoft.com/office/drawing/2014/main" id="{47C005FD-6EF0-7A3C-6393-F6C7EBDD05A8}"/>
-              </a:ext>
-            </a:extLst>
-          </p:cNvPr>
-          <p:cNvPicPr>
-            <a:picLocks noChangeAspect="1"/>
-          </p:cNvPicPr>
-          <p:nvPr/>
-        </p:nvPicPr>
-        <p:blipFill>
-          <a:blip r:embed="rId2"/>
-          <a:stretch>
-            <a:fillRect/>
-          </a:stretch>
-        </p:blipFill>
-        <p:spPr>
-          <a:xfrm>
-            <a:off x="371181" y="958723"/>
-            <a:ext cx="11449638" cy="4940554"/>
-          </a:xfrm>
-          <a:prstGeom prst="rect">
-            <a:avLst/>
-          </a:prstGeom>
-        </p:spPr>
-      </p:pic>
-    </p:spTree>
-    <p:extLst>
-      <p:ext uri="{BB962C8B-B14F-4D97-AF65-F5344CB8AC3E}">
-        <p14:creationId xmlns:p14="http://schemas.microsoft.com/office/powerpoint/2010/main" val="224514564"/>
-      </p:ext>
-    </p:extLst>
-  </p:cSld>
-  <p:clrMapOvr>
-    <a:masterClrMapping/>
-  </p:clrMapOvr>
-</p:sld>
-</file>
-
-<file path=ppt/slides/slide53.xml><?xml version="1.0" encoding="utf-8"?>
-<p:sld xmlns:a="http://schemas.openxmlformats.org/drawingml/2006/main" xmlns:r="http://schemas.openxmlformats.org/officeDocument/2006/relationships" xmlns:p="http://schemas.openxmlformats.org/presentationml/2006/main">
-  <p:cSld>
-    <p:spTree>
-      <p:nvGrpSpPr>
-        <p:cNvPr id="1" name=""/>
-        <p:cNvGrpSpPr/>
-        <p:nvPr/>
-      </p:nvGrpSpPr>
-      <p:grpSpPr>
-        <a:xfrm>
-          <a:off x="0" y="0"/>
-          <a:ext cx="0" cy="0"/>
-          <a:chOff x="0" y="0"/>
-          <a:chExt cx="0" cy="0"/>
-        </a:xfrm>
-      </p:grpSpPr>
-      <p:sp>
-        <p:nvSpPr>
-          <p:cNvPr id="2" name="Title 1">
-            <a:extLst>
-              <a:ext uri="{FF2B5EF4-FFF2-40B4-BE49-F238E27FC236}">
-                <a16:creationId xmlns:a16="http://schemas.microsoft.com/office/drawing/2014/main" id="{DCD86764-00F4-6C9A-2130-D553A9C0F19A}"/>
-              </a:ext>
-            </a:extLst>
-          </p:cNvPr>
-          <p:cNvSpPr>
-            <a:spLocks noGrp="1"/>
-          </p:cNvSpPr>
-          <p:nvPr>
-            <p:ph type="title"/>
-          </p:nvPr>
-        </p:nvSpPr>
-        <p:spPr/>
-        <p:txBody>
-          <a:bodyPr/>
-          <a:lstStyle/>
-          <a:p>
-            <a:endParaRPr lang="en-GB"/>
-          </a:p>
-        </p:txBody>
-      </p:sp>
-      <p:pic>
-        <p:nvPicPr>
-          <p:cNvPr id="4" name="Picture 3">
-            <a:extLst>
-              <a:ext uri="{FF2B5EF4-FFF2-40B4-BE49-F238E27FC236}">
-                <a16:creationId xmlns:a16="http://schemas.microsoft.com/office/drawing/2014/main" id="{1228FCC1-0C76-DB22-35FF-1D59981CB3E8}"/>
-              </a:ext>
-            </a:extLst>
-          </p:cNvPr>
-          <p:cNvPicPr>
-            <a:picLocks noChangeAspect="1"/>
-          </p:cNvPicPr>
-          <p:nvPr/>
-        </p:nvPicPr>
-        <p:blipFill>
-          <a:blip r:embed="rId2"/>
-          <a:stretch>
-            <a:fillRect/>
-          </a:stretch>
-        </p:blipFill>
-        <p:spPr>
-          <a:xfrm>
-            <a:off x="838200" y="2026892"/>
-            <a:ext cx="3968954" cy="2101958"/>
-          </a:xfrm>
-          <a:prstGeom prst="rect">
-            <a:avLst/>
-          </a:prstGeom>
-        </p:spPr>
-      </p:pic>
-    </p:spTree>
-    <p:extLst>
-      <p:ext uri="{BB962C8B-B14F-4D97-AF65-F5344CB8AC3E}">
-        <p14:creationId xmlns:p14="http://schemas.microsoft.com/office/powerpoint/2010/main" val="460359469"/>
-      </p:ext>
-    </p:extLst>
-  </p:cSld>
-  <p:clrMapOvr>
-    <a:masterClrMapping/>
-  </p:clrMapOvr>
-</p:sld>
-</file>
-
-<file path=ppt/slides/slide54.xml><?xml version="1.0" encoding="utf-8"?>
-<p:sld xmlns:a="http://schemas.openxmlformats.org/drawingml/2006/main" xmlns:r="http://schemas.openxmlformats.org/officeDocument/2006/relationships" xmlns:p="http://schemas.openxmlformats.org/presentationml/2006/main">
-  <p:cSld>
-    <p:spTree>
-      <p:nvGrpSpPr>
-        <p:cNvPr id="1" name=""/>
-        <p:cNvGrpSpPr/>
-        <p:nvPr/>
-      </p:nvGrpSpPr>
-      <p:grpSpPr>
-        <a:xfrm>
-          <a:off x="0" y="0"/>
-          <a:ext cx="0" cy="0"/>
-          <a:chOff x="0" y="0"/>
-          <a:chExt cx="0" cy="0"/>
-        </a:xfrm>
-      </p:grpSpPr>
-      <p:sp>
-        <p:nvSpPr>
-          <p:cNvPr id="2" name="Title 1">
-            <a:extLst>
-              <a:ext uri="{FF2B5EF4-FFF2-40B4-BE49-F238E27FC236}">
-                <a16:creationId xmlns:a16="http://schemas.microsoft.com/office/drawing/2014/main" id="{A5469F7B-5F47-517F-D218-DF1E89BBB790}"/>
-              </a:ext>
-            </a:extLst>
-          </p:cNvPr>
-          <p:cNvSpPr>
-            <a:spLocks noGrp="1"/>
-          </p:cNvSpPr>
-          <p:nvPr>
-            <p:ph type="title"/>
-          </p:nvPr>
-        </p:nvSpPr>
-        <p:spPr/>
-        <p:txBody>
-          <a:bodyPr/>
-          <a:lstStyle/>
-          <a:p>
-            <a:r>
-              <a:rPr lang="en-GB" dirty="0"/>
-              <a:t>Python</a:t>
-            </a:r>
-          </a:p>
-        </p:txBody>
-      </p:sp>
-      <p:sp>
-        <p:nvSpPr>
-          <p:cNvPr id="3" name="Content Placeholder 2">
-            <a:extLst>
-              <a:ext uri="{FF2B5EF4-FFF2-40B4-BE49-F238E27FC236}">
-                <a16:creationId xmlns:a16="http://schemas.microsoft.com/office/drawing/2014/main" id="{D887FE72-3475-5DF9-893F-927B7A1BBC5F}"/>
-              </a:ext>
-            </a:extLst>
-          </p:cNvPr>
-          <p:cNvSpPr>
-            <a:spLocks noGrp="1"/>
-          </p:cNvSpPr>
-          <p:nvPr>
-            <p:ph idx="1"/>
-          </p:nvPr>
-        </p:nvSpPr>
-        <p:spPr/>
-        <p:txBody>
-          <a:bodyPr>
-            <a:normAutofit fontScale="32500" lnSpcReduction="20000"/>
-          </a:bodyPr>
-          <a:lstStyle/>
-          <a:p>
-            <a:r>
-              <a:rPr lang="en-GB" dirty="0"/>
-              <a:t>Install Python</a:t>
-            </a:r>
-          </a:p>
-          <a:p>
-            <a:endParaRPr lang="en-GB" dirty="0"/>
-          </a:p>
-          <a:p>
-            <a:r>
-              <a:rPr lang="en-GB" dirty="0"/>
-              <a:t>Set path</a:t>
-            </a:r>
-          </a:p>
-          <a:p>
-            <a:endParaRPr lang="en-GB" dirty="0"/>
-          </a:p>
-          <a:p>
-            <a:r>
-              <a:rPr lang="en-GB" dirty="0"/>
-              <a:t>open Windows Terminal</a:t>
-            </a:r>
-          </a:p>
-          <a:p>
-            <a:r>
-              <a:rPr lang="en-GB" dirty="0"/>
-              <a:t>	- cd to user folder</a:t>
-            </a:r>
-          </a:p>
-          <a:p>
-            <a:r>
-              <a:rPr lang="en-GB" dirty="0"/>
-              <a:t>	- create folder &amp; python file - hello-world.py</a:t>
-            </a:r>
-          </a:p>
-          <a:p>
-            <a:r>
-              <a:rPr lang="en-GB" dirty="0"/>
-              <a:t>	- open python file in notepad</a:t>
-            </a:r>
-          </a:p>
-          <a:p>
-            <a:r>
-              <a:rPr lang="en-GB" dirty="0"/>
-              <a:t>	- print('hello world')</a:t>
-            </a:r>
-          </a:p>
-          <a:p>
-            <a:r>
-              <a:rPr lang="en-GB" dirty="0"/>
-              <a:t>	- from terminal python hello-world.py</a:t>
-            </a:r>
-          </a:p>
-          <a:p>
-            <a:endParaRPr lang="en-GB" dirty="0"/>
-          </a:p>
-          <a:p>
-            <a:r>
-              <a:rPr lang="en-GB" dirty="0"/>
-              <a:t>Run hello-world.py from VS Code in debug</a:t>
-            </a:r>
-          </a:p>
-          <a:p>
-            <a:r>
-              <a:rPr lang="en-GB" dirty="0"/>
-              <a:t>Demo editing file and running in debug</a:t>
-            </a:r>
-          </a:p>
-          <a:p>
-            <a:endParaRPr lang="en-GB" dirty="0"/>
-          </a:p>
-          <a:p>
-            <a:r>
-              <a:rPr lang="en-GB" dirty="0"/>
-              <a:t>Demo python from shell</a:t>
-            </a:r>
-          </a:p>
-          <a:p>
-            <a:endParaRPr lang="en-GB" dirty="0"/>
-          </a:p>
-          <a:p>
-            <a:r>
-              <a:rPr lang="en-GB" dirty="0"/>
-              <a:t>Install Pip</a:t>
-            </a:r>
-          </a:p>
-          <a:p>
-            <a:r>
-              <a:rPr lang="en-GB" dirty="0"/>
-              <a:t>Install Spark from Pip</a:t>
-            </a:r>
-          </a:p>
-        </p:txBody>
-      </p:sp>
-    </p:spTree>
-    <p:extLst>
-      <p:ext uri="{BB962C8B-B14F-4D97-AF65-F5344CB8AC3E}">
-        <p14:creationId xmlns:p14="http://schemas.microsoft.com/office/powerpoint/2010/main" val="3256889448"/>
-      </p:ext>
-    </p:extLst>
-  </p:cSld>
-  <p:clrMapOvr>
-    <a:masterClrMapping/>
-  </p:clrMapOvr>
-</p:sld>
-</file>
-
-<file path=ppt/slides/slide55.xml><?xml version="1.0" encoding="utf-8"?>
+<file path=ppt/slides/slide58.xml><?xml version="1.0" encoding="utf-8"?>
 <p:sld xmlns:a="http://schemas.openxmlformats.org/drawingml/2006/main" xmlns:r="http://schemas.openxmlformats.org/officeDocument/2006/relationships" xmlns:p="http://schemas.openxmlformats.org/presentationml/2006/main">
   <p:cSld>
     <p:spTree>

</xml_diff>

<commit_message>
Anaconda update for slides
</commit_message>
<xml_diff>
--- a/Data Engineering Using Free Tools/Learn Data Engineering For Free.pptx
+++ b/Data Engineering Using Free Tools/Learn Data Engineering For Free.pptx
@@ -5,7 +5,7 @@
     <p:sldMasterId id="2147483648" r:id="rId1"/>
   </p:sldMasterIdLst>
   <p:notesMasterIdLst>
-    <p:notesMasterId r:id="rId60"/>
+    <p:notesMasterId r:id="rId61"/>
   </p:notesMasterIdLst>
   <p:sldIdLst>
     <p:sldId id="256" r:id="rId2"/>
@@ -49,23 +49,24 @@
     <p:sldId id="300" r:id="rId40"/>
     <p:sldId id="316" r:id="rId41"/>
     <p:sldId id="257" r:id="rId42"/>
-    <p:sldId id="314" r:id="rId43"/>
-    <p:sldId id="315" r:id="rId44"/>
-    <p:sldId id="311" r:id="rId45"/>
-    <p:sldId id="301" r:id="rId46"/>
-    <p:sldId id="302" r:id="rId47"/>
-    <p:sldId id="303" r:id="rId48"/>
-    <p:sldId id="304" r:id="rId49"/>
-    <p:sldId id="267" r:id="rId50"/>
-    <p:sldId id="270" r:id="rId51"/>
-    <p:sldId id="266" r:id="rId52"/>
-    <p:sldId id="293" r:id="rId53"/>
-    <p:sldId id="271" r:id="rId54"/>
-    <p:sldId id="272" r:id="rId55"/>
-    <p:sldId id="273" r:id="rId56"/>
-    <p:sldId id="282" r:id="rId57"/>
-    <p:sldId id="305" r:id="rId58"/>
-    <p:sldId id="260" r:id="rId59"/>
+    <p:sldId id="317" r:id="rId43"/>
+    <p:sldId id="314" r:id="rId44"/>
+    <p:sldId id="315" r:id="rId45"/>
+    <p:sldId id="311" r:id="rId46"/>
+    <p:sldId id="301" r:id="rId47"/>
+    <p:sldId id="302" r:id="rId48"/>
+    <p:sldId id="303" r:id="rId49"/>
+    <p:sldId id="304" r:id="rId50"/>
+    <p:sldId id="267" r:id="rId51"/>
+    <p:sldId id="270" r:id="rId52"/>
+    <p:sldId id="266" r:id="rId53"/>
+    <p:sldId id="293" r:id="rId54"/>
+    <p:sldId id="271" r:id="rId55"/>
+    <p:sldId id="272" r:id="rId56"/>
+    <p:sldId id="273" r:id="rId57"/>
+    <p:sldId id="282" r:id="rId58"/>
+    <p:sldId id="305" r:id="rId59"/>
+    <p:sldId id="260" r:id="rId60"/>
   </p:sldIdLst>
   <p:sldSz cx="12192000" cy="6858000"/>
   <p:notesSz cx="6858000" cy="9144000"/>
@@ -1949,7 +1950,7 @@
           <a:p>
             <a:fld id="{C49D3115-C41D-4930-8EF3-A657CFCC644E}" type="datetimeFigureOut">
               <a:rPr lang="en-GB" smtClean="0"/>
-              <a:t>22/09/2024</a:t>
+              <a:t>25/09/2024</a:t>
             </a:fld>
             <a:endParaRPr lang="en-GB"/>
           </a:p>
@@ -2450,7 +2451,7 @@
           <a:p>
             <a:fld id="{35275B4F-5DE5-4D53-BD3B-F0C44FE589B2}" type="datetimeFigureOut">
               <a:rPr lang="en-GB" smtClean="0"/>
-              <a:t>22/09/2024</a:t>
+              <a:t>25/09/2024</a:t>
             </a:fld>
             <a:endParaRPr lang="en-GB"/>
           </a:p>
@@ -2650,7 +2651,7 @@
           <a:p>
             <a:fld id="{35275B4F-5DE5-4D53-BD3B-F0C44FE589B2}" type="datetimeFigureOut">
               <a:rPr lang="en-GB" smtClean="0"/>
-              <a:t>22/09/2024</a:t>
+              <a:t>25/09/2024</a:t>
             </a:fld>
             <a:endParaRPr lang="en-GB"/>
           </a:p>
@@ -2860,7 +2861,7 @@
           <a:p>
             <a:fld id="{35275B4F-5DE5-4D53-BD3B-F0C44FE589B2}" type="datetimeFigureOut">
               <a:rPr lang="en-GB" smtClean="0"/>
-              <a:t>22/09/2024</a:t>
+              <a:t>25/09/2024</a:t>
             </a:fld>
             <a:endParaRPr lang="en-GB"/>
           </a:p>
@@ -3060,7 +3061,7 @@
           <a:p>
             <a:fld id="{35275B4F-5DE5-4D53-BD3B-F0C44FE589B2}" type="datetimeFigureOut">
               <a:rPr lang="en-GB" smtClean="0"/>
-              <a:t>22/09/2024</a:t>
+              <a:t>25/09/2024</a:t>
             </a:fld>
             <a:endParaRPr lang="en-GB"/>
           </a:p>
@@ -3336,7 +3337,7 @@
           <a:p>
             <a:fld id="{35275B4F-5DE5-4D53-BD3B-F0C44FE589B2}" type="datetimeFigureOut">
               <a:rPr lang="en-GB" smtClean="0"/>
-              <a:t>22/09/2024</a:t>
+              <a:t>25/09/2024</a:t>
             </a:fld>
             <a:endParaRPr lang="en-GB"/>
           </a:p>
@@ -3604,7 +3605,7 @@
           <a:p>
             <a:fld id="{35275B4F-5DE5-4D53-BD3B-F0C44FE589B2}" type="datetimeFigureOut">
               <a:rPr lang="en-GB" smtClean="0"/>
-              <a:t>22/09/2024</a:t>
+              <a:t>25/09/2024</a:t>
             </a:fld>
             <a:endParaRPr lang="en-GB"/>
           </a:p>
@@ -4019,7 +4020,7 @@
           <a:p>
             <a:fld id="{35275B4F-5DE5-4D53-BD3B-F0C44FE589B2}" type="datetimeFigureOut">
               <a:rPr lang="en-GB" smtClean="0"/>
-              <a:t>22/09/2024</a:t>
+              <a:t>25/09/2024</a:t>
             </a:fld>
             <a:endParaRPr lang="en-GB"/>
           </a:p>
@@ -4161,7 +4162,7 @@
           <a:p>
             <a:fld id="{35275B4F-5DE5-4D53-BD3B-F0C44FE589B2}" type="datetimeFigureOut">
               <a:rPr lang="en-GB" smtClean="0"/>
-              <a:t>22/09/2024</a:t>
+              <a:t>25/09/2024</a:t>
             </a:fld>
             <a:endParaRPr lang="en-GB"/>
           </a:p>
@@ -4274,7 +4275,7 @@
           <a:p>
             <a:fld id="{35275B4F-5DE5-4D53-BD3B-F0C44FE589B2}" type="datetimeFigureOut">
               <a:rPr lang="en-GB" smtClean="0"/>
-              <a:t>22/09/2024</a:t>
+              <a:t>25/09/2024</a:t>
             </a:fld>
             <a:endParaRPr lang="en-GB"/>
           </a:p>
@@ -4587,7 +4588,7 @@
           <a:p>
             <a:fld id="{35275B4F-5DE5-4D53-BD3B-F0C44FE589B2}" type="datetimeFigureOut">
               <a:rPr lang="en-GB" smtClean="0"/>
-              <a:t>22/09/2024</a:t>
+              <a:t>25/09/2024</a:t>
             </a:fld>
             <a:endParaRPr lang="en-GB"/>
           </a:p>
@@ -4876,7 +4877,7 @@
           <a:p>
             <a:fld id="{35275B4F-5DE5-4D53-BD3B-F0C44FE589B2}" type="datetimeFigureOut">
               <a:rPr lang="en-GB" smtClean="0"/>
-              <a:t>22/09/2024</a:t>
+              <a:t>25/09/2024</a:t>
             </a:fld>
             <a:endParaRPr lang="en-GB"/>
           </a:p>
@@ -5119,7 +5120,7 @@
           <a:p>
             <a:fld id="{35275B4F-5DE5-4D53-BD3B-F0C44FE589B2}" type="datetimeFigureOut">
               <a:rPr lang="en-GB" smtClean="0"/>
-              <a:t>22/09/2024</a:t>
+              <a:t>25/09/2024</a:t>
             </a:fld>
             <a:endParaRPr lang="en-GB"/>
           </a:p>
@@ -9118,7 +9119,7 @@
           <p:cNvPr id="2" name="Title 1">
             <a:extLst>
               <a:ext uri="{FF2B5EF4-FFF2-40B4-BE49-F238E27FC236}">
-                <a16:creationId xmlns:a16="http://schemas.microsoft.com/office/drawing/2014/main" id="{A5469F7B-5F47-517F-D218-DF1E89BBB790}"/>
+                <a16:creationId xmlns:a16="http://schemas.microsoft.com/office/drawing/2014/main" id="{A46B4437-F99E-881D-8C11-C63B2CC3EA49}"/>
               </a:ext>
             </a:extLst>
           </p:cNvPr>
@@ -9134,90 +9135,44 @@
           <a:bodyPr/>
           <a:lstStyle/>
           <a:p>
-            <a:r>
-              <a:rPr lang="en-GB" dirty="0" err="1"/>
-              <a:t>PySpark</a:t>
-            </a:r>
-            <a:r>
-              <a:rPr lang="en-GB" dirty="0"/>
-              <a:t> Pre-requisites</a:t>
-            </a:r>
-          </a:p>
-        </p:txBody>
-      </p:sp>
-      <p:sp>
-        <p:nvSpPr>
-          <p:cNvPr id="3" name="Content Placeholder 2">
-            <a:extLst>
-              <a:ext uri="{FF2B5EF4-FFF2-40B4-BE49-F238E27FC236}">
-                <a16:creationId xmlns:a16="http://schemas.microsoft.com/office/drawing/2014/main" id="{D887FE72-3475-5DF9-893F-927B7A1BBC5F}"/>
-              </a:ext>
-            </a:extLst>
-          </p:cNvPr>
-          <p:cNvSpPr>
-            <a:spLocks noGrp="1"/>
-          </p:cNvSpPr>
-          <p:nvPr>
-            <p:ph idx="1"/>
-          </p:nvPr>
-        </p:nvSpPr>
-        <p:spPr/>
-        <p:txBody>
-          <a:bodyPr>
-            <a:normAutofit/>
-          </a:bodyPr>
-          <a:lstStyle/>
-          <a:p>
-            <a:r>
-              <a:rPr lang="en-GB" dirty="0"/>
-              <a:t>Install Java</a:t>
-            </a:r>
-          </a:p>
-          <a:p>
-            <a:r>
-              <a:rPr lang="en-GB" dirty="0"/>
-              <a:t>Set paths</a:t>
-            </a:r>
-          </a:p>
-          <a:p>
-            <a:pPr lvl="1"/>
-            <a:r>
-              <a:rPr lang="en-GB" dirty="0"/>
-              <a:t>JAVA_HOME</a:t>
-            </a:r>
-          </a:p>
-          <a:p>
-            <a:pPr lvl="1"/>
-            <a:r>
-              <a:rPr lang="en-GB" dirty="0"/>
-              <a:t>PATH</a:t>
-            </a:r>
-          </a:p>
-          <a:p>
-            <a:pPr lvl="1"/>
-            <a:endParaRPr lang="en-GB" dirty="0"/>
-          </a:p>
-          <a:p>
-            <a:r>
-              <a:rPr lang="en-GB" dirty="0"/>
-              <a:t>Install Apache Spark</a:t>
-            </a:r>
-          </a:p>
-          <a:p>
-            <a:r>
-              <a:rPr lang="en-GB" dirty="0"/>
-              <a:t>Install winutils.exe</a:t>
-            </a:r>
-          </a:p>
-          <a:p>
-            <a:endParaRPr lang="en-GB" dirty="0"/>
-          </a:p>
-        </p:txBody>
-      </p:sp>
+            <a:endParaRPr lang="en-GB"/>
+          </a:p>
+        </p:txBody>
+      </p:sp>
+      <p:pic>
+        <p:nvPicPr>
+          <p:cNvPr id="5" name="Picture 4">
+            <a:extLst>
+              <a:ext uri="{FF2B5EF4-FFF2-40B4-BE49-F238E27FC236}">
+                <a16:creationId xmlns:a16="http://schemas.microsoft.com/office/drawing/2014/main" id="{3E636616-F386-FFD4-F9FB-6B28F76C082E}"/>
+              </a:ext>
+            </a:extLst>
+          </p:cNvPr>
+          <p:cNvPicPr>
+            <a:picLocks noChangeAspect="1"/>
+          </p:cNvPicPr>
+          <p:nvPr/>
+        </p:nvPicPr>
+        <p:blipFill>
+          <a:blip r:embed="rId2"/>
+          <a:stretch>
+            <a:fillRect/>
+          </a:stretch>
+        </p:blipFill>
+        <p:spPr>
+          <a:xfrm>
+            <a:off x="1701475" y="2249242"/>
+            <a:ext cx="4648849" cy="3515216"/>
+          </a:xfrm>
+          <a:prstGeom prst="rect">
+            <a:avLst/>
+          </a:prstGeom>
+        </p:spPr>
+      </p:pic>
     </p:spTree>
     <p:extLst>
       <p:ext uri="{BB962C8B-B14F-4D97-AF65-F5344CB8AC3E}">
-        <p14:creationId xmlns:p14="http://schemas.microsoft.com/office/powerpoint/2010/main" val="662787998"/>
+        <p14:creationId xmlns:p14="http://schemas.microsoft.com/office/powerpoint/2010/main" val="1102189768"/>
       </p:ext>
     </p:extLst>
   </p:cSld>
@@ -9271,7 +9226,7 @@
             </a:r>
             <a:r>
               <a:rPr lang="en-GB" dirty="0"/>
-              <a:t> Demo</a:t>
+              <a:t> Pre-requisites</a:t>
             </a:r>
           </a:p>
         </p:txBody>
@@ -9300,38 +9255,71 @@
           <a:lstStyle/>
           <a:p>
             <a:r>
-              <a:rPr lang="en-GB" dirty="0" err="1"/>
-              <a:t>PySpark</a:t>
-            </a:r>
-            <a:r>
               <a:rPr lang="en-GB" dirty="0"/>
-              <a:t> validation</a:t>
+              <a:t>Install Java (not v 21</a:t>
             </a:r>
           </a:p>
           <a:p>
             <a:r>
               <a:rPr lang="en-GB" dirty="0"/>
-              <a:t>Web UI</a:t>
-            </a:r>
-          </a:p>
-          <a:p>
+              <a:t>Set paths</a:t>
+            </a:r>
+          </a:p>
+          <a:p>
+            <a:pPr lvl="1"/>
             <a:r>
               <a:rPr lang="en-GB" dirty="0"/>
-              <a:t>VS Code</a:t>
-            </a:r>
-          </a:p>
-          <a:p>
+              <a:t>JAVA_HOME</a:t>
+            </a:r>
+          </a:p>
+          <a:p>
+            <a:pPr lvl="1"/>
             <a:r>
               <a:rPr lang="en-GB" dirty="0"/>
-              <a:t>Visualisation?</a:t>
-            </a:r>
+              <a:t>PATH</a:t>
+            </a:r>
+          </a:p>
+          <a:p>
+            <a:pPr lvl="1"/>
+            <a:endParaRPr lang="en-GB" dirty="0"/>
+          </a:p>
+          <a:p>
+            <a:r>
+              <a:rPr lang="en-GB" dirty="0"/>
+              <a:t>Install Apache Spark</a:t>
+            </a:r>
+          </a:p>
+          <a:p>
+            <a:r>
+              <a:rPr lang="en-GB" dirty="0"/>
+              <a:t>Install winutils.exe</a:t>
+            </a:r>
+          </a:p>
+          <a:p>
+            <a:r>
+              <a:rPr lang="en-GB"/>
+              <a:t>Instructions: </a:t>
+            </a:r>
+            <a:r>
+              <a:rPr lang="en-GB">
+                <a:hlinkClick r:id="rId2"/>
+              </a:rPr>
+              <a:t>https://sparkbyexamples.com/pyspark-tutorial/</a:t>
+            </a:r>
+            <a:endParaRPr lang="en-GB"/>
+          </a:p>
+          <a:p>
+            <a:pPr marL="0" indent="0">
+              <a:buNone/>
+            </a:pPr>
+            <a:endParaRPr lang="en-GB" dirty="0"/>
           </a:p>
         </p:txBody>
       </p:sp>
     </p:spTree>
     <p:extLst>
       <p:ext uri="{BB962C8B-B14F-4D97-AF65-F5344CB8AC3E}">
-        <p14:creationId xmlns:p14="http://schemas.microsoft.com/office/powerpoint/2010/main" val="3082836330"/>
+        <p14:creationId xmlns:p14="http://schemas.microsoft.com/office/powerpoint/2010/main" val="662787998"/>
       </p:ext>
     </p:extLst>
   </p:cSld>
@@ -9363,6 +9351,120 @@
           <p:cNvPr id="2" name="Title 1">
             <a:extLst>
               <a:ext uri="{FF2B5EF4-FFF2-40B4-BE49-F238E27FC236}">
+                <a16:creationId xmlns:a16="http://schemas.microsoft.com/office/drawing/2014/main" id="{A5469F7B-5F47-517F-D218-DF1E89BBB790}"/>
+              </a:ext>
+            </a:extLst>
+          </p:cNvPr>
+          <p:cNvSpPr>
+            <a:spLocks noGrp="1"/>
+          </p:cNvSpPr>
+          <p:nvPr>
+            <p:ph type="title"/>
+          </p:nvPr>
+        </p:nvSpPr>
+        <p:spPr/>
+        <p:txBody>
+          <a:bodyPr/>
+          <a:lstStyle/>
+          <a:p>
+            <a:r>
+              <a:rPr lang="en-GB" dirty="0" err="1"/>
+              <a:t>PySpark</a:t>
+            </a:r>
+            <a:r>
+              <a:rPr lang="en-GB" dirty="0"/>
+              <a:t> Demo</a:t>
+            </a:r>
+          </a:p>
+        </p:txBody>
+      </p:sp>
+      <p:sp>
+        <p:nvSpPr>
+          <p:cNvPr id="3" name="Content Placeholder 2">
+            <a:extLst>
+              <a:ext uri="{FF2B5EF4-FFF2-40B4-BE49-F238E27FC236}">
+                <a16:creationId xmlns:a16="http://schemas.microsoft.com/office/drawing/2014/main" id="{D887FE72-3475-5DF9-893F-927B7A1BBC5F}"/>
+              </a:ext>
+            </a:extLst>
+          </p:cNvPr>
+          <p:cNvSpPr>
+            <a:spLocks noGrp="1"/>
+          </p:cNvSpPr>
+          <p:nvPr>
+            <p:ph idx="1"/>
+          </p:nvPr>
+        </p:nvSpPr>
+        <p:spPr/>
+        <p:txBody>
+          <a:bodyPr>
+            <a:normAutofit/>
+          </a:bodyPr>
+          <a:lstStyle/>
+          <a:p>
+            <a:r>
+              <a:rPr lang="en-GB" dirty="0" err="1"/>
+              <a:t>PySpark</a:t>
+            </a:r>
+            <a:r>
+              <a:rPr lang="en-GB" dirty="0"/>
+              <a:t> validation</a:t>
+            </a:r>
+          </a:p>
+          <a:p>
+            <a:r>
+              <a:rPr lang="en-GB" dirty="0"/>
+              <a:t>Web UI</a:t>
+            </a:r>
+          </a:p>
+          <a:p>
+            <a:r>
+              <a:rPr lang="en-GB" dirty="0"/>
+              <a:t>VS Code</a:t>
+            </a:r>
+          </a:p>
+          <a:p>
+            <a:r>
+              <a:rPr lang="en-GB" dirty="0"/>
+              <a:t>Visualisation?</a:t>
+            </a:r>
+          </a:p>
+        </p:txBody>
+      </p:sp>
+    </p:spTree>
+    <p:extLst>
+      <p:ext uri="{BB962C8B-B14F-4D97-AF65-F5344CB8AC3E}">
+        <p14:creationId xmlns:p14="http://schemas.microsoft.com/office/powerpoint/2010/main" val="3082836330"/>
+      </p:ext>
+    </p:extLst>
+  </p:cSld>
+  <p:clrMapOvr>
+    <a:masterClrMapping/>
+  </p:clrMapOvr>
+</p:sld>
+</file>
+
+<file path=ppt/slides/slide45.xml><?xml version="1.0" encoding="utf-8"?>
+<p:sld xmlns:a="http://schemas.openxmlformats.org/drawingml/2006/main" xmlns:r="http://schemas.openxmlformats.org/officeDocument/2006/relationships" xmlns:p="http://schemas.openxmlformats.org/presentationml/2006/main">
+  <p:cSld>
+    <p:spTree>
+      <p:nvGrpSpPr>
+        <p:cNvPr id="1" name=""/>
+        <p:cNvGrpSpPr/>
+        <p:nvPr/>
+      </p:nvGrpSpPr>
+      <p:grpSpPr>
+        <a:xfrm>
+          <a:off x="0" y="0"/>
+          <a:ext cx="0" cy="0"/>
+          <a:chOff x="0" y="0"/>
+          <a:chExt cx="0" cy="0"/>
+        </a:xfrm>
+      </p:grpSpPr>
+      <p:sp>
+        <p:nvSpPr>
+          <p:cNvPr id="2" name="Title 1">
+            <a:extLst>
+              <a:ext uri="{FF2B5EF4-FFF2-40B4-BE49-F238E27FC236}">
                 <a16:creationId xmlns:a16="http://schemas.microsoft.com/office/drawing/2014/main" id="{6461F12C-8296-BADA-FD56-149E96554D1E}"/>
               </a:ext>
             </a:extLst>
@@ -9407,7 +9509,7 @@
 </p:sld>
 </file>
 
-<file path=ppt/slides/slide45.xml><?xml version="1.0" encoding="utf-8"?>
+<file path=ppt/slides/slide46.xml><?xml version="1.0" encoding="utf-8"?>
 <p:sld xmlns:a="http://schemas.openxmlformats.org/drawingml/2006/main" xmlns:r="http://schemas.openxmlformats.org/officeDocument/2006/relationships" xmlns:p="http://schemas.openxmlformats.org/presentationml/2006/main">
   <p:cSld>
     <p:spTree>
@@ -9522,7 +9624,7 @@
 </p:sld>
 </file>
 
-<file path=ppt/slides/slide46.xml><?xml version="1.0" encoding="utf-8"?>
+<file path=ppt/slides/slide47.xml><?xml version="1.0" encoding="utf-8"?>
 <p:sld xmlns:a="http://schemas.openxmlformats.org/drawingml/2006/main" xmlns:r="http://schemas.openxmlformats.org/officeDocument/2006/relationships" xmlns:p="http://schemas.openxmlformats.org/presentationml/2006/main">
   <p:cSld>
     <p:spTree>
@@ -9612,7 +9714,7 @@
 </p:sld>
 </file>
 
-<file path=ppt/slides/slide47.xml><?xml version="1.0" encoding="utf-8"?>
+<file path=ppt/slides/slide48.xml><?xml version="1.0" encoding="utf-8"?>
 <p:sld xmlns:a="http://schemas.openxmlformats.org/drawingml/2006/main" xmlns:r="http://schemas.openxmlformats.org/officeDocument/2006/relationships" xmlns:p="http://schemas.openxmlformats.org/presentationml/2006/main">
   <p:cSld>
     <p:spTree>
@@ -9702,7 +9804,7 @@
 </p:sld>
 </file>
 
-<file path=ppt/slides/slide48.xml><?xml version="1.0" encoding="utf-8"?>
+<file path=ppt/slides/slide49.xml><?xml version="1.0" encoding="utf-8"?>
 <p:sld xmlns:a="http://schemas.openxmlformats.org/drawingml/2006/main" xmlns:r="http://schemas.openxmlformats.org/officeDocument/2006/relationships" xmlns:p="http://schemas.openxmlformats.org/presentationml/2006/main">
   <p:cSld>
     <p:spTree>
@@ -9762,7 +9864,90 @@
 </p:sld>
 </file>
 
-<file path=ppt/slides/slide49.xml><?xml version="1.0" encoding="utf-8"?>
+<file path=ppt/slides/slide5.xml><?xml version="1.0" encoding="utf-8"?>
+<p:sld xmlns:a="http://schemas.openxmlformats.org/drawingml/2006/main" xmlns:r="http://schemas.openxmlformats.org/officeDocument/2006/relationships" xmlns:p="http://schemas.openxmlformats.org/presentationml/2006/main">
+  <p:cSld>
+    <p:spTree>
+      <p:nvGrpSpPr>
+        <p:cNvPr id="1" name=""/>
+        <p:cNvGrpSpPr/>
+        <p:nvPr/>
+      </p:nvGrpSpPr>
+      <p:grpSpPr>
+        <a:xfrm>
+          <a:off x="0" y="0"/>
+          <a:ext cx="0" cy="0"/>
+          <a:chOff x="0" y="0"/>
+          <a:chExt cx="0" cy="0"/>
+        </a:xfrm>
+      </p:grpSpPr>
+      <p:sp>
+        <p:nvSpPr>
+          <p:cNvPr id="2" name="Title 1">
+            <a:extLst>
+              <a:ext uri="{FF2B5EF4-FFF2-40B4-BE49-F238E27FC236}">
+                <a16:creationId xmlns:a16="http://schemas.microsoft.com/office/drawing/2014/main" id="{9831B8CC-CE63-2632-A79B-DF312B723DB2}"/>
+              </a:ext>
+            </a:extLst>
+          </p:cNvPr>
+          <p:cNvSpPr>
+            <a:spLocks noGrp="1"/>
+          </p:cNvSpPr>
+          <p:nvPr>
+            <p:ph type="title"/>
+          </p:nvPr>
+        </p:nvSpPr>
+        <p:spPr/>
+        <p:txBody>
+          <a:bodyPr/>
+          <a:lstStyle/>
+          <a:p>
+            <a:r>
+              <a:rPr lang="en-GB" dirty="0"/>
+              <a:t>VS Code</a:t>
+            </a:r>
+          </a:p>
+        </p:txBody>
+      </p:sp>
+      <p:sp>
+        <p:nvSpPr>
+          <p:cNvPr id="3" name="Content Placeholder 2">
+            <a:extLst>
+              <a:ext uri="{FF2B5EF4-FFF2-40B4-BE49-F238E27FC236}">
+                <a16:creationId xmlns:a16="http://schemas.microsoft.com/office/drawing/2014/main" id="{B5E4477C-CAAB-ABF9-981B-11DA484523CD}"/>
+              </a:ext>
+            </a:extLst>
+          </p:cNvPr>
+          <p:cNvSpPr>
+            <a:spLocks noGrp="1"/>
+          </p:cNvSpPr>
+          <p:nvPr>
+            <p:ph idx="1"/>
+          </p:nvPr>
+        </p:nvSpPr>
+        <p:spPr/>
+        <p:txBody>
+          <a:bodyPr/>
+          <a:lstStyle/>
+          <a:p>
+            <a:endParaRPr lang="en-GB"/>
+          </a:p>
+        </p:txBody>
+      </p:sp>
+    </p:spTree>
+    <p:extLst>
+      <p:ext uri="{BB962C8B-B14F-4D97-AF65-F5344CB8AC3E}">
+        <p14:creationId xmlns:p14="http://schemas.microsoft.com/office/powerpoint/2010/main" val="3080502177"/>
+      </p:ext>
+    </p:extLst>
+  </p:cSld>
+  <p:clrMapOvr>
+    <a:masterClrMapping/>
+  </p:clrMapOvr>
+</p:sld>
+</file>
+
+<file path=ppt/slides/slide50.xml><?xml version="1.0" encoding="utf-8"?>
 <p:sld xmlns:a="http://schemas.openxmlformats.org/drawingml/2006/main" xmlns:r="http://schemas.openxmlformats.org/officeDocument/2006/relationships" xmlns:p="http://schemas.openxmlformats.org/presentationml/2006/main">
   <p:cSld>
     <p:spTree>
@@ -9850,90 +10035,7 @@
 </p:sld>
 </file>
 
-<file path=ppt/slides/slide5.xml><?xml version="1.0" encoding="utf-8"?>
-<p:sld xmlns:a="http://schemas.openxmlformats.org/drawingml/2006/main" xmlns:r="http://schemas.openxmlformats.org/officeDocument/2006/relationships" xmlns:p="http://schemas.openxmlformats.org/presentationml/2006/main">
-  <p:cSld>
-    <p:spTree>
-      <p:nvGrpSpPr>
-        <p:cNvPr id="1" name=""/>
-        <p:cNvGrpSpPr/>
-        <p:nvPr/>
-      </p:nvGrpSpPr>
-      <p:grpSpPr>
-        <a:xfrm>
-          <a:off x="0" y="0"/>
-          <a:ext cx="0" cy="0"/>
-          <a:chOff x="0" y="0"/>
-          <a:chExt cx="0" cy="0"/>
-        </a:xfrm>
-      </p:grpSpPr>
-      <p:sp>
-        <p:nvSpPr>
-          <p:cNvPr id="2" name="Title 1">
-            <a:extLst>
-              <a:ext uri="{FF2B5EF4-FFF2-40B4-BE49-F238E27FC236}">
-                <a16:creationId xmlns:a16="http://schemas.microsoft.com/office/drawing/2014/main" id="{9831B8CC-CE63-2632-A79B-DF312B723DB2}"/>
-              </a:ext>
-            </a:extLst>
-          </p:cNvPr>
-          <p:cNvSpPr>
-            <a:spLocks noGrp="1"/>
-          </p:cNvSpPr>
-          <p:nvPr>
-            <p:ph type="title"/>
-          </p:nvPr>
-        </p:nvSpPr>
-        <p:spPr/>
-        <p:txBody>
-          <a:bodyPr/>
-          <a:lstStyle/>
-          <a:p>
-            <a:r>
-              <a:rPr lang="en-GB" dirty="0"/>
-              <a:t>VS Code</a:t>
-            </a:r>
-          </a:p>
-        </p:txBody>
-      </p:sp>
-      <p:sp>
-        <p:nvSpPr>
-          <p:cNvPr id="3" name="Content Placeholder 2">
-            <a:extLst>
-              <a:ext uri="{FF2B5EF4-FFF2-40B4-BE49-F238E27FC236}">
-                <a16:creationId xmlns:a16="http://schemas.microsoft.com/office/drawing/2014/main" id="{B5E4477C-CAAB-ABF9-981B-11DA484523CD}"/>
-              </a:ext>
-            </a:extLst>
-          </p:cNvPr>
-          <p:cNvSpPr>
-            <a:spLocks noGrp="1"/>
-          </p:cNvSpPr>
-          <p:nvPr>
-            <p:ph idx="1"/>
-          </p:nvPr>
-        </p:nvSpPr>
-        <p:spPr/>
-        <p:txBody>
-          <a:bodyPr/>
-          <a:lstStyle/>
-          <a:p>
-            <a:endParaRPr lang="en-GB"/>
-          </a:p>
-        </p:txBody>
-      </p:sp>
-    </p:spTree>
-    <p:extLst>
-      <p:ext uri="{BB962C8B-B14F-4D97-AF65-F5344CB8AC3E}">
-        <p14:creationId xmlns:p14="http://schemas.microsoft.com/office/powerpoint/2010/main" val="3080502177"/>
-      </p:ext>
-    </p:extLst>
-  </p:cSld>
-  <p:clrMapOvr>
-    <a:masterClrMapping/>
-  </p:clrMapOvr>
-</p:sld>
-</file>
-
-<file path=ppt/slides/slide50.xml><?xml version="1.0" encoding="utf-8"?>
+<file path=ppt/slides/slide51.xml><?xml version="1.0" encoding="utf-8"?>
 <p:sld xmlns:a="http://schemas.openxmlformats.org/drawingml/2006/main" xmlns:r="http://schemas.openxmlformats.org/officeDocument/2006/relationships" xmlns:p="http://schemas.openxmlformats.org/presentationml/2006/main">
   <p:cSld>
     <p:spTree>
@@ -10026,7 +10128,7 @@
 </p:sld>
 </file>
 
-<file path=ppt/slides/slide51.xml><?xml version="1.0" encoding="utf-8"?>
+<file path=ppt/slides/slide52.xml><?xml version="1.0" encoding="utf-8"?>
 <p:sld xmlns:a="http://schemas.openxmlformats.org/drawingml/2006/main" xmlns:r="http://schemas.openxmlformats.org/officeDocument/2006/relationships" xmlns:p="http://schemas.openxmlformats.org/presentationml/2006/main">
   <p:cSld>
     <p:spTree>
@@ -10113,7 +10215,7 @@
 </p:sld>
 </file>
 
-<file path=ppt/slides/slide52.xml><?xml version="1.0" encoding="utf-8"?>
+<file path=ppt/slides/slide53.xml><?xml version="1.0" encoding="utf-8"?>
 <p:sld xmlns:a="http://schemas.openxmlformats.org/drawingml/2006/main" xmlns:r="http://schemas.openxmlformats.org/officeDocument/2006/relationships" xmlns:p="http://schemas.openxmlformats.org/presentationml/2006/main">
   <p:cSld>
     <p:spTree>
@@ -10228,7 +10330,7 @@
 </p:sld>
 </file>
 
-<file path=ppt/slides/slide53.xml><?xml version="1.0" encoding="utf-8"?>
+<file path=ppt/slides/slide54.xml><?xml version="1.0" encoding="utf-8"?>
 <p:sld xmlns:a="http://schemas.openxmlformats.org/drawingml/2006/main" xmlns:r="http://schemas.openxmlformats.org/officeDocument/2006/relationships" xmlns:p="http://schemas.openxmlformats.org/presentationml/2006/main">
   <p:cSld>
     <p:spTree>
@@ -10346,7 +10448,7 @@
 </p:sld>
 </file>
 
-<file path=ppt/slides/slide54.xml><?xml version="1.0" encoding="utf-8"?>
+<file path=ppt/slides/slide55.xml><?xml version="1.0" encoding="utf-8"?>
 <p:sld xmlns:a="http://schemas.openxmlformats.org/drawingml/2006/main" xmlns:r="http://schemas.openxmlformats.org/officeDocument/2006/relationships" xmlns:p="http://schemas.openxmlformats.org/presentationml/2006/main">
   <p:cSld>
     <p:spTree>
@@ -10434,7 +10536,7 @@
 </p:sld>
 </file>
 
-<file path=ppt/slides/slide55.xml><?xml version="1.0" encoding="utf-8"?>
+<file path=ppt/slides/slide56.xml><?xml version="1.0" encoding="utf-8"?>
 <p:sld xmlns:a="http://schemas.openxmlformats.org/drawingml/2006/main" xmlns:r="http://schemas.openxmlformats.org/officeDocument/2006/relationships" xmlns:p="http://schemas.openxmlformats.org/presentationml/2006/main">
   <p:cSld>
     <p:spTree>
@@ -10522,7 +10624,7 @@
 </p:sld>
 </file>
 
-<file path=ppt/slides/slide56.xml><?xml version="1.0" encoding="utf-8"?>
+<file path=ppt/slides/slide57.xml><?xml version="1.0" encoding="utf-8"?>
 <p:sld xmlns:a="http://schemas.openxmlformats.org/drawingml/2006/main" xmlns:r="http://schemas.openxmlformats.org/officeDocument/2006/relationships" xmlns:p="http://schemas.openxmlformats.org/presentationml/2006/main">
   <p:cSld>
     <p:spTree>
@@ -10612,7 +10714,7 @@
 </p:sld>
 </file>
 
-<file path=ppt/slides/slide57.xml><?xml version="1.0" encoding="utf-8"?>
+<file path=ppt/slides/slide58.xml><?xml version="1.0" encoding="utf-8"?>
 <p:sld xmlns:a="http://schemas.openxmlformats.org/drawingml/2006/main" xmlns:r="http://schemas.openxmlformats.org/officeDocument/2006/relationships" xmlns:p="http://schemas.openxmlformats.org/presentationml/2006/main">
   <p:cSld>
     <p:spTree>
@@ -10642,7 +10744,7 @@
 </p:sld>
 </file>
 
-<file path=ppt/slides/slide58.xml><?xml version="1.0" encoding="utf-8"?>
+<file path=ppt/slides/slide59.xml><?xml version="1.0" encoding="utf-8"?>
 <p:sld xmlns:a="http://schemas.openxmlformats.org/drawingml/2006/main" xmlns:r="http://schemas.openxmlformats.org/officeDocument/2006/relationships" xmlns:p="http://schemas.openxmlformats.org/presentationml/2006/main">
   <p:cSld>
     <p:spTree>

</xml_diff>

<commit_message>
vscode working with local spark!
</commit_message>
<xml_diff>
--- a/Data Engineering Using Free Tools/Learn Data Engineering For Free.pptx
+++ b/Data Engineering Using Free Tools/Learn Data Engineering For Free.pptx
@@ -5,7 +5,7 @@
     <p:sldMasterId id="2147483648" r:id="rId1"/>
   </p:sldMasterIdLst>
   <p:notesMasterIdLst>
-    <p:notesMasterId r:id="rId61"/>
+    <p:notesMasterId r:id="rId62"/>
   </p:notesMasterIdLst>
   <p:sldIdLst>
     <p:sldId id="256" r:id="rId2"/>
@@ -52,21 +52,22 @@
     <p:sldId id="317" r:id="rId43"/>
     <p:sldId id="314" r:id="rId44"/>
     <p:sldId id="315" r:id="rId45"/>
-    <p:sldId id="311" r:id="rId46"/>
-    <p:sldId id="301" r:id="rId47"/>
-    <p:sldId id="302" r:id="rId48"/>
-    <p:sldId id="303" r:id="rId49"/>
-    <p:sldId id="304" r:id="rId50"/>
-    <p:sldId id="267" r:id="rId51"/>
-    <p:sldId id="270" r:id="rId52"/>
-    <p:sldId id="266" r:id="rId53"/>
-    <p:sldId id="293" r:id="rId54"/>
-    <p:sldId id="271" r:id="rId55"/>
-    <p:sldId id="272" r:id="rId56"/>
-    <p:sldId id="273" r:id="rId57"/>
-    <p:sldId id="282" r:id="rId58"/>
-    <p:sldId id="305" r:id="rId59"/>
-    <p:sldId id="260" r:id="rId60"/>
+    <p:sldId id="318" r:id="rId46"/>
+    <p:sldId id="311" r:id="rId47"/>
+    <p:sldId id="301" r:id="rId48"/>
+    <p:sldId id="302" r:id="rId49"/>
+    <p:sldId id="303" r:id="rId50"/>
+    <p:sldId id="304" r:id="rId51"/>
+    <p:sldId id="267" r:id="rId52"/>
+    <p:sldId id="270" r:id="rId53"/>
+    <p:sldId id="266" r:id="rId54"/>
+    <p:sldId id="293" r:id="rId55"/>
+    <p:sldId id="271" r:id="rId56"/>
+    <p:sldId id="272" r:id="rId57"/>
+    <p:sldId id="273" r:id="rId58"/>
+    <p:sldId id="282" r:id="rId59"/>
+    <p:sldId id="305" r:id="rId60"/>
+    <p:sldId id="260" r:id="rId61"/>
   </p:sldIdLst>
   <p:sldSz cx="12192000" cy="6858000"/>
   <p:notesSz cx="6858000" cy="9144000"/>
@@ -1950,7 +1951,7 @@
           <a:p>
             <a:fld id="{C49D3115-C41D-4930-8EF3-A657CFCC644E}" type="datetimeFigureOut">
               <a:rPr lang="en-GB" smtClean="0"/>
-              <a:t>25/09/2024</a:t>
+              <a:t>27/09/2024</a:t>
             </a:fld>
             <a:endParaRPr lang="en-GB"/>
           </a:p>
@@ -2302,6 +2303,203 @@
 </p:notes>
 </file>
 
+<file path=ppt/notesSlides/notesSlide2.xml><?xml version="1.0" encoding="utf-8"?>
+<p:notes xmlns:a="http://schemas.openxmlformats.org/drawingml/2006/main" xmlns:r="http://schemas.openxmlformats.org/officeDocument/2006/relationships" xmlns:p="http://schemas.openxmlformats.org/presentationml/2006/main">
+  <p:cSld>
+    <p:spTree>
+      <p:nvGrpSpPr>
+        <p:cNvPr id="1" name=""/>
+        <p:cNvGrpSpPr/>
+        <p:nvPr/>
+      </p:nvGrpSpPr>
+      <p:grpSpPr>
+        <a:xfrm>
+          <a:off x="0" y="0"/>
+          <a:ext cx="0" cy="0"/>
+          <a:chOff x="0" y="0"/>
+          <a:chExt cx="0" cy="0"/>
+        </a:xfrm>
+      </p:grpSpPr>
+      <p:sp>
+        <p:nvSpPr>
+          <p:cNvPr id="2" name="Slide Image Placeholder 1"/>
+          <p:cNvSpPr>
+            <a:spLocks noGrp="1" noRot="1" noChangeAspect="1"/>
+          </p:cNvSpPr>
+          <p:nvPr>
+            <p:ph type="sldImg"/>
+          </p:nvPr>
+        </p:nvSpPr>
+        <p:spPr/>
+      </p:sp>
+      <p:sp>
+        <p:nvSpPr>
+          <p:cNvPr id="3" name="Notes Placeholder 2"/>
+          <p:cNvSpPr>
+            <a:spLocks noGrp="1"/>
+          </p:cNvSpPr>
+          <p:nvPr>
+            <p:ph type="body" idx="1"/>
+          </p:nvPr>
+        </p:nvSpPr>
+        <p:spPr/>
+        <p:txBody>
+          <a:bodyPr/>
+          <a:lstStyle/>
+          <a:p>
+            <a:r>
+              <a:rPr lang="en-GB" dirty="0" err="1"/>
+              <a:t>PySpark</a:t>
+            </a:r>
+            <a:r>
+              <a:rPr lang="en-GB" dirty="0"/>
+              <a:t> validation</a:t>
+            </a:r>
+          </a:p>
+          <a:p>
+            <a:r>
+              <a:rPr lang="en-GB" dirty="0"/>
+              <a:t>Web UI</a:t>
+            </a:r>
+          </a:p>
+          <a:p>
+            <a:r>
+              <a:rPr lang="en-GB" dirty="0"/>
+              <a:t>VS Code</a:t>
+            </a:r>
+          </a:p>
+          <a:p>
+            <a:r>
+              <a:rPr lang="en-GB" dirty="0"/>
+              <a:t>	- to run Jupiter notebooks needs </a:t>
+            </a:r>
+            <a:r>
+              <a:rPr lang="en-GB" dirty="0" err="1"/>
+              <a:t>ipykernel</a:t>
+            </a:r>
+            <a:r>
+              <a:rPr lang="en-GB" dirty="0"/>
+              <a:t> installed</a:t>
+            </a:r>
+          </a:p>
+          <a:p>
+            <a:r>
+              <a:rPr lang="en-GB" dirty="0"/>
+              <a:t>	- from </a:t>
+            </a:r>
+            <a:r>
+              <a:rPr lang="en-GB" dirty="0" err="1"/>
+              <a:t>vscode</a:t>
+            </a:r>
+            <a:r>
+              <a:rPr lang="en-GB" dirty="0"/>
+              <a:t> run </a:t>
+            </a:r>
+            <a:r>
+              <a:rPr lang="en-GB" b="1" i="0" dirty="0" err="1">
+                <a:solidFill>
+                  <a:srgbClr val="CD3131"/>
+                </a:solidFill>
+                <a:effectLst/>
+                <a:latin typeface="Consolas" panose="020B0609020204030204" pitchFamily="49" charset="0"/>
+              </a:rPr>
+              <a:t>conda</a:t>
+            </a:r>
+            <a:r>
+              <a:rPr lang="en-GB" b="1" i="0" dirty="0">
+                <a:solidFill>
+                  <a:srgbClr val="CD3131"/>
+                </a:solidFill>
+                <a:effectLst/>
+                <a:latin typeface="Consolas" panose="020B0609020204030204" pitchFamily="49" charset="0"/>
+              </a:rPr>
+              <a:t> install -n </a:t>
+            </a:r>
+            <a:r>
+              <a:rPr lang="en-GB" b="1" i="0" dirty="0" err="1">
+                <a:solidFill>
+                  <a:srgbClr val="CD3131"/>
+                </a:solidFill>
+                <a:effectLst/>
+                <a:latin typeface="Consolas" panose="020B0609020204030204" pitchFamily="49" charset="0"/>
+              </a:rPr>
+              <a:t>dataengforfree_env</a:t>
+            </a:r>
+            <a:r>
+              <a:rPr lang="en-GB" b="1" i="0" dirty="0">
+                <a:solidFill>
+                  <a:srgbClr val="CD3131"/>
+                </a:solidFill>
+                <a:effectLst/>
+                <a:latin typeface="Consolas" panose="020B0609020204030204" pitchFamily="49" charset="0"/>
+              </a:rPr>
+              <a:t> </a:t>
+            </a:r>
+            <a:r>
+              <a:rPr lang="en-GB" b="1" i="0" dirty="0" err="1">
+                <a:solidFill>
+                  <a:srgbClr val="CD3131"/>
+                </a:solidFill>
+                <a:effectLst/>
+                <a:latin typeface="Consolas" panose="020B0609020204030204" pitchFamily="49" charset="0"/>
+              </a:rPr>
+              <a:t>ipykernel</a:t>
+            </a:r>
+            <a:endParaRPr lang="en-GB" dirty="0"/>
+          </a:p>
+          <a:p>
+            <a:r>
+              <a:rPr lang="en-GB" dirty="0"/>
+              <a:t>	- copy python.exe &gt; python3.exe</a:t>
+            </a:r>
+          </a:p>
+          <a:p>
+            <a:r>
+              <a:rPr lang="en-GB" dirty="0"/>
+              <a:t>Visualisation? </a:t>
+            </a:r>
+          </a:p>
+          <a:p>
+            <a:endParaRPr lang="en-GB" dirty="0"/>
+          </a:p>
+        </p:txBody>
+      </p:sp>
+      <p:sp>
+        <p:nvSpPr>
+          <p:cNvPr id="4" name="Slide Number Placeholder 3"/>
+          <p:cNvSpPr>
+            <a:spLocks noGrp="1"/>
+          </p:cNvSpPr>
+          <p:nvPr>
+            <p:ph type="sldNum" sz="quarter" idx="5"/>
+          </p:nvPr>
+        </p:nvSpPr>
+        <p:spPr/>
+        <p:txBody>
+          <a:bodyPr/>
+          <a:lstStyle/>
+          <a:p>
+            <a:fld id="{E7E8E24E-2DA5-414D-9B85-6ED9E2618CC6}" type="slidenum">
+              <a:rPr lang="en-GB" smtClean="0"/>
+              <a:t>44</a:t>
+            </a:fld>
+            <a:endParaRPr lang="en-GB"/>
+          </a:p>
+        </p:txBody>
+      </p:sp>
+    </p:spTree>
+    <p:extLst>
+      <p:ext uri="{BB962C8B-B14F-4D97-AF65-F5344CB8AC3E}">
+        <p14:creationId xmlns:p14="http://schemas.microsoft.com/office/powerpoint/2010/main" val="400731075"/>
+      </p:ext>
+    </p:extLst>
+  </p:cSld>
+  <p:clrMapOvr>
+    <a:masterClrMapping/>
+  </p:clrMapOvr>
+</p:notes>
+</file>
+
 <file path=ppt/slideLayouts/slideLayout1.xml><?xml version="1.0" encoding="utf-8"?>
 <p:sldLayout xmlns:a="http://schemas.openxmlformats.org/drawingml/2006/main" xmlns:r="http://schemas.openxmlformats.org/officeDocument/2006/relationships" xmlns:p="http://schemas.openxmlformats.org/presentationml/2006/main" type="title" preserve="1">
   <p:cSld name="Title Slide">
@@ -2451,7 +2649,7 @@
           <a:p>
             <a:fld id="{35275B4F-5DE5-4D53-BD3B-F0C44FE589B2}" type="datetimeFigureOut">
               <a:rPr lang="en-GB" smtClean="0"/>
-              <a:t>25/09/2024</a:t>
+              <a:t>27/09/2024</a:t>
             </a:fld>
             <a:endParaRPr lang="en-GB"/>
           </a:p>
@@ -2651,7 +2849,7 @@
           <a:p>
             <a:fld id="{35275B4F-5DE5-4D53-BD3B-F0C44FE589B2}" type="datetimeFigureOut">
               <a:rPr lang="en-GB" smtClean="0"/>
-              <a:t>25/09/2024</a:t>
+              <a:t>27/09/2024</a:t>
             </a:fld>
             <a:endParaRPr lang="en-GB"/>
           </a:p>
@@ -2861,7 +3059,7 @@
           <a:p>
             <a:fld id="{35275B4F-5DE5-4D53-BD3B-F0C44FE589B2}" type="datetimeFigureOut">
               <a:rPr lang="en-GB" smtClean="0"/>
-              <a:t>25/09/2024</a:t>
+              <a:t>27/09/2024</a:t>
             </a:fld>
             <a:endParaRPr lang="en-GB"/>
           </a:p>
@@ -3061,7 +3259,7 @@
           <a:p>
             <a:fld id="{35275B4F-5DE5-4D53-BD3B-F0C44FE589B2}" type="datetimeFigureOut">
               <a:rPr lang="en-GB" smtClean="0"/>
-              <a:t>25/09/2024</a:t>
+              <a:t>27/09/2024</a:t>
             </a:fld>
             <a:endParaRPr lang="en-GB"/>
           </a:p>
@@ -3337,7 +3535,7 @@
           <a:p>
             <a:fld id="{35275B4F-5DE5-4D53-BD3B-F0C44FE589B2}" type="datetimeFigureOut">
               <a:rPr lang="en-GB" smtClean="0"/>
-              <a:t>25/09/2024</a:t>
+              <a:t>27/09/2024</a:t>
             </a:fld>
             <a:endParaRPr lang="en-GB"/>
           </a:p>
@@ -3605,7 +3803,7 @@
           <a:p>
             <a:fld id="{35275B4F-5DE5-4D53-BD3B-F0C44FE589B2}" type="datetimeFigureOut">
               <a:rPr lang="en-GB" smtClean="0"/>
-              <a:t>25/09/2024</a:t>
+              <a:t>27/09/2024</a:t>
             </a:fld>
             <a:endParaRPr lang="en-GB"/>
           </a:p>
@@ -4020,7 +4218,7 @@
           <a:p>
             <a:fld id="{35275B4F-5DE5-4D53-BD3B-F0C44FE589B2}" type="datetimeFigureOut">
               <a:rPr lang="en-GB" smtClean="0"/>
-              <a:t>25/09/2024</a:t>
+              <a:t>27/09/2024</a:t>
             </a:fld>
             <a:endParaRPr lang="en-GB"/>
           </a:p>
@@ -4162,7 +4360,7 @@
           <a:p>
             <a:fld id="{35275B4F-5DE5-4D53-BD3B-F0C44FE589B2}" type="datetimeFigureOut">
               <a:rPr lang="en-GB" smtClean="0"/>
-              <a:t>25/09/2024</a:t>
+              <a:t>27/09/2024</a:t>
             </a:fld>
             <a:endParaRPr lang="en-GB"/>
           </a:p>
@@ -4275,7 +4473,7 @@
           <a:p>
             <a:fld id="{35275B4F-5DE5-4D53-BD3B-F0C44FE589B2}" type="datetimeFigureOut">
               <a:rPr lang="en-GB" smtClean="0"/>
-              <a:t>25/09/2024</a:t>
+              <a:t>27/09/2024</a:t>
             </a:fld>
             <a:endParaRPr lang="en-GB"/>
           </a:p>
@@ -4588,7 +4786,7 @@
           <a:p>
             <a:fld id="{35275B4F-5DE5-4D53-BD3B-F0C44FE589B2}" type="datetimeFigureOut">
               <a:rPr lang="en-GB" smtClean="0"/>
-              <a:t>25/09/2024</a:t>
+              <a:t>27/09/2024</a:t>
             </a:fld>
             <a:endParaRPr lang="en-GB"/>
           </a:p>
@@ -4877,7 +5075,7 @@
           <a:p>
             <a:fld id="{35275B4F-5DE5-4D53-BD3B-F0C44FE589B2}" type="datetimeFigureOut">
               <a:rPr lang="en-GB" smtClean="0"/>
-              <a:t>25/09/2024</a:t>
+              <a:t>27/09/2024</a:t>
             </a:fld>
             <a:endParaRPr lang="en-GB"/>
           </a:p>
@@ -5120,7 +5318,7 @@
           <a:p>
             <a:fld id="{35275B4F-5DE5-4D53-BD3B-F0C44FE589B2}" type="datetimeFigureOut">
               <a:rPr lang="en-GB" smtClean="0"/>
-              <a:t>25/09/2024</a:t>
+              <a:t>27/09/2024</a:t>
             </a:fld>
             <a:endParaRPr lang="en-GB"/>
           </a:p>
@@ -8986,100 +9184,27 @@
         <p:spPr/>
         <p:txBody>
           <a:bodyPr>
-            <a:normAutofit fontScale="32500" lnSpcReduction="20000"/>
+            <a:normAutofit/>
           </a:bodyPr>
           <a:lstStyle/>
           <a:p>
             <a:r>
               <a:rPr lang="en-GB" dirty="0"/>
-              <a:t>Install Python</a:t>
-            </a:r>
-          </a:p>
-          <a:p>
-            <a:endParaRPr lang="en-GB" dirty="0"/>
+              <a:t>Install Anaconda</a:t>
+            </a:r>
           </a:p>
           <a:p>
             <a:r>
               <a:rPr lang="en-GB" dirty="0"/>
-              <a:t>Set path</a:t>
-            </a:r>
-          </a:p>
-          <a:p>
-            <a:endParaRPr lang="en-GB" dirty="0"/>
-          </a:p>
-          <a:p>
+              <a:t>Use </a:t>
+            </a:r>
+            <a:r>
+              <a:rPr lang="en-GB" dirty="0" err="1"/>
+              <a:t>conda</a:t>
+            </a:r>
             <a:r>
               <a:rPr lang="en-GB" dirty="0"/>
-              <a:t>open Windows Terminal</a:t>
-            </a:r>
-          </a:p>
-          <a:p>
-            <a:r>
-              <a:rPr lang="en-GB" dirty="0"/>
-              <a:t>	- cd to user folder</a:t>
-            </a:r>
-          </a:p>
-          <a:p>
-            <a:r>
-              <a:rPr lang="en-GB" dirty="0"/>
-              <a:t>	- create folder &amp; python file - hello-world.py</a:t>
-            </a:r>
-          </a:p>
-          <a:p>
-            <a:r>
-              <a:rPr lang="en-GB" dirty="0"/>
-              <a:t>	- open python file in notepad</a:t>
-            </a:r>
-          </a:p>
-          <a:p>
-            <a:r>
-              <a:rPr lang="en-GB" dirty="0"/>
-              <a:t>	- print('hello world')</a:t>
-            </a:r>
-          </a:p>
-          <a:p>
-            <a:r>
-              <a:rPr lang="en-GB" dirty="0"/>
-              <a:t>	- from terminal python hello-world.py</a:t>
-            </a:r>
-          </a:p>
-          <a:p>
-            <a:endParaRPr lang="en-GB" dirty="0"/>
-          </a:p>
-          <a:p>
-            <a:r>
-              <a:rPr lang="en-GB" dirty="0"/>
-              <a:t>Run hello-world.py from VS Code in debug</a:t>
-            </a:r>
-          </a:p>
-          <a:p>
-            <a:r>
-              <a:rPr lang="en-GB" dirty="0"/>
-              <a:t>Demo editing file and running in debug</a:t>
-            </a:r>
-          </a:p>
-          <a:p>
-            <a:endParaRPr lang="en-GB" dirty="0"/>
-          </a:p>
-          <a:p>
-            <a:r>
-              <a:rPr lang="en-GB" dirty="0"/>
-              <a:t>Demo python from shell</a:t>
-            </a:r>
-          </a:p>
-          <a:p>
-            <a:endParaRPr lang="en-GB" dirty="0"/>
-          </a:p>
-          <a:p>
-            <a:r>
-              <a:rPr lang="en-GB" dirty="0"/>
-              <a:t>Install Pip</a:t>
-            </a:r>
-          </a:p>
-          <a:p>
-            <a:r>
-              <a:rPr lang="en-GB" dirty="0"/>
-              <a:t>Install Spark from Pip</a:t>
+              <a:t> to create</a:t>
             </a:r>
           </a:p>
         </p:txBody>
@@ -9256,7 +9381,7 @@
           <a:p>
             <a:r>
               <a:rPr lang="en-GB" dirty="0"/>
-              <a:t>Install Java (not v 21</a:t>
+              <a:t>Install Java (not v 21)</a:t>
             </a:r>
           </a:p>
           <a:p>
@@ -9297,16 +9422,22 @@
           </a:p>
           <a:p>
             <a:r>
-              <a:rPr lang="en-GB"/>
+              <a:rPr lang="en-GB" dirty="0"/>
+              <a:t>Create virtual environment</a:t>
+            </a:r>
+          </a:p>
+          <a:p>
+            <a:r>
+              <a:rPr lang="en-GB" dirty="0"/>
               <a:t>Instructions: </a:t>
             </a:r>
             <a:r>
-              <a:rPr lang="en-GB">
+              <a:rPr lang="en-GB" dirty="0">
                 <a:hlinkClick r:id="rId2"/>
               </a:rPr>
               <a:t>https://sparkbyexamples.com/pyspark-tutorial/</a:t>
             </a:r>
-            <a:endParaRPr lang="en-GB"/>
+            <a:endParaRPr lang="en-GB" dirty="0"/>
           </a:p>
           <a:p>
             <a:pPr marL="0" indent="0">
@@ -9401,32 +9532,7 @@
           </a:bodyPr>
           <a:lstStyle/>
           <a:p>
-            <a:r>
-              <a:rPr lang="en-GB" dirty="0" err="1"/>
-              <a:t>PySpark</a:t>
-            </a:r>
-            <a:r>
-              <a:rPr lang="en-GB" dirty="0"/>
-              <a:t> validation</a:t>
-            </a:r>
-          </a:p>
-          <a:p>
-            <a:r>
-              <a:rPr lang="en-GB" dirty="0"/>
-              <a:t>Web UI</a:t>
-            </a:r>
-          </a:p>
-          <a:p>
-            <a:r>
-              <a:rPr lang="en-GB" dirty="0"/>
-              <a:t>VS Code</a:t>
-            </a:r>
-          </a:p>
-          <a:p>
-            <a:r>
-              <a:rPr lang="en-GB" dirty="0"/>
-              <a:t>Visualisation?</a:t>
-            </a:r>
+            <a:endParaRPr lang="en-GB" dirty="0"/>
           </a:p>
         </p:txBody>
       </p:sp>
@@ -9465,6 +9571,91 @@
           <p:cNvPr id="2" name="Title 1">
             <a:extLst>
               <a:ext uri="{FF2B5EF4-FFF2-40B4-BE49-F238E27FC236}">
+                <a16:creationId xmlns:a16="http://schemas.microsoft.com/office/drawing/2014/main" id="{E44CED87-DE61-C816-A3B2-E63F5185A2FF}"/>
+              </a:ext>
+            </a:extLst>
+          </p:cNvPr>
+          <p:cNvSpPr>
+            <a:spLocks noGrp="1"/>
+          </p:cNvSpPr>
+          <p:nvPr>
+            <p:ph type="title"/>
+          </p:nvPr>
+        </p:nvSpPr>
+        <p:spPr/>
+        <p:txBody>
+          <a:bodyPr/>
+          <a:lstStyle/>
+          <a:p>
+            <a:endParaRPr lang="en-GB"/>
+          </a:p>
+        </p:txBody>
+      </p:sp>
+      <p:pic>
+        <p:nvPicPr>
+          <p:cNvPr id="5" name="Picture 4">
+            <a:extLst>
+              <a:ext uri="{FF2B5EF4-FFF2-40B4-BE49-F238E27FC236}">
+                <a16:creationId xmlns:a16="http://schemas.microsoft.com/office/drawing/2014/main" id="{BBCCA8A9-2EA6-13E9-862D-2FC11BA269AD}"/>
+              </a:ext>
+            </a:extLst>
+          </p:cNvPr>
+          <p:cNvPicPr>
+            <a:picLocks noChangeAspect="1"/>
+          </p:cNvPicPr>
+          <p:nvPr/>
+        </p:nvPicPr>
+        <p:blipFill>
+          <a:blip r:embed="rId2"/>
+          <a:stretch>
+            <a:fillRect/>
+          </a:stretch>
+        </p:blipFill>
+        <p:spPr>
+          <a:xfrm>
+            <a:off x="3976391" y="2519235"/>
+            <a:ext cx="4239217" cy="1819529"/>
+          </a:xfrm>
+          <a:prstGeom prst="rect">
+            <a:avLst/>
+          </a:prstGeom>
+        </p:spPr>
+      </p:pic>
+    </p:spTree>
+    <p:extLst>
+      <p:ext uri="{BB962C8B-B14F-4D97-AF65-F5344CB8AC3E}">
+        <p14:creationId xmlns:p14="http://schemas.microsoft.com/office/powerpoint/2010/main" val="1601142253"/>
+      </p:ext>
+    </p:extLst>
+  </p:cSld>
+  <p:clrMapOvr>
+    <a:masterClrMapping/>
+  </p:clrMapOvr>
+</p:sld>
+</file>
+
+<file path=ppt/slides/slide46.xml><?xml version="1.0" encoding="utf-8"?>
+<p:sld xmlns:a="http://schemas.openxmlformats.org/drawingml/2006/main" xmlns:r="http://schemas.openxmlformats.org/officeDocument/2006/relationships" xmlns:p="http://schemas.openxmlformats.org/presentationml/2006/main">
+  <p:cSld>
+    <p:spTree>
+      <p:nvGrpSpPr>
+        <p:cNvPr id="1" name=""/>
+        <p:cNvGrpSpPr/>
+        <p:nvPr/>
+      </p:nvGrpSpPr>
+      <p:grpSpPr>
+        <a:xfrm>
+          <a:off x="0" y="0"/>
+          <a:ext cx="0" cy="0"/>
+          <a:chOff x="0" y="0"/>
+          <a:chExt cx="0" cy="0"/>
+        </a:xfrm>
+      </p:grpSpPr>
+      <p:sp>
+        <p:nvSpPr>
+          <p:cNvPr id="2" name="Title 1">
+            <a:extLst>
+              <a:ext uri="{FF2B5EF4-FFF2-40B4-BE49-F238E27FC236}">
                 <a16:creationId xmlns:a16="http://schemas.microsoft.com/office/drawing/2014/main" id="{6461F12C-8296-BADA-FD56-149E96554D1E}"/>
               </a:ext>
             </a:extLst>
@@ -9509,7 +9700,7 @@
 </p:sld>
 </file>
 
-<file path=ppt/slides/slide46.xml><?xml version="1.0" encoding="utf-8"?>
+<file path=ppt/slides/slide47.xml><?xml version="1.0" encoding="utf-8"?>
 <p:sld xmlns:a="http://schemas.openxmlformats.org/drawingml/2006/main" xmlns:r="http://schemas.openxmlformats.org/officeDocument/2006/relationships" xmlns:p="http://schemas.openxmlformats.org/presentationml/2006/main">
   <p:cSld>
     <p:spTree>
@@ -9624,7 +9815,7 @@
 </p:sld>
 </file>
 
-<file path=ppt/slides/slide47.xml><?xml version="1.0" encoding="utf-8"?>
+<file path=ppt/slides/slide48.xml><?xml version="1.0" encoding="utf-8"?>
 <p:sld xmlns:a="http://schemas.openxmlformats.org/drawingml/2006/main" xmlns:r="http://schemas.openxmlformats.org/officeDocument/2006/relationships" xmlns:p="http://schemas.openxmlformats.org/presentationml/2006/main">
   <p:cSld>
     <p:spTree>
@@ -9714,7 +9905,7 @@
 </p:sld>
 </file>
 
-<file path=ppt/slides/slide48.xml><?xml version="1.0" encoding="utf-8"?>
+<file path=ppt/slides/slide49.xml><?xml version="1.0" encoding="utf-8"?>
 <p:sld xmlns:a="http://schemas.openxmlformats.org/drawingml/2006/main" xmlns:r="http://schemas.openxmlformats.org/officeDocument/2006/relationships" xmlns:p="http://schemas.openxmlformats.org/presentationml/2006/main">
   <p:cSld>
     <p:spTree>
@@ -9804,7 +9995,90 @@
 </p:sld>
 </file>
 
-<file path=ppt/slides/slide49.xml><?xml version="1.0" encoding="utf-8"?>
+<file path=ppt/slides/slide5.xml><?xml version="1.0" encoding="utf-8"?>
+<p:sld xmlns:a="http://schemas.openxmlformats.org/drawingml/2006/main" xmlns:r="http://schemas.openxmlformats.org/officeDocument/2006/relationships" xmlns:p="http://schemas.openxmlformats.org/presentationml/2006/main">
+  <p:cSld>
+    <p:spTree>
+      <p:nvGrpSpPr>
+        <p:cNvPr id="1" name=""/>
+        <p:cNvGrpSpPr/>
+        <p:nvPr/>
+      </p:nvGrpSpPr>
+      <p:grpSpPr>
+        <a:xfrm>
+          <a:off x="0" y="0"/>
+          <a:ext cx="0" cy="0"/>
+          <a:chOff x="0" y="0"/>
+          <a:chExt cx="0" cy="0"/>
+        </a:xfrm>
+      </p:grpSpPr>
+      <p:sp>
+        <p:nvSpPr>
+          <p:cNvPr id="2" name="Title 1">
+            <a:extLst>
+              <a:ext uri="{FF2B5EF4-FFF2-40B4-BE49-F238E27FC236}">
+                <a16:creationId xmlns:a16="http://schemas.microsoft.com/office/drawing/2014/main" id="{9831B8CC-CE63-2632-A79B-DF312B723DB2}"/>
+              </a:ext>
+            </a:extLst>
+          </p:cNvPr>
+          <p:cNvSpPr>
+            <a:spLocks noGrp="1"/>
+          </p:cNvSpPr>
+          <p:nvPr>
+            <p:ph type="title"/>
+          </p:nvPr>
+        </p:nvSpPr>
+        <p:spPr/>
+        <p:txBody>
+          <a:bodyPr/>
+          <a:lstStyle/>
+          <a:p>
+            <a:r>
+              <a:rPr lang="en-GB" dirty="0"/>
+              <a:t>VS Code</a:t>
+            </a:r>
+          </a:p>
+        </p:txBody>
+      </p:sp>
+      <p:sp>
+        <p:nvSpPr>
+          <p:cNvPr id="3" name="Content Placeholder 2">
+            <a:extLst>
+              <a:ext uri="{FF2B5EF4-FFF2-40B4-BE49-F238E27FC236}">
+                <a16:creationId xmlns:a16="http://schemas.microsoft.com/office/drawing/2014/main" id="{B5E4477C-CAAB-ABF9-981B-11DA484523CD}"/>
+              </a:ext>
+            </a:extLst>
+          </p:cNvPr>
+          <p:cNvSpPr>
+            <a:spLocks noGrp="1"/>
+          </p:cNvSpPr>
+          <p:nvPr>
+            <p:ph idx="1"/>
+          </p:nvPr>
+        </p:nvSpPr>
+        <p:spPr/>
+        <p:txBody>
+          <a:bodyPr/>
+          <a:lstStyle/>
+          <a:p>
+            <a:endParaRPr lang="en-GB"/>
+          </a:p>
+        </p:txBody>
+      </p:sp>
+    </p:spTree>
+    <p:extLst>
+      <p:ext uri="{BB962C8B-B14F-4D97-AF65-F5344CB8AC3E}">
+        <p14:creationId xmlns:p14="http://schemas.microsoft.com/office/powerpoint/2010/main" val="3080502177"/>
+      </p:ext>
+    </p:extLst>
+  </p:cSld>
+  <p:clrMapOvr>
+    <a:masterClrMapping/>
+  </p:clrMapOvr>
+</p:sld>
+</file>
+
+<file path=ppt/slides/slide50.xml><?xml version="1.0" encoding="utf-8"?>
 <p:sld xmlns:a="http://schemas.openxmlformats.org/drawingml/2006/main" xmlns:r="http://schemas.openxmlformats.org/officeDocument/2006/relationships" xmlns:p="http://schemas.openxmlformats.org/presentationml/2006/main">
   <p:cSld>
     <p:spTree>
@@ -9864,90 +10138,7 @@
 </p:sld>
 </file>
 
-<file path=ppt/slides/slide5.xml><?xml version="1.0" encoding="utf-8"?>
-<p:sld xmlns:a="http://schemas.openxmlformats.org/drawingml/2006/main" xmlns:r="http://schemas.openxmlformats.org/officeDocument/2006/relationships" xmlns:p="http://schemas.openxmlformats.org/presentationml/2006/main">
-  <p:cSld>
-    <p:spTree>
-      <p:nvGrpSpPr>
-        <p:cNvPr id="1" name=""/>
-        <p:cNvGrpSpPr/>
-        <p:nvPr/>
-      </p:nvGrpSpPr>
-      <p:grpSpPr>
-        <a:xfrm>
-          <a:off x="0" y="0"/>
-          <a:ext cx="0" cy="0"/>
-          <a:chOff x="0" y="0"/>
-          <a:chExt cx="0" cy="0"/>
-        </a:xfrm>
-      </p:grpSpPr>
-      <p:sp>
-        <p:nvSpPr>
-          <p:cNvPr id="2" name="Title 1">
-            <a:extLst>
-              <a:ext uri="{FF2B5EF4-FFF2-40B4-BE49-F238E27FC236}">
-                <a16:creationId xmlns:a16="http://schemas.microsoft.com/office/drawing/2014/main" id="{9831B8CC-CE63-2632-A79B-DF312B723DB2}"/>
-              </a:ext>
-            </a:extLst>
-          </p:cNvPr>
-          <p:cNvSpPr>
-            <a:spLocks noGrp="1"/>
-          </p:cNvSpPr>
-          <p:nvPr>
-            <p:ph type="title"/>
-          </p:nvPr>
-        </p:nvSpPr>
-        <p:spPr/>
-        <p:txBody>
-          <a:bodyPr/>
-          <a:lstStyle/>
-          <a:p>
-            <a:r>
-              <a:rPr lang="en-GB" dirty="0"/>
-              <a:t>VS Code</a:t>
-            </a:r>
-          </a:p>
-        </p:txBody>
-      </p:sp>
-      <p:sp>
-        <p:nvSpPr>
-          <p:cNvPr id="3" name="Content Placeholder 2">
-            <a:extLst>
-              <a:ext uri="{FF2B5EF4-FFF2-40B4-BE49-F238E27FC236}">
-                <a16:creationId xmlns:a16="http://schemas.microsoft.com/office/drawing/2014/main" id="{B5E4477C-CAAB-ABF9-981B-11DA484523CD}"/>
-              </a:ext>
-            </a:extLst>
-          </p:cNvPr>
-          <p:cNvSpPr>
-            <a:spLocks noGrp="1"/>
-          </p:cNvSpPr>
-          <p:nvPr>
-            <p:ph idx="1"/>
-          </p:nvPr>
-        </p:nvSpPr>
-        <p:spPr/>
-        <p:txBody>
-          <a:bodyPr/>
-          <a:lstStyle/>
-          <a:p>
-            <a:endParaRPr lang="en-GB"/>
-          </a:p>
-        </p:txBody>
-      </p:sp>
-    </p:spTree>
-    <p:extLst>
-      <p:ext uri="{BB962C8B-B14F-4D97-AF65-F5344CB8AC3E}">
-        <p14:creationId xmlns:p14="http://schemas.microsoft.com/office/powerpoint/2010/main" val="3080502177"/>
-      </p:ext>
-    </p:extLst>
-  </p:cSld>
-  <p:clrMapOvr>
-    <a:masterClrMapping/>
-  </p:clrMapOvr>
-</p:sld>
-</file>
-
-<file path=ppt/slides/slide50.xml><?xml version="1.0" encoding="utf-8"?>
+<file path=ppt/slides/slide51.xml><?xml version="1.0" encoding="utf-8"?>
 <p:sld xmlns:a="http://schemas.openxmlformats.org/drawingml/2006/main" xmlns:r="http://schemas.openxmlformats.org/officeDocument/2006/relationships" xmlns:p="http://schemas.openxmlformats.org/presentationml/2006/main">
   <p:cSld>
     <p:spTree>
@@ -10035,7 +10226,7 @@
 </p:sld>
 </file>
 
-<file path=ppt/slides/slide51.xml><?xml version="1.0" encoding="utf-8"?>
+<file path=ppt/slides/slide52.xml><?xml version="1.0" encoding="utf-8"?>
 <p:sld xmlns:a="http://schemas.openxmlformats.org/drawingml/2006/main" xmlns:r="http://schemas.openxmlformats.org/officeDocument/2006/relationships" xmlns:p="http://schemas.openxmlformats.org/presentationml/2006/main">
   <p:cSld>
     <p:spTree>
@@ -10128,7 +10319,7 @@
 </p:sld>
 </file>
 
-<file path=ppt/slides/slide52.xml><?xml version="1.0" encoding="utf-8"?>
+<file path=ppt/slides/slide53.xml><?xml version="1.0" encoding="utf-8"?>
 <p:sld xmlns:a="http://schemas.openxmlformats.org/drawingml/2006/main" xmlns:r="http://schemas.openxmlformats.org/officeDocument/2006/relationships" xmlns:p="http://schemas.openxmlformats.org/presentationml/2006/main">
   <p:cSld>
     <p:spTree>
@@ -10215,7 +10406,7 @@
 </p:sld>
 </file>
 
-<file path=ppt/slides/slide53.xml><?xml version="1.0" encoding="utf-8"?>
+<file path=ppt/slides/slide54.xml><?xml version="1.0" encoding="utf-8"?>
 <p:sld xmlns:a="http://schemas.openxmlformats.org/drawingml/2006/main" xmlns:r="http://schemas.openxmlformats.org/officeDocument/2006/relationships" xmlns:p="http://schemas.openxmlformats.org/presentationml/2006/main">
   <p:cSld>
     <p:spTree>
@@ -10330,7 +10521,7 @@
 </p:sld>
 </file>
 
-<file path=ppt/slides/slide54.xml><?xml version="1.0" encoding="utf-8"?>
+<file path=ppt/slides/slide55.xml><?xml version="1.0" encoding="utf-8"?>
 <p:sld xmlns:a="http://schemas.openxmlformats.org/drawingml/2006/main" xmlns:r="http://schemas.openxmlformats.org/officeDocument/2006/relationships" xmlns:p="http://schemas.openxmlformats.org/presentationml/2006/main">
   <p:cSld>
     <p:spTree>
@@ -10448,7 +10639,7 @@
 </p:sld>
 </file>
 
-<file path=ppt/slides/slide55.xml><?xml version="1.0" encoding="utf-8"?>
+<file path=ppt/slides/slide56.xml><?xml version="1.0" encoding="utf-8"?>
 <p:sld xmlns:a="http://schemas.openxmlformats.org/drawingml/2006/main" xmlns:r="http://schemas.openxmlformats.org/officeDocument/2006/relationships" xmlns:p="http://schemas.openxmlformats.org/presentationml/2006/main">
   <p:cSld>
     <p:spTree>
@@ -10536,7 +10727,7 @@
 </p:sld>
 </file>
 
-<file path=ppt/slides/slide56.xml><?xml version="1.0" encoding="utf-8"?>
+<file path=ppt/slides/slide57.xml><?xml version="1.0" encoding="utf-8"?>
 <p:sld xmlns:a="http://schemas.openxmlformats.org/drawingml/2006/main" xmlns:r="http://schemas.openxmlformats.org/officeDocument/2006/relationships" xmlns:p="http://schemas.openxmlformats.org/presentationml/2006/main">
   <p:cSld>
     <p:spTree>
@@ -10624,7 +10815,7 @@
 </p:sld>
 </file>
 
-<file path=ppt/slides/slide57.xml><?xml version="1.0" encoding="utf-8"?>
+<file path=ppt/slides/slide58.xml><?xml version="1.0" encoding="utf-8"?>
 <p:sld xmlns:a="http://schemas.openxmlformats.org/drawingml/2006/main" xmlns:r="http://schemas.openxmlformats.org/officeDocument/2006/relationships" xmlns:p="http://schemas.openxmlformats.org/presentationml/2006/main">
   <p:cSld>
     <p:spTree>
@@ -10714,7 +10905,7 @@
 </p:sld>
 </file>
 
-<file path=ppt/slides/slide58.xml><?xml version="1.0" encoding="utf-8"?>
+<file path=ppt/slides/slide59.xml><?xml version="1.0" encoding="utf-8"?>
 <p:sld xmlns:a="http://schemas.openxmlformats.org/drawingml/2006/main" xmlns:r="http://schemas.openxmlformats.org/officeDocument/2006/relationships" xmlns:p="http://schemas.openxmlformats.org/presentationml/2006/main">
   <p:cSld>
     <p:spTree>
@@ -10744,90 +10935,6 @@
 </p:sld>
 </file>
 
-<file path=ppt/slides/slide59.xml><?xml version="1.0" encoding="utf-8"?>
-<p:sld xmlns:a="http://schemas.openxmlformats.org/drawingml/2006/main" xmlns:r="http://schemas.openxmlformats.org/officeDocument/2006/relationships" xmlns:p="http://schemas.openxmlformats.org/presentationml/2006/main">
-  <p:cSld>
-    <p:spTree>
-      <p:nvGrpSpPr>
-        <p:cNvPr id="1" name=""/>
-        <p:cNvGrpSpPr/>
-        <p:nvPr/>
-      </p:nvGrpSpPr>
-      <p:grpSpPr>
-        <a:xfrm>
-          <a:off x="0" y="0"/>
-          <a:ext cx="0" cy="0"/>
-          <a:chOff x="0" y="0"/>
-          <a:chExt cx="0" cy="0"/>
-        </a:xfrm>
-      </p:grpSpPr>
-      <p:sp>
-        <p:nvSpPr>
-          <p:cNvPr id="2" name="Title 1">
-            <a:extLst>
-              <a:ext uri="{FF2B5EF4-FFF2-40B4-BE49-F238E27FC236}">
-                <a16:creationId xmlns:a16="http://schemas.microsoft.com/office/drawing/2014/main" id="{2EA7A9B8-5D1F-EEF7-133A-D74F7FD68BA6}"/>
-              </a:ext>
-            </a:extLst>
-          </p:cNvPr>
-          <p:cNvSpPr>
-            <a:spLocks noGrp="1"/>
-          </p:cNvSpPr>
-          <p:nvPr>
-            <p:ph type="title"/>
-          </p:nvPr>
-        </p:nvSpPr>
-        <p:spPr/>
-        <p:txBody>
-          <a:bodyPr/>
-          <a:lstStyle/>
-          <a:p>
-            <a:r>
-              <a:rPr lang="en-GB" dirty="0" err="1"/>
-              <a:t>PySpark</a:t>
-            </a:r>
-            <a:endParaRPr lang="en-GB" dirty="0"/>
-          </a:p>
-        </p:txBody>
-      </p:sp>
-      <p:sp>
-        <p:nvSpPr>
-          <p:cNvPr id="3" name="Content Placeholder 2">
-            <a:extLst>
-              <a:ext uri="{FF2B5EF4-FFF2-40B4-BE49-F238E27FC236}">
-                <a16:creationId xmlns:a16="http://schemas.microsoft.com/office/drawing/2014/main" id="{C40C2E14-BFE4-C9DF-C194-89994D9EB591}"/>
-              </a:ext>
-            </a:extLst>
-          </p:cNvPr>
-          <p:cNvSpPr>
-            <a:spLocks noGrp="1"/>
-          </p:cNvSpPr>
-          <p:nvPr>
-            <p:ph idx="1"/>
-          </p:nvPr>
-        </p:nvSpPr>
-        <p:spPr/>
-        <p:txBody>
-          <a:bodyPr/>
-          <a:lstStyle/>
-          <a:p>
-            <a:endParaRPr lang="en-GB" dirty="0"/>
-          </a:p>
-        </p:txBody>
-      </p:sp>
-    </p:spTree>
-    <p:extLst>
-      <p:ext uri="{BB962C8B-B14F-4D97-AF65-F5344CB8AC3E}">
-        <p14:creationId xmlns:p14="http://schemas.microsoft.com/office/powerpoint/2010/main" val="317081444"/>
-      </p:ext>
-    </p:extLst>
-  </p:cSld>
-  <p:clrMapOvr>
-    <a:masterClrMapping/>
-  </p:clrMapOvr>
-</p:sld>
-</file>
-
 <file path=ppt/slides/slide6.xml><?xml version="1.0" encoding="utf-8"?>
 <p:sld xmlns:a="http://schemas.openxmlformats.org/drawingml/2006/main" xmlns:r="http://schemas.openxmlformats.org/officeDocument/2006/relationships" xmlns:p="http://schemas.openxmlformats.org/presentationml/2006/main">
   <p:cSld>
@@ -10959,6 +11066,90 @@
     <p:extLst>
       <p:ext uri="{BB962C8B-B14F-4D97-AF65-F5344CB8AC3E}">
         <p14:creationId xmlns:p14="http://schemas.microsoft.com/office/powerpoint/2010/main" val="2113534899"/>
+      </p:ext>
+    </p:extLst>
+  </p:cSld>
+  <p:clrMapOvr>
+    <a:masterClrMapping/>
+  </p:clrMapOvr>
+</p:sld>
+</file>
+
+<file path=ppt/slides/slide60.xml><?xml version="1.0" encoding="utf-8"?>
+<p:sld xmlns:a="http://schemas.openxmlformats.org/drawingml/2006/main" xmlns:r="http://schemas.openxmlformats.org/officeDocument/2006/relationships" xmlns:p="http://schemas.openxmlformats.org/presentationml/2006/main">
+  <p:cSld>
+    <p:spTree>
+      <p:nvGrpSpPr>
+        <p:cNvPr id="1" name=""/>
+        <p:cNvGrpSpPr/>
+        <p:nvPr/>
+      </p:nvGrpSpPr>
+      <p:grpSpPr>
+        <a:xfrm>
+          <a:off x="0" y="0"/>
+          <a:ext cx="0" cy="0"/>
+          <a:chOff x="0" y="0"/>
+          <a:chExt cx="0" cy="0"/>
+        </a:xfrm>
+      </p:grpSpPr>
+      <p:sp>
+        <p:nvSpPr>
+          <p:cNvPr id="2" name="Title 1">
+            <a:extLst>
+              <a:ext uri="{FF2B5EF4-FFF2-40B4-BE49-F238E27FC236}">
+                <a16:creationId xmlns:a16="http://schemas.microsoft.com/office/drawing/2014/main" id="{2EA7A9B8-5D1F-EEF7-133A-D74F7FD68BA6}"/>
+              </a:ext>
+            </a:extLst>
+          </p:cNvPr>
+          <p:cNvSpPr>
+            <a:spLocks noGrp="1"/>
+          </p:cNvSpPr>
+          <p:nvPr>
+            <p:ph type="title"/>
+          </p:nvPr>
+        </p:nvSpPr>
+        <p:spPr/>
+        <p:txBody>
+          <a:bodyPr/>
+          <a:lstStyle/>
+          <a:p>
+            <a:r>
+              <a:rPr lang="en-GB" dirty="0" err="1"/>
+              <a:t>PySpark</a:t>
+            </a:r>
+            <a:endParaRPr lang="en-GB" dirty="0"/>
+          </a:p>
+        </p:txBody>
+      </p:sp>
+      <p:sp>
+        <p:nvSpPr>
+          <p:cNvPr id="3" name="Content Placeholder 2">
+            <a:extLst>
+              <a:ext uri="{FF2B5EF4-FFF2-40B4-BE49-F238E27FC236}">
+                <a16:creationId xmlns:a16="http://schemas.microsoft.com/office/drawing/2014/main" id="{C40C2E14-BFE4-C9DF-C194-89994D9EB591}"/>
+              </a:ext>
+            </a:extLst>
+          </p:cNvPr>
+          <p:cNvSpPr>
+            <a:spLocks noGrp="1"/>
+          </p:cNvSpPr>
+          <p:nvPr>
+            <p:ph idx="1"/>
+          </p:nvPr>
+        </p:nvSpPr>
+        <p:spPr/>
+        <p:txBody>
+          <a:bodyPr/>
+          <a:lstStyle/>
+          <a:p>
+            <a:endParaRPr lang="en-GB" dirty="0"/>
+          </a:p>
+        </p:txBody>
+      </p:sp>
+    </p:spTree>
+    <p:extLst>
+      <p:ext uri="{BB962C8B-B14F-4D97-AF65-F5344CB8AC3E}">
+        <p14:creationId xmlns:p14="http://schemas.microsoft.com/office/powerpoint/2010/main" val="317081444"/>
       </p:ext>
     </p:extLst>
   </p:cSld>

</xml_diff>

<commit_message>
added conda demo sql connection not working new conda slides
</commit_message>
<xml_diff>
--- a/Data Engineering Using Free Tools/Learn Data Engineering For Free.pptx
+++ b/Data Engineering Using Free Tools/Learn Data Engineering For Free.pptx
@@ -5,7 +5,7 @@
     <p:sldMasterId id="2147483648" r:id="rId1"/>
   </p:sldMasterIdLst>
   <p:notesMasterIdLst>
-    <p:notesMasterId r:id="rId62"/>
+    <p:notesMasterId r:id="rId68"/>
   </p:notesMasterIdLst>
   <p:sldIdLst>
     <p:sldId id="256" r:id="rId2"/>
@@ -47,27 +47,33 @@
     <p:sldId id="298" r:id="rId38"/>
     <p:sldId id="299" r:id="rId39"/>
     <p:sldId id="300" r:id="rId40"/>
-    <p:sldId id="316" r:id="rId41"/>
-    <p:sldId id="257" r:id="rId42"/>
-    <p:sldId id="317" r:id="rId43"/>
+    <p:sldId id="257" r:id="rId41"/>
+    <p:sldId id="317" r:id="rId42"/>
+    <p:sldId id="324" r:id="rId43"/>
     <p:sldId id="314" r:id="rId44"/>
     <p:sldId id="315" r:id="rId45"/>
     <p:sldId id="318" r:id="rId46"/>
-    <p:sldId id="311" r:id="rId47"/>
-    <p:sldId id="301" r:id="rId48"/>
-    <p:sldId id="302" r:id="rId49"/>
-    <p:sldId id="303" r:id="rId50"/>
-    <p:sldId id="304" r:id="rId51"/>
-    <p:sldId id="267" r:id="rId52"/>
-    <p:sldId id="270" r:id="rId53"/>
-    <p:sldId id="266" r:id="rId54"/>
-    <p:sldId id="293" r:id="rId55"/>
-    <p:sldId id="271" r:id="rId56"/>
-    <p:sldId id="272" r:id="rId57"/>
-    <p:sldId id="273" r:id="rId58"/>
-    <p:sldId id="282" r:id="rId59"/>
-    <p:sldId id="305" r:id="rId60"/>
-    <p:sldId id="260" r:id="rId61"/>
+    <p:sldId id="319" r:id="rId47"/>
+    <p:sldId id="320" r:id="rId48"/>
+    <p:sldId id="321" r:id="rId49"/>
+    <p:sldId id="322" r:id="rId50"/>
+    <p:sldId id="323" r:id="rId51"/>
+    <p:sldId id="311" r:id="rId52"/>
+    <p:sldId id="316" r:id="rId53"/>
+    <p:sldId id="301" r:id="rId54"/>
+    <p:sldId id="302" r:id="rId55"/>
+    <p:sldId id="303" r:id="rId56"/>
+    <p:sldId id="304" r:id="rId57"/>
+    <p:sldId id="267" r:id="rId58"/>
+    <p:sldId id="270" r:id="rId59"/>
+    <p:sldId id="266" r:id="rId60"/>
+    <p:sldId id="293" r:id="rId61"/>
+    <p:sldId id="271" r:id="rId62"/>
+    <p:sldId id="272" r:id="rId63"/>
+    <p:sldId id="273" r:id="rId64"/>
+    <p:sldId id="282" r:id="rId65"/>
+    <p:sldId id="305" r:id="rId66"/>
+    <p:sldId id="260" r:id="rId67"/>
   </p:sldIdLst>
   <p:sldSz cx="12192000" cy="6858000"/>
   <p:notesSz cx="6858000" cy="9144000"/>
@@ -1951,7 +1957,7 @@
           <a:p>
             <a:fld id="{C49D3115-C41D-4930-8EF3-A657CFCC644E}" type="datetimeFigureOut">
               <a:rPr lang="en-GB" smtClean="0"/>
-              <a:t>27/09/2024</a:t>
+              <a:t>07/10/2024</a:t>
             </a:fld>
             <a:endParaRPr lang="en-GB"/>
           </a:p>
@@ -2500,6 +2506,90 @@
 </p:notes>
 </file>
 
+<file path=ppt/notesSlides/notesSlide3.xml><?xml version="1.0" encoding="utf-8"?>
+<p:notes xmlns:a="http://schemas.openxmlformats.org/drawingml/2006/main" xmlns:r="http://schemas.openxmlformats.org/officeDocument/2006/relationships" xmlns:p="http://schemas.openxmlformats.org/presentationml/2006/main">
+  <p:cSld>
+    <p:spTree>
+      <p:nvGrpSpPr>
+        <p:cNvPr id="1" name=""/>
+        <p:cNvGrpSpPr/>
+        <p:nvPr/>
+      </p:nvGrpSpPr>
+      <p:grpSpPr>
+        <a:xfrm>
+          <a:off x="0" y="0"/>
+          <a:ext cx="0" cy="0"/>
+          <a:chOff x="0" y="0"/>
+          <a:chExt cx="0" cy="0"/>
+        </a:xfrm>
+      </p:grpSpPr>
+      <p:sp>
+        <p:nvSpPr>
+          <p:cNvPr id="2" name="Slide Image Placeholder 1"/>
+          <p:cNvSpPr>
+            <a:spLocks noGrp="1" noRot="1" noChangeAspect="1"/>
+          </p:cNvSpPr>
+          <p:nvPr>
+            <p:ph type="sldImg"/>
+          </p:nvPr>
+        </p:nvSpPr>
+        <p:spPr/>
+      </p:sp>
+      <p:sp>
+        <p:nvSpPr>
+          <p:cNvPr id="3" name="Notes Placeholder 2"/>
+          <p:cNvSpPr>
+            <a:spLocks noGrp="1"/>
+          </p:cNvSpPr>
+          <p:nvPr>
+            <p:ph type="body" idx="1"/>
+          </p:nvPr>
+        </p:nvSpPr>
+        <p:spPr/>
+        <p:txBody>
+          <a:bodyPr/>
+          <a:lstStyle/>
+          <a:p>
+            <a:endParaRPr lang="en-GB" dirty="0"/>
+          </a:p>
+        </p:txBody>
+      </p:sp>
+      <p:sp>
+        <p:nvSpPr>
+          <p:cNvPr id="4" name="Slide Number Placeholder 3"/>
+          <p:cNvSpPr>
+            <a:spLocks noGrp="1"/>
+          </p:cNvSpPr>
+          <p:nvPr>
+            <p:ph type="sldNum" sz="quarter" idx="5"/>
+          </p:nvPr>
+        </p:nvSpPr>
+        <p:spPr/>
+        <p:txBody>
+          <a:bodyPr/>
+          <a:lstStyle/>
+          <a:p>
+            <a:fld id="{E7E8E24E-2DA5-414D-9B85-6ED9E2618CC6}" type="slidenum">
+              <a:rPr lang="en-GB" smtClean="0"/>
+              <a:t>48</a:t>
+            </a:fld>
+            <a:endParaRPr lang="en-GB"/>
+          </a:p>
+        </p:txBody>
+      </p:sp>
+    </p:spTree>
+    <p:extLst>
+      <p:ext uri="{BB962C8B-B14F-4D97-AF65-F5344CB8AC3E}">
+        <p14:creationId xmlns:p14="http://schemas.microsoft.com/office/powerpoint/2010/main" val="201077094"/>
+      </p:ext>
+    </p:extLst>
+  </p:cSld>
+  <p:clrMapOvr>
+    <a:masterClrMapping/>
+  </p:clrMapOvr>
+</p:notes>
+</file>
+
 <file path=ppt/slideLayouts/slideLayout1.xml><?xml version="1.0" encoding="utf-8"?>
 <p:sldLayout xmlns:a="http://schemas.openxmlformats.org/drawingml/2006/main" xmlns:r="http://schemas.openxmlformats.org/officeDocument/2006/relationships" xmlns:p="http://schemas.openxmlformats.org/presentationml/2006/main" type="title" preserve="1">
   <p:cSld name="Title Slide">
@@ -2649,7 +2739,7 @@
           <a:p>
             <a:fld id="{35275B4F-5DE5-4D53-BD3B-F0C44FE589B2}" type="datetimeFigureOut">
               <a:rPr lang="en-GB" smtClean="0"/>
-              <a:t>27/09/2024</a:t>
+              <a:t>07/10/2024</a:t>
             </a:fld>
             <a:endParaRPr lang="en-GB"/>
           </a:p>
@@ -2849,7 +2939,7 @@
           <a:p>
             <a:fld id="{35275B4F-5DE5-4D53-BD3B-F0C44FE589B2}" type="datetimeFigureOut">
               <a:rPr lang="en-GB" smtClean="0"/>
-              <a:t>27/09/2024</a:t>
+              <a:t>07/10/2024</a:t>
             </a:fld>
             <a:endParaRPr lang="en-GB"/>
           </a:p>
@@ -3059,7 +3149,7 @@
           <a:p>
             <a:fld id="{35275B4F-5DE5-4D53-BD3B-F0C44FE589B2}" type="datetimeFigureOut">
               <a:rPr lang="en-GB" smtClean="0"/>
-              <a:t>27/09/2024</a:t>
+              <a:t>07/10/2024</a:t>
             </a:fld>
             <a:endParaRPr lang="en-GB"/>
           </a:p>
@@ -3259,7 +3349,7 @@
           <a:p>
             <a:fld id="{35275B4F-5DE5-4D53-BD3B-F0C44FE589B2}" type="datetimeFigureOut">
               <a:rPr lang="en-GB" smtClean="0"/>
-              <a:t>27/09/2024</a:t>
+              <a:t>07/10/2024</a:t>
             </a:fld>
             <a:endParaRPr lang="en-GB"/>
           </a:p>
@@ -3535,7 +3625,7 @@
           <a:p>
             <a:fld id="{35275B4F-5DE5-4D53-BD3B-F0C44FE589B2}" type="datetimeFigureOut">
               <a:rPr lang="en-GB" smtClean="0"/>
-              <a:t>27/09/2024</a:t>
+              <a:t>07/10/2024</a:t>
             </a:fld>
             <a:endParaRPr lang="en-GB"/>
           </a:p>
@@ -3803,7 +3893,7 @@
           <a:p>
             <a:fld id="{35275B4F-5DE5-4D53-BD3B-F0C44FE589B2}" type="datetimeFigureOut">
               <a:rPr lang="en-GB" smtClean="0"/>
-              <a:t>27/09/2024</a:t>
+              <a:t>07/10/2024</a:t>
             </a:fld>
             <a:endParaRPr lang="en-GB"/>
           </a:p>
@@ -4218,7 +4308,7 @@
           <a:p>
             <a:fld id="{35275B4F-5DE5-4D53-BD3B-F0C44FE589B2}" type="datetimeFigureOut">
               <a:rPr lang="en-GB" smtClean="0"/>
-              <a:t>27/09/2024</a:t>
+              <a:t>07/10/2024</a:t>
             </a:fld>
             <a:endParaRPr lang="en-GB"/>
           </a:p>
@@ -4360,7 +4450,7 @@
           <a:p>
             <a:fld id="{35275B4F-5DE5-4D53-BD3B-F0C44FE589B2}" type="datetimeFigureOut">
               <a:rPr lang="en-GB" smtClean="0"/>
-              <a:t>27/09/2024</a:t>
+              <a:t>07/10/2024</a:t>
             </a:fld>
             <a:endParaRPr lang="en-GB"/>
           </a:p>
@@ -4473,7 +4563,7 @@
           <a:p>
             <a:fld id="{35275B4F-5DE5-4D53-BD3B-F0C44FE589B2}" type="datetimeFigureOut">
               <a:rPr lang="en-GB" smtClean="0"/>
-              <a:t>27/09/2024</a:t>
+              <a:t>07/10/2024</a:t>
             </a:fld>
             <a:endParaRPr lang="en-GB"/>
           </a:p>
@@ -4786,7 +4876,7 @@
           <a:p>
             <a:fld id="{35275B4F-5DE5-4D53-BD3B-F0C44FE589B2}" type="datetimeFigureOut">
               <a:rPr lang="en-GB" smtClean="0"/>
-              <a:t>27/09/2024</a:t>
+              <a:t>07/10/2024</a:t>
             </a:fld>
             <a:endParaRPr lang="en-GB"/>
           </a:p>
@@ -5075,7 +5165,7 @@
           <a:p>
             <a:fld id="{35275B4F-5DE5-4D53-BD3B-F0C44FE589B2}" type="datetimeFigureOut">
               <a:rPr lang="en-GB" smtClean="0"/>
-              <a:t>27/09/2024</a:t>
+              <a:t>07/10/2024</a:t>
             </a:fld>
             <a:endParaRPr lang="en-GB"/>
           </a:p>
@@ -5318,7 +5408,7 @@
           <a:p>
             <a:fld id="{35275B4F-5DE5-4D53-BD3B-F0C44FE589B2}" type="datetimeFigureOut">
               <a:rPr lang="en-GB" smtClean="0"/>
-              <a:t>27/09/2024</a:t>
+              <a:t>07/10/2024</a:t>
             </a:fld>
             <a:endParaRPr lang="en-GB"/>
           </a:p>
@@ -9019,7 +9109,7 @@
           <p:cNvPr id="2" name="Title 1">
             <a:extLst>
               <a:ext uri="{FF2B5EF4-FFF2-40B4-BE49-F238E27FC236}">
-                <a16:creationId xmlns:a16="http://schemas.microsoft.com/office/drawing/2014/main" id="{DCD86764-00F4-6C9A-2130-D553A9C0F19A}"/>
+                <a16:creationId xmlns:a16="http://schemas.microsoft.com/office/drawing/2014/main" id="{A5469F7B-5F47-517F-D218-DF1E89BBB790}"/>
               </a:ext>
             </a:extLst>
           </p:cNvPr>
@@ -9037,80 +9127,65 @@
           <a:p>
             <a:r>
               <a:rPr lang="en-GB" dirty="0"/>
-              <a:t>Python pre-</a:t>
+              <a:t>Python</a:t>
+            </a:r>
+          </a:p>
+        </p:txBody>
+      </p:sp>
+      <p:sp>
+        <p:nvSpPr>
+          <p:cNvPr id="3" name="Content Placeholder 2">
+            <a:extLst>
+              <a:ext uri="{FF2B5EF4-FFF2-40B4-BE49-F238E27FC236}">
+                <a16:creationId xmlns:a16="http://schemas.microsoft.com/office/drawing/2014/main" id="{D887FE72-3475-5DF9-893F-927B7A1BBC5F}"/>
+              </a:ext>
+            </a:extLst>
+          </p:cNvPr>
+          <p:cNvSpPr>
+            <a:spLocks noGrp="1"/>
+          </p:cNvSpPr>
+          <p:nvPr>
+            <p:ph idx="1"/>
+          </p:nvPr>
+        </p:nvSpPr>
+        <p:spPr/>
+        <p:txBody>
+          <a:bodyPr>
+            <a:normAutofit/>
+          </a:bodyPr>
+          <a:lstStyle/>
+          <a:p>
+            <a:r>
+              <a:rPr lang="en-GB" dirty="0"/>
+              <a:t>Use Anaconda</a:t>
+            </a:r>
+          </a:p>
+          <a:p>
+            <a:r>
+              <a:rPr lang="en-GB" dirty="0"/>
+              <a:t>Use </a:t>
             </a:r>
             <a:r>
               <a:rPr lang="en-GB" dirty="0" err="1"/>
-              <a:t>reqs</a:t>
-            </a:r>
-            <a:endParaRPr lang="en-GB" dirty="0"/>
-          </a:p>
-        </p:txBody>
-      </p:sp>
-      <p:pic>
-        <p:nvPicPr>
-          <p:cNvPr id="5" name="Picture 4">
-            <a:extLst>
-              <a:ext uri="{FF2B5EF4-FFF2-40B4-BE49-F238E27FC236}">
-                <a16:creationId xmlns:a16="http://schemas.microsoft.com/office/drawing/2014/main" id="{C663F566-F2F6-4996-C066-E71C1013515E}"/>
-              </a:ext>
-            </a:extLst>
-          </p:cNvPr>
-          <p:cNvPicPr>
-            <a:picLocks noChangeAspect="1"/>
-          </p:cNvPicPr>
-          <p:nvPr/>
-        </p:nvPicPr>
-        <p:blipFill>
-          <a:blip r:embed="rId2"/>
-          <a:stretch>
-            <a:fillRect/>
-          </a:stretch>
-        </p:blipFill>
-        <p:spPr>
-          <a:xfrm>
-            <a:off x="838200" y="1431753"/>
-            <a:ext cx="9392961" cy="2457793"/>
-          </a:xfrm>
-          <a:prstGeom prst="rect">
-            <a:avLst/>
-          </a:prstGeom>
-        </p:spPr>
-      </p:pic>
-      <p:pic>
-        <p:nvPicPr>
-          <p:cNvPr id="8" name="Picture 7">
-            <a:extLst>
-              <a:ext uri="{FF2B5EF4-FFF2-40B4-BE49-F238E27FC236}">
-                <a16:creationId xmlns:a16="http://schemas.microsoft.com/office/drawing/2014/main" id="{0DA08BAC-BAA2-E123-3A0B-E202C41AC238}"/>
-              </a:ext>
-            </a:extLst>
-          </p:cNvPr>
-          <p:cNvPicPr>
-            <a:picLocks noChangeAspect="1"/>
-          </p:cNvPicPr>
-          <p:nvPr/>
-        </p:nvPicPr>
-        <p:blipFill>
-          <a:blip r:embed="rId3"/>
-          <a:stretch>
-            <a:fillRect/>
-          </a:stretch>
-        </p:blipFill>
-        <p:spPr>
-          <a:xfrm>
-            <a:off x="838200" y="4217883"/>
-            <a:ext cx="4934639" cy="1476581"/>
-          </a:xfrm>
-          <a:prstGeom prst="rect">
-            <a:avLst/>
-          </a:prstGeom>
-        </p:spPr>
-      </p:pic>
+              <a:t>conda</a:t>
+            </a:r>
+            <a:r>
+              <a:rPr lang="en-GB" dirty="0"/>
+              <a:t> to create environment</a:t>
+            </a:r>
+          </a:p>
+          <a:p>
+            <a:r>
+              <a:rPr lang="en-GB" dirty="0"/>
+              <a:t>Might need to enable Long Paths</a:t>
+            </a:r>
+          </a:p>
+        </p:txBody>
+      </p:sp>
     </p:spTree>
     <p:extLst>
       <p:ext uri="{BB962C8B-B14F-4D97-AF65-F5344CB8AC3E}">
-        <p14:creationId xmlns:p14="http://schemas.microsoft.com/office/powerpoint/2010/main" val="2091675727"/>
+        <p14:creationId xmlns:p14="http://schemas.microsoft.com/office/powerpoint/2010/main" val="3256889448"/>
       </p:ext>
     </p:extLst>
   </p:cSld>
@@ -9142,7 +9217,7 @@
           <p:cNvPr id="2" name="Title 1">
             <a:extLst>
               <a:ext uri="{FF2B5EF4-FFF2-40B4-BE49-F238E27FC236}">
-                <a16:creationId xmlns:a16="http://schemas.microsoft.com/office/drawing/2014/main" id="{A5469F7B-5F47-517F-D218-DF1E89BBB790}"/>
+                <a16:creationId xmlns:a16="http://schemas.microsoft.com/office/drawing/2014/main" id="{A46B4437-F99E-881D-8C11-C63B2CC3EA49}"/>
               </a:ext>
             </a:extLst>
           </p:cNvPr>
@@ -9160,59 +9235,45 @@
           <a:p>
             <a:r>
               <a:rPr lang="en-GB" dirty="0"/>
-              <a:t>Python Demo</a:t>
-            </a:r>
-          </a:p>
-        </p:txBody>
-      </p:sp>
-      <p:sp>
-        <p:nvSpPr>
-          <p:cNvPr id="3" name="Content Placeholder 2">
-            <a:extLst>
-              <a:ext uri="{FF2B5EF4-FFF2-40B4-BE49-F238E27FC236}">
-                <a16:creationId xmlns:a16="http://schemas.microsoft.com/office/drawing/2014/main" id="{D887FE72-3475-5DF9-893F-927B7A1BBC5F}"/>
-              </a:ext>
-            </a:extLst>
-          </p:cNvPr>
-          <p:cNvSpPr>
-            <a:spLocks noGrp="1"/>
-          </p:cNvSpPr>
-          <p:nvPr>
-            <p:ph idx="1"/>
-          </p:nvPr>
-        </p:nvSpPr>
-        <p:spPr/>
-        <p:txBody>
-          <a:bodyPr>
-            <a:normAutofit/>
-          </a:bodyPr>
-          <a:lstStyle/>
-          <a:p>
-            <a:r>
-              <a:rPr lang="en-GB" dirty="0"/>
-              <a:t>Install Anaconda</a:t>
-            </a:r>
-          </a:p>
-          <a:p>
-            <a:r>
-              <a:rPr lang="en-GB" dirty="0"/>
-              <a:t>Use </a:t>
-            </a:r>
-            <a:r>
-              <a:rPr lang="en-GB" dirty="0" err="1"/>
-              <a:t>conda</a:t>
-            </a:r>
-            <a:r>
-              <a:rPr lang="en-GB" dirty="0"/>
-              <a:t> to create</a:t>
-            </a:r>
-          </a:p>
-        </p:txBody>
-      </p:sp>
+              <a:t>Anaconda install</a:t>
+            </a:r>
+          </a:p>
+        </p:txBody>
+      </p:sp>
+      <p:pic>
+        <p:nvPicPr>
+          <p:cNvPr id="5" name="Picture 4">
+            <a:extLst>
+              <a:ext uri="{FF2B5EF4-FFF2-40B4-BE49-F238E27FC236}">
+                <a16:creationId xmlns:a16="http://schemas.microsoft.com/office/drawing/2014/main" id="{3E636616-F386-FFD4-F9FB-6B28F76C082E}"/>
+              </a:ext>
+            </a:extLst>
+          </p:cNvPr>
+          <p:cNvPicPr>
+            <a:picLocks noChangeAspect="1"/>
+          </p:cNvPicPr>
+          <p:nvPr/>
+        </p:nvPicPr>
+        <p:blipFill>
+          <a:blip r:embed="rId2"/>
+          <a:stretch>
+            <a:fillRect/>
+          </a:stretch>
+        </p:blipFill>
+        <p:spPr>
+          <a:xfrm>
+            <a:off x="1701475" y="2249242"/>
+            <a:ext cx="4648849" cy="3515216"/>
+          </a:xfrm>
+          <a:prstGeom prst="rect">
+            <a:avLst/>
+          </a:prstGeom>
+        </p:spPr>
+      </p:pic>
     </p:spTree>
     <p:extLst>
       <p:ext uri="{BB962C8B-B14F-4D97-AF65-F5344CB8AC3E}">
-        <p14:creationId xmlns:p14="http://schemas.microsoft.com/office/powerpoint/2010/main" val="3256889448"/>
+        <p14:creationId xmlns:p14="http://schemas.microsoft.com/office/powerpoint/2010/main" val="1102189768"/>
       </p:ext>
     </p:extLst>
   </p:cSld>
@@ -9244,7 +9305,7 @@
           <p:cNvPr id="2" name="Title 1">
             <a:extLst>
               <a:ext uri="{FF2B5EF4-FFF2-40B4-BE49-F238E27FC236}">
-                <a16:creationId xmlns:a16="http://schemas.microsoft.com/office/drawing/2014/main" id="{A46B4437-F99E-881D-8C11-C63B2CC3EA49}"/>
+                <a16:creationId xmlns:a16="http://schemas.microsoft.com/office/drawing/2014/main" id="{08BA6218-7C2E-0654-E7FF-890943A38659}"/>
               </a:ext>
             </a:extLst>
           </p:cNvPr>
@@ -9260,44 +9321,21 @@
           <a:bodyPr/>
           <a:lstStyle/>
           <a:p>
-            <a:endParaRPr lang="en-GB"/>
-          </a:p>
-        </p:txBody>
-      </p:sp>
-      <p:pic>
-        <p:nvPicPr>
-          <p:cNvPr id="5" name="Picture 4">
-            <a:extLst>
-              <a:ext uri="{FF2B5EF4-FFF2-40B4-BE49-F238E27FC236}">
-                <a16:creationId xmlns:a16="http://schemas.microsoft.com/office/drawing/2014/main" id="{3E636616-F386-FFD4-F9FB-6B28F76C082E}"/>
-              </a:ext>
-            </a:extLst>
-          </p:cNvPr>
-          <p:cNvPicPr>
-            <a:picLocks noChangeAspect="1"/>
-          </p:cNvPicPr>
-          <p:nvPr/>
-        </p:nvPicPr>
-        <p:blipFill>
-          <a:blip r:embed="rId2"/>
-          <a:stretch>
-            <a:fillRect/>
-          </a:stretch>
-        </p:blipFill>
-        <p:spPr>
-          <a:xfrm>
-            <a:off x="1701475" y="2249242"/>
-            <a:ext cx="4648849" cy="3515216"/>
-          </a:xfrm>
-          <a:prstGeom prst="rect">
-            <a:avLst/>
-          </a:prstGeom>
-        </p:spPr>
-      </p:pic>
+            <a:r>
+              <a:rPr lang="en-GB" dirty="0" err="1"/>
+              <a:t>Conda</a:t>
+            </a:r>
+            <a:r>
+              <a:rPr lang="en-GB" dirty="0"/>
+              <a:t> demo</a:t>
+            </a:r>
+          </a:p>
+        </p:txBody>
+      </p:sp>
     </p:spTree>
     <p:extLst>
       <p:ext uri="{BB962C8B-B14F-4D97-AF65-F5344CB8AC3E}">
-        <p14:creationId xmlns:p14="http://schemas.microsoft.com/office/powerpoint/2010/main" val="1102189768"/>
+        <p14:creationId xmlns:p14="http://schemas.microsoft.com/office/powerpoint/2010/main" val="349260128"/>
       </p:ext>
     </p:extLst>
   </p:cSld>
@@ -9656,6 +9694,621 @@
           <p:cNvPr id="2" name="Title 1">
             <a:extLst>
               <a:ext uri="{FF2B5EF4-FFF2-40B4-BE49-F238E27FC236}">
+                <a16:creationId xmlns:a16="http://schemas.microsoft.com/office/drawing/2014/main" id="{721D1864-1AA2-D6DD-A480-FBC15302FDFD}"/>
+              </a:ext>
+            </a:extLst>
+          </p:cNvPr>
+          <p:cNvSpPr>
+            <a:spLocks noGrp="1"/>
+          </p:cNvSpPr>
+          <p:nvPr>
+            <p:ph type="title"/>
+          </p:nvPr>
+        </p:nvSpPr>
+        <p:spPr/>
+        <p:txBody>
+          <a:bodyPr/>
+          <a:lstStyle/>
+          <a:p>
+            <a:r>
+              <a:rPr lang="en-GB" dirty="0"/>
+              <a:t>SQL Express!</a:t>
+            </a:r>
+          </a:p>
+        </p:txBody>
+      </p:sp>
+      <p:pic>
+        <p:nvPicPr>
+          <p:cNvPr id="5" name="Picture 4">
+            <a:extLst>
+              <a:ext uri="{FF2B5EF4-FFF2-40B4-BE49-F238E27FC236}">
+                <a16:creationId xmlns:a16="http://schemas.microsoft.com/office/drawing/2014/main" id="{448D210F-2791-BB01-3E4C-209625B18617}"/>
+              </a:ext>
+            </a:extLst>
+          </p:cNvPr>
+          <p:cNvPicPr>
+            <a:picLocks noChangeAspect="1"/>
+          </p:cNvPicPr>
+          <p:nvPr/>
+        </p:nvPicPr>
+        <p:blipFill>
+          <a:blip r:embed="rId2"/>
+          <a:stretch>
+            <a:fillRect/>
+          </a:stretch>
+        </p:blipFill>
+        <p:spPr>
+          <a:xfrm>
+            <a:off x="838200" y="2620727"/>
+            <a:ext cx="7525137" cy="2076557"/>
+          </a:xfrm>
+          <a:prstGeom prst="rect">
+            <a:avLst/>
+          </a:prstGeom>
+        </p:spPr>
+      </p:pic>
+      <p:sp>
+        <p:nvSpPr>
+          <p:cNvPr id="7" name="TextBox 6">
+            <a:extLst>
+              <a:ext uri="{FF2B5EF4-FFF2-40B4-BE49-F238E27FC236}">
+                <a16:creationId xmlns:a16="http://schemas.microsoft.com/office/drawing/2014/main" id="{C2A7AA09-D58C-3AA6-7B91-08BDBC8B6CF0}"/>
+              </a:ext>
+            </a:extLst>
+          </p:cNvPr>
+          <p:cNvSpPr txBox="1"/>
+          <p:nvPr/>
+        </p:nvSpPr>
+        <p:spPr>
+          <a:xfrm>
+            <a:off x="838200" y="1791385"/>
+            <a:ext cx="9296787" cy="369332"/>
+          </a:xfrm>
+          <a:prstGeom prst="rect">
+            <a:avLst/>
+          </a:prstGeom>
+          <a:noFill/>
+        </p:spPr>
+        <p:txBody>
+          <a:bodyPr wrap="square">
+            <a:spAutoFit/>
+          </a:bodyPr>
+          <a:lstStyle/>
+          <a:p>
+            <a:r>
+              <a:rPr lang="en-GB" dirty="0"/>
+              <a:t>https://www.microsoft.com/en-us/download/details.aspx?id=104781&amp;lc=1033</a:t>
+            </a:r>
+          </a:p>
+        </p:txBody>
+      </p:sp>
+    </p:spTree>
+    <p:extLst>
+      <p:ext uri="{BB962C8B-B14F-4D97-AF65-F5344CB8AC3E}">
+        <p14:creationId xmlns:p14="http://schemas.microsoft.com/office/powerpoint/2010/main" val="309386999"/>
+      </p:ext>
+    </p:extLst>
+  </p:cSld>
+  <p:clrMapOvr>
+    <a:masterClrMapping/>
+  </p:clrMapOvr>
+</p:sld>
+</file>
+
+<file path=ppt/slides/slide47.xml><?xml version="1.0" encoding="utf-8"?>
+<p:sld xmlns:a="http://schemas.openxmlformats.org/drawingml/2006/main" xmlns:r="http://schemas.openxmlformats.org/officeDocument/2006/relationships" xmlns:p="http://schemas.openxmlformats.org/presentationml/2006/main">
+  <p:cSld>
+    <p:spTree>
+      <p:nvGrpSpPr>
+        <p:cNvPr id="1" name=""/>
+        <p:cNvGrpSpPr/>
+        <p:nvPr/>
+      </p:nvGrpSpPr>
+      <p:grpSpPr>
+        <a:xfrm>
+          <a:off x="0" y="0"/>
+          <a:ext cx="0" cy="0"/>
+          <a:chOff x="0" y="0"/>
+          <a:chExt cx="0" cy="0"/>
+        </a:xfrm>
+      </p:grpSpPr>
+      <p:sp>
+        <p:nvSpPr>
+          <p:cNvPr id="2" name="Title 1">
+            <a:extLst>
+              <a:ext uri="{FF2B5EF4-FFF2-40B4-BE49-F238E27FC236}">
+                <a16:creationId xmlns:a16="http://schemas.microsoft.com/office/drawing/2014/main" id="{E54C7220-D4E8-C4CE-9F41-17CBBA3E9D1F}"/>
+              </a:ext>
+            </a:extLst>
+          </p:cNvPr>
+          <p:cNvSpPr>
+            <a:spLocks noGrp="1"/>
+          </p:cNvSpPr>
+          <p:nvPr>
+            <p:ph type="title"/>
+          </p:nvPr>
+        </p:nvSpPr>
+        <p:spPr/>
+        <p:txBody>
+          <a:bodyPr/>
+          <a:lstStyle/>
+          <a:p>
+            <a:endParaRPr lang="en-GB"/>
+          </a:p>
+        </p:txBody>
+      </p:sp>
+      <p:pic>
+        <p:nvPicPr>
+          <p:cNvPr id="5" name="Picture 4">
+            <a:extLst>
+              <a:ext uri="{FF2B5EF4-FFF2-40B4-BE49-F238E27FC236}">
+                <a16:creationId xmlns:a16="http://schemas.microsoft.com/office/drawing/2014/main" id="{1DE6EA73-5C07-A441-9C79-2FAF0206876C}"/>
+              </a:ext>
+            </a:extLst>
+          </p:cNvPr>
+          <p:cNvPicPr>
+            <a:picLocks noChangeAspect="1"/>
+          </p:cNvPicPr>
+          <p:nvPr/>
+        </p:nvPicPr>
+        <p:blipFill>
+          <a:blip r:embed="rId2"/>
+          <a:stretch>
+            <a:fillRect/>
+          </a:stretch>
+        </p:blipFill>
+        <p:spPr>
+          <a:xfrm>
+            <a:off x="2197359" y="1549342"/>
+            <a:ext cx="7550538" cy="2235315"/>
+          </a:xfrm>
+          <a:prstGeom prst="rect">
+            <a:avLst/>
+          </a:prstGeom>
+        </p:spPr>
+      </p:pic>
+      <p:pic>
+        <p:nvPicPr>
+          <p:cNvPr id="7" name="Picture 6">
+            <a:extLst>
+              <a:ext uri="{FF2B5EF4-FFF2-40B4-BE49-F238E27FC236}">
+                <a16:creationId xmlns:a16="http://schemas.microsoft.com/office/drawing/2014/main" id="{357DCD06-D3F9-B3E6-6147-8B555688ED76}"/>
+              </a:ext>
+            </a:extLst>
+          </p:cNvPr>
+          <p:cNvPicPr>
+            <a:picLocks noChangeAspect="1"/>
+          </p:cNvPicPr>
+          <p:nvPr/>
+        </p:nvPicPr>
+        <p:blipFill>
+          <a:blip r:embed="rId3"/>
+          <a:stretch>
+            <a:fillRect/>
+          </a:stretch>
+        </p:blipFill>
+        <p:spPr>
+          <a:xfrm>
+            <a:off x="2197359" y="4302102"/>
+            <a:ext cx="2921150" cy="895396"/>
+          </a:xfrm>
+          <a:prstGeom prst="rect">
+            <a:avLst/>
+          </a:prstGeom>
+        </p:spPr>
+      </p:pic>
+      <p:pic>
+        <p:nvPicPr>
+          <p:cNvPr id="9" name="Picture 8">
+            <a:extLst>
+              <a:ext uri="{FF2B5EF4-FFF2-40B4-BE49-F238E27FC236}">
+                <a16:creationId xmlns:a16="http://schemas.microsoft.com/office/drawing/2014/main" id="{C0E1A8B2-FE52-27DA-F7DB-CAD822372C31}"/>
+              </a:ext>
+            </a:extLst>
+          </p:cNvPr>
+          <p:cNvPicPr>
+            <a:picLocks noChangeAspect="1"/>
+          </p:cNvPicPr>
+          <p:nvPr/>
+        </p:nvPicPr>
+        <p:blipFill>
+          <a:blip r:embed="rId4"/>
+          <a:stretch>
+            <a:fillRect/>
+          </a:stretch>
+        </p:blipFill>
+        <p:spPr>
+          <a:xfrm>
+            <a:off x="2197359" y="5714943"/>
+            <a:ext cx="2254366" cy="806491"/>
+          </a:xfrm>
+          <a:prstGeom prst="rect">
+            <a:avLst/>
+          </a:prstGeom>
+        </p:spPr>
+      </p:pic>
+    </p:spTree>
+    <p:extLst>
+      <p:ext uri="{BB962C8B-B14F-4D97-AF65-F5344CB8AC3E}">
+        <p14:creationId xmlns:p14="http://schemas.microsoft.com/office/powerpoint/2010/main" val="2308371639"/>
+      </p:ext>
+    </p:extLst>
+  </p:cSld>
+  <p:clrMapOvr>
+    <a:masterClrMapping/>
+  </p:clrMapOvr>
+</p:sld>
+</file>
+
+<file path=ppt/slides/slide48.xml><?xml version="1.0" encoding="utf-8"?>
+<p:sld xmlns:a="http://schemas.openxmlformats.org/drawingml/2006/main" xmlns:r="http://schemas.openxmlformats.org/officeDocument/2006/relationships" xmlns:p="http://schemas.openxmlformats.org/presentationml/2006/main">
+  <p:cSld>
+    <p:spTree>
+      <p:nvGrpSpPr>
+        <p:cNvPr id="1" name=""/>
+        <p:cNvGrpSpPr/>
+        <p:nvPr/>
+      </p:nvGrpSpPr>
+      <p:grpSpPr>
+        <a:xfrm>
+          <a:off x="0" y="0"/>
+          <a:ext cx="0" cy="0"/>
+          <a:chOff x="0" y="0"/>
+          <a:chExt cx="0" cy="0"/>
+        </a:xfrm>
+      </p:grpSpPr>
+      <p:sp>
+        <p:nvSpPr>
+          <p:cNvPr id="2" name="Title 1">
+            <a:extLst>
+              <a:ext uri="{FF2B5EF4-FFF2-40B4-BE49-F238E27FC236}">
+                <a16:creationId xmlns:a16="http://schemas.microsoft.com/office/drawing/2014/main" id="{C3969D66-3483-9BE2-7840-401EA06DCA64}"/>
+              </a:ext>
+            </a:extLst>
+          </p:cNvPr>
+          <p:cNvSpPr>
+            <a:spLocks noGrp="1"/>
+          </p:cNvSpPr>
+          <p:nvPr>
+            <p:ph type="title"/>
+          </p:nvPr>
+        </p:nvSpPr>
+        <p:spPr/>
+        <p:txBody>
+          <a:bodyPr/>
+          <a:lstStyle/>
+          <a:p>
+            <a:endParaRPr lang="en-GB"/>
+          </a:p>
+        </p:txBody>
+      </p:sp>
+      <p:pic>
+        <p:nvPicPr>
+          <p:cNvPr id="5" name="Picture 4">
+            <a:extLst>
+              <a:ext uri="{FF2B5EF4-FFF2-40B4-BE49-F238E27FC236}">
+                <a16:creationId xmlns:a16="http://schemas.microsoft.com/office/drawing/2014/main" id="{2A36F57A-EBEF-472A-C1FC-9EA3E640B70A}"/>
+              </a:ext>
+            </a:extLst>
+          </p:cNvPr>
+          <p:cNvPicPr>
+            <a:picLocks noChangeAspect="1"/>
+          </p:cNvPicPr>
+          <p:nvPr/>
+        </p:nvPicPr>
+        <p:blipFill>
+          <a:blip r:embed="rId3"/>
+          <a:stretch>
+            <a:fillRect/>
+          </a:stretch>
+        </p:blipFill>
+        <p:spPr>
+          <a:xfrm>
+            <a:off x="838200" y="2042237"/>
+            <a:ext cx="2959252" cy="3187864"/>
+          </a:xfrm>
+          <a:prstGeom prst="rect">
+            <a:avLst/>
+          </a:prstGeom>
+        </p:spPr>
+      </p:pic>
+    </p:spTree>
+    <p:extLst>
+      <p:ext uri="{BB962C8B-B14F-4D97-AF65-F5344CB8AC3E}">
+        <p14:creationId xmlns:p14="http://schemas.microsoft.com/office/powerpoint/2010/main" val="2682671986"/>
+      </p:ext>
+    </p:extLst>
+  </p:cSld>
+  <p:clrMapOvr>
+    <a:masterClrMapping/>
+  </p:clrMapOvr>
+</p:sld>
+</file>
+
+<file path=ppt/slides/slide49.xml><?xml version="1.0" encoding="utf-8"?>
+<p:sld xmlns:a="http://schemas.openxmlformats.org/drawingml/2006/main" xmlns:r="http://schemas.openxmlformats.org/officeDocument/2006/relationships" xmlns:p="http://schemas.openxmlformats.org/presentationml/2006/main">
+  <p:cSld>
+    <p:spTree>
+      <p:nvGrpSpPr>
+        <p:cNvPr id="1" name=""/>
+        <p:cNvGrpSpPr/>
+        <p:nvPr/>
+      </p:nvGrpSpPr>
+      <p:grpSpPr>
+        <a:xfrm>
+          <a:off x="0" y="0"/>
+          <a:ext cx="0" cy="0"/>
+          <a:chOff x="0" y="0"/>
+          <a:chExt cx="0" cy="0"/>
+        </a:xfrm>
+      </p:grpSpPr>
+      <p:sp>
+        <p:nvSpPr>
+          <p:cNvPr id="2" name="Title 1">
+            <a:extLst>
+              <a:ext uri="{FF2B5EF4-FFF2-40B4-BE49-F238E27FC236}">
+                <a16:creationId xmlns:a16="http://schemas.microsoft.com/office/drawing/2014/main" id="{F9730C1D-834B-610B-0E29-AE24F94D4143}"/>
+              </a:ext>
+            </a:extLst>
+          </p:cNvPr>
+          <p:cNvSpPr>
+            <a:spLocks noGrp="1"/>
+          </p:cNvSpPr>
+          <p:nvPr>
+            <p:ph type="title"/>
+          </p:nvPr>
+        </p:nvSpPr>
+        <p:spPr/>
+        <p:txBody>
+          <a:bodyPr/>
+          <a:lstStyle/>
+          <a:p>
+            <a:endParaRPr lang="en-GB"/>
+          </a:p>
+        </p:txBody>
+      </p:sp>
+      <p:pic>
+        <p:nvPicPr>
+          <p:cNvPr id="7" name="Picture 6">
+            <a:extLst>
+              <a:ext uri="{FF2B5EF4-FFF2-40B4-BE49-F238E27FC236}">
+                <a16:creationId xmlns:a16="http://schemas.microsoft.com/office/drawing/2014/main" id="{84D8D550-260F-0F03-0F0E-8FB1893DB52E}"/>
+              </a:ext>
+            </a:extLst>
+          </p:cNvPr>
+          <p:cNvPicPr>
+            <a:picLocks noChangeAspect="1"/>
+          </p:cNvPicPr>
+          <p:nvPr/>
+        </p:nvPicPr>
+        <p:blipFill>
+          <a:blip r:embed="rId2"/>
+          <a:stretch>
+            <a:fillRect/>
+          </a:stretch>
+        </p:blipFill>
+        <p:spPr>
+          <a:xfrm>
+            <a:off x="3685605" y="1366482"/>
+            <a:ext cx="4559534" cy="5010407"/>
+          </a:xfrm>
+          <a:prstGeom prst="rect">
+            <a:avLst/>
+          </a:prstGeom>
+        </p:spPr>
+      </p:pic>
+    </p:spTree>
+    <p:extLst>
+      <p:ext uri="{BB962C8B-B14F-4D97-AF65-F5344CB8AC3E}">
+        <p14:creationId xmlns:p14="http://schemas.microsoft.com/office/powerpoint/2010/main" val="3024344180"/>
+      </p:ext>
+    </p:extLst>
+  </p:cSld>
+  <p:clrMapOvr>
+    <a:masterClrMapping/>
+  </p:clrMapOvr>
+</p:sld>
+</file>
+
+<file path=ppt/slides/slide5.xml><?xml version="1.0" encoding="utf-8"?>
+<p:sld xmlns:a="http://schemas.openxmlformats.org/drawingml/2006/main" xmlns:r="http://schemas.openxmlformats.org/officeDocument/2006/relationships" xmlns:p="http://schemas.openxmlformats.org/presentationml/2006/main">
+  <p:cSld>
+    <p:spTree>
+      <p:nvGrpSpPr>
+        <p:cNvPr id="1" name=""/>
+        <p:cNvGrpSpPr/>
+        <p:nvPr/>
+      </p:nvGrpSpPr>
+      <p:grpSpPr>
+        <a:xfrm>
+          <a:off x="0" y="0"/>
+          <a:ext cx="0" cy="0"/>
+          <a:chOff x="0" y="0"/>
+          <a:chExt cx="0" cy="0"/>
+        </a:xfrm>
+      </p:grpSpPr>
+      <p:sp>
+        <p:nvSpPr>
+          <p:cNvPr id="2" name="Title 1">
+            <a:extLst>
+              <a:ext uri="{FF2B5EF4-FFF2-40B4-BE49-F238E27FC236}">
+                <a16:creationId xmlns:a16="http://schemas.microsoft.com/office/drawing/2014/main" id="{9831B8CC-CE63-2632-A79B-DF312B723DB2}"/>
+              </a:ext>
+            </a:extLst>
+          </p:cNvPr>
+          <p:cNvSpPr>
+            <a:spLocks noGrp="1"/>
+          </p:cNvSpPr>
+          <p:nvPr>
+            <p:ph type="title"/>
+          </p:nvPr>
+        </p:nvSpPr>
+        <p:spPr/>
+        <p:txBody>
+          <a:bodyPr/>
+          <a:lstStyle/>
+          <a:p>
+            <a:r>
+              <a:rPr lang="en-GB" dirty="0"/>
+              <a:t>VS Code</a:t>
+            </a:r>
+          </a:p>
+        </p:txBody>
+      </p:sp>
+      <p:sp>
+        <p:nvSpPr>
+          <p:cNvPr id="3" name="Content Placeholder 2">
+            <a:extLst>
+              <a:ext uri="{FF2B5EF4-FFF2-40B4-BE49-F238E27FC236}">
+                <a16:creationId xmlns:a16="http://schemas.microsoft.com/office/drawing/2014/main" id="{B5E4477C-CAAB-ABF9-981B-11DA484523CD}"/>
+              </a:ext>
+            </a:extLst>
+          </p:cNvPr>
+          <p:cNvSpPr>
+            <a:spLocks noGrp="1"/>
+          </p:cNvSpPr>
+          <p:nvPr>
+            <p:ph idx="1"/>
+          </p:nvPr>
+        </p:nvSpPr>
+        <p:spPr/>
+        <p:txBody>
+          <a:bodyPr/>
+          <a:lstStyle/>
+          <a:p>
+            <a:endParaRPr lang="en-GB"/>
+          </a:p>
+        </p:txBody>
+      </p:sp>
+    </p:spTree>
+    <p:extLst>
+      <p:ext uri="{BB962C8B-B14F-4D97-AF65-F5344CB8AC3E}">
+        <p14:creationId xmlns:p14="http://schemas.microsoft.com/office/powerpoint/2010/main" val="3080502177"/>
+      </p:ext>
+    </p:extLst>
+  </p:cSld>
+  <p:clrMapOvr>
+    <a:masterClrMapping/>
+  </p:clrMapOvr>
+</p:sld>
+</file>
+
+<file path=ppt/slides/slide50.xml><?xml version="1.0" encoding="utf-8"?>
+<p:sld xmlns:a="http://schemas.openxmlformats.org/drawingml/2006/main" xmlns:r="http://schemas.openxmlformats.org/officeDocument/2006/relationships" xmlns:p="http://schemas.openxmlformats.org/presentationml/2006/main">
+  <p:cSld>
+    <p:spTree>
+      <p:nvGrpSpPr>
+        <p:cNvPr id="1" name=""/>
+        <p:cNvGrpSpPr/>
+        <p:nvPr/>
+      </p:nvGrpSpPr>
+      <p:grpSpPr>
+        <a:xfrm>
+          <a:off x="0" y="0"/>
+          <a:ext cx="0" cy="0"/>
+          <a:chOff x="0" y="0"/>
+          <a:chExt cx="0" cy="0"/>
+        </a:xfrm>
+      </p:grpSpPr>
+      <p:sp>
+        <p:nvSpPr>
+          <p:cNvPr id="2" name="Title 1">
+            <a:extLst>
+              <a:ext uri="{FF2B5EF4-FFF2-40B4-BE49-F238E27FC236}">
+                <a16:creationId xmlns:a16="http://schemas.microsoft.com/office/drawing/2014/main" id="{E4048C8B-7E17-501E-E69D-E0441C9CC7E9}"/>
+              </a:ext>
+            </a:extLst>
+          </p:cNvPr>
+          <p:cNvSpPr>
+            <a:spLocks noGrp="1"/>
+          </p:cNvSpPr>
+          <p:nvPr>
+            <p:ph type="title"/>
+          </p:nvPr>
+        </p:nvSpPr>
+        <p:spPr/>
+        <p:txBody>
+          <a:bodyPr/>
+          <a:lstStyle/>
+          <a:p>
+            <a:endParaRPr lang="en-GB"/>
+          </a:p>
+        </p:txBody>
+      </p:sp>
+      <p:sp>
+        <p:nvSpPr>
+          <p:cNvPr id="3" name="Content Placeholder 2">
+            <a:extLst>
+              <a:ext uri="{FF2B5EF4-FFF2-40B4-BE49-F238E27FC236}">
+                <a16:creationId xmlns:a16="http://schemas.microsoft.com/office/drawing/2014/main" id="{06C03778-3C7D-68FE-3C89-CE3F1EFD313F}"/>
+              </a:ext>
+            </a:extLst>
+          </p:cNvPr>
+          <p:cNvSpPr>
+            <a:spLocks noGrp="1"/>
+          </p:cNvSpPr>
+          <p:nvPr>
+            <p:ph idx="1"/>
+          </p:nvPr>
+        </p:nvSpPr>
+        <p:spPr/>
+        <p:txBody>
+          <a:bodyPr/>
+          <a:lstStyle/>
+          <a:p>
+            <a:r>
+              <a:rPr lang="en-GB" dirty="0"/>
+              <a:t>Download JDBC driver</a:t>
+            </a:r>
+            <a:r>
+              <a:rPr lang="en-GB"/>
+              <a:t>: https://repo1.maven.org/maven2/com/microsoft/azure/spark-mssql-connector_2.12/1.2.0/spark-mssql-connector_2.12-1.2.0.jar</a:t>
+            </a:r>
+            <a:endParaRPr lang="en-GB" dirty="0"/>
+          </a:p>
+          <a:p>
+            <a:r>
+              <a:rPr lang="en-GB" dirty="0"/>
+              <a:t>Copy jar file to anaconda jars folder</a:t>
+            </a:r>
+          </a:p>
+        </p:txBody>
+      </p:sp>
+    </p:spTree>
+    <p:extLst>
+      <p:ext uri="{BB962C8B-B14F-4D97-AF65-F5344CB8AC3E}">
+        <p14:creationId xmlns:p14="http://schemas.microsoft.com/office/powerpoint/2010/main" val="4018909052"/>
+      </p:ext>
+    </p:extLst>
+  </p:cSld>
+  <p:clrMapOvr>
+    <a:masterClrMapping/>
+  </p:clrMapOvr>
+</p:sld>
+</file>
+
+<file path=ppt/slides/slide51.xml><?xml version="1.0" encoding="utf-8"?>
+<p:sld xmlns:a="http://schemas.openxmlformats.org/drawingml/2006/main" xmlns:r="http://schemas.openxmlformats.org/officeDocument/2006/relationships" xmlns:p="http://schemas.openxmlformats.org/presentationml/2006/main">
+  <p:cSld>
+    <p:spTree>
+      <p:nvGrpSpPr>
+        <p:cNvPr id="1" name=""/>
+        <p:cNvGrpSpPr/>
+        <p:nvPr/>
+      </p:nvGrpSpPr>
+      <p:grpSpPr>
+        <a:xfrm>
+          <a:off x="0" y="0"/>
+          <a:ext cx="0" cy="0"/>
+          <a:chOff x="0" y="0"/>
+          <a:chExt cx="0" cy="0"/>
+        </a:xfrm>
+      </p:grpSpPr>
+      <p:sp>
+        <p:nvSpPr>
+          <p:cNvPr id="2" name="Title 1">
+            <a:extLst>
+              <a:ext uri="{FF2B5EF4-FFF2-40B4-BE49-F238E27FC236}">
                 <a16:creationId xmlns:a16="http://schemas.microsoft.com/office/drawing/2014/main" id="{6461F12C-8296-BADA-FD56-149E96554D1E}"/>
               </a:ext>
             </a:extLst>
@@ -9700,7 +10353,130 @@
 </p:sld>
 </file>
 
-<file path=ppt/slides/slide47.xml><?xml version="1.0" encoding="utf-8"?>
+<file path=ppt/slides/slide52.xml><?xml version="1.0" encoding="utf-8"?>
+<p:sld xmlns:a="http://schemas.openxmlformats.org/drawingml/2006/main" xmlns:r="http://schemas.openxmlformats.org/officeDocument/2006/relationships" xmlns:p="http://schemas.openxmlformats.org/presentationml/2006/main">
+  <p:cSld>
+    <p:spTree>
+      <p:nvGrpSpPr>
+        <p:cNvPr id="1" name=""/>
+        <p:cNvGrpSpPr/>
+        <p:nvPr/>
+      </p:nvGrpSpPr>
+      <p:grpSpPr>
+        <a:xfrm>
+          <a:off x="0" y="0"/>
+          <a:ext cx="0" cy="0"/>
+          <a:chOff x="0" y="0"/>
+          <a:chExt cx="0" cy="0"/>
+        </a:xfrm>
+      </p:grpSpPr>
+      <p:sp>
+        <p:nvSpPr>
+          <p:cNvPr id="2" name="Title 1">
+            <a:extLst>
+              <a:ext uri="{FF2B5EF4-FFF2-40B4-BE49-F238E27FC236}">
+                <a16:creationId xmlns:a16="http://schemas.microsoft.com/office/drawing/2014/main" id="{DCD86764-00F4-6C9A-2130-D553A9C0F19A}"/>
+              </a:ext>
+            </a:extLst>
+          </p:cNvPr>
+          <p:cNvSpPr>
+            <a:spLocks noGrp="1"/>
+          </p:cNvSpPr>
+          <p:nvPr>
+            <p:ph type="title"/>
+          </p:nvPr>
+        </p:nvSpPr>
+        <p:spPr/>
+        <p:txBody>
+          <a:bodyPr/>
+          <a:lstStyle/>
+          <a:p>
+            <a:r>
+              <a:rPr lang="en-GB" dirty="0"/>
+              <a:t>Python pre-</a:t>
+            </a:r>
+            <a:r>
+              <a:rPr lang="en-GB" dirty="0" err="1"/>
+              <a:t>reqs</a:t>
+            </a:r>
+            <a:endParaRPr lang="en-GB" dirty="0"/>
+          </a:p>
+        </p:txBody>
+      </p:sp>
+      <p:pic>
+        <p:nvPicPr>
+          <p:cNvPr id="5" name="Picture 4">
+            <a:extLst>
+              <a:ext uri="{FF2B5EF4-FFF2-40B4-BE49-F238E27FC236}">
+                <a16:creationId xmlns:a16="http://schemas.microsoft.com/office/drawing/2014/main" id="{C663F566-F2F6-4996-C066-E71C1013515E}"/>
+              </a:ext>
+            </a:extLst>
+          </p:cNvPr>
+          <p:cNvPicPr>
+            <a:picLocks noChangeAspect="1"/>
+          </p:cNvPicPr>
+          <p:nvPr/>
+        </p:nvPicPr>
+        <p:blipFill>
+          <a:blip r:embed="rId2"/>
+          <a:stretch>
+            <a:fillRect/>
+          </a:stretch>
+        </p:blipFill>
+        <p:spPr>
+          <a:xfrm>
+            <a:off x="838200" y="1431753"/>
+            <a:ext cx="9392961" cy="2457793"/>
+          </a:xfrm>
+          <a:prstGeom prst="rect">
+            <a:avLst/>
+          </a:prstGeom>
+        </p:spPr>
+      </p:pic>
+      <p:pic>
+        <p:nvPicPr>
+          <p:cNvPr id="8" name="Picture 7">
+            <a:extLst>
+              <a:ext uri="{FF2B5EF4-FFF2-40B4-BE49-F238E27FC236}">
+                <a16:creationId xmlns:a16="http://schemas.microsoft.com/office/drawing/2014/main" id="{0DA08BAC-BAA2-E123-3A0B-E202C41AC238}"/>
+              </a:ext>
+            </a:extLst>
+          </p:cNvPr>
+          <p:cNvPicPr>
+            <a:picLocks noChangeAspect="1"/>
+          </p:cNvPicPr>
+          <p:nvPr/>
+        </p:nvPicPr>
+        <p:blipFill>
+          <a:blip r:embed="rId3"/>
+          <a:stretch>
+            <a:fillRect/>
+          </a:stretch>
+        </p:blipFill>
+        <p:spPr>
+          <a:xfrm>
+            <a:off x="838200" y="4217883"/>
+            <a:ext cx="4934639" cy="1476581"/>
+          </a:xfrm>
+          <a:prstGeom prst="rect">
+            <a:avLst/>
+          </a:prstGeom>
+        </p:spPr>
+      </p:pic>
+    </p:spTree>
+    <p:extLst>
+      <p:ext uri="{BB962C8B-B14F-4D97-AF65-F5344CB8AC3E}">
+        <p14:creationId xmlns:p14="http://schemas.microsoft.com/office/powerpoint/2010/main" val="2091675727"/>
+      </p:ext>
+    </p:extLst>
+  </p:cSld>
+  <p:clrMapOvr>
+    <a:masterClrMapping/>
+  </p:clrMapOvr>
+</p:sld>
+</file>
+
+<file path=ppt/slides/slide53.xml><?xml version="1.0" encoding="utf-8"?>
 <p:sld xmlns:a="http://schemas.openxmlformats.org/drawingml/2006/main" xmlns:r="http://schemas.openxmlformats.org/officeDocument/2006/relationships" xmlns:p="http://schemas.openxmlformats.org/presentationml/2006/main">
   <p:cSld>
     <p:spTree>
@@ -9815,7 +10591,7 @@
 </p:sld>
 </file>
 
-<file path=ppt/slides/slide48.xml><?xml version="1.0" encoding="utf-8"?>
+<file path=ppt/slides/slide54.xml><?xml version="1.0" encoding="utf-8"?>
 <p:sld xmlns:a="http://schemas.openxmlformats.org/drawingml/2006/main" xmlns:r="http://schemas.openxmlformats.org/officeDocument/2006/relationships" xmlns:p="http://schemas.openxmlformats.org/presentationml/2006/main">
   <p:cSld>
     <p:spTree>
@@ -9905,7 +10681,7 @@
 </p:sld>
 </file>
 
-<file path=ppt/slides/slide49.xml><?xml version="1.0" encoding="utf-8"?>
+<file path=ppt/slides/slide55.xml><?xml version="1.0" encoding="utf-8"?>
 <p:sld xmlns:a="http://schemas.openxmlformats.org/drawingml/2006/main" xmlns:r="http://schemas.openxmlformats.org/officeDocument/2006/relationships" xmlns:p="http://schemas.openxmlformats.org/presentationml/2006/main">
   <p:cSld>
     <p:spTree>
@@ -9995,90 +10771,7 @@
 </p:sld>
 </file>
 
-<file path=ppt/slides/slide5.xml><?xml version="1.0" encoding="utf-8"?>
-<p:sld xmlns:a="http://schemas.openxmlformats.org/drawingml/2006/main" xmlns:r="http://schemas.openxmlformats.org/officeDocument/2006/relationships" xmlns:p="http://schemas.openxmlformats.org/presentationml/2006/main">
-  <p:cSld>
-    <p:spTree>
-      <p:nvGrpSpPr>
-        <p:cNvPr id="1" name=""/>
-        <p:cNvGrpSpPr/>
-        <p:nvPr/>
-      </p:nvGrpSpPr>
-      <p:grpSpPr>
-        <a:xfrm>
-          <a:off x="0" y="0"/>
-          <a:ext cx="0" cy="0"/>
-          <a:chOff x="0" y="0"/>
-          <a:chExt cx="0" cy="0"/>
-        </a:xfrm>
-      </p:grpSpPr>
-      <p:sp>
-        <p:nvSpPr>
-          <p:cNvPr id="2" name="Title 1">
-            <a:extLst>
-              <a:ext uri="{FF2B5EF4-FFF2-40B4-BE49-F238E27FC236}">
-                <a16:creationId xmlns:a16="http://schemas.microsoft.com/office/drawing/2014/main" id="{9831B8CC-CE63-2632-A79B-DF312B723DB2}"/>
-              </a:ext>
-            </a:extLst>
-          </p:cNvPr>
-          <p:cNvSpPr>
-            <a:spLocks noGrp="1"/>
-          </p:cNvSpPr>
-          <p:nvPr>
-            <p:ph type="title"/>
-          </p:nvPr>
-        </p:nvSpPr>
-        <p:spPr/>
-        <p:txBody>
-          <a:bodyPr/>
-          <a:lstStyle/>
-          <a:p>
-            <a:r>
-              <a:rPr lang="en-GB" dirty="0"/>
-              <a:t>VS Code</a:t>
-            </a:r>
-          </a:p>
-        </p:txBody>
-      </p:sp>
-      <p:sp>
-        <p:nvSpPr>
-          <p:cNvPr id="3" name="Content Placeholder 2">
-            <a:extLst>
-              <a:ext uri="{FF2B5EF4-FFF2-40B4-BE49-F238E27FC236}">
-                <a16:creationId xmlns:a16="http://schemas.microsoft.com/office/drawing/2014/main" id="{B5E4477C-CAAB-ABF9-981B-11DA484523CD}"/>
-              </a:ext>
-            </a:extLst>
-          </p:cNvPr>
-          <p:cNvSpPr>
-            <a:spLocks noGrp="1"/>
-          </p:cNvSpPr>
-          <p:nvPr>
-            <p:ph idx="1"/>
-          </p:nvPr>
-        </p:nvSpPr>
-        <p:spPr/>
-        <p:txBody>
-          <a:bodyPr/>
-          <a:lstStyle/>
-          <a:p>
-            <a:endParaRPr lang="en-GB"/>
-          </a:p>
-        </p:txBody>
-      </p:sp>
-    </p:spTree>
-    <p:extLst>
-      <p:ext uri="{BB962C8B-B14F-4D97-AF65-F5344CB8AC3E}">
-        <p14:creationId xmlns:p14="http://schemas.microsoft.com/office/powerpoint/2010/main" val="3080502177"/>
-      </p:ext>
-    </p:extLst>
-  </p:cSld>
-  <p:clrMapOvr>
-    <a:masterClrMapping/>
-  </p:clrMapOvr>
-</p:sld>
-</file>
-
-<file path=ppt/slides/slide50.xml><?xml version="1.0" encoding="utf-8"?>
+<file path=ppt/slides/slide56.xml><?xml version="1.0" encoding="utf-8"?>
 <p:sld xmlns:a="http://schemas.openxmlformats.org/drawingml/2006/main" xmlns:r="http://schemas.openxmlformats.org/officeDocument/2006/relationships" xmlns:p="http://schemas.openxmlformats.org/presentationml/2006/main">
   <p:cSld>
     <p:spTree>
@@ -10138,7 +10831,7 @@
 </p:sld>
 </file>
 
-<file path=ppt/slides/slide51.xml><?xml version="1.0" encoding="utf-8"?>
+<file path=ppt/slides/slide57.xml><?xml version="1.0" encoding="utf-8"?>
 <p:sld xmlns:a="http://schemas.openxmlformats.org/drawingml/2006/main" xmlns:r="http://schemas.openxmlformats.org/officeDocument/2006/relationships" xmlns:p="http://schemas.openxmlformats.org/presentationml/2006/main">
   <p:cSld>
     <p:spTree>
@@ -10226,7 +10919,7 @@
 </p:sld>
 </file>
 
-<file path=ppt/slides/slide52.xml><?xml version="1.0" encoding="utf-8"?>
+<file path=ppt/slides/slide58.xml><?xml version="1.0" encoding="utf-8"?>
 <p:sld xmlns:a="http://schemas.openxmlformats.org/drawingml/2006/main" xmlns:r="http://schemas.openxmlformats.org/officeDocument/2006/relationships" xmlns:p="http://schemas.openxmlformats.org/presentationml/2006/main">
   <p:cSld>
     <p:spTree>
@@ -10319,7 +11012,7 @@
 </p:sld>
 </file>
 
-<file path=ppt/slides/slide53.xml><?xml version="1.0" encoding="utf-8"?>
+<file path=ppt/slides/slide59.xml><?xml version="1.0" encoding="utf-8"?>
 <p:sld xmlns:a="http://schemas.openxmlformats.org/drawingml/2006/main" xmlns:r="http://schemas.openxmlformats.org/officeDocument/2006/relationships" xmlns:p="http://schemas.openxmlformats.org/presentationml/2006/main">
   <p:cSld>
     <p:spTree>
@@ -10406,7 +11099,147 @@
 </p:sld>
 </file>
 
-<file path=ppt/slides/slide54.xml><?xml version="1.0" encoding="utf-8"?>
+<file path=ppt/slides/slide6.xml><?xml version="1.0" encoding="utf-8"?>
+<p:sld xmlns:a="http://schemas.openxmlformats.org/drawingml/2006/main" xmlns:r="http://schemas.openxmlformats.org/officeDocument/2006/relationships" xmlns:p="http://schemas.openxmlformats.org/presentationml/2006/main">
+  <p:cSld>
+    <p:spTree>
+      <p:nvGrpSpPr>
+        <p:cNvPr id="1" name=""/>
+        <p:cNvGrpSpPr/>
+        <p:nvPr/>
+      </p:nvGrpSpPr>
+      <p:grpSpPr>
+        <a:xfrm>
+          <a:off x="0" y="0"/>
+          <a:ext cx="0" cy="0"/>
+          <a:chOff x="0" y="0"/>
+          <a:chExt cx="0" cy="0"/>
+        </a:xfrm>
+      </p:grpSpPr>
+      <p:sp>
+        <p:nvSpPr>
+          <p:cNvPr id="2" name="Title 1">
+            <a:extLst>
+              <a:ext uri="{FF2B5EF4-FFF2-40B4-BE49-F238E27FC236}">
+                <a16:creationId xmlns:a16="http://schemas.microsoft.com/office/drawing/2014/main" id="{838AC0F5-5B6B-B939-FA3C-B663E317E445}"/>
+              </a:ext>
+            </a:extLst>
+          </p:cNvPr>
+          <p:cNvSpPr>
+            <a:spLocks noGrp="1"/>
+          </p:cNvSpPr>
+          <p:nvPr>
+            <p:ph type="title"/>
+          </p:nvPr>
+        </p:nvSpPr>
+        <p:spPr/>
+        <p:txBody>
+          <a:bodyPr/>
+          <a:lstStyle/>
+          <a:p>
+            <a:br>
+              <a:rPr lang="en-GB" dirty="0"/>
+            </a:br>
+            <a:r>
+              <a:rPr lang="en-GB" dirty="0"/>
+              <a:t>Azure CLI</a:t>
+            </a:r>
+          </a:p>
+        </p:txBody>
+      </p:sp>
+      <p:sp>
+        <p:nvSpPr>
+          <p:cNvPr id="3" name="Content Placeholder 2">
+            <a:extLst>
+              <a:ext uri="{FF2B5EF4-FFF2-40B4-BE49-F238E27FC236}">
+                <a16:creationId xmlns:a16="http://schemas.microsoft.com/office/drawing/2014/main" id="{F8A13E07-A759-E54C-79C1-64A09C31C106}"/>
+              </a:ext>
+            </a:extLst>
+          </p:cNvPr>
+          <p:cNvSpPr>
+            <a:spLocks noGrp="1"/>
+          </p:cNvSpPr>
+          <p:nvPr>
+            <p:ph idx="1"/>
+          </p:nvPr>
+        </p:nvSpPr>
+        <p:spPr/>
+        <p:txBody>
+          <a:bodyPr/>
+          <a:lstStyle/>
+          <a:p>
+            <a:r>
+              <a:rPr lang="en-GB" dirty="0"/>
+              <a:t>Install by following links from: </a:t>
+            </a:r>
+            <a:r>
+              <a:rPr lang="en-GB" dirty="0">
+                <a:hlinkClick r:id="rId2"/>
+              </a:rPr>
+              <a:t>https://learn.microsoft.com/en-us/cli/azure/install-azure-cli</a:t>
+            </a:r>
+            <a:endParaRPr lang="en-GB" dirty="0"/>
+          </a:p>
+          <a:p>
+            <a:r>
+              <a:rPr lang="en-GB" dirty="0"/>
+              <a:t>For </a:t>
+            </a:r>
+            <a:r>
+              <a:rPr lang="en-GB" dirty="0" err="1"/>
+              <a:t>VSCode</a:t>
+            </a:r>
+            <a:r>
+              <a:rPr lang="en-GB" dirty="0"/>
+              <a:t>:</a:t>
+            </a:r>
+          </a:p>
+          <a:p>
+            <a:pPr lvl="1"/>
+            <a:r>
+              <a:rPr lang="en-GB" dirty="0"/>
+              <a:t>Azure CLI Tools</a:t>
+            </a:r>
+          </a:p>
+          <a:p>
+            <a:pPr lvl="1"/>
+            <a:r>
+              <a:rPr lang="en-GB" dirty="0"/>
+              <a:t>Azure Developer CLI</a:t>
+            </a:r>
+          </a:p>
+          <a:p>
+            <a:r>
+              <a:rPr lang="en-GB" dirty="0"/>
+              <a:t>CLI will require extensions for some commands</a:t>
+            </a:r>
+          </a:p>
+          <a:p>
+            <a:pPr lvl="1"/>
+            <a:r>
+              <a:rPr lang="en-GB" dirty="0"/>
+              <a:t>Automatically downloaded</a:t>
+            </a:r>
+          </a:p>
+          <a:p>
+            <a:endParaRPr lang="en-GB" dirty="0"/>
+          </a:p>
+        </p:txBody>
+      </p:sp>
+    </p:spTree>
+    <p:extLst>
+      <p:ext uri="{BB962C8B-B14F-4D97-AF65-F5344CB8AC3E}">
+        <p14:creationId xmlns:p14="http://schemas.microsoft.com/office/powerpoint/2010/main" val="2113534899"/>
+      </p:ext>
+    </p:extLst>
+  </p:cSld>
+  <p:clrMapOvr>
+    <a:masterClrMapping/>
+  </p:clrMapOvr>
+</p:sld>
+</file>
+
+<file path=ppt/slides/slide60.xml><?xml version="1.0" encoding="utf-8"?>
 <p:sld xmlns:a="http://schemas.openxmlformats.org/drawingml/2006/main" xmlns:r="http://schemas.openxmlformats.org/officeDocument/2006/relationships" xmlns:p="http://schemas.openxmlformats.org/presentationml/2006/main">
   <p:cSld>
     <p:spTree>
@@ -10521,7 +11354,7 @@
 </p:sld>
 </file>
 
-<file path=ppt/slides/slide55.xml><?xml version="1.0" encoding="utf-8"?>
+<file path=ppt/slides/slide61.xml><?xml version="1.0" encoding="utf-8"?>
 <p:sld xmlns:a="http://schemas.openxmlformats.org/drawingml/2006/main" xmlns:r="http://schemas.openxmlformats.org/officeDocument/2006/relationships" xmlns:p="http://schemas.openxmlformats.org/presentationml/2006/main">
   <p:cSld>
     <p:spTree>
@@ -10639,7 +11472,7 @@
 </p:sld>
 </file>
 
-<file path=ppt/slides/slide56.xml><?xml version="1.0" encoding="utf-8"?>
+<file path=ppt/slides/slide62.xml><?xml version="1.0" encoding="utf-8"?>
 <p:sld xmlns:a="http://schemas.openxmlformats.org/drawingml/2006/main" xmlns:r="http://schemas.openxmlformats.org/officeDocument/2006/relationships" xmlns:p="http://schemas.openxmlformats.org/presentationml/2006/main">
   <p:cSld>
     <p:spTree>
@@ -10727,7 +11560,7 @@
 </p:sld>
 </file>
 
-<file path=ppt/slides/slide57.xml><?xml version="1.0" encoding="utf-8"?>
+<file path=ppt/slides/slide63.xml><?xml version="1.0" encoding="utf-8"?>
 <p:sld xmlns:a="http://schemas.openxmlformats.org/drawingml/2006/main" xmlns:r="http://schemas.openxmlformats.org/officeDocument/2006/relationships" xmlns:p="http://schemas.openxmlformats.org/presentationml/2006/main">
   <p:cSld>
     <p:spTree>
@@ -10815,7 +11648,7 @@
 </p:sld>
 </file>
 
-<file path=ppt/slides/slide58.xml><?xml version="1.0" encoding="utf-8"?>
+<file path=ppt/slides/slide64.xml><?xml version="1.0" encoding="utf-8"?>
 <p:sld xmlns:a="http://schemas.openxmlformats.org/drawingml/2006/main" xmlns:r="http://schemas.openxmlformats.org/officeDocument/2006/relationships" xmlns:p="http://schemas.openxmlformats.org/presentationml/2006/main">
   <p:cSld>
     <p:spTree>
@@ -10905,7 +11738,7 @@
 </p:sld>
 </file>
 
-<file path=ppt/slides/slide59.xml><?xml version="1.0" encoding="utf-8"?>
+<file path=ppt/slides/slide65.xml><?xml version="1.0" encoding="utf-8"?>
 <p:sld xmlns:a="http://schemas.openxmlformats.org/drawingml/2006/main" xmlns:r="http://schemas.openxmlformats.org/officeDocument/2006/relationships" xmlns:p="http://schemas.openxmlformats.org/presentationml/2006/main">
   <p:cSld>
     <p:spTree>
@@ -10935,147 +11768,7 @@
 </p:sld>
 </file>
 
-<file path=ppt/slides/slide6.xml><?xml version="1.0" encoding="utf-8"?>
-<p:sld xmlns:a="http://schemas.openxmlformats.org/drawingml/2006/main" xmlns:r="http://schemas.openxmlformats.org/officeDocument/2006/relationships" xmlns:p="http://schemas.openxmlformats.org/presentationml/2006/main">
-  <p:cSld>
-    <p:spTree>
-      <p:nvGrpSpPr>
-        <p:cNvPr id="1" name=""/>
-        <p:cNvGrpSpPr/>
-        <p:nvPr/>
-      </p:nvGrpSpPr>
-      <p:grpSpPr>
-        <a:xfrm>
-          <a:off x="0" y="0"/>
-          <a:ext cx="0" cy="0"/>
-          <a:chOff x="0" y="0"/>
-          <a:chExt cx="0" cy="0"/>
-        </a:xfrm>
-      </p:grpSpPr>
-      <p:sp>
-        <p:nvSpPr>
-          <p:cNvPr id="2" name="Title 1">
-            <a:extLst>
-              <a:ext uri="{FF2B5EF4-FFF2-40B4-BE49-F238E27FC236}">
-                <a16:creationId xmlns:a16="http://schemas.microsoft.com/office/drawing/2014/main" id="{838AC0F5-5B6B-B939-FA3C-B663E317E445}"/>
-              </a:ext>
-            </a:extLst>
-          </p:cNvPr>
-          <p:cNvSpPr>
-            <a:spLocks noGrp="1"/>
-          </p:cNvSpPr>
-          <p:nvPr>
-            <p:ph type="title"/>
-          </p:nvPr>
-        </p:nvSpPr>
-        <p:spPr/>
-        <p:txBody>
-          <a:bodyPr/>
-          <a:lstStyle/>
-          <a:p>
-            <a:br>
-              <a:rPr lang="en-GB" dirty="0"/>
-            </a:br>
-            <a:r>
-              <a:rPr lang="en-GB" dirty="0"/>
-              <a:t>Azure CLI</a:t>
-            </a:r>
-          </a:p>
-        </p:txBody>
-      </p:sp>
-      <p:sp>
-        <p:nvSpPr>
-          <p:cNvPr id="3" name="Content Placeholder 2">
-            <a:extLst>
-              <a:ext uri="{FF2B5EF4-FFF2-40B4-BE49-F238E27FC236}">
-                <a16:creationId xmlns:a16="http://schemas.microsoft.com/office/drawing/2014/main" id="{F8A13E07-A759-E54C-79C1-64A09C31C106}"/>
-              </a:ext>
-            </a:extLst>
-          </p:cNvPr>
-          <p:cNvSpPr>
-            <a:spLocks noGrp="1"/>
-          </p:cNvSpPr>
-          <p:nvPr>
-            <p:ph idx="1"/>
-          </p:nvPr>
-        </p:nvSpPr>
-        <p:spPr/>
-        <p:txBody>
-          <a:bodyPr/>
-          <a:lstStyle/>
-          <a:p>
-            <a:r>
-              <a:rPr lang="en-GB" dirty="0"/>
-              <a:t>Install by following links from: </a:t>
-            </a:r>
-            <a:r>
-              <a:rPr lang="en-GB" dirty="0">
-                <a:hlinkClick r:id="rId2"/>
-              </a:rPr>
-              <a:t>https://learn.microsoft.com/en-us/cli/azure/install-azure-cli</a:t>
-            </a:r>
-            <a:endParaRPr lang="en-GB" dirty="0"/>
-          </a:p>
-          <a:p>
-            <a:r>
-              <a:rPr lang="en-GB" dirty="0"/>
-              <a:t>For </a:t>
-            </a:r>
-            <a:r>
-              <a:rPr lang="en-GB" dirty="0" err="1"/>
-              <a:t>VSCode</a:t>
-            </a:r>
-            <a:r>
-              <a:rPr lang="en-GB" dirty="0"/>
-              <a:t>:</a:t>
-            </a:r>
-          </a:p>
-          <a:p>
-            <a:pPr lvl="1"/>
-            <a:r>
-              <a:rPr lang="en-GB" dirty="0"/>
-              <a:t>Azure CLI Tools</a:t>
-            </a:r>
-          </a:p>
-          <a:p>
-            <a:pPr lvl="1"/>
-            <a:r>
-              <a:rPr lang="en-GB" dirty="0"/>
-              <a:t>Azure Developer CLI</a:t>
-            </a:r>
-          </a:p>
-          <a:p>
-            <a:r>
-              <a:rPr lang="en-GB" dirty="0"/>
-              <a:t>CLI will require extensions for some commands</a:t>
-            </a:r>
-          </a:p>
-          <a:p>
-            <a:pPr lvl="1"/>
-            <a:r>
-              <a:rPr lang="en-GB" dirty="0"/>
-              <a:t>Automatically downloaded</a:t>
-            </a:r>
-          </a:p>
-          <a:p>
-            <a:endParaRPr lang="en-GB" dirty="0"/>
-          </a:p>
-        </p:txBody>
-      </p:sp>
-    </p:spTree>
-    <p:extLst>
-      <p:ext uri="{BB962C8B-B14F-4D97-AF65-F5344CB8AC3E}">
-        <p14:creationId xmlns:p14="http://schemas.microsoft.com/office/powerpoint/2010/main" val="2113534899"/>
-      </p:ext>
-    </p:extLst>
-  </p:cSld>
-  <p:clrMapOvr>
-    <a:masterClrMapping/>
-  </p:clrMapOvr>
-</p:sld>
-</file>
-
-<file path=ppt/slides/slide60.xml><?xml version="1.0" encoding="utf-8"?>
+<file path=ppt/slides/slide66.xml><?xml version="1.0" encoding="utf-8"?>
 <p:sld xmlns:a="http://schemas.openxmlformats.org/drawingml/2006/main" xmlns:r="http://schemas.openxmlformats.org/officeDocument/2006/relationships" xmlns:p="http://schemas.openxmlformats.org/presentationml/2006/main">
   <p:cSld>
     <p:spTree>

</xml_diff>

<commit_message>
more slide typos and az changes
</commit_message>
<xml_diff>
--- a/Data Engineering Using Free Tools/Learn Data Engineering For Free.pptx
+++ b/Data Engineering Using Free Tools/Learn Data Engineering For Free.pptx
@@ -367,8 +367,11 @@
     </a:lvl9pPr>
   </p:defaultTextStyle>
   <p:extLst>
+    <p:ext uri="{EFAFB233-063F-42B5-8137-9DF3F51BA10A}">
+      <p15:sldGuideLst xmlns:p15="http://schemas.microsoft.com/office/powerpoint/2012/main"/>
+    </p:ext>
     <p:ext uri="GoogleSlidesCustomDataVersion2">
-      <go:slidesCustomData xmlns:go="http://customooxmlschemas.google.com/" xmlns:ahyp="http://schemas.microsoft.com/office/drawing/2018/hyperlinkcolor" xmlns:p15="http://schemas.microsoft.com/office/powerpoint/2012/main" xmlns:p14="http://schemas.microsoft.com/office/powerpoint/2010/main" xmlns:com="http://schemas.openxmlformats.org/drawingml/2006/compatibility" xmlns:pvml="urn:schemas-microsoft-com:office:powerpoint" xmlns:v="urn:schemas-microsoft-com:vml" xmlns:o="urn:schemas-microsoft-com:office:office" xmlns:dgm="http://schemas.openxmlformats.org/drawingml/2006/diagram" xmlns:c="http://schemas.openxmlformats.org/drawingml/2006/chart" xmlns:mv="urn:schemas-microsoft-com:mac:vml" xmlns:mc="http://schemas.openxmlformats.org/markup-compatibility/2006" xmlns="" r:id="rId121" roundtripDataSignature="AMtx7mjfBPD4zcRyFOakZxj0Wu5uQHlzcQ=="/>
+      <go:slidesCustomData xmlns="" xmlns:mc="http://schemas.openxmlformats.org/markup-compatibility/2006" xmlns:mv="urn:schemas-microsoft-com:mac:vml" xmlns:c="http://schemas.openxmlformats.org/drawingml/2006/chart" xmlns:dgm="http://schemas.openxmlformats.org/drawingml/2006/diagram" xmlns:o="urn:schemas-microsoft-com:office:office" xmlns:v="urn:schemas-microsoft-com:vml" xmlns:pvml="urn:schemas-microsoft-com:office:powerpoint" xmlns:com="http://schemas.openxmlformats.org/drawingml/2006/compatibility" xmlns:p14="http://schemas.microsoft.com/office/powerpoint/2010/main" xmlns:p15="http://schemas.microsoft.com/office/powerpoint/2012/main" xmlns:ahyp="http://schemas.microsoft.com/office/drawing/2018/hyperlinkcolor" xmlns:go="http://customooxmlschemas.google.com/" r:id="rId121" roundtripDataSignature="AMtx7mjfBPD4zcRyFOakZxj0Wu5uQHlzcQ=="/>
     </p:ext>
   </p:extLst>
 </p:presentation>
@@ -28275,56 +28278,6 @@
       </p:sp>
       <p:sp>
         <p:nvSpPr>
-          <p:cNvPr id="195" name="Google Shape;195;g30ccb334bf1_0_120"/>
-          <p:cNvSpPr txBox="1"/>
-          <p:nvPr/>
-        </p:nvSpPr>
-        <p:spPr>
-          <a:xfrm>
-            <a:off x="9701579" y="4506408"/>
-            <a:ext cx="1320900" cy="646500"/>
-          </a:xfrm>
-          <a:prstGeom prst="rect">
-            <a:avLst/>
-          </a:prstGeom>
-          <a:noFill/>
-          <a:ln>
-            <a:noFill/>
-          </a:ln>
-        </p:spPr>
-        <p:txBody>
-          <a:bodyPr spcFirstLastPara="1" wrap="square" lIns="91425" tIns="45700" rIns="91425" bIns="45700" anchor="t" anchorCtr="0">
-            <a:spAutoFit/>
-          </a:bodyPr>
-          <a:lstStyle/>
-          <a:p>
-            <a:pPr marL="0" marR="0" lvl="0" indent="0" algn="l" rtl="0">
-              <a:spcBef>
-                <a:spcPts val="0"/>
-              </a:spcBef>
-              <a:spcAft>
-                <a:spcPts val="0"/>
-              </a:spcAft>
-              <a:buNone/>
-            </a:pPr>
-            <a:r>
-              <a:rPr lang="en-GB" sz="1800" b="1">
-                <a:solidFill>
-                  <a:schemeClr val="dk1"/>
-                </a:solidFill>
-                <a:latin typeface="Arial"/>
-                <a:ea typeface="Arial"/>
-                <a:cs typeface="Arial"/>
-                <a:sym typeface="Arial"/>
-              </a:rPr>
-              <a:t>Databricks</a:t>
-            </a:r>
-            <a:endParaRPr/>
-          </a:p>
-        </p:txBody>
-      </p:sp>
-      <p:sp>
-        <p:nvSpPr>
           <p:cNvPr id="196" name="Google Shape;196;g30ccb334bf1_0_120"/>
           <p:cNvSpPr txBox="1"/>
           <p:nvPr/>
@@ -30649,11 +30602,11 @@
               <a:buChar char="•"/>
             </a:pPr>
             <a:r>
-              <a:rPr lang="en-GB"/>
+              <a:rPr lang="en-GB" dirty="0"/>
               <a:t>Install by following links from: </a:t>
             </a:r>
             <a:r>
-              <a:rPr lang="en-GB">
+              <a:rPr lang="en-GB" dirty="0">
                 <a:solidFill>
                   <a:schemeClr val="hlink"/>
                 </a:solidFill>
@@ -30664,7 +30617,7 @@
               </a:rPr>
               <a:t>https://learn.microsoft.com/en-us/cli/azure/install-azure-cli</a:t>
             </a:r>
-            <a:endParaRPr/>
+            <a:endParaRPr dirty="0"/>
           </a:p>
           <a:p>
             <a:pPr marL="228600" lvl="0" indent="-228600" algn="l" rtl="0">
@@ -30684,10 +30637,10 @@
               <a:buChar char="•"/>
             </a:pPr>
             <a:r>
-              <a:rPr lang="en-GB"/>
-              <a:t>For VS Code:</a:t>
+              <a:rPr lang="en-GB" dirty="0"/>
+              <a:t>VS Code extensions:</a:t>
             </a:r>
-            <a:endParaRPr/>
+            <a:endParaRPr dirty="0"/>
           </a:p>
           <a:p>
             <a:pPr marL="685800" lvl="1" indent="-228600" algn="l" rtl="0">
@@ -30707,10 +30660,10 @@
               <a:buChar char="•"/>
             </a:pPr>
             <a:r>
-              <a:rPr lang="en-GB"/>
+              <a:rPr lang="en-GB" dirty="0"/>
               <a:t>Azure CLI Tools</a:t>
             </a:r>
-            <a:endParaRPr/>
+            <a:endParaRPr dirty="0"/>
           </a:p>
           <a:p>
             <a:pPr marL="685800" lvl="1" indent="-228600" algn="l" rtl="0">
@@ -30730,10 +30683,10 @@
               <a:buChar char="•"/>
             </a:pPr>
             <a:r>
-              <a:rPr lang="en-GB"/>
+              <a:rPr lang="en-GB" dirty="0"/>
               <a:t>Azure Developer CLI</a:t>
             </a:r>
-            <a:endParaRPr/>
+            <a:endParaRPr dirty="0"/>
           </a:p>
           <a:p>
             <a:pPr marL="228600" lvl="0" indent="-50800" algn="l" rtl="0">
@@ -30752,7 +30705,7 @@
               <a:buSzPts val="2800"/>
               <a:buNone/>
             </a:pPr>
-            <a:endParaRPr/>
+            <a:endParaRPr dirty="0"/>
           </a:p>
         </p:txBody>
       </p:sp>

</xml_diff>

<commit_message>
added contact details added new version dbx notebook
</commit_message>
<xml_diff>
--- a/Data Engineering Using Free Tools/Learn Data Engineering For Free.pptx
+++ b/Data Engineering Using Free Tools/Learn Data Engineering For Free.pptx
@@ -373,7 +373,7 @@
       <p15:sldGuideLst xmlns:p15="http://schemas.microsoft.com/office/powerpoint/2012/main"/>
     </p:ext>
     <p:ext uri="GoogleSlidesCustomDataVersion2">
-      <go:slidesCustomData xmlns="" xmlns:mc="http://schemas.openxmlformats.org/markup-compatibility/2006" xmlns:mv="urn:schemas-microsoft-com:mac:vml" xmlns:c="http://schemas.openxmlformats.org/drawingml/2006/chart" xmlns:dgm="http://schemas.openxmlformats.org/drawingml/2006/diagram" xmlns:o="urn:schemas-microsoft-com:office:office" xmlns:v="urn:schemas-microsoft-com:vml" xmlns:pvml="urn:schemas-microsoft-com:office:powerpoint" xmlns:com="http://schemas.openxmlformats.org/drawingml/2006/compatibility" xmlns:p14="http://schemas.microsoft.com/office/powerpoint/2010/main" xmlns:p15="http://schemas.microsoft.com/office/powerpoint/2012/main" xmlns:ahyp="http://schemas.microsoft.com/office/drawing/2018/hyperlinkcolor" xmlns:go="http://customooxmlschemas.google.com/" r:id="rId123" roundtripDataSignature="AMtx7mjfBPD4zcRyFOakZxj0Wu5uQHlzcQ=="/>
+      <go:slidesCustomData xmlns:go="http://customooxmlschemas.google.com/" xmlns:ahyp="http://schemas.microsoft.com/office/drawing/2018/hyperlinkcolor" xmlns:p15="http://schemas.microsoft.com/office/powerpoint/2012/main" xmlns:p14="http://schemas.microsoft.com/office/powerpoint/2010/main" xmlns:com="http://schemas.openxmlformats.org/drawingml/2006/compatibility" xmlns:pvml="urn:schemas-microsoft-com:office:powerpoint" xmlns:v="urn:schemas-microsoft-com:vml" xmlns:o="urn:schemas-microsoft-com:office:office" xmlns:dgm="http://schemas.openxmlformats.org/drawingml/2006/diagram" xmlns:c="http://schemas.openxmlformats.org/drawingml/2006/chart" xmlns:mv="urn:schemas-microsoft-com:mac:vml" xmlns:mc="http://schemas.openxmlformats.org/markup-compatibility/2006" xmlns="" r:id="rId123" roundtripDataSignature="AMtx7mjfBPD4zcRyFOakZxj0Wu5uQHlzcQ=="/>
     </p:ext>
   </p:extLst>
 </p:presentation>
@@ -35642,7 +35642,7 @@
         </p:blipFill>
         <p:spPr>
           <a:xfrm>
-            <a:off x="6454473" y="1343849"/>
+            <a:off x="6454387" y="956327"/>
             <a:ext cx="3685308" cy="4063504"/>
           </a:xfrm>
           <a:prstGeom prst="rect">
@@ -35718,7 +35718,7 @@
         </p:nvSpPr>
         <p:spPr>
           <a:xfrm>
-            <a:off x="1243316" y="1343849"/>
+            <a:off x="1243314" y="911877"/>
             <a:ext cx="4494300" cy="638700"/>
           </a:xfrm>
           <a:prstGeom prst="rect">
@@ -35752,10 +35752,10 @@
               <a:buNone/>
             </a:pPr>
             <a:r>
-              <a:rPr lang="en-GB"/>
+              <a:rPr lang="en-GB" dirty="0"/>
               <a:t>Phil Austin</a:t>
             </a:r>
-            <a:endParaRPr/>
+            <a:endParaRPr dirty="0"/>
           </a:p>
         </p:txBody>
       </p:sp>
@@ -35771,7 +35771,7 @@
         </p:nvSpPr>
         <p:spPr>
           <a:xfrm>
-            <a:off x="1243315" y="1982652"/>
+            <a:off x="1243314" y="1391182"/>
             <a:ext cx="4494300" cy="428700"/>
           </a:xfrm>
           <a:prstGeom prst="rect">
@@ -35805,10 +35805,10 @@
               <a:buNone/>
             </a:pPr>
             <a:r>
-              <a:rPr lang="en-GB"/>
+              <a:rPr lang="en-GB" dirty="0"/>
               <a:t>Senior Consultant</a:t>
             </a:r>
-            <a:endParaRPr/>
+            <a:endParaRPr dirty="0"/>
           </a:p>
         </p:txBody>
       </p:sp>
@@ -35894,6 +35894,592 @@
               <a:t>Data &amp; AI</a:t>
             </a:r>
             <a:endParaRPr/>
+          </a:p>
+        </p:txBody>
+      </p:sp>
+      <p:sp>
+        <p:nvSpPr>
+          <p:cNvPr id="2" name="Google Shape;136;g30ccb334bf1_0_6">
+            <a:extLst>
+              <a:ext uri="{FF2B5EF4-FFF2-40B4-BE49-F238E27FC236}">
+                <a16:creationId xmlns:a16="http://schemas.microsoft.com/office/drawing/2014/main" id="{C1BBE2EF-04B5-85C2-DE0F-2015A859E3DE}"/>
+              </a:ext>
+            </a:extLst>
+          </p:cNvPr>
+          <p:cNvSpPr txBox="1">
+            <a:spLocks/>
+          </p:cNvSpPr>
+          <p:nvPr/>
+        </p:nvSpPr>
+        <p:spPr>
+          <a:xfrm>
+            <a:off x="1243314" y="1755114"/>
+            <a:ext cx="4494300" cy="428700"/>
+          </a:xfrm>
+          <a:prstGeom prst="rect">
+            <a:avLst/>
+          </a:prstGeom>
+          <a:noFill/>
+          <a:ln>
+            <a:noFill/>
+          </a:ln>
+        </p:spPr>
+        <p:txBody>
+          <a:bodyPr spcFirstLastPara="1" wrap="square" lIns="91425" tIns="45700" rIns="91425" bIns="45700" anchor="t" anchorCtr="0">
+            <a:normAutofit/>
+          </a:bodyPr>
+          <a:lstStyle>
+            <a:defPPr marR="0" lvl="0" algn="l" rtl="0">
+              <a:lnSpc>
+                <a:spcPct val="100000"/>
+              </a:lnSpc>
+              <a:spcBef>
+                <a:spcPts val="0"/>
+              </a:spcBef>
+              <a:spcAft>
+                <a:spcPts val="0"/>
+              </a:spcAft>
+            </a:defPPr>
+            <a:lvl1pPr marL="457200" marR="0" lvl="0" indent="-355600" algn="l" rtl="0">
+              <a:lnSpc>
+                <a:spcPct val="90000"/>
+              </a:lnSpc>
+              <a:spcBef>
+                <a:spcPts val="1000"/>
+              </a:spcBef>
+              <a:spcAft>
+                <a:spcPts val="0"/>
+              </a:spcAft>
+              <a:buClr>
+                <a:schemeClr val="lt2"/>
+              </a:buClr>
+              <a:buSzPts val="2000"/>
+              <a:buFont typeface="Arial"/>
+              <a:buChar char="•"/>
+              <a:defRPr sz="2000" b="0" i="0" u="none" strike="noStrike" cap="none">
+                <a:solidFill>
+                  <a:schemeClr val="lt2"/>
+                </a:solidFill>
+                <a:latin typeface="Arial"/>
+                <a:ea typeface="Arial"/>
+                <a:cs typeface="Arial"/>
+                <a:sym typeface="Arial"/>
+              </a:defRPr>
+            </a:lvl1pPr>
+            <a:lvl2pPr marL="914400" marR="0" lvl="1" indent="-482600" algn="l" rtl="0">
+              <a:lnSpc>
+                <a:spcPct val="90000"/>
+              </a:lnSpc>
+              <a:spcBef>
+                <a:spcPts val="500"/>
+              </a:spcBef>
+              <a:spcAft>
+                <a:spcPts val="0"/>
+              </a:spcAft>
+              <a:buClr>
+                <a:schemeClr val="lt2"/>
+              </a:buClr>
+              <a:buSzPts val="4000"/>
+              <a:buFont typeface="Arial"/>
+              <a:buChar char="•"/>
+              <a:defRPr sz="4000" b="0" i="0" u="none" strike="noStrike" cap="none">
+                <a:solidFill>
+                  <a:schemeClr val="lt2"/>
+                </a:solidFill>
+                <a:latin typeface="Arial"/>
+                <a:ea typeface="Arial"/>
+                <a:cs typeface="Arial"/>
+                <a:sym typeface="Arial"/>
+              </a:defRPr>
+            </a:lvl2pPr>
+            <a:lvl3pPr marL="1371600" marR="0" lvl="2" indent="-482600" algn="l" rtl="0">
+              <a:lnSpc>
+                <a:spcPct val="90000"/>
+              </a:lnSpc>
+              <a:spcBef>
+                <a:spcPts val="500"/>
+              </a:spcBef>
+              <a:spcAft>
+                <a:spcPts val="0"/>
+              </a:spcAft>
+              <a:buClr>
+                <a:schemeClr val="lt2"/>
+              </a:buClr>
+              <a:buSzPts val="4000"/>
+              <a:buFont typeface="Arial"/>
+              <a:buChar char="•"/>
+              <a:defRPr sz="4000" b="0" i="0" u="none" strike="noStrike" cap="none">
+                <a:solidFill>
+                  <a:schemeClr val="lt2"/>
+                </a:solidFill>
+                <a:latin typeface="Arial"/>
+                <a:ea typeface="Arial"/>
+                <a:cs typeface="Arial"/>
+                <a:sym typeface="Arial"/>
+              </a:defRPr>
+            </a:lvl3pPr>
+            <a:lvl4pPr marL="1828800" marR="0" lvl="3" indent="-482600" algn="l" rtl="0">
+              <a:lnSpc>
+                <a:spcPct val="90000"/>
+              </a:lnSpc>
+              <a:spcBef>
+                <a:spcPts val="500"/>
+              </a:spcBef>
+              <a:spcAft>
+                <a:spcPts val="0"/>
+              </a:spcAft>
+              <a:buClr>
+                <a:schemeClr val="lt2"/>
+              </a:buClr>
+              <a:buSzPts val="4000"/>
+              <a:buFont typeface="Arial"/>
+              <a:buChar char="•"/>
+              <a:defRPr sz="4000" b="0" i="0" u="none" strike="noStrike" cap="none">
+                <a:solidFill>
+                  <a:schemeClr val="lt2"/>
+                </a:solidFill>
+                <a:latin typeface="Arial"/>
+                <a:ea typeface="Arial"/>
+                <a:cs typeface="Arial"/>
+                <a:sym typeface="Arial"/>
+              </a:defRPr>
+            </a:lvl4pPr>
+            <a:lvl5pPr marL="2286000" marR="0" lvl="4" indent="-482600" algn="l" rtl="0">
+              <a:lnSpc>
+                <a:spcPct val="90000"/>
+              </a:lnSpc>
+              <a:spcBef>
+                <a:spcPts val="500"/>
+              </a:spcBef>
+              <a:spcAft>
+                <a:spcPts val="0"/>
+              </a:spcAft>
+              <a:buClr>
+                <a:schemeClr val="lt2"/>
+              </a:buClr>
+              <a:buSzPts val="4000"/>
+              <a:buFont typeface="Arial"/>
+              <a:buChar char="•"/>
+              <a:defRPr sz="4000" b="0" i="0" u="none" strike="noStrike" cap="none">
+                <a:solidFill>
+                  <a:schemeClr val="lt2"/>
+                </a:solidFill>
+                <a:latin typeface="Arial"/>
+                <a:ea typeface="Arial"/>
+                <a:cs typeface="Arial"/>
+                <a:sym typeface="Arial"/>
+              </a:defRPr>
+            </a:lvl5pPr>
+            <a:lvl6pPr marL="2743200" marR="0" lvl="5" indent="-342900" algn="l" rtl="0">
+              <a:lnSpc>
+                <a:spcPct val="90000"/>
+              </a:lnSpc>
+              <a:spcBef>
+                <a:spcPts val="500"/>
+              </a:spcBef>
+              <a:spcAft>
+                <a:spcPts val="0"/>
+              </a:spcAft>
+              <a:buClr>
+                <a:schemeClr val="dk1"/>
+              </a:buClr>
+              <a:buSzPts val="1800"/>
+              <a:buFont typeface="Arial"/>
+              <a:buChar char="•"/>
+              <a:defRPr sz="1800" b="0" i="0" u="none" strike="noStrike" cap="none">
+                <a:solidFill>
+                  <a:srgbClr val="CFE2F3"/>
+                </a:solidFill>
+                <a:latin typeface="Arial"/>
+                <a:ea typeface="Arial"/>
+                <a:cs typeface="Arial"/>
+                <a:sym typeface="Arial"/>
+              </a:defRPr>
+            </a:lvl6pPr>
+            <a:lvl7pPr marL="3200400" marR="0" lvl="6" indent="-342900" algn="l" rtl="0">
+              <a:lnSpc>
+                <a:spcPct val="90000"/>
+              </a:lnSpc>
+              <a:spcBef>
+                <a:spcPts val="500"/>
+              </a:spcBef>
+              <a:spcAft>
+                <a:spcPts val="0"/>
+              </a:spcAft>
+              <a:buClr>
+                <a:schemeClr val="dk1"/>
+              </a:buClr>
+              <a:buSzPts val="1800"/>
+              <a:buFont typeface="Arial"/>
+              <a:buChar char="•"/>
+              <a:defRPr sz="1800" b="0" i="0" u="none" strike="noStrike" cap="none">
+                <a:solidFill>
+                  <a:srgbClr val="CFE2F3"/>
+                </a:solidFill>
+                <a:latin typeface="Arial"/>
+                <a:ea typeface="Arial"/>
+                <a:cs typeface="Arial"/>
+                <a:sym typeface="Arial"/>
+              </a:defRPr>
+            </a:lvl7pPr>
+            <a:lvl8pPr marL="3657600" marR="0" lvl="7" indent="-342900" algn="l" rtl="0">
+              <a:lnSpc>
+                <a:spcPct val="90000"/>
+              </a:lnSpc>
+              <a:spcBef>
+                <a:spcPts val="500"/>
+              </a:spcBef>
+              <a:spcAft>
+                <a:spcPts val="0"/>
+              </a:spcAft>
+              <a:buClr>
+                <a:schemeClr val="dk1"/>
+              </a:buClr>
+              <a:buSzPts val="1800"/>
+              <a:buFont typeface="Arial"/>
+              <a:buChar char="•"/>
+              <a:defRPr sz="1800" b="0" i="0" u="none" strike="noStrike" cap="none">
+                <a:solidFill>
+                  <a:srgbClr val="CFE2F3"/>
+                </a:solidFill>
+                <a:latin typeface="Arial"/>
+                <a:ea typeface="Arial"/>
+                <a:cs typeface="Arial"/>
+                <a:sym typeface="Arial"/>
+              </a:defRPr>
+            </a:lvl8pPr>
+            <a:lvl9pPr marL="4114800" marR="0" lvl="8" indent="-342900" algn="l" rtl="0">
+              <a:lnSpc>
+                <a:spcPct val="90000"/>
+              </a:lnSpc>
+              <a:spcBef>
+                <a:spcPts val="500"/>
+              </a:spcBef>
+              <a:spcAft>
+                <a:spcPts val="0"/>
+              </a:spcAft>
+              <a:buClr>
+                <a:schemeClr val="dk1"/>
+              </a:buClr>
+              <a:buSzPts val="1800"/>
+              <a:buFont typeface="Arial"/>
+              <a:buChar char="•"/>
+              <a:defRPr sz="1800" b="0" i="0" u="none" strike="noStrike" cap="none">
+                <a:solidFill>
+                  <a:srgbClr val="CFE2F3"/>
+                </a:solidFill>
+                <a:latin typeface="Arial"/>
+                <a:ea typeface="Arial"/>
+                <a:cs typeface="Arial"/>
+                <a:sym typeface="Arial"/>
+              </a:defRPr>
+            </a:lvl9pPr>
+          </a:lstStyle>
+          <a:p>
+            <a:pPr marL="0" indent="0">
+              <a:spcBef>
+                <a:spcPts val="0"/>
+              </a:spcBef>
+              <a:buFont typeface="Arial"/>
+              <a:buNone/>
+            </a:pPr>
+            <a:r>
+              <a:rPr lang="en-GB" dirty="0"/>
+              <a:t>Phil.Austin@telefonicatech.uk</a:t>
+            </a:r>
+          </a:p>
+        </p:txBody>
+      </p:sp>
+      <p:sp>
+        <p:nvSpPr>
+          <p:cNvPr id="3" name="Google Shape;136;g30ccb334bf1_0_6">
+            <a:extLst>
+              <a:ext uri="{FF2B5EF4-FFF2-40B4-BE49-F238E27FC236}">
+                <a16:creationId xmlns:a16="http://schemas.microsoft.com/office/drawing/2014/main" id="{C74BFC0A-C522-B4D8-6A68-2C3668E01742}"/>
+              </a:ext>
+            </a:extLst>
+          </p:cNvPr>
+          <p:cNvSpPr txBox="1">
+            <a:spLocks/>
+          </p:cNvSpPr>
+          <p:nvPr/>
+        </p:nvSpPr>
+        <p:spPr>
+          <a:xfrm>
+            <a:off x="1243314" y="2044220"/>
+            <a:ext cx="4494300" cy="428700"/>
+          </a:xfrm>
+          <a:prstGeom prst="rect">
+            <a:avLst/>
+          </a:prstGeom>
+          <a:noFill/>
+          <a:ln>
+            <a:noFill/>
+          </a:ln>
+        </p:spPr>
+        <p:txBody>
+          <a:bodyPr spcFirstLastPara="1" wrap="square" lIns="91425" tIns="45700" rIns="91425" bIns="45700" anchor="t" anchorCtr="0">
+            <a:normAutofit/>
+          </a:bodyPr>
+          <a:lstStyle>
+            <a:defPPr marR="0" lvl="0" algn="l" rtl="0">
+              <a:lnSpc>
+                <a:spcPct val="100000"/>
+              </a:lnSpc>
+              <a:spcBef>
+                <a:spcPts val="0"/>
+              </a:spcBef>
+              <a:spcAft>
+                <a:spcPts val="0"/>
+              </a:spcAft>
+            </a:defPPr>
+            <a:lvl1pPr marL="457200" marR="0" lvl="0" indent="-355600" algn="l" rtl="0">
+              <a:lnSpc>
+                <a:spcPct val="90000"/>
+              </a:lnSpc>
+              <a:spcBef>
+                <a:spcPts val="1000"/>
+              </a:spcBef>
+              <a:spcAft>
+                <a:spcPts val="0"/>
+              </a:spcAft>
+              <a:buClr>
+                <a:schemeClr val="lt2"/>
+              </a:buClr>
+              <a:buSzPts val="2000"/>
+              <a:buFont typeface="Arial"/>
+              <a:buChar char="•"/>
+              <a:defRPr sz="2000" b="0" i="0" u="none" strike="noStrike" cap="none">
+                <a:solidFill>
+                  <a:schemeClr val="lt2"/>
+                </a:solidFill>
+                <a:latin typeface="Arial"/>
+                <a:ea typeface="Arial"/>
+                <a:cs typeface="Arial"/>
+                <a:sym typeface="Arial"/>
+              </a:defRPr>
+            </a:lvl1pPr>
+            <a:lvl2pPr marL="914400" marR="0" lvl="1" indent="-482600" algn="l" rtl="0">
+              <a:lnSpc>
+                <a:spcPct val="90000"/>
+              </a:lnSpc>
+              <a:spcBef>
+                <a:spcPts val="500"/>
+              </a:spcBef>
+              <a:spcAft>
+                <a:spcPts val="0"/>
+              </a:spcAft>
+              <a:buClr>
+                <a:schemeClr val="lt2"/>
+              </a:buClr>
+              <a:buSzPts val="4000"/>
+              <a:buFont typeface="Arial"/>
+              <a:buChar char="•"/>
+              <a:defRPr sz="4000" b="0" i="0" u="none" strike="noStrike" cap="none">
+                <a:solidFill>
+                  <a:schemeClr val="lt2"/>
+                </a:solidFill>
+                <a:latin typeface="Arial"/>
+                <a:ea typeface="Arial"/>
+                <a:cs typeface="Arial"/>
+                <a:sym typeface="Arial"/>
+              </a:defRPr>
+            </a:lvl2pPr>
+            <a:lvl3pPr marL="1371600" marR="0" lvl="2" indent="-482600" algn="l" rtl="0">
+              <a:lnSpc>
+                <a:spcPct val="90000"/>
+              </a:lnSpc>
+              <a:spcBef>
+                <a:spcPts val="500"/>
+              </a:spcBef>
+              <a:spcAft>
+                <a:spcPts val="0"/>
+              </a:spcAft>
+              <a:buClr>
+                <a:schemeClr val="lt2"/>
+              </a:buClr>
+              <a:buSzPts val="4000"/>
+              <a:buFont typeface="Arial"/>
+              <a:buChar char="•"/>
+              <a:defRPr sz="4000" b="0" i="0" u="none" strike="noStrike" cap="none">
+                <a:solidFill>
+                  <a:schemeClr val="lt2"/>
+                </a:solidFill>
+                <a:latin typeface="Arial"/>
+                <a:ea typeface="Arial"/>
+                <a:cs typeface="Arial"/>
+                <a:sym typeface="Arial"/>
+              </a:defRPr>
+            </a:lvl3pPr>
+            <a:lvl4pPr marL="1828800" marR="0" lvl="3" indent="-482600" algn="l" rtl="0">
+              <a:lnSpc>
+                <a:spcPct val="90000"/>
+              </a:lnSpc>
+              <a:spcBef>
+                <a:spcPts val="500"/>
+              </a:spcBef>
+              <a:spcAft>
+                <a:spcPts val="0"/>
+              </a:spcAft>
+              <a:buClr>
+                <a:schemeClr val="lt2"/>
+              </a:buClr>
+              <a:buSzPts val="4000"/>
+              <a:buFont typeface="Arial"/>
+              <a:buChar char="•"/>
+              <a:defRPr sz="4000" b="0" i="0" u="none" strike="noStrike" cap="none">
+                <a:solidFill>
+                  <a:schemeClr val="lt2"/>
+                </a:solidFill>
+                <a:latin typeface="Arial"/>
+                <a:ea typeface="Arial"/>
+                <a:cs typeface="Arial"/>
+                <a:sym typeface="Arial"/>
+              </a:defRPr>
+            </a:lvl4pPr>
+            <a:lvl5pPr marL="2286000" marR="0" lvl="4" indent="-482600" algn="l" rtl="0">
+              <a:lnSpc>
+                <a:spcPct val="90000"/>
+              </a:lnSpc>
+              <a:spcBef>
+                <a:spcPts val="500"/>
+              </a:spcBef>
+              <a:spcAft>
+                <a:spcPts val="0"/>
+              </a:spcAft>
+              <a:buClr>
+                <a:schemeClr val="lt2"/>
+              </a:buClr>
+              <a:buSzPts val="4000"/>
+              <a:buFont typeface="Arial"/>
+              <a:buChar char="•"/>
+              <a:defRPr sz="4000" b="0" i="0" u="none" strike="noStrike" cap="none">
+                <a:solidFill>
+                  <a:schemeClr val="lt2"/>
+                </a:solidFill>
+                <a:latin typeface="Arial"/>
+                <a:ea typeface="Arial"/>
+                <a:cs typeface="Arial"/>
+                <a:sym typeface="Arial"/>
+              </a:defRPr>
+            </a:lvl5pPr>
+            <a:lvl6pPr marL="2743200" marR="0" lvl="5" indent="-342900" algn="l" rtl="0">
+              <a:lnSpc>
+                <a:spcPct val="90000"/>
+              </a:lnSpc>
+              <a:spcBef>
+                <a:spcPts val="500"/>
+              </a:spcBef>
+              <a:spcAft>
+                <a:spcPts val="0"/>
+              </a:spcAft>
+              <a:buClr>
+                <a:schemeClr val="dk1"/>
+              </a:buClr>
+              <a:buSzPts val="1800"/>
+              <a:buFont typeface="Arial"/>
+              <a:buChar char="•"/>
+              <a:defRPr sz="1800" b="0" i="0" u="none" strike="noStrike" cap="none">
+                <a:solidFill>
+                  <a:srgbClr val="CFE2F3"/>
+                </a:solidFill>
+                <a:latin typeface="Arial"/>
+                <a:ea typeface="Arial"/>
+                <a:cs typeface="Arial"/>
+                <a:sym typeface="Arial"/>
+              </a:defRPr>
+            </a:lvl6pPr>
+            <a:lvl7pPr marL="3200400" marR="0" lvl="6" indent="-342900" algn="l" rtl="0">
+              <a:lnSpc>
+                <a:spcPct val="90000"/>
+              </a:lnSpc>
+              <a:spcBef>
+                <a:spcPts val="500"/>
+              </a:spcBef>
+              <a:spcAft>
+                <a:spcPts val="0"/>
+              </a:spcAft>
+              <a:buClr>
+                <a:schemeClr val="dk1"/>
+              </a:buClr>
+              <a:buSzPts val="1800"/>
+              <a:buFont typeface="Arial"/>
+              <a:buChar char="•"/>
+              <a:defRPr sz="1800" b="0" i="0" u="none" strike="noStrike" cap="none">
+                <a:solidFill>
+                  <a:srgbClr val="CFE2F3"/>
+                </a:solidFill>
+                <a:latin typeface="Arial"/>
+                <a:ea typeface="Arial"/>
+                <a:cs typeface="Arial"/>
+                <a:sym typeface="Arial"/>
+              </a:defRPr>
+            </a:lvl7pPr>
+            <a:lvl8pPr marL="3657600" marR="0" lvl="7" indent="-342900" algn="l" rtl="0">
+              <a:lnSpc>
+                <a:spcPct val="90000"/>
+              </a:lnSpc>
+              <a:spcBef>
+                <a:spcPts val="500"/>
+              </a:spcBef>
+              <a:spcAft>
+                <a:spcPts val="0"/>
+              </a:spcAft>
+              <a:buClr>
+                <a:schemeClr val="dk1"/>
+              </a:buClr>
+              <a:buSzPts val="1800"/>
+              <a:buFont typeface="Arial"/>
+              <a:buChar char="•"/>
+              <a:defRPr sz="1800" b="0" i="0" u="none" strike="noStrike" cap="none">
+                <a:solidFill>
+                  <a:srgbClr val="CFE2F3"/>
+                </a:solidFill>
+                <a:latin typeface="Arial"/>
+                <a:ea typeface="Arial"/>
+                <a:cs typeface="Arial"/>
+                <a:sym typeface="Arial"/>
+              </a:defRPr>
+            </a:lvl8pPr>
+            <a:lvl9pPr marL="4114800" marR="0" lvl="8" indent="-342900" algn="l" rtl="0">
+              <a:lnSpc>
+                <a:spcPct val="90000"/>
+              </a:lnSpc>
+              <a:spcBef>
+                <a:spcPts val="500"/>
+              </a:spcBef>
+              <a:spcAft>
+                <a:spcPts val="0"/>
+              </a:spcAft>
+              <a:buClr>
+                <a:schemeClr val="dk1"/>
+              </a:buClr>
+              <a:buSzPts val="1800"/>
+              <a:buFont typeface="Arial"/>
+              <a:buChar char="•"/>
+              <a:defRPr sz="1800" b="0" i="0" u="none" strike="noStrike" cap="none">
+                <a:solidFill>
+                  <a:srgbClr val="CFE2F3"/>
+                </a:solidFill>
+                <a:latin typeface="Arial"/>
+                <a:ea typeface="Arial"/>
+                <a:cs typeface="Arial"/>
+                <a:sym typeface="Arial"/>
+              </a:defRPr>
+            </a:lvl9pPr>
+          </a:lstStyle>
+          <a:p>
+            <a:pPr marL="0" indent="0">
+              <a:spcBef>
+                <a:spcPts val="0"/>
+              </a:spcBef>
+              <a:buFont typeface="Arial"/>
+              <a:buNone/>
+            </a:pPr>
+            <a:r>
+              <a:rPr lang="en-GB" dirty="0"/>
+              <a:t>linkedin.com/in/phila10</a:t>
+            </a:r>
           </a:p>
         </p:txBody>
       </p:sp>

</xml_diff>